<commit_message>
Add tests for sync fill and line transparency
</commit_message>
<xml_diff>
--- a/doc/test/SyncLab.pptx
+++ b/doc/test/SyncLab.pptx
@@ -8,7 +8,7 @@
     <p:sldMasterId id="2147483684" r:id="rId4"/>
   </p:sldMasterIdLst>
   <p:notesMasterIdLst>
-    <p:notesMasterId r:id="rId32"/>
+    <p:notesMasterId r:id="rId34"/>
   </p:notesMasterIdLst>
   <p:sldIdLst>
     <p:sldId id="287" r:id="rId5"/>
@@ -24,20 +24,22 @@
     <p:sldId id="367" r:id="rId15"/>
     <p:sldId id="368" r:id="rId16"/>
     <p:sldId id="369" r:id="rId17"/>
-    <p:sldId id="370" r:id="rId18"/>
-    <p:sldId id="372" r:id="rId19"/>
-    <p:sldId id="373" r:id="rId20"/>
-    <p:sldId id="374" r:id="rId21"/>
-    <p:sldId id="375" r:id="rId22"/>
-    <p:sldId id="376" r:id="rId23"/>
-    <p:sldId id="378" r:id="rId24"/>
-    <p:sldId id="379" r:id="rId25"/>
-    <p:sldId id="380" r:id="rId26"/>
-    <p:sldId id="381" r:id="rId27"/>
-    <p:sldId id="385" r:id="rId28"/>
-    <p:sldId id="383" r:id="rId29"/>
-    <p:sldId id="384" r:id="rId30"/>
-    <p:sldId id="386" r:id="rId31"/>
+    <p:sldId id="387" r:id="rId18"/>
+    <p:sldId id="370" r:id="rId19"/>
+    <p:sldId id="372" r:id="rId20"/>
+    <p:sldId id="373" r:id="rId21"/>
+    <p:sldId id="374" r:id="rId22"/>
+    <p:sldId id="375" r:id="rId23"/>
+    <p:sldId id="376" r:id="rId24"/>
+    <p:sldId id="378" r:id="rId25"/>
+    <p:sldId id="379" r:id="rId26"/>
+    <p:sldId id="380" r:id="rId27"/>
+    <p:sldId id="381" r:id="rId28"/>
+    <p:sldId id="385" r:id="rId29"/>
+    <p:sldId id="383" r:id="rId30"/>
+    <p:sldId id="384" r:id="rId31"/>
+    <p:sldId id="386" r:id="rId32"/>
+    <p:sldId id="388" r:id="rId33"/>
   </p:sldIdLst>
   <p:sldSz cx="9144000" cy="6858000" type="screen4x3"/>
   <p:notesSz cx="6858000" cy="9144000"/>
@@ -162,6 +164,7 @@
             <p14:sldId id="367"/>
             <p14:sldId id="368"/>
             <p14:sldId id="369"/>
+            <p14:sldId id="387"/>
           </p14:sldIdLst>
         </p14:section>
         <p14:section name="Sync Font" id="{279FFFCB-2F30-428D-9DE6-AC1BAD44FC05}">
@@ -184,6 +187,7 @@
             <p14:sldId id="383"/>
             <p14:sldId id="384"/>
             <p14:sldId id="386"/>
+            <p14:sldId id="388"/>
           </p14:sldIdLst>
         </p14:section>
       </p14:sectionLst>
@@ -679,8 +683,9 @@
           <a:p>
             <a:r>
               <a:rPr lang="en-US" dirty="0" smtClean="0"/>
-              <a:t>Original Shapes</a:t>
-            </a:r>
+              <a:t>Sync Transparency. You should be able to see the shape behind faintly.</a:t>
+            </a:r>
+            <a:endParaRPr lang="en-US" dirty="0"/>
           </a:p>
         </p:txBody>
       </p:sp>
@@ -701,7 +706,7 @@
           <a:p>
             <a:fld id="{0FE7C38A-472B-4221-8E00-509E1DA863EC}" type="slidenum">
               <a:rPr lang="en-US" smtClean="0"/>
-              <a:t>15</a:t>
+              <a:t>14</a:t>
             </a:fld>
             <a:endParaRPr lang="en-US"/>
           </a:p>
@@ -710,7 +715,7 @@
     </p:spTree>
     <p:extLst>
       <p:ext uri="{BB962C8B-B14F-4D97-AF65-F5344CB8AC3E}">
-        <p14:creationId xmlns:p14="http://schemas.microsoft.com/office/powerpoint/2010/main" val="1685765263"/>
+        <p14:creationId xmlns:p14="http://schemas.microsoft.com/office/powerpoint/2010/main" val="2232228806"/>
       </p:ext>
     </p:extLst>
   </p:cSld>
@@ -766,13 +771,8 @@
           <a:p>
             <a:r>
               <a:rPr lang="en-US" dirty="0" smtClean="0"/>
-              <a:t>Copy font from the above</a:t>
-            </a:r>
-            <a:r>
-              <a:rPr lang="en-US" baseline="0" dirty="0" smtClean="0"/>
-              <a:t> red shape to the blue shape</a:t>
-            </a:r>
-            <a:endParaRPr lang="en-US" dirty="0" smtClean="0"/>
+              <a:t>Original Shapes</a:t>
+            </a:r>
           </a:p>
         </p:txBody>
       </p:sp>
@@ -802,7 +802,7 @@
     </p:spTree>
     <p:extLst>
       <p:ext uri="{BB962C8B-B14F-4D97-AF65-F5344CB8AC3E}">
-        <p14:creationId xmlns:p14="http://schemas.microsoft.com/office/powerpoint/2010/main" val="3383510217"/>
+        <p14:creationId xmlns:p14="http://schemas.microsoft.com/office/powerpoint/2010/main" val="1685765263"/>
       </p:ext>
     </p:extLst>
   </p:cSld>
@@ -858,7 +858,7 @@
           <a:p>
             <a:r>
               <a:rPr lang="en-US" dirty="0" smtClean="0"/>
-              <a:t>Copy font size from the above</a:t>
+              <a:t>Copy font from the above</a:t>
             </a:r>
             <a:r>
               <a:rPr lang="en-US" baseline="0" dirty="0" smtClean="0"/>
@@ -894,7 +894,7 @@
     </p:spTree>
     <p:extLst>
       <p:ext uri="{BB962C8B-B14F-4D97-AF65-F5344CB8AC3E}">
-        <p14:creationId xmlns:p14="http://schemas.microsoft.com/office/powerpoint/2010/main" val="1262072629"/>
+        <p14:creationId xmlns:p14="http://schemas.microsoft.com/office/powerpoint/2010/main" val="3383510217"/>
       </p:ext>
     </p:extLst>
   </p:cSld>
@@ -950,12 +950,13 @@
           <a:p>
             <a:r>
               <a:rPr lang="en-US" dirty="0" smtClean="0"/>
-              <a:t>Copy font color from the above</a:t>
+              <a:t>Copy font size from the above</a:t>
             </a:r>
             <a:r>
               <a:rPr lang="en-US" baseline="0" dirty="0" smtClean="0"/>
               <a:t> red shape to the blue shape</a:t>
             </a:r>
+            <a:endParaRPr lang="en-US" dirty="0" smtClean="0"/>
           </a:p>
         </p:txBody>
       </p:sp>
@@ -985,7 +986,7 @@
     </p:spTree>
     <p:extLst>
       <p:ext uri="{BB962C8B-B14F-4D97-AF65-F5344CB8AC3E}">
-        <p14:creationId xmlns:p14="http://schemas.microsoft.com/office/powerpoint/2010/main" val="979640482"/>
+        <p14:creationId xmlns:p14="http://schemas.microsoft.com/office/powerpoint/2010/main" val="1262072629"/>
       </p:ext>
     </p:extLst>
   </p:cSld>
@@ -1041,19 +1042,12 @@
           <a:p>
             <a:r>
               <a:rPr lang="en-US" dirty="0" smtClean="0"/>
-              <a:t>Copy font style from the above</a:t>
+              <a:t>Copy font color from the above</a:t>
             </a:r>
             <a:r>
               <a:rPr lang="en-US" baseline="0" dirty="0" smtClean="0"/>
               <a:t> red shape to the blue shape</a:t>
             </a:r>
-          </a:p>
-          <a:p>
-            <a:r>
-              <a:rPr lang="en-US" baseline="0" dirty="0" smtClean="0"/>
-              <a:t>This should sync the bold style only</a:t>
-            </a:r>
-            <a:endParaRPr lang="en-US" dirty="0" smtClean="0"/>
           </a:p>
         </p:txBody>
       </p:sp>
@@ -1083,7 +1077,7 @@
     </p:spTree>
     <p:extLst>
       <p:ext uri="{BB962C8B-B14F-4D97-AF65-F5344CB8AC3E}">
-        <p14:creationId xmlns:p14="http://schemas.microsoft.com/office/powerpoint/2010/main" val="635275277"/>
+        <p14:creationId xmlns:p14="http://schemas.microsoft.com/office/powerpoint/2010/main" val="979640482"/>
       </p:ext>
     </p:extLst>
   </p:cSld>
@@ -1139,7 +1133,7 @@
           <a:p>
             <a:r>
               <a:rPr lang="en-US" dirty="0" smtClean="0"/>
-              <a:t>Copy font style from the below</a:t>
+              <a:t>Copy font style from the above</a:t>
             </a:r>
             <a:r>
               <a:rPr lang="en-US" baseline="0" dirty="0" smtClean="0"/>
@@ -1149,7 +1143,7 @@
           <a:p>
             <a:r>
               <a:rPr lang="en-US" baseline="0" dirty="0" smtClean="0"/>
-              <a:t>This should sync the bold, italic and underline style only</a:t>
+              <a:t>This should sync the bold style only</a:t>
             </a:r>
             <a:endParaRPr lang="en-US" dirty="0" smtClean="0"/>
           </a:p>
@@ -1181,7 +1175,7 @@
     </p:spTree>
     <p:extLst>
       <p:ext uri="{BB962C8B-B14F-4D97-AF65-F5344CB8AC3E}">
-        <p14:creationId xmlns:p14="http://schemas.microsoft.com/office/powerpoint/2010/main" val="2396339872"/>
+        <p14:creationId xmlns:p14="http://schemas.microsoft.com/office/powerpoint/2010/main" val="635275277"/>
       </p:ext>
     </p:extLst>
   </p:cSld>
@@ -1237,9 +1231,19 @@
           <a:p>
             <a:r>
               <a:rPr lang="en-US" dirty="0" smtClean="0"/>
-              <a:t>Original Shapes</a:t>
-            </a:r>
-            <a:endParaRPr lang="en-US" dirty="0"/>
+              <a:t>Copy font style from the below</a:t>
+            </a:r>
+            <a:r>
+              <a:rPr lang="en-US" baseline="0" dirty="0" smtClean="0"/>
+              <a:t> red shape to the blue shape</a:t>
+            </a:r>
+          </a:p>
+          <a:p>
+            <a:r>
+              <a:rPr lang="en-US" baseline="0" dirty="0" smtClean="0"/>
+              <a:t>This should sync the bold, italic and underline style only</a:t>
+            </a:r>
+            <a:endParaRPr lang="en-US" dirty="0" smtClean="0"/>
           </a:p>
         </p:txBody>
       </p:sp>
@@ -1260,7 +1264,7 @@
           <a:p>
             <a:fld id="{0FE7C38A-472B-4221-8E00-509E1DA863EC}" type="slidenum">
               <a:rPr lang="en-US" smtClean="0"/>
-              <a:t>22</a:t>
+              <a:t>21</a:t>
             </a:fld>
             <a:endParaRPr lang="en-US"/>
           </a:p>
@@ -1269,7 +1273,7 @@
     </p:spTree>
     <p:extLst>
       <p:ext uri="{BB962C8B-B14F-4D97-AF65-F5344CB8AC3E}">
-        <p14:creationId xmlns:p14="http://schemas.microsoft.com/office/powerpoint/2010/main" val="1736089629"/>
+        <p14:creationId xmlns:p14="http://schemas.microsoft.com/office/powerpoint/2010/main" val="2396339872"/>
       </p:ext>
     </p:extLst>
   </p:cSld>
@@ -1325,21 +1329,9 @@
           <a:p>
             <a:r>
               <a:rPr lang="en-US" dirty="0" smtClean="0"/>
-              <a:t>Copy</a:t>
-            </a:r>
-            <a:r>
-              <a:rPr lang="en-US" baseline="0" dirty="0" smtClean="0"/>
-              <a:t> line color</a:t>
-            </a:r>
-            <a:r>
-              <a:rPr lang="en-US" dirty="0" smtClean="0"/>
-              <a:t> from the</a:t>
-            </a:r>
-            <a:r>
-              <a:rPr lang="en-US" baseline="0" dirty="0" smtClean="0"/>
-              <a:t> red line to the horizontal straight line</a:t>
-            </a:r>
-            <a:endParaRPr lang="en-US" dirty="0" smtClean="0"/>
+              <a:t>Original Shapes</a:t>
+            </a:r>
+            <a:endParaRPr lang="en-US" dirty="0"/>
           </a:p>
         </p:txBody>
       </p:sp>
@@ -1369,7 +1361,7 @@
     </p:spTree>
     <p:extLst>
       <p:ext uri="{BB962C8B-B14F-4D97-AF65-F5344CB8AC3E}">
-        <p14:creationId xmlns:p14="http://schemas.microsoft.com/office/powerpoint/2010/main" val="2738705966"/>
+        <p14:creationId xmlns:p14="http://schemas.microsoft.com/office/powerpoint/2010/main" val="1736089629"/>
       </p:ext>
     </p:extLst>
   </p:cSld>
@@ -1429,7 +1421,7 @@
             </a:r>
             <a:r>
               <a:rPr lang="en-US" baseline="0" dirty="0" smtClean="0"/>
-              <a:t> line width</a:t>
+              <a:t> line color</a:t>
             </a:r>
             <a:r>
               <a:rPr lang="en-US" dirty="0" smtClean="0"/>
@@ -1437,7 +1429,7 @@
             </a:r>
             <a:r>
               <a:rPr lang="en-US" baseline="0" dirty="0" smtClean="0"/>
-              <a:t> red line to the arrow</a:t>
+              <a:t> red line to the horizontal straight line</a:t>
             </a:r>
             <a:endParaRPr lang="en-US" dirty="0" smtClean="0"/>
           </a:p>
@@ -1469,7 +1461,7 @@
     </p:spTree>
     <p:extLst>
       <p:ext uri="{BB962C8B-B14F-4D97-AF65-F5344CB8AC3E}">
-        <p14:creationId xmlns:p14="http://schemas.microsoft.com/office/powerpoint/2010/main" val="3671241295"/>
+        <p14:creationId xmlns:p14="http://schemas.microsoft.com/office/powerpoint/2010/main" val="2738705966"/>
       </p:ext>
     </p:extLst>
   </p:cSld>
@@ -1529,15 +1521,15 @@
             </a:r>
             <a:r>
               <a:rPr lang="en-US" baseline="0" dirty="0" smtClean="0"/>
-              <a:t> compound type </a:t>
+              <a:t> line width</a:t>
             </a:r>
             <a:r>
               <a:rPr lang="en-US" dirty="0" smtClean="0"/>
-              <a:t>from the</a:t>
+              <a:t> from the</a:t>
             </a:r>
             <a:r>
               <a:rPr lang="en-US" baseline="0" dirty="0" smtClean="0"/>
-              <a:t> red line to the horizontal straight line</a:t>
+              <a:t> red line to the arrow</a:t>
             </a:r>
             <a:endParaRPr lang="en-US" dirty="0" smtClean="0"/>
           </a:p>
@@ -1569,7 +1561,7 @@
     </p:spTree>
     <p:extLst>
       <p:ext uri="{BB962C8B-B14F-4D97-AF65-F5344CB8AC3E}">
-        <p14:creationId xmlns:p14="http://schemas.microsoft.com/office/powerpoint/2010/main" val="2751340805"/>
+        <p14:creationId xmlns:p14="http://schemas.microsoft.com/office/powerpoint/2010/main" val="3671241295"/>
       </p:ext>
     </p:extLst>
   </p:cSld>
@@ -1721,7 +1713,7 @@
             </a:r>
             <a:r>
               <a:rPr lang="en-US" baseline="0" dirty="0" smtClean="0"/>
-              <a:t> dash type </a:t>
+              <a:t> compound type </a:t>
             </a:r>
             <a:r>
               <a:rPr lang="en-US" dirty="0" smtClean="0"/>
@@ -1761,7 +1753,7 @@
     </p:spTree>
     <p:extLst>
       <p:ext uri="{BB962C8B-B14F-4D97-AF65-F5344CB8AC3E}">
-        <p14:creationId xmlns:p14="http://schemas.microsoft.com/office/powerpoint/2010/main" val="280532680"/>
+        <p14:creationId xmlns:p14="http://schemas.microsoft.com/office/powerpoint/2010/main" val="2751340805"/>
       </p:ext>
     </p:extLst>
   </p:cSld>
@@ -1817,9 +1809,21 @@
           <a:p>
             <a:r>
               <a:rPr lang="en-US" dirty="0" smtClean="0"/>
-              <a:t>Original Shapes</a:t>
-            </a:r>
-            <a:endParaRPr lang="en-US" dirty="0"/>
+              <a:t>Copy</a:t>
+            </a:r>
+            <a:r>
+              <a:rPr lang="en-US" baseline="0" dirty="0" smtClean="0"/>
+              <a:t> dash type </a:t>
+            </a:r>
+            <a:r>
+              <a:rPr lang="en-US" dirty="0" smtClean="0"/>
+              <a:t>from the</a:t>
+            </a:r>
+            <a:r>
+              <a:rPr lang="en-US" baseline="0" dirty="0" smtClean="0"/>
+              <a:t> red line to the horizontal straight line</a:t>
+            </a:r>
+            <a:endParaRPr lang="en-US" dirty="0" smtClean="0"/>
           </a:p>
         </p:txBody>
       </p:sp>
@@ -1849,7 +1853,207 @@
     </p:spTree>
     <p:extLst>
       <p:ext uri="{BB962C8B-B14F-4D97-AF65-F5344CB8AC3E}">
+        <p14:creationId xmlns:p14="http://schemas.microsoft.com/office/powerpoint/2010/main" val="280532680"/>
+      </p:ext>
+    </p:extLst>
+  </p:cSld>
+  <p:clrMapOvr>
+    <a:masterClrMapping/>
+  </p:clrMapOvr>
+</p:notes>
+</file>
+
+<file path=ppt/notesSlides/notesSlide22.xml><?xml version="1.0" encoding="utf-8"?>
+<p:notes xmlns:a="http://schemas.openxmlformats.org/drawingml/2006/main" xmlns:r="http://schemas.openxmlformats.org/officeDocument/2006/relationships" xmlns:p="http://schemas.openxmlformats.org/presentationml/2006/main">
+  <p:cSld>
+    <p:spTree>
+      <p:nvGrpSpPr>
+        <p:cNvPr id="1" name=""/>
+        <p:cNvGrpSpPr/>
+        <p:nvPr/>
+      </p:nvGrpSpPr>
+      <p:grpSpPr>
+        <a:xfrm>
+          <a:off x="0" y="0"/>
+          <a:ext cx="0" cy="0"/>
+          <a:chOff x="0" y="0"/>
+          <a:chExt cx="0" cy="0"/>
+        </a:xfrm>
+      </p:grpSpPr>
+      <p:sp>
+        <p:nvSpPr>
+          <p:cNvPr id="2" name="Slide Image Placeholder 1"/>
+          <p:cNvSpPr>
+            <a:spLocks noGrp="1" noRot="1" noChangeAspect="1"/>
+          </p:cNvSpPr>
+          <p:nvPr>
+            <p:ph type="sldImg"/>
+          </p:nvPr>
+        </p:nvSpPr>
+        <p:spPr/>
+      </p:sp>
+      <p:sp>
+        <p:nvSpPr>
+          <p:cNvPr id="3" name="Notes Placeholder 2"/>
+          <p:cNvSpPr>
+            <a:spLocks noGrp="1"/>
+          </p:cNvSpPr>
+          <p:nvPr>
+            <p:ph type="body" idx="1"/>
+          </p:nvPr>
+        </p:nvSpPr>
+        <p:spPr/>
+        <p:txBody>
+          <a:bodyPr/>
+          <a:lstStyle/>
+          <a:p>
+            <a:r>
+              <a:rPr lang="en-US" dirty="0" smtClean="0"/>
+              <a:t>Copy</a:t>
+            </a:r>
+            <a:r>
+              <a:rPr lang="en-US" baseline="0" dirty="0" smtClean="0"/>
+              <a:t> arrow </a:t>
+            </a:r>
+            <a:r>
+              <a:rPr lang="en-US" dirty="0" smtClean="0"/>
+              <a:t>from the</a:t>
+            </a:r>
+            <a:r>
+              <a:rPr lang="en-US" baseline="0" dirty="0" smtClean="0"/>
+              <a:t> red line to the horizontal straight line</a:t>
+            </a:r>
+            <a:endParaRPr lang="en-US" dirty="0" smtClean="0"/>
+          </a:p>
+        </p:txBody>
+      </p:sp>
+      <p:sp>
+        <p:nvSpPr>
+          <p:cNvPr id="4" name="Slide Number Placeholder 3"/>
+          <p:cNvSpPr>
+            <a:spLocks noGrp="1"/>
+          </p:cNvSpPr>
+          <p:nvPr>
+            <p:ph type="sldNum" sz="quarter" idx="10"/>
+          </p:nvPr>
+        </p:nvSpPr>
+        <p:spPr/>
+        <p:txBody>
+          <a:bodyPr/>
+          <a:lstStyle/>
+          <a:p>
+            <a:fld id="{0FE7C38A-472B-4221-8E00-509E1DA863EC}" type="slidenum">
+              <a:rPr lang="en-US" smtClean="0"/>
+              <a:t>28</a:t>
+            </a:fld>
+            <a:endParaRPr lang="en-US"/>
+          </a:p>
+        </p:txBody>
+      </p:sp>
+    </p:spTree>
+    <p:extLst>
+      <p:ext uri="{BB962C8B-B14F-4D97-AF65-F5344CB8AC3E}">
         <p14:creationId xmlns:p14="http://schemas.microsoft.com/office/powerpoint/2010/main" val="2304815935"/>
+      </p:ext>
+    </p:extLst>
+  </p:cSld>
+  <p:clrMapOvr>
+    <a:masterClrMapping/>
+  </p:clrMapOvr>
+</p:notes>
+</file>
+
+<file path=ppt/notesSlides/notesSlide23.xml><?xml version="1.0" encoding="utf-8"?>
+<p:notes xmlns:a="http://schemas.openxmlformats.org/drawingml/2006/main" xmlns:r="http://schemas.openxmlformats.org/officeDocument/2006/relationships" xmlns:p="http://schemas.openxmlformats.org/presentationml/2006/main">
+  <p:cSld>
+    <p:spTree>
+      <p:nvGrpSpPr>
+        <p:cNvPr id="1" name=""/>
+        <p:cNvGrpSpPr/>
+        <p:nvPr/>
+      </p:nvGrpSpPr>
+      <p:grpSpPr>
+        <a:xfrm>
+          <a:off x="0" y="0"/>
+          <a:ext cx="0" cy="0"/>
+          <a:chOff x="0" y="0"/>
+          <a:chExt cx="0" cy="0"/>
+        </a:xfrm>
+      </p:grpSpPr>
+      <p:sp>
+        <p:nvSpPr>
+          <p:cNvPr id="2" name="Slide Image Placeholder 1"/>
+          <p:cNvSpPr>
+            <a:spLocks noGrp="1" noRot="1" noChangeAspect="1"/>
+          </p:cNvSpPr>
+          <p:nvPr>
+            <p:ph type="sldImg"/>
+          </p:nvPr>
+        </p:nvSpPr>
+        <p:spPr/>
+      </p:sp>
+      <p:sp>
+        <p:nvSpPr>
+          <p:cNvPr id="3" name="Notes Placeholder 2"/>
+          <p:cNvSpPr>
+            <a:spLocks noGrp="1"/>
+          </p:cNvSpPr>
+          <p:nvPr>
+            <p:ph type="body" idx="1"/>
+          </p:nvPr>
+        </p:nvSpPr>
+        <p:spPr/>
+        <p:txBody>
+          <a:bodyPr/>
+          <a:lstStyle/>
+          <a:p>
+            <a:r>
+              <a:rPr lang="en-US" dirty="0" smtClean="0"/>
+              <a:t>Copy</a:t>
+            </a:r>
+            <a:r>
+              <a:rPr lang="en-US" baseline="0" dirty="0" smtClean="0"/>
+              <a:t> line transparency </a:t>
+            </a:r>
+            <a:r>
+              <a:rPr lang="en-US" dirty="0" smtClean="0"/>
+              <a:t>from the</a:t>
+            </a:r>
+            <a:r>
+              <a:rPr lang="en-US" baseline="0" dirty="0" smtClean="0"/>
+              <a:t> red line to the arrow</a:t>
+            </a:r>
+            <a:endParaRPr lang="en-US" dirty="0" smtClean="0"/>
+          </a:p>
+        </p:txBody>
+      </p:sp>
+      <p:sp>
+        <p:nvSpPr>
+          <p:cNvPr id="4" name="Slide Number Placeholder 3"/>
+          <p:cNvSpPr>
+            <a:spLocks noGrp="1"/>
+          </p:cNvSpPr>
+          <p:nvPr>
+            <p:ph type="sldNum" sz="quarter" idx="10"/>
+          </p:nvPr>
+        </p:nvSpPr>
+        <p:spPr/>
+        <p:txBody>
+          <a:bodyPr/>
+          <a:lstStyle/>
+          <a:p>
+            <a:fld id="{0FE7C38A-472B-4221-8E00-509E1DA863EC}" type="slidenum">
+              <a:rPr lang="en-US" smtClean="0"/>
+              <a:t>29</a:t>
+            </a:fld>
+            <a:endParaRPr lang="en-US"/>
+          </a:p>
+        </p:txBody>
+      </p:sp>
+    </p:spTree>
+    <p:extLst>
+      <p:ext uri="{BB962C8B-B14F-4D97-AF65-F5344CB8AC3E}">
+        <p14:creationId xmlns:p14="http://schemas.microsoft.com/office/powerpoint/2010/main" val="1897444609"/>
       </p:ext>
     </p:extLst>
   </p:cSld>
@@ -2185,7 +2389,15 @@
           <a:p>
             <a:r>
               <a:rPr lang="en-US" dirty="0" smtClean="0"/>
-              <a:t>Original Shapes</a:t>
+              <a:t>Original </a:t>
+            </a:r>
+            <a:r>
+              <a:rPr lang="en-US" dirty="0" smtClean="0"/>
+              <a:t>Shapes. There is a shape behind the</a:t>
+            </a:r>
+            <a:r>
+              <a:rPr lang="en-US" baseline="0" dirty="0" smtClean="0"/>
+              <a:t> large blue, to check for transparency and no fill</a:t>
             </a:r>
             <a:endParaRPr lang="en-US" dirty="0"/>
           </a:p>
@@ -2453,11 +2665,7 @@
             </a:r>
             <a:r>
               <a:rPr lang="en-US" baseline="0" dirty="0" smtClean="0"/>
-              <a:t> Fill. To determine the difference between background fill and no fill, we have an object behind. If you can see the object, that means that the </a:t>
-            </a:r>
-            <a:r>
-              <a:rPr lang="en-US" baseline="0" smtClean="0"/>
-              <a:t>same is using no fill.</a:t>
+              <a:t> Fill. To determine the difference between background fill and no fill, we have an object behind. If you can see the object, that means that the same is using no fill.</a:t>
             </a:r>
             <a:endParaRPr lang="en-US" dirty="0"/>
           </a:p>
@@ -8599,7 +8807,7 @@
           <a:bodyPr/>
           <a:lstStyle/>
           <a:p>
-            <a:fld id="{139E1460-E900-4A35-A714-A7F71933AED7}" type="datetimeFigureOut">
+            <a:fld id="{3A7DD4BF-EC1E-4755-8C71-0061F4F36BE2}" type="datetimeFigureOut">
               <a:rPr lang="en-US" smtClean="0"/>
               <a:t>3/28/2017</a:t>
             </a:fld>
@@ -8641,7 +8849,7 @@
           <a:bodyPr/>
           <a:lstStyle/>
           <a:p>
-            <a:fld id="{329FF5F6-E7D4-4065-A48D-9876AFF239DB}" type="slidenum">
+            <a:fld id="{8E20C79B-4D7F-4DD1-AFD0-94579907042E}" type="slidenum">
               <a:rPr lang="en-US" smtClean="0"/>
               <a:t>‹#›</a:t>
             </a:fld>
@@ -8649,9 +8857,68 @@
           </a:p>
         </p:txBody>
       </p:sp>
+      <p:sp>
+        <p:nvSpPr>
+          <p:cNvPr id="12" name="SolidShape"/>
+          <p:cNvSpPr/>
+          <p:nvPr userDrawn="1"/>
+        </p:nvSpPr>
+        <p:spPr>
+          <a:xfrm>
+            <a:off x="533400" y="2057400"/>
+            <a:ext cx="1828800" cy="1219200"/>
+          </a:xfrm>
+          <a:prstGeom prst="rect">
+            <a:avLst/>
+          </a:prstGeom>
+          <a:solidFill>
+            <a:srgbClr val="FF0000">
+              <a:alpha val="79000"/>
+            </a:srgbClr>
+          </a:solidFill>
+          <a:ln w="25400" cap="flat" cmpd="sng" algn="ctr">
+            <a:solidFill>
+              <a:schemeClr val="accent1"/>
+            </a:solidFill>
+            <a:prstDash val="solid"/>
+            <a:round/>
+            <a:headEnd type="none" w="med" len="med"/>
+            <a:tailEnd type="none" w="med" len="med"/>
+          </a:ln>
+        </p:spPr>
+        <p:style>
+          <a:lnRef idx="2">
+            <a:schemeClr val="accent1">
+              <a:shade val="50000"/>
+            </a:schemeClr>
+          </a:lnRef>
+          <a:fillRef idx="1">
+            <a:schemeClr val="accent1"/>
+          </a:fillRef>
+          <a:effectRef idx="0">
+            <a:schemeClr val="accent1"/>
+          </a:effectRef>
+          <a:fontRef idx="minor">
+            <a:schemeClr val="lt1"/>
+          </a:fontRef>
+        </p:style>
+        <p:txBody>
+          <a:bodyPr rtlCol="0" anchor="ctr"/>
+          <a:lstStyle/>
+          <a:p>
+            <a:pPr algn="ctr"/>
+            <a:endParaRPr lang="en-US">
+              <a:solidFill>
+                <a:srgbClr val="FFFFFF"/>
+              </a:solidFill>
+              <a:latin typeface="Calibri" panose="020F0502020204030204" pitchFamily="34" charset="0"/>
+            </a:endParaRPr>
+          </a:p>
+        </p:txBody>
+      </p:sp>
       <p:cxnSp>
         <p:nvCxnSpPr>
-          <p:cNvPr id="17" name="CopyFrom"/>
+          <p:cNvPr id="18" name="CopyFrom"/>
           <p:cNvCxnSpPr/>
           <p:nvPr userDrawn="1"/>
         </p:nvCxnSpPr>
@@ -8665,7 +8932,9 @@
           </a:prstGeom>
           <a:ln w="254000" cap="flat" cmpd="dbl" algn="ctr">
             <a:solidFill>
-              <a:srgbClr val="FF0000"/>
+              <a:srgbClr val="FF0000">
+                <a:alpha val="88000"/>
+              </a:srgbClr>
             </a:solidFill>
             <a:prstDash val="dash"/>
             <a:round/>
@@ -8691,7 +8960,7 @@
     </p:spTree>
     <p:extLst>
       <p:ext uri="{BB962C8B-B14F-4D97-AF65-F5344CB8AC3E}">
-        <p14:creationId xmlns:p14="http://schemas.microsoft.com/office/powerpoint/2010/main" val="878557308"/>
+        <p14:creationId xmlns:p14="http://schemas.microsoft.com/office/powerpoint/2010/main" val="3969651679"/>
       </p:ext>
     </p:extLst>
   </p:cSld>
@@ -8808,7 +9077,7 @@
           <a:bodyPr/>
           <a:lstStyle/>
           <a:p>
-            <a:fld id="{139E1460-E900-4A35-A714-A7F71933AED7}" type="datetimeFigureOut">
+            <a:fld id="{3A7DD4BF-EC1E-4755-8C71-0061F4F36BE2}" type="datetimeFigureOut">
               <a:rPr lang="en-US" smtClean="0"/>
               <a:t>3/28/2017</a:t>
             </a:fld>
@@ -8850,7 +9119,7 @@
           <a:bodyPr/>
           <a:lstStyle/>
           <a:p>
-            <a:fld id="{329FF5F6-E7D4-4065-A48D-9876AFF239DB}" type="slidenum">
+            <a:fld id="{8E20C79B-4D7F-4DD1-AFD0-94579907042E}" type="slidenum">
               <a:rPr lang="en-US" smtClean="0"/>
               <a:t>‹#›</a:t>
             </a:fld>
@@ -8861,7 +9130,7 @@
     </p:spTree>
     <p:extLst>
       <p:ext uri="{BB962C8B-B14F-4D97-AF65-F5344CB8AC3E}">
-        <p14:creationId xmlns:p14="http://schemas.microsoft.com/office/powerpoint/2010/main" val="389418992"/>
+        <p14:creationId xmlns:p14="http://schemas.microsoft.com/office/powerpoint/2010/main" val="68210969"/>
       </p:ext>
     </p:extLst>
   </p:cSld>
@@ -9054,7 +9323,7 @@
           <a:bodyPr/>
           <a:lstStyle/>
           <a:p>
-            <a:fld id="{139E1460-E900-4A35-A714-A7F71933AED7}" type="datetimeFigureOut">
+            <a:fld id="{3A7DD4BF-EC1E-4755-8C71-0061F4F36BE2}" type="datetimeFigureOut">
               <a:rPr lang="en-US" smtClean="0"/>
               <a:t>3/28/2017</a:t>
             </a:fld>
@@ -9096,7 +9365,7 @@
           <a:bodyPr/>
           <a:lstStyle/>
           <a:p>
-            <a:fld id="{329FF5F6-E7D4-4065-A48D-9876AFF239DB}" type="slidenum">
+            <a:fld id="{8E20C79B-4D7F-4DD1-AFD0-94579907042E}" type="slidenum">
               <a:rPr lang="en-US" smtClean="0"/>
               <a:t>‹#›</a:t>
             </a:fld>
@@ -9107,7 +9376,7 @@
     </p:spTree>
     <p:extLst>
       <p:ext uri="{BB962C8B-B14F-4D97-AF65-F5344CB8AC3E}">
-        <p14:creationId xmlns:p14="http://schemas.microsoft.com/office/powerpoint/2010/main" val="2161058735"/>
+        <p14:creationId xmlns:p14="http://schemas.microsoft.com/office/powerpoint/2010/main" val="1163109081"/>
       </p:ext>
     </p:extLst>
   </p:cSld>
@@ -9286,7 +9555,7 @@
           <a:bodyPr/>
           <a:lstStyle/>
           <a:p>
-            <a:fld id="{139E1460-E900-4A35-A714-A7F71933AED7}" type="datetimeFigureOut">
+            <a:fld id="{3A7DD4BF-EC1E-4755-8C71-0061F4F36BE2}" type="datetimeFigureOut">
               <a:rPr lang="en-US" smtClean="0"/>
               <a:t>3/28/2017</a:t>
             </a:fld>
@@ -9328,7 +9597,7 @@
           <a:bodyPr/>
           <a:lstStyle/>
           <a:p>
-            <a:fld id="{329FF5F6-E7D4-4065-A48D-9876AFF239DB}" type="slidenum">
+            <a:fld id="{8E20C79B-4D7F-4DD1-AFD0-94579907042E}" type="slidenum">
               <a:rPr lang="en-US" smtClean="0"/>
               <a:t>‹#›</a:t>
             </a:fld>
@@ -9339,7 +9608,7 @@
     </p:spTree>
     <p:extLst>
       <p:ext uri="{BB962C8B-B14F-4D97-AF65-F5344CB8AC3E}">
-        <p14:creationId xmlns:p14="http://schemas.microsoft.com/office/powerpoint/2010/main" val="2333855264"/>
+        <p14:creationId xmlns:p14="http://schemas.microsoft.com/office/powerpoint/2010/main" val="3630497716"/>
       </p:ext>
     </p:extLst>
   </p:cSld>
@@ -9653,7 +9922,7 @@
           <a:bodyPr/>
           <a:lstStyle/>
           <a:p>
-            <a:fld id="{139E1460-E900-4A35-A714-A7F71933AED7}" type="datetimeFigureOut">
+            <a:fld id="{3A7DD4BF-EC1E-4755-8C71-0061F4F36BE2}" type="datetimeFigureOut">
               <a:rPr lang="en-US" smtClean="0"/>
               <a:t>3/28/2017</a:t>
             </a:fld>
@@ -9695,7 +9964,7 @@
           <a:bodyPr/>
           <a:lstStyle/>
           <a:p>
-            <a:fld id="{329FF5F6-E7D4-4065-A48D-9876AFF239DB}" type="slidenum">
+            <a:fld id="{8E20C79B-4D7F-4DD1-AFD0-94579907042E}" type="slidenum">
               <a:rPr lang="en-US" smtClean="0"/>
               <a:t>‹#›</a:t>
             </a:fld>
@@ -9706,7 +9975,7 @@
     </p:spTree>
     <p:extLst>
       <p:ext uri="{BB962C8B-B14F-4D97-AF65-F5344CB8AC3E}">
-        <p14:creationId xmlns:p14="http://schemas.microsoft.com/office/powerpoint/2010/main" val="2436370402"/>
+        <p14:creationId xmlns:p14="http://schemas.microsoft.com/office/powerpoint/2010/main" val="1957304392"/>
       </p:ext>
     </p:extLst>
   </p:cSld>
@@ -9771,7 +10040,7 @@
           <a:bodyPr/>
           <a:lstStyle/>
           <a:p>
-            <a:fld id="{139E1460-E900-4A35-A714-A7F71933AED7}" type="datetimeFigureOut">
+            <a:fld id="{3A7DD4BF-EC1E-4755-8C71-0061F4F36BE2}" type="datetimeFigureOut">
               <a:rPr lang="en-US" smtClean="0"/>
               <a:t>3/28/2017</a:t>
             </a:fld>
@@ -9813,7 +10082,7 @@
           <a:bodyPr/>
           <a:lstStyle/>
           <a:p>
-            <a:fld id="{329FF5F6-E7D4-4065-A48D-9876AFF239DB}" type="slidenum">
+            <a:fld id="{8E20C79B-4D7F-4DD1-AFD0-94579907042E}" type="slidenum">
               <a:rPr lang="en-US" smtClean="0"/>
               <a:t>‹#›</a:t>
             </a:fld>
@@ -9824,7 +10093,7 @@
     </p:spTree>
     <p:extLst>
       <p:ext uri="{BB962C8B-B14F-4D97-AF65-F5344CB8AC3E}">
-        <p14:creationId xmlns:p14="http://schemas.microsoft.com/office/powerpoint/2010/main" val="175198537"/>
+        <p14:creationId xmlns:p14="http://schemas.microsoft.com/office/powerpoint/2010/main" val="858583760"/>
       </p:ext>
     </p:extLst>
   </p:cSld>
@@ -10151,7 +10420,7 @@
           <a:bodyPr/>
           <a:lstStyle/>
           <a:p>
-            <a:fld id="{139E1460-E900-4A35-A714-A7F71933AED7}" type="datetimeFigureOut">
+            <a:fld id="{3A7DD4BF-EC1E-4755-8C71-0061F4F36BE2}" type="datetimeFigureOut">
               <a:rPr lang="en-US" smtClean="0"/>
               <a:t>3/28/2017</a:t>
             </a:fld>
@@ -10193,7 +10462,7 @@
           <a:bodyPr/>
           <a:lstStyle/>
           <a:p>
-            <a:fld id="{329FF5F6-E7D4-4065-A48D-9876AFF239DB}" type="slidenum">
+            <a:fld id="{8E20C79B-4D7F-4DD1-AFD0-94579907042E}" type="slidenum">
               <a:rPr lang="en-US" smtClean="0"/>
               <a:t>‹#›</a:t>
             </a:fld>
@@ -10204,7 +10473,7 @@
     </p:spTree>
     <p:extLst>
       <p:ext uri="{BB962C8B-B14F-4D97-AF65-F5344CB8AC3E}">
-        <p14:creationId xmlns:p14="http://schemas.microsoft.com/office/powerpoint/2010/main" val="1900716336"/>
+        <p14:creationId xmlns:p14="http://schemas.microsoft.com/office/powerpoint/2010/main" val="778013818"/>
       </p:ext>
     </p:extLst>
   </p:cSld>
@@ -10428,7 +10697,7 @@
           <a:bodyPr/>
           <a:lstStyle/>
           <a:p>
-            <a:fld id="{139E1460-E900-4A35-A714-A7F71933AED7}" type="datetimeFigureOut">
+            <a:fld id="{3A7DD4BF-EC1E-4755-8C71-0061F4F36BE2}" type="datetimeFigureOut">
               <a:rPr lang="en-US" smtClean="0"/>
               <a:t>3/28/2017</a:t>
             </a:fld>
@@ -10470,7 +10739,7 @@
           <a:bodyPr/>
           <a:lstStyle/>
           <a:p>
-            <a:fld id="{329FF5F6-E7D4-4065-A48D-9876AFF239DB}" type="slidenum">
+            <a:fld id="{8E20C79B-4D7F-4DD1-AFD0-94579907042E}" type="slidenum">
               <a:rPr lang="en-US" smtClean="0"/>
               <a:t>‹#›</a:t>
             </a:fld>
@@ -10481,7 +10750,7 @@
     </p:spTree>
     <p:extLst>
       <p:ext uri="{BB962C8B-B14F-4D97-AF65-F5344CB8AC3E}">
-        <p14:creationId xmlns:p14="http://schemas.microsoft.com/office/powerpoint/2010/main" val="872199539"/>
+        <p14:creationId xmlns:p14="http://schemas.microsoft.com/office/powerpoint/2010/main" val="2133603435"/>
       </p:ext>
     </p:extLst>
   </p:cSld>
@@ -10681,7 +10950,7 @@
           <a:bodyPr/>
           <a:lstStyle/>
           <a:p>
-            <a:fld id="{139E1460-E900-4A35-A714-A7F71933AED7}" type="datetimeFigureOut">
+            <a:fld id="{3A7DD4BF-EC1E-4755-8C71-0061F4F36BE2}" type="datetimeFigureOut">
               <a:rPr lang="en-US" smtClean="0"/>
               <a:t>3/28/2017</a:t>
             </a:fld>
@@ -10723,7 +10992,7 @@
           <a:bodyPr/>
           <a:lstStyle/>
           <a:p>
-            <a:fld id="{329FF5F6-E7D4-4065-A48D-9876AFF239DB}" type="slidenum">
+            <a:fld id="{8E20C79B-4D7F-4DD1-AFD0-94579907042E}" type="slidenum">
               <a:rPr lang="en-US" smtClean="0"/>
               <a:t>‹#›</a:t>
             </a:fld>
@@ -10734,7 +11003,7 @@
     </p:spTree>
     <p:extLst>
       <p:ext uri="{BB962C8B-B14F-4D97-AF65-F5344CB8AC3E}">
-        <p14:creationId xmlns:p14="http://schemas.microsoft.com/office/powerpoint/2010/main" val="22735971"/>
+        <p14:creationId xmlns:p14="http://schemas.microsoft.com/office/powerpoint/2010/main" val="1274140022"/>
       </p:ext>
     </p:extLst>
   </p:cSld>
@@ -10851,7 +11120,7 @@
           <a:bodyPr/>
           <a:lstStyle/>
           <a:p>
-            <a:fld id="{139E1460-E900-4A35-A714-A7F71933AED7}" type="datetimeFigureOut">
+            <a:fld id="{3A7DD4BF-EC1E-4755-8C71-0061F4F36BE2}" type="datetimeFigureOut">
               <a:rPr lang="en-US" smtClean="0"/>
               <a:t>3/28/2017</a:t>
             </a:fld>
@@ -10893,7 +11162,7 @@
           <a:bodyPr/>
           <a:lstStyle/>
           <a:p>
-            <a:fld id="{329FF5F6-E7D4-4065-A48D-9876AFF239DB}" type="slidenum">
+            <a:fld id="{8E20C79B-4D7F-4DD1-AFD0-94579907042E}" type="slidenum">
               <a:rPr lang="en-US" smtClean="0"/>
               <a:t>‹#›</a:t>
             </a:fld>
@@ -10904,7 +11173,7 @@
     </p:spTree>
     <p:extLst>
       <p:ext uri="{BB962C8B-B14F-4D97-AF65-F5344CB8AC3E}">
-        <p14:creationId xmlns:p14="http://schemas.microsoft.com/office/powerpoint/2010/main" val="234964556"/>
+        <p14:creationId xmlns:p14="http://schemas.microsoft.com/office/powerpoint/2010/main" val="614091368"/>
       </p:ext>
     </p:extLst>
   </p:cSld>
@@ -11031,7 +11300,7 @@
           <a:bodyPr/>
           <a:lstStyle/>
           <a:p>
-            <a:fld id="{139E1460-E900-4A35-A714-A7F71933AED7}" type="datetimeFigureOut">
+            <a:fld id="{3A7DD4BF-EC1E-4755-8C71-0061F4F36BE2}" type="datetimeFigureOut">
               <a:rPr lang="en-US" smtClean="0"/>
               <a:t>3/28/2017</a:t>
             </a:fld>
@@ -11073,7 +11342,7 @@
           <a:bodyPr/>
           <a:lstStyle/>
           <a:p>
-            <a:fld id="{329FF5F6-E7D4-4065-A48D-9876AFF239DB}" type="slidenum">
+            <a:fld id="{8E20C79B-4D7F-4DD1-AFD0-94579907042E}" type="slidenum">
               <a:rPr lang="en-US" smtClean="0"/>
               <a:t>‹#›</a:t>
             </a:fld>
@@ -11084,7 +11353,7 @@
     </p:spTree>
     <p:extLst>
       <p:ext uri="{BB962C8B-B14F-4D97-AF65-F5344CB8AC3E}">
-        <p14:creationId xmlns:p14="http://schemas.microsoft.com/office/powerpoint/2010/main" val="1307511100"/>
+        <p14:creationId xmlns:p14="http://schemas.microsoft.com/office/powerpoint/2010/main" val="3347459397"/>
       </p:ext>
     </p:extLst>
   </p:cSld>
@@ -13934,7 +14203,7 @@
             </a:lvl1pPr>
           </a:lstStyle>
           <a:p>
-            <a:fld id="{139E1460-E900-4A35-A714-A7F71933AED7}" type="datetimeFigureOut">
+            <a:fld id="{3A7DD4BF-EC1E-4755-8C71-0061F4F36BE2}" type="datetimeFigureOut">
               <a:rPr lang="en-US" smtClean="0"/>
               <a:t>3/28/2017</a:t>
             </a:fld>
@@ -14012,7 +14281,7 @@
             </a:lvl1pPr>
           </a:lstStyle>
           <a:p>
-            <a:fld id="{329FF5F6-E7D4-4065-A48D-9876AFF239DB}" type="slidenum">
+            <a:fld id="{8E20C79B-4D7F-4DD1-AFD0-94579907042E}" type="slidenum">
               <a:rPr lang="en-US" smtClean="0"/>
               <a:t>‹#›</a:t>
             </a:fld>
@@ -14023,7 +14292,7 @@
     </p:spTree>
     <p:extLst>
       <p:ext uri="{BB962C8B-B14F-4D97-AF65-F5344CB8AC3E}">
-        <p14:creationId xmlns:p14="http://schemas.microsoft.com/office/powerpoint/2010/main" val="3517586833"/>
+        <p14:creationId xmlns:p14="http://schemas.microsoft.com/office/powerpoint/2010/main" val="2017755596"/>
       </p:ext>
     </p:extLst>
   </p:cSld>
@@ -14592,8 +14861,19 @@
             <a:avLst/>
           </a:prstGeom>
           <a:solidFill>
-            <a:srgbClr val="FF0000"/>
+            <a:srgbClr val="FF0000">
+              <a:alpha val="79000"/>
+            </a:srgbClr>
           </a:solidFill>
+          <a:ln w="25400" cap="flat" cmpd="sng" algn="ctr">
+            <a:solidFill>
+              <a:schemeClr val="accent1"/>
+            </a:solidFill>
+            <a:prstDash val="solid"/>
+            <a:round/>
+            <a:headEnd type="none" w="med" len="med"/>
+            <a:tailEnd type="none" w="med" len="med"/>
+          </a:ln>
         </p:spPr>
         <p:style>
           <a:lnRef idx="2">
@@ -14616,7 +14896,12 @@
           <a:lstStyle/>
           <a:p>
             <a:pPr algn="ctr"/>
-            <a:endParaRPr lang="en-US"/>
+            <a:endParaRPr lang="en-US">
+              <a:solidFill>
+                <a:srgbClr val="FFFFFF"/>
+              </a:solidFill>
+              <a:latin typeface="Calibri" panose="020F0502020204030204" pitchFamily="34" charset="0"/>
+            </a:endParaRPr>
           </a:p>
         </p:txBody>
       </p:sp>
@@ -14851,7 +15136,9 @@
             <a:avLst/>
           </a:prstGeom>
           <a:solidFill>
-            <a:srgbClr val="FF0000"/>
+            <a:srgbClr val="FF0000">
+              <a:alpha val="79000"/>
+            </a:srgbClr>
           </a:solidFill>
         </p:spPr>
         <p:style>
@@ -15104,7 +15391,9 @@
             <a:avLst/>
           </a:prstGeom>
           <a:solidFill>
-            <a:srgbClr val="FF0000"/>
+            <a:srgbClr val="FF0000">
+              <a:alpha val="79000"/>
+            </a:srgbClr>
           </a:solidFill>
           <a:ln w="25400" cap="flat" cmpd="sng" algn="ctr">
             <a:solidFill>
@@ -15366,7 +15655,9 @@
             <a:avLst/>
           </a:prstGeom>
           <a:solidFill>
-            <a:srgbClr val="FF0000"/>
+            <a:srgbClr val="FF0000">
+              <a:alpha val="79000"/>
+            </a:srgbClr>
           </a:solidFill>
         </p:spPr>
         <p:style>
@@ -15523,6 +15814,272 @@
       </p:grpSpPr>
       <p:sp>
         <p:nvSpPr>
+          <p:cNvPr id="7" name="Rectangle 1"/>
+          <p:cNvSpPr/>
+          <p:nvPr/>
+        </p:nvSpPr>
+        <p:spPr>
+          <a:xfrm>
+            <a:off x="4686300" y="1143000"/>
+            <a:ext cx="2971800" cy="3200400"/>
+          </a:xfrm>
+          <a:prstGeom prst="rect">
+            <a:avLst/>
+          </a:prstGeom>
+        </p:spPr>
+        <p:style>
+          <a:lnRef idx="2">
+            <a:schemeClr val="accent1">
+              <a:shade val="50000"/>
+            </a:schemeClr>
+          </a:lnRef>
+          <a:fillRef idx="1">
+            <a:schemeClr val="accent1"/>
+          </a:fillRef>
+          <a:effectRef idx="0">
+            <a:schemeClr val="accent1"/>
+          </a:effectRef>
+          <a:fontRef idx="minor">
+            <a:schemeClr val="lt1"/>
+          </a:fontRef>
+        </p:style>
+        <p:txBody>
+          <a:bodyPr rtlCol="0" anchor="ctr"/>
+          <a:lstStyle/>
+          <a:p>
+            <a:pPr algn="ctr"/>
+            <a:r>
+              <a:rPr lang="en-US" dirty="0" smtClean="0"/>
+              <a:t>I can see through No fill</a:t>
+            </a:r>
+            <a:endParaRPr lang="en-US" dirty="0"/>
+          </a:p>
+        </p:txBody>
+      </p:sp>
+      <p:sp>
+        <p:nvSpPr>
+          <p:cNvPr id="4" name="PatternShape"/>
+          <p:cNvSpPr/>
+          <p:nvPr/>
+        </p:nvSpPr>
+        <p:spPr>
+          <a:xfrm>
+            <a:off x="533400" y="381000"/>
+            <a:ext cx="1828800" cy="1219200"/>
+          </a:xfrm>
+          <a:prstGeom prst="rect">
+            <a:avLst/>
+          </a:prstGeom>
+          <a:pattFill prst="wdDnDiag">
+            <a:fgClr>
+              <a:srgbClr val="FFFF00"/>
+            </a:fgClr>
+            <a:bgClr>
+              <a:srgbClr val="00B050"/>
+            </a:bgClr>
+          </a:pattFill>
+        </p:spPr>
+        <p:style>
+          <a:lnRef idx="2">
+            <a:schemeClr val="accent1">
+              <a:shade val="50000"/>
+            </a:schemeClr>
+          </a:lnRef>
+          <a:fillRef idx="1">
+            <a:schemeClr val="accent1"/>
+          </a:fillRef>
+          <a:effectRef idx="0">
+            <a:schemeClr val="accent1"/>
+          </a:effectRef>
+          <a:fontRef idx="minor">
+            <a:schemeClr val="lt1"/>
+          </a:fontRef>
+        </p:style>
+        <p:txBody>
+          <a:bodyPr rtlCol="0" anchor="ctr"/>
+          <a:lstStyle/>
+          <a:p>
+            <a:pPr algn="ctr"/>
+            <a:endParaRPr lang="en-US"/>
+          </a:p>
+        </p:txBody>
+      </p:sp>
+      <p:sp>
+        <p:nvSpPr>
+          <p:cNvPr id="8" name="SolidShape"/>
+          <p:cNvSpPr/>
+          <p:nvPr/>
+        </p:nvSpPr>
+        <p:spPr>
+          <a:xfrm>
+            <a:off x="533400" y="2057400"/>
+            <a:ext cx="1828800" cy="1219200"/>
+          </a:xfrm>
+          <a:prstGeom prst="rect">
+            <a:avLst/>
+          </a:prstGeom>
+          <a:solidFill>
+            <a:srgbClr val="FF0000">
+              <a:alpha val="79000"/>
+            </a:srgbClr>
+          </a:solidFill>
+          <a:ln w="25400" cap="flat" cmpd="sng" algn="ctr">
+            <a:solidFill>
+              <a:schemeClr val="accent1"/>
+            </a:solidFill>
+            <a:prstDash val="solid"/>
+            <a:round/>
+            <a:headEnd type="none" w="med" len="med"/>
+            <a:tailEnd type="none" w="med" len="med"/>
+          </a:ln>
+        </p:spPr>
+        <p:style>
+          <a:lnRef idx="2">
+            <a:schemeClr val="accent1">
+              <a:shade val="50000"/>
+            </a:schemeClr>
+          </a:lnRef>
+          <a:fillRef idx="1">
+            <a:schemeClr val="accent1"/>
+          </a:fillRef>
+          <a:effectRef idx="0">
+            <a:schemeClr val="accent1"/>
+          </a:effectRef>
+          <a:fontRef idx="minor">
+            <a:schemeClr val="lt1"/>
+          </a:fontRef>
+        </p:style>
+        <p:txBody>
+          <a:bodyPr rtlCol="0" anchor="ctr"/>
+          <a:lstStyle/>
+          <a:p>
+            <a:pPr algn="ctr"/>
+            <a:endParaRPr lang="en-US">
+              <a:solidFill>
+                <a:srgbClr val="FFFFFF"/>
+              </a:solidFill>
+              <a:latin typeface="Calibri" panose="020F0502020204030204" pitchFamily="34" charset="0"/>
+            </a:endParaRPr>
+          </a:p>
+        </p:txBody>
+      </p:sp>
+      <p:sp useBgFill="1">
+        <p:nvSpPr>
+          <p:cNvPr id="9" name="BackgroundShape"/>
+          <p:cNvSpPr/>
+          <p:nvPr/>
+        </p:nvSpPr>
+        <p:spPr>
+          <a:xfrm>
+            <a:off x="533400" y="3733800"/>
+            <a:ext cx="1828800" cy="1219200"/>
+          </a:xfrm>
+          <a:prstGeom prst="rect">
+            <a:avLst/>
+          </a:prstGeom>
+        </p:spPr>
+        <p:style>
+          <a:lnRef idx="2">
+            <a:schemeClr val="accent1">
+              <a:shade val="50000"/>
+            </a:schemeClr>
+          </a:lnRef>
+          <a:fillRef idx="1">
+            <a:schemeClr val="accent1"/>
+          </a:fillRef>
+          <a:effectRef idx="0">
+            <a:schemeClr val="accent1"/>
+          </a:effectRef>
+          <a:fontRef idx="minor">
+            <a:schemeClr val="lt1"/>
+          </a:fontRef>
+        </p:style>
+        <p:txBody>
+          <a:bodyPr rtlCol="0" anchor="ctr"/>
+          <a:lstStyle/>
+          <a:p>
+            <a:pPr algn="ctr"/>
+            <a:endParaRPr lang="en-US"/>
+          </a:p>
+        </p:txBody>
+      </p:sp>
+      <p:sp>
+        <p:nvSpPr>
+          <p:cNvPr id="6" name="Rectangle 3"/>
+          <p:cNvSpPr/>
+          <p:nvPr/>
+        </p:nvSpPr>
+        <p:spPr>
+          <a:xfrm>
+            <a:off x="3886200" y="381000"/>
+            <a:ext cx="4572000" cy="6248400"/>
+          </a:xfrm>
+          <a:prstGeom prst="rect">
+            <a:avLst/>
+          </a:prstGeom>
+          <a:solidFill>
+            <a:schemeClr val="accent1">
+              <a:alpha val="79000"/>
+            </a:schemeClr>
+          </a:solidFill>
+        </p:spPr>
+        <p:style>
+          <a:lnRef idx="2">
+            <a:schemeClr val="accent1">
+              <a:shade val="50000"/>
+            </a:schemeClr>
+          </a:lnRef>
+          <a:fillRef idx="1">
+            <a:schemeClr val="accent1"/>
+          </a:fillRef>
+          <a:effectRef idx="0">
+            <a:schemeClr val="accent1"/>
+          </a:effectRef>
+          <a:fontRef idx="minor">
+            <a:schemeClr val="lt1"/>
+          </a:fontRef>
+        </p:style>
+        <p:txBody>
+          <a:bodyPr rtlCol="0" anchor="ctr"/>
+          <a:lstStyle/>
+          <a:p>
+            <a:pPr algn="ctr"/>
+            <a:endParaRPr lang="en-US"/>
+          </a:p>
+        </p:txBody>
+      </p:sp>
+    </p:spTree>
+    <p:extLst>
+      <p:ext uri="{BB962C8B-B14F-4D97-AF65-F5344CB8AC3E}">
+        <p14:creationId xmlns:p14="http://schemas.microsoft.com/office/powerpoint/2010/main" val="3889944317"/>
+      </p:ext>
+    </p:extLst>
+  </p:cSld>
+  <p:clrMapOvr>
+    <a:masterClrMapping/>
+  </p:clrMapOvr>
+</p:sld>
+</file>
+
+<file path=ppt/slides/slide15.xml><?xml version="1.0" encoding="utf-8"?>
+<p:sld xmlns:a="http://schemas.openxmlformats.org/drawingml/2006/main" xmlns:r="http://schemas.openxmlformats.org/officeDocument/2006/relationships" xmlns:p="http://schemas.openxmlformats.org/presentationml/2006/main">
+  <p:cSld>
+    <p:spTree>
+      <p:nvGrpSpPr>
+        <p:cNvPr id="1" name=""/>
+        <p:cNvGrpSpPr/>
+        <p:nvPr/>
+      </p:nvGrpSpPr>
+      <p:grpSpPr>
+        <a:xfrm>
+          <a:off x="0" y="0"/>
+          <a:ext cx="0" cy="0"/>
+          <a:chOff x="0" y="0"/>
+          <a:chExt cx="0" cy="0"/>
+        </a:xfrm>
+      </p:grpSpPr>
+      <p:sp>
+        <p:nvSpPr>
           <p:cNvPr id="2" name="Title 1"/>
           <p:cNvSpPr>
             <a:spLocks noGrp="1"/>
@@ -15669,7 +16226,7 @@
 </p:sld>
 </file>
 
-<file path=ppt/slides/slide15.xml><?xml version="1.0" encoding="utf-8"?>
+<file path=ppt/slides/slide16.xml><?xml version="1.0" encoding="utf-8"?>
 <p:sld xmlns:a="http://schemas.openxmlformats.org/drawingml/2006/main" xmlns:r="http://schemas.openxmlformats.org/officeDocument/2006/relationships" xmlns:p="http://schemas.openxmlformats.org/presentationml/2006/main">
   <p:cSld>
     <p:spTree>
@@ -16129,7 +16686,7 @@
 </p:sld>
 </file>
 
-<file path=ppt/slides/slide16.xml><?xml version="1.0" encoding="utf-8"?>
+<file path=ppt/slides/slide17.xml><?xml version="1.0" encoding="utf-8"?>
 <p:sld xmlns:a="http://schemas.openxmlformats.org/drawingml/2006/main" xmlns:r="http://schemas.openxmlformats.org/officeDocument/2006/relationships" xmlns:p="http://schemas.openxmlformats.org/presentationml/2006/main">
   <p:cSld>
     <p:spTree>
@@ -16623,7 +17180,7 @@
 </p:sld>
 </file>
 
-<file path=ppt/slides/slide17.xml><?xml version="1.0" encoding="utf-8"?>
+<file path=ppt/slides/slide18.xml><?xml version="1.0" encoding="utf-8"?>
 <p:sld xmlns:a="http://schemas.openxmlformats.org/drawingml/2006/main" xmlns:r="http://schemas.openxmlformats.org/officeDocument/2006/relationships" xmlns:p="http://schemas.openxmlformats.org/presentationml/2006/main">
   <p:cSld>
     <p:spTree>
@@ -17083,7 +17640,7 @@
 </p:sld>
 </file>
 
-<file path=ppt/slides/slide18.xml><?xml version="1.0" encoding="utf-8"?>
+<file path=ppt/slides/slide19.xml><?xml version="1.0" encoding="utf-8"?>
 <p:sld xmlns:a="http://schemas.openxmlformats.org/drawingml/2006/main" xmlns:r="http://schemas.openxmlformats.org/officeDocument/2006/relationships" xmlns:p="http://schemas.openxmlformats.org/presentationml/2006/main">
   <p:cSld>
     <p:spTree>
@@ -17543,7 +18100,82 @@
 </p:sld>
 </file>
 
-<file path=ppt/slides/slide19.xml><?xml version="1.0" encoding="utf-8"?>
+<file path=ppt/slides/slide2.xml><?xml version="1.0" encoding="utf-8"?>
+<p:sld xmlns:a="http://schemas.openxmlformats.org/drawingml/2006/main" xmlns:r="http://schemas.openxmlformats.org/officeDocument/2006/relationships" xmlns:p="http://schemas.openxmlformats.org/presentationml/2006/main">
+  <p:cSld>
+    <p:bg>
+      <p:bgPr>
+        <a:solidFill>
+          <a:schemeClr val="accent6">
+            <a:lumMod val="75000"/>
+          </a:schemeClr>
+        </a:solidFill>
+        <a:effectLst/>
+      </p:bgPr>
+    </p:bg>
+    <p:spTree>
+      <p:nvGrpSpPr>
+        <p:cNvPr id="1" name=""/>
+        <p:cNvGrpSpPr/>
+        <p:nvPr/>
+      </p:nvGrpSpPr>
+      <p:grpSpPr>
+        <a:xfrm>
+          <a:off x="0" y="0"/>
+          <a:ext cx="0" cy="0"/>
+          <a:chOff x="0" y="0"/>
+          <a:chExt cx="0" cy="0"/>
+        </a:xfrm>
+      </p:grpSpPr>
+      <p:sp>
+        <p:nvSpPr>
+          <p:cNvPr id="2" name="Title 1"/>
+          <p:cNvSpPr>
+            <a:spLocks noGrp="1"/>
+          </p:cNvSpPr>
+          <p:nvPr>
+            <p:ph type="title"/>
+          </p:nvPr>
+        </p:nvSpPr>
+        <p:spPr>
+          <a:xfrm>
+            <a:off x="381000" y="609600"/>
+            <a:ext cx="8229600" cy="1143000"/>
+          </a:xfrm>
+        </p:spPr>
+        <p:txBody>
+          <a:bodyPr>
+            <a:noAutofit/>
+          </a:bodyPr>
+          <a:lstStyle/>
+          <a:p>
+            <a:pPr algn="l"/>
+            <a:r>
+              <a:rPr lang="en-US" sz="7200" dirty="0" smtClean="0"/>
+              <a:t>Sync Lab</a:t>
+            </a:r>
+            <a:endParaRPr lang="en-SG" sz="7200" dirty="0">
+              <a:solidFill>
+                <a:schemeClr val="bg1"/>
+              </a:solidFill>
+            </a:endParaRPr>
+          </a:p>
+        </p:txBody>
+      </p:sp>
+    </p:spTree>
+    <p:extLst>
+      <p:ext uri="{BB962C8B-B14F-4D97-AF65-F5344CB8AC3E}">
+        <p14:creationId xmlns:p14="http://schemas.microsoft.com/office/powerpoint/2010/main" val="1569131388"/>
+      </p:ext>
+    </p:extLst>
+  </p:cSld>
+  <p:clrMapOvr>
+    <a:masterClrMapping/>
+  </p:clrMapOvr>
+</p:sld>
+</file>
+
+<file path=ppt/slides/slide20.xml><?xml version="1.0" encoding="utf-8"?>
 <p:sld xmlns:a="http://schemas.openxmlformats.org/drawingml/2006/main" xmlns:r="http://schemas.openxmlformats.org/officeDocument/2006/relationships" xmlns:p="http://schemas.openxmlformats.org/presentationml/2006/main">
   <p:cSld>
     <p:spTree>
@@ -18003,82 +18635,7 @@
 </p:sld>
 </file>
 
-<file path=ppt/slides/slide2.xml><?xml version="1.0" encoding="utf-8"?>
-<p:sld xmlns:a="http://schemas.openxmlformats.org/drawingml/2006/main" xmlns:r="http://schemas.openxmlformats.org/officeDocument/2006/relationships" xmlns:p="http://schemas.openxmlformats.org/presentationml/2006/main">
-  <p:cSld>
-    <p:bg>
-      <p:bgPr>
-        <a:solidFill>
-          <a:schemeClr val="accent6">
-            <a:lumMod val="75000"/>
-          </a:schemeClr>
-        </a:solidFill>
-        <a:effectLst/>
-      </p:bgPr>
-    </p:bg>
-    <p:spTree>
-      <p:nvGrpSpPr>
-        <p:cNvPr id="1" name=""/>
-        <p:cNvGrpSpPr/>
-        <p:nvPr/>
-      </p:nvGrpSpPr>
-      <p:grpSpPr>
-        <a:xfrm>
-          <a:off x="0" y="0"/>
-          <a:ext cx="0" cy="0"/>
-          <a:chOff x="0" y="0"/>
-          <a:chExt cx="0" cy="0"/>
-        </a:xfrm>
-      </p:grpSpPr>
-      <p:sp>
-        <p:nvSpPr>
-          <p:cNvPr id="2" name="Title 1"/>
-          <p:cNvSpPr>
-            <a:spLocks noGrp="1"/>
-          </p:cNvSpPr>
-          <p:nvPr>
-            <p:ph type="title"/>
-          </p:nvPr>
-        </p:nvSpPr>
-        <p:spPr>
-          <a:xfrm>
-            <a:off x="381000" y="609600"/>
-            <a:ext cx="8229600" cy="1143000"/>
-          </a:xfrm>
-        </p:spPr>
-        <p:txBody>
-          <a:bodyPr>
-            <a:noAutofit/>
-          </a:bodyPr>
-          <a:lstStyle/>
-          <a:p>
-            <a:pPr algn="l"/>
-            <a:r>
-              <a:rPr lang="en-US" sz="7200" dirty="0" smtClean="0"/>
-              <a:t>Sync Lab</a:t>
-            </a:r>
-            <a:endParaRPr lang="en-SG" sz="7200" dirty="0">
-              <a:solidFill>
-                <a:schemeClr val="bg1"/>
-              </a:solidFill>
-            </a:endParaRPr>
-          </a:p>
-        </p:txBody>
-      </p:sp>
-    </p:spTree>
-    <p:extLst>
-      <p:ext uri="{BB962C8B-B14F-4D97-AF65-F5344CB8AC3E}">
-        <p14:creationId xmlns:p14="http://schemas.microsoft.com/office/powerpoint/2010/main" val="1569131388"/>
-      </p:ext>
-    </p:extLst>
-  </p:cSld>
-  <p:clrMapOvr>
-    <a:masterClrMapping/>
-  </p:clrMapOvr>
-</p:sld>
-</file>
-
-<file path=ppt/slides/slide20.xml><?xml version="1.0" encoding="utf-8"?>
+<file path=ppt/slides/slide21.xml><?xml version="1.0" encoding="utf-8"?>
 <p:sld xmlns:a="http://schemas.openxmlformats.org/drawingml/2006/main" xmlns:r="http://schemas.openxmlformats.org/officeDocument/2006/relationships" xmlns:p="http://schemas.openxmlformats.org/presentationml/2006/main">
   <p:cSld>
     <p:spTree>
@@ -18548,7 +19105,7 @@
 </p:sld>
 </file>
 
-<file path=ppt/slides/slide21.xml><?xml version="1.0" encoding="utf-8"?>
+<file path=ppt/slides/slide22.xml><?xml version="1.0" encoding="utf-8"?>
 <p:sld xmlns:a="http://schemas.openxmlformats.org/drawingml/2006/main" xmlns:r="http://schemas.openxmlformats.org/officeDocument/2006/relationships" xmlns:p="http://schemas.openxmlformats.org/presentationml/2006/main">
   <p:cSld>
     <p:spTree>
@@ -18713,7 +19270,7 @@
 </p:sld>
 </file>
 
-<file path=ppt/slides/slide22.xml><?xml version="1.0" encoding="utf-8"?>
+<file path=ppt/slides/slide23.xml><?xml version="1.0" encoding="utf-8"?>
 <p:sld xmlns:a="http://schemas.openxmlformats.org/drawingml/2006/main" xmlns:r="http://schemas.openxmlformats.org/officeDocument/2006/relationships" xmlns:p="http://schemas.openxmlformats.org/presentationml/2006/main">
   <p:cSld>
     <p:spTree>
@@ -18830,7 +19387,9 @@
           </a:prstGeom>
           <a:ln w="254000" cap="flat" cmpd="dbl" algn="ctr">
             <a:solidFill>
-              <a:srgbClr val="FF0000"/>
+              <a:srgbClr val="FF0000">
+                <a:alpha val="88000"/>
+              </a:srgbClr>
             </a:solidFill>
             <a:prstDash val="dash"/>
             <a:round/>
@@ -18866,7 +19425,7 @@
 </p:sld>
 </file>
 
-<file path=ppt/slides/slide23.xml><?xml version="1.0" encoding="utf-8"?>
+<file path=ppt/slides/slide24.xml><?xml version="1.0" encoding="utf-8"?>
 <p:sld xmlns:a="http://schemas.openxmlformats.org/drawingml/2006/main" xmlns:r="http://schemas.openxmlformats.org/officeDocument/2006/relationships" xmlns:p="http://schemas.openxmlformats.org/presentationml/2006/main">
   <p:cSld>
     <p:spTree>
@@ -18979,7 +19538,9 @@
           </a:prstGeom>
           <a:ln w="254000" cap="flat" cmpd="dbl" algn="ctr">
             <a:solidFill>
-              <a:srgbClr val="FF0000"/>
+              <a:srgbClr val="FF0000">
+                <a:alpha val="88000"/>
+              </a:srgbClr>
             </a:solidFill>
             <a:prstDash val="dash"/>
             <a:round/>
@@ -19015,7 +19576,7 @@
 </p:sld>
 </file>
 
-<file path=ppt/slides/slide24.xml><?xml version="1.0" encoding="utf-8"?>
+<file path=ppt/slides/slide25.xml><?xml version="1.0" encoding="utf-8"?>
 <p:sld xmlns:a="http://schemas.openxmlformats.org/drawingml/2006/main" xmlns:r="http://schemas.openxmlformats.org/officeDocument/2006/relationships" xmlns:p="http://schemas.openxmlformats.org/presentationml/2006/main">
   <p:cSld>
     <p:spTree>
@@ -19132,7 +19693,9 @@
           </a:prstGeom>
           <a:ln w="254000" cap="flat" cmpd="dbl" algn="ctr">
             <a:solidFill>
-              <a:srgbClr val="FF0000"/>
+              <a:srgbClr val="FF0000">
+                <a:alpha val="88000"/>
+              </a:srgbClr>
             </a:solidFill>
             <a:prstDash val="dash"/>
             <a:round/>
@@ -19168,7 +19731,7 @@
 </p:sld>
 </file>
 
-<file path=ppt/slides/slide25.xml><?xml version="1.0" encoding="utf-8"?>
+<file path=ppt/slides/slide26.xml><?xml version="1.0" encoding="utf-8"?>
 <p:sld xmlns:a="http://schemas.openxmlformats.org/drawingml/2006/main" xmlns:r="http://schemas.openxmlformats.org/officeDocument/2006/relationships" xmlns:p="http://schemas.openxmlformats.org/presentationml/2006/main">
   <p:cSld>
     <p:spTree>
@@ -19281,7 +19844,9 @@
           </a:prstGeom>
           <a:ln w="254000" cap="flat" cmpd="dbl" algn="ctr">
             <a:solidFill>
-              <a:srgbClr val="FF0000"/>
+              <a:srgbClr val="FF0000">
+                <a:alpha val="88000"/>
+              </a:srgbClr>
             </a:solidFill>
             <a:prstDash val="dash"/>
             <a:round/>
@@ -19317,7 +19882,7 @@
 </p:sld>
 </file>
 
-<file path=ppt/slides/slide26.xml><?xml version="1.0" encoding="utf-8"?>
+<file path=ppt/slides/slide27.xml><?xml version="1.0" encoding="utf-8"?>
 <p:sld xmlns:a="http://schemas.openxmlformats.org/drawingml/2006/main" xmlns:r="http://schemas.openxmlformats.org/officeDocument/2006/relationships" xmlns:p="http://schemas.openxmlformats.org/presentationml/2006/main">
   <p:cSld>
     <p:spTree>
@@ -19434,7 +19999,9 @@
           </a:prstGeom>
           <a:ln w="254000" cap="flat" cmpd="dbl" algn="ctr">
             <a:solidFill>
-              <a:srgbClr val="FF0000"/>
+              <a:srgbClr val="FF0000">
+                <a:alpha val="88000"/>
+              </a:srgbClr>
             </a:solidFill>
             <a:prstDash val="dash"/>
             <a:round/>
@@ -19470,7 +20037,7 @@
 </p:sld>
 </file>
 
-<file path=ppt/slides/slide27.xml><?xml version="1.0" encoding="utf-8"?>
+<file path=ppt/slides/slide28.xml><?xml version="1.0" encoding="utf-8"?>
 <p:sld xmlns:a="http://schemas.openxmlformats.org/drawingml/2006/main" xmlns:r="http://schemas.openxmlformats.org/officeDocument/2006/relationships" xmlns:p="http://schemas.openxmlformats.org/presentationml/2006/main">
   <p:cSld>
     <p:spTree>
@@ -19587,7 +20154,9 @@
           </a:prstGeom>
           <a:ln w="254000" cap="flat" cmpd="dbl" algn="ctr">
             <a:solidFill>
-              <a:srgbClr val="FF0000"/>
+              <a:srgbClr val="FF0000">
+                <a:alpha val="88000"/>
+              </a:srgbClr>
             </a:solidFill>
             <a:prstDash val="dash"/>
             <a:round/>
@@ -19614,6 +20183,170 @@
     <p:extLst>
       <p:ext uri="{BB962C8B-B14F-4D97-AF65-F5344CB8AC3E}">
         <p14:creationId xmlns:p14="http://schemas.microsoft.com/office/powerpoint/2010/main" val="1088945910"/>
+      </p:ext>
+    </p:extLst>
+  </p:cSld>
+  <p:clrMapOvr>
+    <a:masterClrMapping/>
+  </p:clrMapOvr>
+</p:sld>
+</file>
+
+<file path=ppt/slides/slide29.xml><?xml version="1.0" encoding="utf-8"?>
+<p:sld xmlns:a="http://schemas.openxmlformats.org/drawingml/2006/main" xmlns:r="http://schemas.openxmlformats.org/officeDocument/2006/relationships" xmlns:p="http://schemas.openxmlformats.org/presentationml/2006/main">
+  <p:cSld>
+    <p:spTree>
+      <p:nvGrpSpPr>
+        <p:cNvPr id="1" name=""/>
+        <p:cNvGrpSpPr/>
+        <p:nvPr/>
+      </p:nvGrpSpPr>
+      <p:grpSpPr>
+        <a:xfrm>
+          <a:off x="0" y="0"/>
+          <a:ext cx="0" cy="0"/>
+          <a:chOff x="0" y="0"/>
+          <a:chExt cx="0" cy="0"/>
+        </a:xfrm>
+      </p:grpSpPr>
+      <p:sp>
+        <p:nvSpPr>
+          <p:cNvPr id="6" name="Right Arrow 5"/>
+          <p:cNvSpPr/>
+          <p:nvPr/>
+        </p:nvSpPr>
+        <p:spPr>
+          <a:xfrm>
+            <a:off x="4686300" y="1905000"/>
+            <a:ext cx="3581400" cy="1066800"/>
+          </a:xfrm>
+          <a:prstGeom prst="rightArrow">
+            <a:avLst/>
+          </a:prstGeom>
+          <a:solidFill>
+            <a:schemeClr val="accent1"/>
+          </a:solidFill>
+          <a:ln w="25400" cap="flat" cmpd="sng" algn="ctr">
+            <a:solidFill>
+              <a:srgbClr val="00B050">
+                <a:alpha val="88000"/>
+              </a:srgbClr>
+            </a:solidFill>
+            <a:prstDash val="solid"/>
+            <a:round/>
+            <a:headEnd type="none" w="med" len="med"/>
+            <a:tailEnd type="none" w="med" len="med"/>
+          </a:ln>
+        </p:spPr>
+        <p:style>
+          <a:lnRef idx="2">
+            <a:schemeClr val="accent1">
+              <a:shade val="50000"/>
+            </a:schemeClr>
+          </a:lnRef>
+          <a:fillRef idx="1">
+            <a:schemeClr val="accent1"/>
+          </a:fillRef>
+          <a:effectRef idx="0">
+            <a:schemeClr val="accent1"/>
+          </a:effectRef>
+          <a:fontRef idx="minor">
+            <a:schemeClr val="lt1"/>
+          </a:fontRef>
+        </p:style>
+        <p:txBody>
+          <a:bodyPr rtlCol="0" anchor="ctr"/>
+          <a:lstStyle/>
+          <a:p>
+            <a:pPr algn="ctr"/>
+            <a:endParaRPr lang="en-US"/>
+          </a:p>
+        </p:txBody>
+      </p:sp>
+      <p:cxnSp>
+        <p:nvCxnSpPr>
+          <p:cNvPr id="3" name="Straight Connector 2"/>
+          <p:cNvCxnSpPr/>
+          <p:nvPr/>
+        </p:nvCxnSpPr>
+        <p:spPr>
+          <a:xfrm flipH="1">
+            <a:off x="4038600" y="4724400"/>
+            <a:ext cx="4572000" cy="0"/>
+          </a:xfrm>
+          <a:prstGeom prst="line">
+            <a:avLst/>
+          </a:prstGeom>
+          <a:ln w="254000" cap="flat" cmpd="sng" algn="ctr">
+            <a:solidFill>
+              <a:srgbClr val="FFFF00"/>
+            </a:solidFill>
+            <a:prstDash val="solid"/>
+            <a:round/>
+            <a:headEnd type="none" w="med" len="med"/>
+            <a:tailEnd type="none" w="med" len="med"/>
+          </a:ln>
+        </p:spPr>
+        <p:style>
+          <a:lnRef idx="1">
+            <a:schemeClr val="accent1"/>
+          </a:lnRef>
+          <a:fillRef idx="0">
+            <a:schemeClr val="accent1"/>
+          </a:fillRef>
+          <a:effectRef idx="0">
+            <a:schemeClr val="accent1"/>
+          </a:effectRef>
+          <a:fontRef idx="minor">
+            <a:schemeClr val="tx1"/>
+          </a:fontRef>
+        </p:style>
+      </p:cxnSp>
+      <p:cxnSp>
+        <p:nvCxnSpPr>
+          <p:cNvPr id="12" name="CopyFrom"/>
+          <p:cNvCxnSpPr/>
+          <p:nvPr/>
+        </p:nvCxnSpPr>
+        <p:spPr>
+          <a:xfrm>
+            <a:off x="1371600" y="1295400"/>
+            <a:ext cx="0" cy="4572000"/>
+          </a:xfrm>
+          <a:prstGeom prst="line">
+            <a:avLst/>
+          </a:prstGeom>
+          <a:ln w="254000" cap="flat" cmpd="dbl" algn="ctr">
+            <a:solidFill>
+              <a:srgbClr val="FF0000">
+                <a:alpha val="88000"/>
+              </a:srgbClr>
+            </a:solidFill>
+            <a:prstDash val="dash"/>
+            <a:round/>
+            <a:headEnd type="triangle" w="med" len="sm"/>
+            <a:tailEnd type="diamond" w="sm" len="lg"/>
+          </a:ln>
+        </p:spPr>
+        <p:style>
+          <a:lnRef idx="1">
+            <a:schemeClr val="accent1"/>
+          </a:lnRef>
+          <a:fillRef idx="0">
+            <a:schemeClr val="accent1"/>
+          </a:fillRef>
+          <a:effectRef idx="0">
+            <a:schemeClr val="accent1"/>
+          </a:effectRef>
+          <a:fontRef idx="minor">
+            <a:schemeClr val="tx1"/>
+          </a:fontRef>
+        </p:style>
+      </p:cxnSp>
+    </p:spTree>
+    <p:extLst>
+      <p:ext uri="{BB962C8B-B14F-4D97-AF65-F5344CB8AC3E}">
+        <p14:creationId xmlns:p14="http://schemas.microsoft.com/office/powerpoint/2010/main" val="1904788095"/>
       </p:ext>
     </p:extLst>
   </p:cSld>

</xml_diff>

<commit_message>
Improve descriptions and images to make test ppt clearer
</commit_message>
<xml_diff>
--- a/doc/test/SyncLab.pptx
+++ b/doc/test/SyncLab.pptx
@@ -5,41 +5,40 @@
     <p:sldMasterId id="2147483648" r:id="rId1"/>
     <p:sldMasterId id="2147483660" r:id="rId2"/>
     <p:sldMasterId id="2147483672" r:id="rId3"/>
-    <p:sldMasterId id="2147483684" r:id="rId4"/>
   </p:sldMasterIdLst>
   <p:notesMasterIdLst>
-    <p:notesMasterId r:id="rId34"/>
+    <p:notesMasterId r:id="rId33"/>
   </p:notesMasterIdLst>
   <p:sldIdLst>
-    <p:sldId id="287" r:id="rId5"/>
-    <p:sldId id="256" r:id="rId6"/>
-    <p:sldId id="311" r:id="rId7"/>
-    <p:sldId id="294" r:id="rId8"/>
-    <p:sldId id="356" r:id="rId9"/>
-    <p:sldId id="358" r:id="rId10"/>
-    <p:sldId id="359" r:id="rId11"/>
-    <p:sldId id="360" r:id="rId12"/>
-    <p:sldId id="363" r:id="rId13"/>
-    <p:sldId id="362" r:id="rId14"/>
-    <p:sldId id="367" r:id="rId15"/>
-    <p:sldId id="368" r:id="rId16"/>
-    <p:sldId id="369" r:id="rId17"/>
-    <p:sldId id="387" r:id="rId18"/>
-    <p:sldId id="370" r:id="rId19"/>
-    <p:sldId id="372" r:id="rId20"/>
-    <p:sldId id="373" r:id="rId21"/>
-    <p:sldId id="374" r:id="rId22"/>
-    <p:sldId id="375" r:id="rId23"/>
-    <p:sldId id="376" r:id="rId24"/>
-    <p:sldId id="378" r:id="rId25"/>
-    <p:sldId id="379" r:id="rId26"/>
-    <p:sldId id="380" r:id="rId27"/>
-    <p:sldId id="381" r:id="rId28"/>
-    <p:sldId id="385" r:id="rId29"/>
-    <p:sldId id="383" r:id="rId30"/>
-    <p:sldId id="384" r:id="rId31"/>
-    <p:sldId id="386" r:id="rId32"/>
-    <p:sldId id="388" r:id="rId33"/>
+    <p:sldId id="287" r:id="rId4"/>
+    <p:sldId id="256" r:id="rId5"/>
+    <p:sldId id="311" r:id="rId6"/>
+    <p:sldId id="294" r:id="rId7"/>
+    <p:sldId id="356" r:id="rId8"/>
+    <p:sldId id="358" r:id="rId9"/>
+    <p:sldId id="359" r:id="rId10"/>
+    <p:sldId id="360" r:id="rId11"/>
+    <p:sldId id="363" r:id="rId12"/>
+    <p:sldId id="362" r:id="rId13"/>
+    <p:sldId id="367" r:id="rId14"/>
+    <p:sldId id="368" r:id="rId15"/>
+    <p:sldId id="389" r:id="rId16"/>
+    <p:sldId id="387" r:id="rId17"/>
+    <p:sldId id="370" r:id="rId18"/>
+    <p:sldId id="372" r:id="rId19"/>
+    <p:sldId id="373" r:id="rId20"/>
+    <p:sldId id="374" r:id="rId21"/>
+    <p:sldId id="375" r:id="rId22"/>
+    <p:sldId id="376" r:id="rId23"/>
+    <p:sldId id="378" r:id="rId24"/>
+    <p:sldId id="379" r:id="rId25"/>
+    <p:sldId id="380" r:id="rId26"/>
+    <p:sldId id="381" r:id="rId27"/>
+    <p:sldId id="385" r:id="rId28"/>
+    <p:sldId id="383" r:id="rId29"/>
+    <p:sldId id="384" r:id="rId30"/>
+    <p:sldId id="386" r:id="rId31"/>
+    <p:sldId id="388" r:id="rId32"/>
   </p:sldIdLst>
   <p:sldSz cx="9144000" cy="6858000" type="screen4x3"/>
   <p:notesSz cx="6858000" cy="9144000"/>
@@ -163,7 +162,7 @@
             <p14:sldId id="362"/>
             <p14:sldId id="367"/>
             <p14:sldId id="368"/>
-            <p14:sldId id="369"/>
+            <p14:sldId id="389"/>
             <p14:sldId id="387"/>
           </p14:sldIdLst>
         </p14:section>
@@ -683,7 +682,49 @@
           <a:p>
             <a:r>
               <a:rPr lang="en-US" dirty="0" smtClean="0"/>
-              <a:t>Sync Transparency. You should be able to see the shape behind faintly.</a:t>
+              <a:t>Sync </a:t>
+            </a:r>
+            <a:r>
+              <a:rPr lang="en-US" dirty="0" smtClean="0"/>
+              <a:t>Transparency.</a:t>
+            </a:r>
+          </a:p>
+          <a:p>
+            <a:pPr marL="0" marR="0" lvl="0" indent="0" algn="l" defTabSz="914400" rtl="0" eaLnBrk="1" fontAlgn="auto" latinLnBrk="0" hangingPunct="1">
+              <a:lnSpc>
+                <a:spcPct val="100000"/>
+              </a:lnSpc>
+              <a:spcBef>
+                <a:spcPts val="0"/>
+              </a:spcBef>
+              <a:spcAft>
+                <a:spcPts val="0"/>
+              </a:spcAft>
+              <a:buClrTx/>
+              <a:buSzTx/>
+              <a:buFontTx/>
+              <a:buNone/>
+              <a:tabLst/>
+              <a:defRPr/>
+            </a:pPr>
+            <a:r>
+              <a:rPr lang="en-US" dirty="0" smtClean="0"/>
+              <a:t>Copy transparency from the second</a:t>
+            </a:r>
+            <a:r>
+              <a:rPr lang="en-US" baseline="0" dirty="0" smtClean="0"/>
+              <a:t> shape to the large blue shape.</a:t>
+            </a:r>
+            <a:endParaRPr lang="en-US" dirty="0" smtClean="0"/>
+          </a:p>
+          <a:p>
+            <a:r>
+              <a:rPr lang="en-US" dirty="0" smtClean="0"/>
+              <a:t>You </a:t>
+            </a:r>
+            <a:r>
+              <a:rPr lang="en-US" dirty="0" smtClean="0"/>
+              <a:t>should be able to see the shape behind faintly.</a:t>
             </a:r>
             <a:endParaRPr lang="en-US" dirty="0"/>
           </a:p>
@@ -858,7 +899,17 @@
           <a:p>
             <a:r>
               <a:rPr lang="en-US" dirty="0" smtClean="0"/>
-              <a:t>Copy font from the above</a:t>
+              <a:t>Sync Font Family</a:t>
+            </a:r>
+          </a:p>
+          <a:p>
+            <a:r>
+              <a:rPr lang="en-US" dirty="0" smtClean="0"/>
+              <a:t>Copy </a:t>
+            </a:r>
+            <a:r>
+              <a:rPr lang="en-US" dirty="0" smtClean="0"/>
+              <a:t>font from the above</a:t>
             </a:r>
             <a:r>
               <a:rPr lang="en-US" baseline="0" dirty="0" smtClean="0"/>
@@ -950,7 +1001,22 @@
           <a:p>
             <a:r>
               <a:rPr lang="en-US" dirty="0" smtClean="0"/>
-              <a:t>Copy font size from the above</a:t>
+              <a:t>Sync Font</a:t>
+            </a:r>
+            <a:r>
+              <a:rPr lang="en-US" baseline="0" dirty="0" smtClean="0"/>
+              <a:t> Size</a:t>
+            </a:r>
+            <a:endParaRPr lang="en-US" dirty="0" smtClean="0"/>
+          </a:p>
+          <a:p>
+            <a:r>
+              <a:rPr lang="en-US" dirty="0" smtClean="0"/>
+              <a:t>Copy </a:t>
+            </a:r>
+            <a:r>
+              <a:rPr lang="en-US" dirty="0" smtClean="0"/>
+              <a:t>font size from the above</a:t>
             </a:r>
             <a:r>
               <a:rPr lang="en-US" baseline="0" dirty="0" smtClean="0"/>
@@ -1042,7 +1108,17 @@
           <a:p>
             <a:r>
               <a:rPr lang="en-US" dirty="0" smtClean="0"/>
-              <a:t>Copy font color from the above</a:t>
+              <a:t>Sync Font Color</a:t>
+            </a:r>
+          </a:p>
+          <a:p>
+            <a:r>
+              <a:rPr lang="en-US" dirty="0" smtClean="0"/>
+              <a:t>Copy </a:t>
+            </a:r>
+            <a:r>
+              <a:rPr lang="en-US" dirty="0" smtClean="0"/>
+              <a:t>font color from the above</a:t>
             </a:r>
             <a:r>
               <a:rPr lang="en-US" baseline="0" dirty="0" smtClean="0"/>
@@ -1133,7 +1209,22 @@
           <a:p>
             <a:r>
               <a:rPr lang="en-US" dirty="0" smtClean="0"/>
-              <a:t>Copy font style from the above</a:t>
+              <a:t>Sync</a:t>
+            </a:r>
+            <a:r>
+              <a:rPr lang="en-US" baseline="0" dirty="0" smtClean="0"/>
+              <a:t> Font Style (One)</a:t>
+            </a:r>
+            <a:endParaRPr lang="en-US" dirty="0" smtClean="0"/>
+          </a:p>
+          <a:p>
+            <a:r>
+              <a:rPr lang="en-US" dirty="0" smtClean="0"/>
+              <a:t>Copy </a:t>
+            </a:r>
+            <a:r>
+              <a:rPr lang="en-US" dirty="0" smtClean="0"/>
+              <a:t>font style from the above</a:t>
             </a:r>
             <a:r>
               <a:rPr lang="en-US" baseline="0" dirty="0" smtClean="0"/>
@@ -1231,7 +1322,17 @@
           <a:p>
             <a:r>
               <a:rPr lang="en-US" dirty="0" smtClean="0"/>
-              <a:t>Copy font style from the below</a:t>
+              <a:t>Sync Font Style (All)</a:t>
+            </a:r>
+          </a:p>
+          <a:p>
+            <a:r>
+              <a:rPr lang="en-US" dirty="0" smtClean="0"/>
+              <a:t>Copy </a:t>
+            </a:r>
+            <a:r>
+              <a:rPr lang="en-US" dirty="0" smtClean="0"/>
+              <a:t>font style from the below</a:t>
             </a:r>
             <a:r>
               <a:rPr lang="en-US" baseline="0" dirty="0" smtClean="0"/>
@@ -1417,11 +1518,21 @@
           <a:p>
             <a:r>
               <a:rPr lang="en-US" dirty="0" smtClean="0"/>
+              <a:t>Sync Line Color</a:t>
+            </a:r>
+          </a:p>
+          <a:p>
+            <a:r>
+              <a:rPr lang="en-US" dirty="0" smtClean="0"/>
               <a:t>Copy</a:t>
             </a:r>
             <a:r>
               <a:rPr lang="en-US" baseline="0" dirty="0" smtClean="0"/>
-              <a:t> line color</a:t>
+              <a:t> </a:t>
+            </a:r>
+            <a:r>
+              <a:rPr lang="en-US" baseline="0" dirty="0" smtClean="0"/>
+              <a:t>line color</a:t>
             </a:r>
             <a:r>
               <a:rPr lang="en-US" dirty="0" smtClean="0"/>
@@ -1517,11 +1628,26 @@
           <a:p>
             <a:r>
               <a:rPr lang="en-US" dirty="0" smtClean="0"/>
+              <a:t>Sync Line</a:t>
+            </a:r>
+            <a:r>
+              <a:rPr lang="en-US" baseline="0" dirty="0" smtClean="0"/>
+              <a:t> Width</a:t>
+            </a:r>
+            <a:endParaRPr lang="en-US" dirty="0" smtClean="0"/>
+          </a:p>
+          <a:p>
+            <a:r>
+              <a:rPr lang="en-US" dirty="0" smtClean="0"/>
               <a:t>Copy</a:t>
             </a:r>
             <a:r>
               <a:rPr lang="en-US" baseline="0" dirty="0" smtClean="0"/>
-              <a:t> line width</a:t>
+              <a:t> </a:t>
+            </a:r>
+            <a:r>
+              <a:rPr lang="en-US" baseline="0" dirty="0" smtClean="0"/>
+              <a:t>line width</a:t>
             </a:r>
             <a:r>
               <a:rPr lang="en-US" dirty="0" smtClean="0"/>
@@ -1621,9 +1747,40 @@
             </a:r>
             <a:r>
               <a:rPr lang="en-US" baseline="0" dirty="0" smtClean="0"/>
-              <a:t> X position of Rectangle</a:t>
-            </a:r>
-            <a:endParaRPr lang="en-US" dirty="0"/>
+              <a:t> X </a:t>
+            </a:r>
+            <a:r>
+              <a:rPr lang="en-US" baseline="0" dirty="0" smtClean="0"/>
+              <a:t>position</a:t>
+            </a:r>
+          </a:p>
+          <a:p>
+            <a:pPr marL="0" marR="0" lvl="0" indent="0" algn="l" defTabSz="914400" rtl="0" eaLnBrk="1" fontAlgn="auto" latinLnBrk="0" hangingPunct="1">
+              <a:lnSpc>
+                <a:spcPct val="100000"/>
+              </a:lnSpc>
+              <a:spcBef>
+                <a:spcPts val="0"/>
+              </a:spcBef>
+              <a:spcAft>
+                <a:spcPts val="0"/>
+              </a:spcAft>
+              <a:buClrTx/>
+              <a:buSzTx/>
+              <a:buFontTx/>
+              <a:buNone/>
+              <a:tabLst/>
+              <a:defRPr/>
+            </a:pPr>
+            <a:r>
+              <a:rPr lang="en-US" dirty="0" smtClean="0"/>
+              <a:t>Copy X position from the red rectangle</a:t>
+            </a:r>
+            <a:r>
+              <a:rPr lang="en-US" baseline="0" dirty="0" smtClean="0"/>
+              <a:t> to blue rectangle</a:t>
+            </a:r>
+            <a:endParaRPr lang="en-US" dirty="0" smtClean="0"/>
           </a:p>
         </p:txBody>
       </p:sp>
@@ -1709,11 +1866,21 @@
           <a:p>
             <a:r>
               <a:rPr lang="en-US" dirty="0" smtClean="0"/>
+              <a:t>Sync Line Compound Type</a:t>
+            </a:r>
+          </a:p>
+          <a:p>
+            <a:r>
+              <a:rPr lang="en-US" dirty="0" smtClean="0"/>
               <a:t>Copy</a:t>
             </a:r>
             <a:r>
               <a:rPr lang="en-US" baseline="0" dirty="0" smtClean="0"/>
-              <a:t> compound type </a:t>
+              <a:t> </a:t>
+            </a:r>
+            <a:r>
+              <a:rPr lang="en-US" baseline="0" dirty="0" smtClean="0"/>
+              <a:t>compound type </a:t>
             </a:r>
             <a:r>
               <a:rPr lang="en-US" dirty="0" smtClean="0"/>
@@ -1809,11 +1976,21 @@
           <a:p>
             <a:r>
               <a:rPr lang="en-US" dirty="0" smtClean="0"/>
+              <a:t>Sync Line Dash Type</a:t>
+            </a:r>
+          </a:p>
+          <a:p>
+            <a:r>
+              <a:rPr lang="en-US" dirty="0" smtClean="0"/>
               <a:t>Copy</a:t>
             </a:r>
             <a:r>
               <a:rPr lang="en-US" baseline="0" dirty="0" smtClean="0"/>
-              <a:t> dash type </a:t>
+              <a:t> </a:t>
+            </a:r>
+            <a:r>
+              <a:rPr lang="en-US" baseline="0" dirty="0" smtClean="0"/>
+              <a:t>dash type </a:t>
             </a:r>
             <a:r>
               <a:rPr lang="en-US" dirty="0" smtClean="0"/>
@@ -1909,11 +2086,21 @@
           <a:p>
             <a:r>
               <a:rPr lang="en-US" dirty="0" smtClean="0"/>
+              <a:t>Sync Line Arrow</a:t>
+            </a:r>
+          </a:p>
+          <a:p>
+            <a:r>
+              <a:rPr lang="en-US" dirty="0" smtClean="0"/>
               <a:t>Copy</a:t>
             </a:r>
             <a:r>
               <a:rPr lang="en-US" baseline="0" dirty="0" smtClean="0"/>
-              <a:t> arrow </a:t>
+              <a:t> </a:t>
+            </a:r>
+            <a:r>
+              <a:rPr lang="en-US" baseline="0" dirty="0" smtClean="0"/>
+              <a:t>arrow </a:t>
             </a:r>
             <a:r>
               <a:rPr lang="en-US" dirty="0" smtClean="0"/>
@@ -2009,11 +2196,21 @@
           <a:p>
             <a:r>
               <a:rPr lang="en-US" dirty="0" smtClean="0"/>
+              <a:t>Sync Line Transparency</a:t>
+            </a:r>
+          </a:p>
+          <a:p>
+            <a:r>
+              <a:rPr lang="en-US" dirty="0" smtClean="0"/>
               <a:t>Copy</a:t>
             </a:r>
             <a:r>
               <a:rPr lang="en-US" baseline="0" dirty="0" smtClean="0"/>
-              <a:t> line transparency </a:t>
+              <a:t> </a:t>
+            </a:r>
+            <a:r>
+              <a:rPr lang="en-US" baseline="0" dirty="0" smtClean="0"/>
+              <a:t>line transparency </a:t>
             </a:r>
             <a:r>
               <a:rPr lang="en-US" dirty="0" smtClean="0"/>
@@ -2113,8 +2310,50 @@
             </a:r>
             <a:r>
               <a:rPr lang="en-US" baseline="0" dirty="0" smtClean="0"/>
-              <a:t> Y position of Rectangle</a:t>
-            </a:r>
+              <a:t> Y </a:t>
+            </a:r>
+            <a:r>
+              <a:rPr lang="en-US" baseline="0" dirty="0" smtClean="0"/>
+              <a:t>position</a:t>
+            </a:r>
+          </a:p>
+          <a:p>
+            <a:pPr marL="0" marR="0" lvl="0" indent="0" algn="l" defTabSz="914400" rtl="0" eaLnBrk="1" fontAlgn="auto" latinLnBrk="0" hangingPunct="1">
+              <a:lnSpc>
+                <a:spcPct val="100000"/>
+              </a:lnSpc>
+              <a:spcBef>
+                <a:spcPts val="0"/>
+              </a:spcBef>
+              <a:spcAft>
+                <a:spcPts val="0"/>
+              </a:spcAft>
+              <a:buClrTx/>
+              <a:buSzTx/>
+              <a:buFontTx/>
+              <a:buNone/>
+              <a:tabLst/>
+              <a:defRPr/>
+            </a:pPr>
+            <a:r>
+              <a:rPr lang="en-US" dirty="0" smtClean="0"/>
+              <a:t>Copy</a:t>
+            </a:r>
+            <a:r>
+              <a:rPr lang="en-US" baseline="0" dirty="0" smtClean="0"/>
+              <a:t> Y</a:t>
+            </a:r>
+            <a:r>
+              <a:rPr lang="en-US" dirty="0" smtClean="0"/>
+              <a:t> position from the red rectangle</a:t>
+            </a:r>
+            <a:r>
+              <a:rPr lang="en-US" baseline="0" dirty="0" smtClean="0"/>
+              <a:t> to blue rectangle</a:t>
+            </a:r>
+            <a:endParaRPr lang="en-US" dirty="0" smtClean="0"/>
+          </a:p>
+          <a:p>
             <a:endParaRPr lang="en-US" dirty="0"/>
           </a:p>
         </p:txBody>
@@ -2205,9 +2444,40 @@
             </a:r>
             <a:r>
               <a:rPr lang="en-US" baseline="0" dirty="0" smtClean="0"/>
-              <a:t> Height of Circle</a:t>
-            </a:r>
-            <a:endParaRPr lang="en-US" dirty="0"/>
+              <a:t> </a:t>
+            </a:r>
+            <a:r>
+              <a:rPr lang="en-US" baseline="0" dirty="0" smtClean="0"/>
+              <a:t>Height</a:t>
+            </a:r>
+          </a:p>
+          <a:p>
+            <a:pPr marL="0" marR="0" lvl="0" indent="0" algn="l" defTabSz="914400" rtl="0" eaLnBrk="1" fontAlgn="auto" latinLnBrk="0" hangingPunct="1">
+              <a:lnSpc>
+                <a:spcPct val="100000"/>
+              </a:lnSpc>
+              <a:spcBef>
+                <a:spcPts val="0"/>
+              </a:spcBef>
+              <a:spcAft>
+                <a:spcPts val="0"/>
+              </a:spcAft>
+              <a:buClrTx/>
+              <a:buSzTx/>
+              <a:buFontTx/>
+              <a:buNone/>
+              <a:tabLst/>
+              <a:defRPr/>
+            </a:pPr>
+            <a:r>
+              <a:rPr lang="en-US" dirty="0" smtClean="0"/>
+              <a:t>Copy Height from the red rectangle</a:t>
+            </a:r>
+            <a:r>
+              <a:rPr lang="en-US" baseline="0" dirty="0" smtClean="0"/>
+              <a:t> to blue circle</a:t>
+            </a:r>
+            <a:endParaRPr lang="en-US" dirty="0" smtClean="0"/>
           </a:p>
         </p:txBody>
       </p:sp>
@@ -2297,13 +2567,23 @@
             </a:r>
             <a:r>
               <a:rPr lang="en-US" baseline="0" dirty="0" smtClean="0"/>
-              <a:t> Width </a:t>
-            </a:r>
-            <a:r>
-              <a:rPr lang="en-US" baseline="0" smtClean="0"/>
-              <a:t>of Arrow</a:t>
-            </a:r>
-            <a:endParaRPr lang="en-US" dirty="0"/>
+              <a:t> </a:t>
+            </a:r>
+            <a:r>
+              <a:rPr lang="en-US" baseline="0" dirty="0" smtClean="0"/>
+              <a:t>Width</a:t>
+            </a:r>
+          </a:p>
+          <a:p>
+            <a:r>
+              <a:rPr lang="en-US" dirty="0" smtClean="0"/>
+              <a:t>Copy Width from the red rectangle</a:t>
+            </a:r>
+            <a:r>
+              <a:rPr lang="en-US" baseline="0" dirty="0" smtClean="0"/>
+              <a:t> to blue arrow</a:t>
+            </a:r>
+            <a:endParaRPr lang="en-US" dirty="0" smtClean="0"/>
           </a:p>
         </p:txBody>
       </p:sp>
@@ -2389,15 +2669,25 @@
           <a:p>
             <a:r>
               <a:rPr lang="en-US" dirty="0" smtClean="0"/>
-              <a:t>Original </a:t>
-            </a:r>
+              <a:t>Original Shapes. There is a shape behind the</a:t>
+            </a:r>
+            <a:r>
+              <a:rPr lang="en-US" baseline="0" dirty="0" smtClean="0"/>
+              <a:t> large blue, to check for transparency and no </a:t>
+            </a:r>
+            <a:r>
+              <a:rPr lang="en-US" baseline="0" dirty="0" smtClean="0"/>
+              <a:t>fill. </a:t>
+            </a:r>
+          </a:p>
+          <a:p>
             <a:r>
               <a:rPr lang="en-US" dirty="0" smtClean="0"/>
-              <a:t>Shapes. There is a shape behind the</a:t>
+              <a:t>There is gradient for</a:t>
             </a:r>
             <a:r>
               <a:rPr lang="en-US" baseline="0" dirty="0" smtClean="0"/>
-              <a:t> large blue, to check for transparency and no fill</a:t>
+              <a:t> the background to help differentiate between background fill and other fills</a:t>
             </a:r>
             <a:endParaRPr lang="en-US" dirty="0"/>
           </a:p>
@@ -2485,8 +2775,42 @@
           <a:p>
             <a:r>
               <a:rPr lang="en-US" dirty="0" smtClean="0"/>
-              <a:t>Sync Pattern Fill</a:t>
-            </a:r>
+              <a:t>Sync Pattern </a:t>
+            </a:r>
+            <a:r>
+              <a:rPr lang="en-US" dirty="0" smtClean="0"/>
+              <a:t>Fill</a:t>
+            </a:r>
+          </a:p>
+          <a:p>
+            <a:pPr marL="0" marR="0" lvl="0" indent="0" algn="l" defTabSz="914400" rtl="0" eaLnBrk="1" fontAlgn="auto" latinLnBrk="0" hangingPunct="1">
+              <a:lnSpc>
+                <a:spcPct val="100000"/>
+              </a:lnSpc>
+              <a:spcBef>
+                <a:spcPts val="0"/>
+              </a:spcBef>
+              <a:spcAft>
+                <a:spcPts val="0"/>
+              </a:spcAft>
+              <a:buClrTx/>
+              <a:buSzTx/>
+              <a:buFontTx/>
+              <a:buNone/>
+              <a:tabLst/>
+              <a:defRPr/>
+            </a:pPr>
+            <a:r>
+              <a:rPr lang="en-US" dirty="0" smtClean="0"/>
+              <a:t>Copy fill from the first</a:t>
+            </a:r>
+            <a:r>
+              <a:rPr lang="en-US" baseline="0" dirty="0" smtClean="0"/>
+              <a:t> shape to the large blue shape.</a:t>
+            </a:r>
+            <a:endParaRPr lang="en-US" dirty="0" smtClean="0"/>
+          </a:p>
+          <a:p>
             <a:endParaRPr lang="en-US" dirty="0"/>
           </a:p>
         </p:txBody>
@@ -2573,8 +2897,42 @@
           <a:p>
             <a:r>
               <a:rPr lang="en-US" dirty="0" smtClean="0"/>
-              <a:t>Sync Solid Fill</a:t>
-            </a:r>
+              <a:t>Sync Solid </a:t>
+            </a:r>
+            <a:r>
+              <a:rPr lang="en-US" dirty="0" smtClean="0"/>
+              <a:t>Fill</a:t>
+            </a:r>
+          </a:p>
+          <a:p>
+            <a:pPr marL="0" marR="0" lvl="0" indent="0" algn="l" defTabSz="914400" rtl="0" eaLnBrk="1" fontAlgn="auto" latinLnBrk="0" hangingPunct="1">
+              <a:lnSpc>
+                <a:spcPct val="100000"/>
+              </a:lnSpc>
+              <a:spcBef>
+                <a:spcPts val="0"/>
+              </a:spcBef>
+              <a:spcAft>
+                <a:spcPts val="0"/>
+              </a:spcAft>
+              <a:buClrTx/>
+              <a:buSzTx/>
+              <a:buFontTx/>
+              <a:buNone/>
+              <a:tabLst/>
+              <a:defRPr/>
+            </a:pPr>
+            <a:r>
+              <a:rPr lang="en-US" dirty="0" smtClean="0"/>
+              <a:t>Copy fill from the second</a:t>
+            </a:r>
+            <a:r>
+              <a:rPr lang="en-US" baseline="0" dirty="0" smtClean="0"/>
+              <a:t> shape to the large blue shape.</a:t>
+            </a:r>
+            <a:endParaRPr lang="en-US" dirty="0" smtClean="0"/>
+          </a:p>
+          <a:p>
             <a:endParaRPr lang="en-US" dirty="0"/>
           </a:p>
         </p:txBody>
@@ -2659,13 +3017,112 @@
           <a:bodyPr/>
           <a:lstStyle/>
           <a:p>
+            <a:pPr marL="0" marR="0" lvl="0" indent="0" algn="l" defTabSz="914400" rtl="0" eaLnBrk="1" fontAlgn="auto" latinLnBrk="0" hangingPunct="1">
+              <a:lnSpc>
+                <a:spcPct val="100000"/>
+              </a:lnSpc>
+              <a:spcBef>
+                <a:spcPts val="0"/>
+              </a:spcBef>
+              <a:spcAft>
+                <a:spcPts val="0"/>
+              </a:spcAft>
+              <a:buClrTx/>
+              <a:buSzTx/>
+              <a:buFontTx/>
+              <a:buNone/>
+              <a:tabLst/>
+              <a:defRPr/>
+            </a:pPr>
             <a:r>
               <a:rPr lang="en-US" dirty="0" smtClean="0"/>
-              <a:t>Sync Background</a:t>
+              <a:t>Sync Background Fill</a:t>
+            </a:r>
+          </a:p>
+          <a:p>
+            <a:pPr marL="0" marR="0" lvl="0" indent="0" algn="l" defTabSz="914400" rtl="0" eaLnBrk="1" fontAlgn="auto" latinLnBrk="0" hangingPunct="1">
+              <a:lnSpc>
+                <a:spcPct val="100000"/>
+              </a:lnSpc>
+              <a:spcBef>
+                <a:spcPts val="0"/>
+              </a:spcBef>
+              <a:spcAft>
+                <a:spcPts val="0"/>
+              </a:spcAft>
+              <a:buClrTx/>
+              <a:buSzTx/>
+              <a:buFontTx/>
+              <a:buNone/>
+              <a:tabLst/>
+              <a:defRPr/>
+            </a:pPr>
+            <a:r>
+              <a:rPr lang="en-US" dirty="0" smtClean="0"/>
+              <a:t>Copy fill from the third</a:t>
             </a:r>
             <a:r>
               <a:rPr lang="en-US" baseline="0" dirty="0" smtClean="0"/>
-              <a:t> Fill. To determine the difference between background fill and no fill, we have an object behind. If you can see the object, that means that the same is using no fill.</a:t>
+              <a:t> shape to the large blue shape.</a:t>
+            </a:r>
+            <a:endParaRPr lang="en-US" dirty="0" smtClean="0"/>
+          </a:p>
+          <a:p>
+            <a:pPr marL="0" marR="0" lvl="0" indent="0" algn="l" defTabSz="914400" rtl="0" eaLnBrk="1" fontAlgn="auto" latinLnBrk="0" hangingPunct="1">
+              <a:lnSpc>
+                <a:spcPct val="100000"/>
+              </a:lnSpc>
+              <a:spcBef>
+                <a:spcPts val="0"/>
+              </a:spcBef>
+              <a:spcAft>
+                <a:spcPts val="0"/>
+              </a:spcAft>
+              <a:buClrTx/>
+              <a:buSzTx/>
+              <a:buFontTx/>
+              <a:buNone/>
+              <a:tabLst/>
+              <a:defRPr/>
+            </a:pPr>
+            <a:r>
+              <a:rPr lang="en-US" dirty="0" smtClean="0"/>
+              <a:t>There </a:t>
+            </a:r>
+            <a:r>
+              <a:rPr lang="en-US" dirty="0" smtClean="0"/>
+              <a:t>is a shape behind the</a:t>
+            </a:r>
+            <a:r>
+              <a:rPr lang="en-US" baseline="0" dirty="0" smtClean="0"/>
+              <a:t> large blue, to check for transparency and no </a:t>
+            </a:r>
+            <a:r>
+              <a:rPr lang="en-US" baseline="0" dirty="0" smtClean="0"/>
+              <a:t>fill</a:t>
+            </a:r>
+          </a:p>
+          <a:p>
+            <a:pPr marL="0" marR="0" lvl="0" indent="0" algn="l" defTabSz="914400" rtl="0" eaLnBrk="1" fontAlgn="auto" latinLnBrk="0" hangingPunct="1">
+              <a:lnSpc>
+                <a:spcPct val="100000"/>
+              </a:lnSpc>
+              <a:spcBef>
+                <a:spcPts val="0"/>
+              </a:spcBef>
+              <a:spcAft>
+                <a:spcPts val="0"/>
+              </a:spcAft>
+              <a:buClrTx/>
+              <a:buSzTx/>
+              <a:buFontTx/>
+              <a:buNone/>
+              <a:tabLst/>
+              <a:defRPr/>
+            </a:pPr>
+            <a:r>
+              <a:rPr lang="en-US" baseline="0" dirty="0" smtClean="0"/>
+              <a:t>The fill should follow the background</a:t>
             </a:r>
             <a:endParaRPr lang="en-US" dirty="0"/>
           </a:p>
@@ -2697,7 +3154,7 @@
     </p:spTree>
     <p:extLst>
       <p:ext uri="{BB962C8B-B14F-4D97-AF65-F5344CB8AC3E}">
-        <p14:creationId xmlns:p14="http://schemas.microsoft.com/office/powerpoint/2010/main" val="2845973502"/>
+        <p14:creationId xmlns:p14="http://schemas.microsoft.com/office/powerpoint/2010/main" val="2630814665"/>
       </p:ext>
     </p:extLst>
   </p:cSld>
@@ -8678,1431 +9135,6 @@
 </p:sldLayout>
 </file>
 
-<file path=ppt/slideLayouts/slideLayout34.xml><?xml version="1.0" encoding="utf-8"?>
-<p:sldLayout xmlns:a="http://schemas.openxmlformats.org/drawingml/2006/main" xmlns:r="http://schemas.openxmlformats.org/officeDocument/2006/relationships" xmlns:p="http://schemas.openxmlformats.org/presentationml/2006/main" type="title" preserve="1">
-  <p:cSld name="Title Slide">
-    <p:spTree>
-      <p:nvGrpSpPr>
-        <p:cNvPr id="1" name=""/>
-        <p:cNvGrpSpPr/>
-        <p:nvPr/>
-      </p:nvGrpSpPr>
-      <p:grpSpPr>
-        <a:xfrm>
-          <a:off x="0" y="0"/>
-          <a:ext cx="0" cy="0"/>
-          <a:chOff x="0" y="0"/>
-          <a:chExt cx="0" cy="0"/>
-        </a:xfrm>
-      </p:grpSpPr>
-      <p:sp>
-        <p:nvSpPr>
-          <p:cNvPr id="2" name="Title 1"/>
-          <p:cNvSpPr>
-            <a:spLocks noGrp="1"/>
-          </p:cNvSpPr>
-          <p:nvPr>
-            <p:ph type="ctrTitle"/>
-          </p:nvPr>
-        </p:nvSpPr>
-        <p:spPr>
-          <a:xfrm>
-            <a:off x="1143000" y="1122363"/>
-            <a:ext cx="6858000" cy="2387600"/>
-          </a:xfrm>
-        </p:spPr>
-        <p:txBody>
-          <a:bodyPr anchor="b"/>
-          <a:lstStyle>
-            <a:lvl1pPr algn="ctr">
-              <a:defRPr sz="6000"/>
-            </a:lvl1pPr>
-          </a:lstStyle>
-          <a:p>
-            <a:r>
-              <a:rPr lang="en-US" smtClean="0"/>
-              <a:t>Click to edit Master title style</a:t>
-            </a:r>
-            <a:endParaRPr lang="en-US"/>
-          </a:p>
-        </p:txBody>
-      </p:sp>
-      <p:sp>
-        <p:nvSpPr>
-          <p:cNvPr id="3" name="Subtitle 2"/>
-          <p:cNvSpPr>
-            <a:spLocks noGrp="1"/>
-          </p:cNvSpPr>
-          <p:nvPr>
-            <p:ph type="subTitle" idx="1"/>
-          </p:nvPr>
-        </p:nvSpPr>
-        <p:spPr>
-          <a:xfrm>
-            <a:off x="1143000" y="3602038"/>
-            <a:ext cx="6858000" cy="1655762"/>
-          </a:xfrm>
-        </p:spPr>
-        <p:txBody>
-          <a:bodyPr/>
-          <a:lstStyle>
-            <a:lvl1pPr marL="0" indent="0" algn="ctr">
-              <a:buNone/>
-              <a:defRPr sz="2400"/>
-            </a:lvl1pPr>
-            <a:lvl2pPr marL="457200" indent="0" algn="ctr">
-              <a:buNone/>
-              <a:defRPr sz="2000"/>
-            </a:lvl2pPr>
-            <a:lvl3pPr marL="914400" indent="0" algn="ctr">
-              <a:buNone/>
-              <a:defRPr sz="1800"/>
-            </a:lvl3pPr>
-            <a:lvl4pPr marL="1371600" indent="0" algn="ctr">
-              <a:buNone/>
-              <a:defRPr sz="1600"/>
-            </a:lvl4pPr>
-            <a:lvl5pPr marL="1828800" indent="0" algn="ctr">
-              <a:buNone/>
-              <a:defRPr sz="1600"/>
-            </a:lvl5pPr>
-            <a:lvl6pPr marL="2286000" indent="0" algn="ctr">
-              <a:buNone/>
-              <a:defRPr sz="1600"/>
-            </a:lvl6pPr>
-            <a:lvl7pPr marL="2743200" indent="0" algn="ctr">
-              <a:buNone/>
-              <a:defRPr sz="1600"/>
-            </a:lvl7pPr>
-            <a:lvl8pPr marL="3200400" indent="0" algn="ctr">
-              <a:buNone/>
-              <a:defRPr sz="1600"/>
-            </a:lvl8pPr>
-            <a:lvl9pPr marL="3657600" indent="0" algn="ctr">
-              <a:buNone/>
-              <a:defRPr sz="1600"/>
-            </a:lvl9pPr>
-          </a:lstStyle>
-          <a:p>
-            <a:r>
-              <a:rPr lang="en-US" smtClean="0"/>
-              <a:t>Click to edit Master subtitle style</a:t>
-            </a:r>
-            <a:endParaRPr lang="en-US"/>
-          </a:p>
-        </p:txBody>
-      </p:sp>
-      <p:sp>
-        <p:nvSpPr>
-          <p:cNvPr id="4" name="Date Placeholder 3"/>
-          <p:cNvSpPr>
-            <a:spLocks noGrp="1"/>
-          </p:cNvSpPr>
-          <p:nvPr>
-            <p:ph type="dt" sz="half" idx="10"/>
-          </p:nvPr>
-        </p:nvSpPr>
-        <p:spPr/>
-        <p:txBody>
-          <a:bodyPr/>
-          <a:lstStyle/>
-          <a:p>
-            <a:fld id="{3A7DD4BF-EC1E-4755-8C71-0061F4F36BE2}" type="datetimeFigureOut">
-              <a:rPr lang="en-US" smtClean="0"/>
-              <a:t>3/28/2017</a:t>
-            </a:fld>
-            <a:endParaRPr lang="en-US"/>
-          </a:p>
-        </p:txBody>
-      </p:sp>
-      <p:sp>
-        <p:nvSpPr>
-          <p:cNvPr id="5" name="Footer Placeholder 4"/>
-          <p:cNvSpPr>
-            <a:spLocks noGrp="1"/>
-          </p:cNvSpPr>
-          <p:nvPr>
-            <p:ph type="ftr" sz="quarter" idx="11"/>
-          </p:nvPr>
-        </p:nvSpPr>
-        <p:spPr/>
-        <p:txBody>
-          <a:bodyPr/>
-          <a:lstStyle/>
-          <a:p>
-            <a:endParaRPr lang="en-US"/>
-          </a:p>
-        </p:txBody>
-      </p:sp>
-      <p:sp>
-        <p:nvSpPr>
-          <p:cNvPr id="6" name="Slide Number Placeholder 5"/>
-          <p:cNvSpPr>
-            <a:spLocks noGrp="1"/>
-          </p:cNvSpPr>
-          <p:nvPr>
-            <p:ph type="sldNum" sz="quarter" idx="12"/>
-          </p:nvPr>
-        </p:nvSpPr>
-        <p:spPr/>
-        <p:txBody>
-          <a:bodyPr/>
-          <a:lstStyle/>
-          <a:p>
-            <a:fld id="{8E20C79B-4D7F-4DD1-AFD0-94579907042E}" type="slidenum">
-              <a:rPr lang="en-US" smtClean="0"/>
-              <a:t>‹#›</a:t>
-            </a:fld>
-            <a:endParaRPr lang="en-US"/>
-          </a:p>
-        </p:txBody>
-      </p:sp>
-      <p:sp>
-        <p:nvSpPr>
-          <p:cNvPr id="12" name="SolidShape"/>
-          <p:cNvSpPr/>
-          <p:nvPr userDrawn="1"/>
-        </p:nvSpPr>
-        <p:spPr>
-          <a:xfrm>
-            <a:off x="533400" y="2057400"/>
-            <a:ext cx="1828800" cy="1219200"/>
-          </a:xfrm>
-          <a:prstGeom prst="rect">
-            <a:avLst/>
-          </a:prstGeom>
-          <a:solidFill>
-            <a:srgbClr val="FF0000">
-              <a:alpha val="79000"/>
-            </a:srgbClr>
-          </a:solidFill>
-          <a:ln w="25400" cap="flat" cmpd="sng" algn="ctr">
-            <a:solidFill>
-              <a:schemeClr val="accent1"/>
-            </a:solidFill>
-            <a:prstDash val="solid"/>
-            <a:round/>
-            <a:headEnd type="none" w="med" len="med"/>
-            <a:tailEnd type="none" w="med" len="med"/>
-          </a:ln>
-        </p:spPr>
-        <p:style>
-          <a:lnRef idx="2">
-            <a:schemeClr val="accent1">
-              <a:shade val="50000"/>
-            </a:schemeClr>
-          </a:lnRef>
-          <a:fillRef idx="1">
-            <a:schemeClr val="accent1"/>
-          </a:fillRef>
-          <a:effectRef idx="0">
-            <a:schemeClr val="accent1"/>
-          </a:effectRef>
-          <a:fontRef idx="minor">
-            <a:schemeClr val="lt1"/>
-          </a:fontRef>
-        </p:style>
-        <p:txBody>
-          <a:bodyPr rtlCol="0" anchor="ctr"/>
-          <a:lstStyle/>
-          <a:p>
-            <a:pPr algn="ctr"/>
-            <a:endParaRPr lang="en-US">
-              <a:solidFill>
-                <a:srgbClr val="FFFFFF"/>
-              </a:solidFill>
-              <a:latin typeface="Calibri" panose="020F0502020204030204" pitchFamily="34" charset="0"/>
-            </a:endParaRPr>
-          </a:p>
-        </p:txBody>
-      </p:sp>
-      <p:cxnSp>
-        <p:nvCxnSpPr>
-          <p:cNvPr id="18" name="CopyFrom"/>
-          <p:cNvCxnSpPr/>
-          <p:nvPr userDrawn="1"/>
-        </p:nvCxnSpPr>
-        <p:spPr>
-          <a:xfrm>
-            <a:off x="1371600" y="1295400"/>
-            <a:ext cx="0" cy="4572000"/>
-          </a:xfrm>
-          <a:prstGeom prst="line">
-            <a:avLst/>
-          </a:prstGeom>
-          <a:ln w="254000" cap="flat" cmpd="dbl" algn="ctr">
-            <a:solidFill>
-              <a:srgbClr val="FF0000">
-                <a:alpha val="88000"/>
-              </a:srgbClr>
-            </a:solidFill>
-            <a:prstDash val="dash"/>
-            <a:round/>
-            <a:headEnd type="triangle" w="med" len="sm"/>
-            <a:tailEnd type="diamond" w="sm" len="lg"/>
-          </a:ln>
-        </p:spPr>
-        <p:style>
-          <a:lnRef idx="1">
-            <a:schemeClr val="accent1"/>
-          </a:lnRef>
-          <a:fillRef idx="0">
-            <a:schemeClr val="accent1"/>
-          </a:fillRef>
-          <a:effectRef idx="0">
-            <a:schemeClr val="accent1"/>
-          </a:effectRef>
-          <a:fontRef idx="minor">
-            <a:schemeClr val="tx1"/>
-          </a:fontRef>
-        </p:style>
-      </p:cxnSp>
-    </p:spTree>
-    <p:extLst>
-      <p:ext uri="{BB962C8B-B14F-4D97-AF65-F5344CB8AC3E}">
-        <p14:creationId xmlns:p14="http://schemas.microsoft.com/office/powerpoint/2010/main" val="3969651679"/>
-      </p:ext>
-    </p:extLst>
-  </p:cSld>
-  <p:clrMapOvr>
-    <a:masterClrMapping/>
-  </p:clrMapOvr>
-</p:sldLayout>
-</file>
-
-<file path=ppt/slideLayouts/slideLayout35.xml><?xml version="1.0" encoding="utf-8"?>
-<p:sldLayout xmlns:a="http://schemas.openxmlformats.org/drawingml/2006/main" xmlns:r="http://schemas.openxmlformats.org/officeDocument/2006/relationships" xmlns:p="http://schemas.openxmlformats.org/presentationml/2006/main" type="obj" preserve="1">
-  <p:cSld name="Title and Content">
-    <p:spTree>
-      <p:nvGrpSpPr>
-        <p:cNvPr id="1" name=""/>
-        <p:cNvGrpSpPr/>
-        <p:nvPr/>
-      </p:nvGrpSpPr>
-      <p:grpSpPr>
-        <a:xfrm>
-          <a:off x="0" y="0"/>
-          <a:ext cx="0" cy="0"/>
-          <a:chOff x="0" y="0"/>
-          <a:chExt cx="0" cy="0"/>
-        </a:xfrm>
-      </p:grpSpPr>
-      <p:sp>
-        <p:nvSpPr>
-          <p:cNvPr id="2" name="Title 1"/>
-          <p:cNvSpPr>
-            <a:spLocks noGrp="1"/>
-          </p:cNvSpPr>
-          <p:nvPr>
-            <p:ph type="title"/>
-          </p:nvPr>
-        </p:nvSpPr>
-        <p:spPr/>
-        <p:txBody>
-          <a:bodyPr/>
-          <a:lstStyle/>
-          <a:p>
-            <a:r>
-              <a:rPr lang="en-US" smtClean="0"/>
-              <a:t>Click to edit Master title style</a:t>
-            </a:r>
-            <a:endParaRPr lang="en-US"/>
-          </a:p>
-        </p:txBody>
-      </p:sp>
-      <p:sp>
-        <p:nvSpPr>
-          <p:cNvPr id="3" name="Content Placeholder 2"/>
-          <p:cNvSpPr>
-            <a:spLocks noGrp="1"/>
-          </p:cNvSpPr>
-          <p:nvPr>
-            <p:ph idx="1"/>
-          </p:nvPr>
-        </p:nvSpPr>
-        <p:spPr/>
-        <p:txBody>
-          <a:bodyPr/>
-          <a:lstStyle/>
-          <a:p>
-            <a:pPr lvl="0"/>
-            <a:r>
-              <a:rPr lang="en-US" smtClean="0"/>
-              <a:t>Click to edit Master text styles</a:t>
-            </a:r>
-          </a:p>
-          <a:p>
-            <a:pPr lvl="1"/>
-            <a:r>
-              <a:rPr lang="en-US" smtClean="0"/>
-              <a:t>Second level</a:t>
-            </a:r>
-          </a:p>
-          <a:p>
-            <a:pPr lvl="2"/>
-            <a:r>
-              <a:rPr lang="en-US" smtClean="0"/>
-              <a:t>Third level</a:t>
-            </a:r>
-          </a:p>
-          <a:p>
-            <a:pPr lvl="3"/>
-            <a:r>
-              <a:rPr lang="en-US" smtClean="0"/>
-              <a:t>Fourth level</a:t>
-            </a:r>
-          </a:p>
-          <a:p>
-            <a:pPr lvl="4"/>
-            <a:r>
-              <a:rPr lang="en-US" smtClean="0"/>
-              <a:t>Fifth level</a:t>
-            </a:r>
-            <a:endParaRPr lang="en-US"/>
-          </a:p>
-        </p:txBody>
-      </p:sp>
-      <p:sp>
-        <p:nvSpPr>
-          <p:cNvPr id="4" name="Date Placeholder 3"/>
-          <p:cNvSpPr>
-            <a:spLocks noGrp="1"/>
-          </p:cNvSpPr>
-          <p:nvPr>
-            <p:ph type="dt" sz="half" idx="10"/>
-          </p:nvPr>
-        </p:nvSpPr>
-        <p:spPr/>
-        <p:txBody>
-          <a:bodyPr/>
-          <a:lstStyle/>
-          <a:p>
-            <a:fld id="{3A7DD4BF-EC1E-4755-8C71-0061F4F36BE2}" type="datetimeFigureOut">
-              <a:rPr lang="en-US" smtClean="0"/>
-              <a:t>3/28/2017</a:t>
-            </a:fld>
-            <a:endParaRPr lang="en-US"/>
-          </a:p>
-        </p:txBody>
-      </p:sp>
-      <p:sp>
-        <p:nvSpPr>
-          <p:cNvPr id="5" name="Footer Placeholder 4"/>
-          <p:cNvSpPr>
-            <a:spLocks noGrp="1"/>
-          </p:cNvSpPr>
-          <p:nvPr>
-            <p:ph type="ftr" sz="quarter" idx="11"/>
-          </p:nvPr>
-        </p:nvSpPr>
-        <p:spPr/>
-        <p:txBody>
-          <a:bodyPr/>
-          <a:lstStyle/>
-          <a:p>
-            <a:endParaRPr lang="en-US"/>
-          </a:p>
-        </p:txBody>
-      </p:sp>
-      <p:sp>
-        <p:nvSpPr>
-          <p:cNvPr id="6" name="Slide Number Placeholder 5"/>
-          <p:cNvSpPr>
-            <a:spLocks noGrp="1"/>
-          </p:cNvSpPr>
-          <p:nvPr>
-            <p:ph type="sldNum" sz="quarter" idx="12"/>
-          </p:nvPr>
-        </p:nvSpPr>
-        <p:spPr/>
-        <p:txBody>
-          <a:bodyPr/>
-          <a:lstStyle/>
-          <a:p>
-            <a:fld id="{8E20C79B-4D7F-4DD1-AFD0-94579907042E}" type="slidenum">
-              <a:rPr lang="en-US" smtClean="0"/>
-              <a:t>‹#›</a:t>
-            </a:fld>
-            <a:endParaRPr lang="en-US"/>
-          </a:p>
-        </p:txBody>
-      </p:sp>
-    </p:spTree>
-    <p:extLst>
-      <p:ext uri="{BB962C8B-B14F-4D97-AF65-F5344CB8AC3E}">
-        <p14:creationId xmlns:p14="http://schemas.microsoft.com/office/powerpoint/2010/main" val="68210969"/>
-      </p:ext>
-    </p:extLst>
-  </p:cSld>
-  <p:clrMapOvr>
-    <a:masterClrMapping/>
-  </p:clrMapOvr>
-</p:sldLayout>
-</file>
-
-<file path=ppt/slideLayouts/slideLayout36.xml><?xml version="1.0" encoding="utf-8"?>
-<p:sldLayout xmlns:a="http://schemas.openxmlformats.org/drawingml/2006/main" xmlns:r="http://schemas.openxmlformats.org/officeDocument/2006/relationships" xmlns:p="http://schemas.openxmlformats.org/presentationml/2006/main" type="secHead" preserve="1">
-  <p:cSld name="Section Header">
-    <p:spTree>
-      <p:nvGrpSpPr>
-        <p:cNvPr id="1" name=""/>
-        <p:cNvGrpSpPr/>
-        <p:nvPr/>
-      </p:nvGrpSpPr>
-      <p:grpSpPr>
-        <a:xfrm>
-          <a:off x="0" y="0"/>
-          <a:ext cx="0" cy="0"/>
-          <a:chOff x="0" y="0"/>
-          <a:chExt cx="0" cy="0"/>
-        </a:xfrm>
-      </p:grpSpPr>
-      <p:sp>
-        <p:nvSpPr>
-          <p:cNvPr id="2" name="Title 1"/>
-          <p:cNvSpPr>
-            <a:spLocks noGrp="1"/>
-          </p:cNvSpPr>
-          <p:nvPr>
-            <p:ph type="title"/>
-          </p:nvPr>
-        </p:nvSpPr>
-        <p:spPr>
-          <a:xfrm>
-            <a:off x="623888" y="1709738"/>
-            <a:ext cx="7886700" cy="2852737"/>
-          </a:xfrm>
-        </p:spPr>
-        <p:txBody>
-          <a:bodyPr anchor="b"/>
-          <a:lstStyle>
-            <a:lvl1pPr>
-              <a:defRPr sz="6000"/>
-            </a:lvl1pPr>
-          </a:lstStyle>
-          <a:p>
-            <a:r>
-              <a:rPr lang="en-US" smtClean="0"/>
-              <a:t>Click to edit Master title style</a:t>
-            </a:r>
-            <a:endParaRPr lang="en-US"/>
-          </a:p>
-        </p:txBody>
-      </p:sp>
-      <p:sp>
-        <p:nvSpPr>
-          <p:cNvPr id="3" name="Text Placeholder 2"/>
-          <p:cNvSpPr>
-            <a:spLocks noGrp="1"/>
-          </p:cNvSpPr>
-          <p:nvPr>
-            <p:ph type="body" idx="1"/>
-          </p:nvPr>
-        </p:nvSpPr>
-        <p:spPr>
-          <a:xfrm>
-            <a:off x="623888" y="4589463"/>
-            <a:ext cx="7886700" cy="1500187"/>
-          </a:xfrm>
-        </p:spPr>
-        <p:txBody>
-          <a:bodyPr/>
-          <a:lstStyle>
-            <a:lvl1pPr marL="0" indent="0">
-              <a:buNone/>
-              <a:defRPr sz="2400">
-                <a:solidFill>
-                  <a:schemeClr val="tx1">
-                    <a:tint val="75000"/>
-                  </a:schemeClr>
-                </a:solidFill>
-              </a:defRPr>
-            </a:lvl1pPr>
-            <a:lvl2pPr marL="457200" indent="0">
-              <a:buNone/>
-              <a:defRPr sz="2000">
-                <a:solidFill>
-                  <a:schemeClr val="tx1">
-                    <a:tint val="75000"/>
-                  </a:schemeClr>
-                </a:solidFill>
-              </a:defRPr>
-            </a:lvl2pPr>
-            <a:lvl3pPr marL="914400" indent="0">
-              <a:buNone/>
-              <a:defRPr sz="1800">
-                <a:solidFill>
-                  <a:schemeClr val="tx1">
-                    <a:tint val="75000"/>
-                  </a:schemeClr>
-                </a:solidFill>
-              </a:defRPr>
-            </a:lvl3pPr>
-            <a:lvl4pPr marL="1371600" indent="0">
-              <a:buNone/>
-              <a:defRPr sz="1600">
-                <a:solidFill>
-                  <a:schemeClr val="tx1">
-                    <a:tint val="75000"/>
-                  </a:schemeClr>
-                </a:solidFill>
-              </a:defRPr>
-            </a:lvl4pPr>
-            <a:lvl5pPr marL="1828800" indent="0">
-              <a:buNone/>
-              <a:defRPr sz="1600">
-                <a:solidFill>
-                  <a:schemeClr val="tx1">
-                    <a:tint val="75000"/>
-                  </a:schemeClr>
-                </a:solidFill>
-              </a:defRPr>
-            </a:lvl5pPr>
-            <a:lvl6pPr marL="2286000" indent="0">
-              <a:buNone/>
-              <a:defRPr sz="1600">
-                <a:solidFill>
-                  <a:schemeClr val="tx1">
-                    <a:tint val="75000"/>
-                  </a:schemeClr>
-                </a:solidFill>
-              </a:defRPr>
-            </a:lvl6pPr>
-            <a:lvl7pPr marL="2743200" indent="0">
-              <a:buNone/>
-              <a:defRPr sz="1600">
-                <a:solidFill>
-                  <a:schemeClr val="tx1">
-                    <a:tint val="75000"/>
-                  </a:schemeClr>
-                </a:solidFill>
-              </a:defRPr>
-            </a:lvl7pPr>
-            <a:lvl8pPr marL="3200400" indent="0">
-              <a:buNone/>
-              <a:defRPr sz="1600">
-                <a:solidFill>
-                  <a:schemeClr val="tx1">
-                    <a:tint val="75000"/>
-                  </a:schemeClr>
-                </a:solidFill>
-              </a:defRPr>
-            </a:lvl8pPr>
-            <a:lvl9pPr marL="3657600" indent="0">
-              <a:buNone/>
-              <a:defRPr sz="1600">
-                <a:solidFill>
-                  <a:schemeClr val="tx1">
-                    <a:tint val="75000"/>
-                  </a:schemeClr>
-                </a:solidFill>
-              </a:defRPr>
-            </a:lvl9pPr>
-          </a:lstStyle>
-          <a:p>
-            <a:pPr lvl="0"/>
-            <a:r>
-              <a:rPr lang="en-US" smtClean="0"/>
-              <a:t>Click to edit Master text styles</a:t>
-            </a:r>
-          </a:p>
-        </p:txBody>
-      </p:sp>
-      <p:sp>
-        <p:nvSpPr>
-          <p:cNvPr id="4" name="Date Placeholder 3"/>
-          <p:cNvSpPr>
-            <a:spLocks noGrp="1"/>
-          </p:cNvSpPr>
-          <p:nvPr>
-            <p:ph type="dt" sz="half" idx="10"/>
-          </p:nvPr>
-        </p:nvSpPr>
-        <p:spPr/>
-        <p:txBody>
-          <a:bodyPr/>
-          <a:lstStyle/>
-          <a:p>
-            <a:fld id="{3A7DD4BF-EC1E-4755-8C71-0061F4F36BE2}" type="datetimeFigureOut">
-              <a:rPr lang="en-US" smtClean="0"/>
-              <a:t>3/28/2017</a:t>
-            </a:fld>
-            <a:endParaRPr lang="en-US"/>
-          </a:p>
-        </p:txBody>
-      </p:sp>
-      <p:sp>
-        <p:nvSpPr>
-          <p:cNvPr id="5" name="Footer Placeholder 4"/>
-          <p:cNvSpPr>
-            <a:spLocks noGrp="1"/>
-          </p:cNvSpPr>
-          <p:nvPr>
-            <p:ph type="ftr" sz="quarter" idx="11"/>
-          </p:nvPr>
-        </p:nvSpPr>
-        <p:spPr/>
-        <p:txBody>
-          <a:bodyPr/>
-          <a:lstStyle/>
-          <a:p>
-            <a:endParaRPr lang="en-US"/>
-          </a:p>
-        </p:txBody>
-      </p:sp>
-      <p:sp>
-        <p:nvSpPr>
-          <p:cNvPr id="6" name="Slide Number Placeholder 5"/>
-          <p:cNvSpPr>
-            <a:spLocks noGrp="1"/>
-          </p:cNvSpPr>
-          <p:nvPr>
-            <p:ph type="sldNum" sz="quarter" idx="12"/>
-          </p:nvPr>
-        </p:nvSpPr>
-        <p:spPr/>
-        <p:txBody>
-          <a:bodyPr/>
-          <a:lstStyle/>
-          <a:p>
-            <a:fld id="{8E20C79B-4D7F-4DD1-AFD0-94579907042E}" type="slidenum">
-              <a:rPr lang="en-US" smtClean="0"/>
-              <a:t>‹#›</a:t>
-            </a:fld>
-            <a:endParaRPr lang="en-US"/>
-          </a:p>
-        </p:txBody>
-      </p:sp>
-    </p:spTree>
-    <p:extLst>
-      <p:ext uri="{BB962C8B-B14F-4D97-AF65-F5344CB8AC3E}">
-        <p14:creationId xmlns:p14="http://schemas.microsoft.com/office/powerpoint/2010/main" val="1163109081"/>
-      </p:ext>
-    </p:extLst>
-  </p:cSld>
-  <p:clrMapOvr>
-    <a:masterClrMapping/>
-  </p:clrMapOvr>
-</p:sldLayout>
-</file>
-
-<file path=ppt/slideLayouts/slideLayout37.xml><?xml version="1.0" encoding="utf-8"?>
-<p:sldLayout xmlns:a="http://schemas.openxmlformats.org/drawingml/2006/main" xmlns:r="http://schemas.openxmlformats.org/officeDocument/2006/relationships" xmlns:p="http://schemas.openxmlformats.org/presentationml/2006/main" type="twoObj" preserve="1">
-  <p:cSld name="Two Content">
-    <p:spTree>
-      <p:nvGrpSpPr>
-        <p:cNvPr id="1" name=""/>
-        <p:cNvGrpSpPr/>
-        <p:nvPr/>
-      </p:nvGrpSpPr>
-      <p:grpSpPr>
-        <a:xfrm>
-          <a:off x="0" y="0"/>
-          <a:ext cx="0" cy="0"/>
-          <a:chOff x="0" y="0"/>
-          <a:chExt cx="0" cy="0"/>
-        </a:xfrm>
-      </p:grpSpPr>
-      <p:sp>
-        <p:nvSpPr>
-          <p:cNvPr id="2" name="Title 1"/>
-          <p:cNvSpPr>
-            <a:spLocks noGrp="1"/>
-          </p:cNvSpPr>
-          <p:nvPr>
-            <p:ph type="title"/>
-          </p:nvPr>
-        </p:nvSpPr>
-        <p:spPr/>
-        <p:txBody>
-          <a:bodyPr/>
-          <a:lstStyle/>
-          <a:p>
-            <a:r>
-              <a:rPr lang="en-US" smtClean="0"/>
-              <a:t>Click to edit Master title style</a:t>
-            </a:r>
-            <a:endParaRPr lang="en-US"/>
-          </a:p>
-        </p:txBody>
-      </p:sp>
-      <p:sp>
-        <p:nvSpPr>
-          <p:cNvPr id="3" name="Content Placeholder 2"/>
-          <p:cNvSpPr>
-            <a:spLocks noGrp="1"/>
-          </p:cNvSpPr>
-          <p:nvPr>
-            <p:ph sz="half" idx="1"/>
-          </p:nvPr>
-        </p:nvSpPr>
-        <p:spPr>
-          <a:xfrm>
-            <a:off x="628650" y="1825625"/>
-            <a:ext cx="3867150" cy="4351338"/>
-          </a:xfrm>
-        </p:spPr>
-        <p:txBody>
-          <a:bodyPr/>
-          <a:lstStyle/>
-          <a:p>
-            <a:pPr lvl="0"/>
-            <a:r>
-              <a:rPr lang="en-US" smtClean="0"/>
-              <a:t>Click to edit Master text styles</a:t>
-            </a:r>
-          </a:p>
-          <a:p>
-            <a:pPr lvl="1"/>
-            <a:r>
-              <a:rPr lang="en-US" smtClean="0"/>
-              <a:t>Second level</a:t>
-            </a:r>
-          </a:p>
-          <a:p>
-            <a:pPr lvl="2"/>
-            <a:r>
-              <a:rPr lang="en-US" smtClean="0"/>
-              <a:t>Third level</a:t>
-            </a:r>
-          </a:p>
-          <a:p>
-            <a:pPr lvl="3"/>
-            <a:r>
-              <a:rPr lang="en-US" smtClean="0"/>
-              <a:t>Fourth level</a:t>
-            </a:r>
-          </a:p>
-          <a:p>
-            <a:pPr lvl="4"/>
-            <a:r>
-              <a:rPr lang="en-US" smtClean="0"/>
-              <a:t>Fifth level</a:t>
-            </a:r>
-            <a:endParaRPr lang="en-US"/>
-          </a:p>
-        </p:txBody>
-      </p:sp>
-      <p:sp>
-        <p:nvSpPr>
-          <p:cNvPr id="4" name="Content Placeholder 3"/>
-          <p:cNvSpPr>
-            <a:spLocks noGrp="1"/>
-          </p:cNvSpPr>
-          <p:nvPr>
-            <p:ph sz="half" idx="2"/>
-          </p:nvPr>
-        </p:nvSpPr>
-        <p:spPr>
-          <a:xfrm>
-            <a:off x="4648200" y="1825625"/>
-            <a:ext cx="3867150" cy="4351338"/>
-          </a:xfrm>
-        </p:spPr>
-        <p:txBody>
-          <a:bodyPr/>
-          <a:lstStyle/>
-          <a:p>
-            <a:pPr lvl="0"/>
-            <a:r>
-              <a:rPr lang="en-US" smtClean="0"/>
-              <a:t>Click to edit Master text styles</a:t>
-            </a:r>
-          </a:p>
-          <a:p>
-            <a:pPr lvl="1"/>
-            <a:r>
-              <a:rPr lang="en-US" smtClean="0"/>
-              <a:t>Second level</a:t>
-            </a:r>
-          </a:p>
-          <a:p>
-            <a:pPr lvl="2"/>
-            <a:r>
-              <a:rPr lang="en-US" smtClean="0"/>
-              <a:t>Third level</a:t>
-            </a:r>
-          </a:p>
-          <a:p>
-            <a:pPr lvl="3"/>
-            <a:r>
-              <a:rPr lang="en-US" smtClean="0"/>
-              <a:t>Fourth level</a:t>
-            </a:r>
-          </a:p>
-          <a:p>
-            <a:pPr lvl="4"/>
-            <a:r>
-              <a:rPr lang="en-US" smtClean="0"/>
-              <a:t>Fifth level</a:t>
-            </a:r>
-            <a:endParaRPr lang="en-US"/>
-          </a:p>
-        </p:txBody>
-      </p:sp>
-      <p:sp>
-        <p:nvSpPr>
-          <p:cNvPr id="5" name="Date Placeholder 4"/>
-          <p:cNvSpPr>
-            <a:spLocks noGrp="1"/>
-          </p:cNvSpPr>
-          <p:nvPr>
-            <p:ph type="dt" sz="half" idx="10"/>
-          </p:nvPr>
-        </p:nvSpPr>
-        <p:spPr/>
-        <p:txBody>
-          <a:bodyPr/>
-          <a:lstStyle/>
-          <a:p>
-            <a:fld id="{3A7DD4BF-EC1E-4755-8C71-0061F4F36BE2}" type="datetimeFigureOut">
-              <a:rPr lang="en-US" smtClean="0"/>
-              <a:t>3/28/2017</a:t>
-            </a:fld>
-            <a:endParaRPr lang="en-US"/>
-          </a:p>
-        </p:txBody>
-      </p:sp>
-      <p:sp>
-        <p:nvSpPr>
-          <p:cNvPr id="6" name="Footer Placeholder 5"/>
-          <p:cNvSpPr>
-            <a:spLocks noGrp="1"/>
-          </p:cNvSpPr>
-          <p:nvPr>
-            <p:ph type="ftr" sz="quarter" idx="11"/>
-          </p:nvPr>
-        </p:nvSpPr>
-        <p:spPr/>
-        <p:txBody>
-          <a:bodyPr/>
-          <a:lstStyle/>
-          <a:p>
-            <a:endParaRPr lang="en-US"/>
-          </a:p>
-        </p:txBody>
-      </p:sp>
-      <p:sp>
-        <p:nvSpPr>
-          <p:cNvPr id="7" name="Slide Number Placeholder 6"/>
-          <p:cNvSpPr>
-            <a:spLocks noGrp="1"/>
-          </p:cNvSpPr>
-          <p:nvPr>
-            <p:ph type="sldNum" sz="quarter" idx="12"/>
-          </p:nvPr>
-        </p:nvSpPr>
-        <p:spPr/>
-        <p:txBody>
-          <a:bodyPr/>
-          <a:lstStyle/>
-          <a:p>
-            <a:fld id="{8E20C79B-4D7F-4DD1-AFD0-94579907042E}" type="slidenum">
-              <a:rPr lang="en-US" smtClean="0"/>
-              <a:t>‹#›</a:t>
-            </a:fld>
-            <a:endParaRPr lang="en-US"/>
-          </a:p>
-        </p:txBody>
-      </p:sp>
-    </p:spTree>
-    <p:extLst>
-      <p:ext uri="{BB962C8B-B14F-4D97-AF65-F5344CB8AC3E}">
-        <p14:creationId xmlns:p14="http://schemas.microsoft.com/office/powerpoint/2010/main" val="3630497716"/>
-      </p:ext>
-    </p:extLst>
-  </p:cSld>
-  <p:clrMapOvr>
-    <a:masterClrMapping/>
-  </p:clrMapOvr>
-</p:sldLayout>
-</file>
-
-<file path=ppt/slideLayouts/slideLayout38.xml><?xml version="1.0" encoding="utf-8"?>
-<p:sldLayout xmlns:a="http://schemas.openxmlformats.org/drawingml/2006/main" xmlns:r="http://schemas.openxmlformats.org/officeDocument/2006/relationships" xmlns:p="http://schemas.openxmlformats.org/presentationml/2006/main" type="twoTxTwoObj" preserve="1">
-  <p:cSld name="Comparison">
-    <p:spTree>
-      <p:nvGrpSpPr>
-        <p:cNvPr id="1" name=""/>
-        <p:cNvGrpSpPr/>
-        <p:nvPr/>
-      </p:nvGrpSpPr>
-      <p:grpSpPr>
-        <a:xfrm>
-          <a:off x="0" y="0"/>
-          <a:ext cx="0" cy="0"/>
-          <a:chOff x="0" y="0"/>
-          <a:chExt cx="0" cy="0"/>
-        </a:xfrm>
-      </p:grpSpPr>
-      <p:sp>
-        <p:nvSpPr>
-          <p:cNvPr id="2" name="Title 1"/>
-          <p:cNvSpPr>
-            <a:spLocks noGrp="1"/>
-          </p:cNvSpPr>
-          <p:nvPr>
-            <p:ph type="title"/>
-          </p:nvPr>
-        </p:nvSpPr>
-        <p:spPr>
-          <a:xfrm>
-            <a:off x="630238" y="365125"/>
-            <a:ext cx="7886700" cy="1325563"/>
-          </a:xfrm>
-        </p:spPr>
-        <p:txBody>
-          <a:bodyPr/>
-          <a:lstStyle/>
-          <a:p>
-            <a:r>
-              <a:rPr lang="en-US" smtClean="0"/>
-              <a:t>Click to edit Master title style</a:t>
-            </a:r>
-            <a:endParaRPr lang="en-US"/>
-          </a:p>
-        </p:txBody>
-      </p:sp>
-      <p:sp>
-        <p:nvSpPr>
-          <p:cNvPr id="3" name="Text Placeholder 2"/>
-          <p:cNvSpPr>
-            <a:spLocks noGrp="1"/>
-          </p:cNvSpPr>
-          <p:nvPr>
-            <p:ph type="body" idx="1"/>
-          </p:nvPr>
-        </p:nvSpPr>
-        <p:spPr>
-          <a:xfrm>
-            <a:off x="630238" y="1681163"/>
-            <a:ext cx="3868737" cy="823912"/>
-          </a:xfrm>
-        </p:spPr>
-        <p:txBody>
-          <a:bodyPr anchor="b"/>
-          <a:lstStyle>
-            <a:lvl1pPr marL="0" indent="0">
-              <a:buNone/>
-              <a:defRPr sz="2400" b="1"/>
-            </a:lvl1pPr>
-            <a:lvl2pPr marL="457200" indent="0">
-              <a:buNone/>
-              <a:defRPr sz="2000" b="1"/>
-            </a:lvl2pPr>
-            <a:lvl3pPr marL="914400" indent="0">
-              <a:buNone/>
-              <a:defRPr sz="1800" b="1"/>
-            </a:lvl3pPr>
-            <a:lvl4pPr marL="1371600" indent="0">
-              <a:buNone/>
-              <a:defRPr sz="1600" b="1"/>
-            </a:lvl4pPr>
-            <a:lvl5pPr marL="1828800" indent="0">
-              <a:buNone/>
-              <a:defRPr sz="1600" b="1"/>
-            </a:lvl5pPr>
-            <a:lvl6pPr marL="2286000" indent="0">
-              <a:buNone/>
-              <a:defRPr sz="1600" b="1"/>
-            </a:lvl6pPr>
-            <a:lvl7pPr marL="2743200" indent="0">
-              <a:buNone/>
-              <a:defRPr sz="1600" b="1"/>
-            </a:lvl7pPr>
-            <a:lvl8pPr marL="3200400" indent="0">
-              <a:buNone/>
-              <a:defRPr sz="1600" b="1"/>
-            </a:lvl8pPr>
-            <a:lvl9pPr marL="3657600" indent="0">
-              <a:buNone/>
-              <a:defRPr sz="1600" b="1"/>
-            </a:lvl9pPr>
-          </a:lstStyle>
-          <a:p>
-            <a:pPr lvl="0"/>
-            <a:r>
-              <a:rPr lang="en-US" smtClean="0"/>
-              <a:t>Click to edit Master text styles</a:t>
-            </a:r>
-          </a:p>
-        </p:txBody>
-      </p:sp>
-      <p:sp>
-        <p:nvSpPr>
-          <p:cNvPr id="4" name="Content Placeholder 3"/>
-          <p:cNvSpPr>
-            <a:spLocks noGrp="1"/>
-          </p:cNvSpPr>
-          <p:nvPr>
-            <p:ph sz="half" idx="2"/>
-          </p:nvPr>
-        </p:nvSpPr>
-        <p:spPr>
-          <a:xfrm>
-            <a:off x="630238" y="2505075"/>
-            <a:ext cx="3868737" cy="3684588"/>
-          </a:xfrm>
-        </p:spPr>
-        <p:txBody>
-          <a:bodyPr/>
-          <a:lstStyle/>
-          <a:p>
-            <a:pPr lvl="0"/>
-            <a:r>
-              <a:rPr lang="en-US" smtClean="0"/>
-              <a:t>Click to edit Master text styles</a:t>
-            </a:r>
-          </a:p>
-          <a:p>
-            <a:pPr lvl="1"/>
-            <a:r>
-              <a:rPr lang="en-US" smtClean="0"/>
-              <a:t>Second level</a:t>
-            </a:r>
-          </a:p>
-          <a:p>
-            <a:pPr lvl="2"/>
-            <a:r>
-              <a:rPr lang="en-US" smtClean="0"/>
-              <a:t>Third level</a:t>
-            </a:r>
-          </a:p>
-          <a:p>
-            <a:pPr lvl="3"/>
-            <a:r>
-              <a:rPr lang="en-US" smtClean="0"/>
-              <a:t>Fourth level</a:t>
-            </a:r>
-          </a:p>
-          <a:p>
-            <a:pPr lvl="4"/>
-            <a:r>
-              <a:rPr lang="en-US" smtClean="0"/>
-              <a:t>Fifth level</a:t>
-            </a:r>
-            <a:endParaRPr lang="en-US"/>
-          </a:p>
-        </p:txBody>
-      </p:sp>
-      <p:sp>
-        <p:nvSpPr>
-          <p:cNvPr id="5" name="Text Placeholder 4"/>
-          <p:cNvSpPr>
-            <a:spLocks noGrp="1"/>
-          </p:cNvSpPr>
-          <p:nvPr>
-            <p:ph type="body" sz="quarter" idx="3"/>
-          </p:nvPr>
-        </p:nvSpPr>
-        <p:spPr>
-          <a:xfrm>
-            <a:off x="4629150" y="1681163"/>
-            <a:ext cx="3887788" cy="823912"/>
-          </a:xfrm>
-        </p:spPr>
-        <p:txBody>
-          <a:bodyPr anchor="b"/>
-          <a:lstStyle>
-            <a:lvl1pPr marL="0" indent="0">
-              <a:buNone/>
-              <a:defRPr sz="2400" b="1"/>
-            </a:lvl1pPr>
-            <a:lvl2pPr marL="457200" indent="0">
-              <a:buNone/>
-              <a:defRPr sz="2000" b="1"/>
-            </a:lvl2pPr>
-            <a:lvl3pPr marL="914400" indent="0">
-              <a:buNone/>
-              <a:defRPr sz="1800" b="1"/>
-            </a:lvl3pPr>
-            <a:lvl4pPr marL="1371600" indent="0">
-              <a:buNone/>
-              <a:defRPr sz="1600" b="1"/>
-            </a:lvl4pPr>
-            <a:lvl5pPr marL="1828800" indent="0">
-              <a:buNone/>
-              <a:defRPr sz="1600" b="1"/>
-            </a:lvl5pPr>
-            <a:lvl6pPr marL="2286000" indent="0">
-              <a:buNone/>
-              <a:defRPr sz="1600" b="1"/>
-            </a:lvl6pPr>
-            <a:lvl7pPr marL="2743200" indent="0">
-              <a:buNone/>
-              <a:defRPr sz="1600" b="1"/>
-            </a:lvl7pPr>
-            <a:lvl8pPr marL="3200400" indent="0">
-              <a:buNone/>
-              <a:defRPr sz="1600" b="1"/>
-            </a:lvl8pPr>
-            <a:lvl9pPr marL="3657600" indent="0">
-              <a:buNone/>
-              <a:defRPr sz="1600" b="1"/>
-            </a:lvl9pPr>
-          </a:lstStyle>
-          <a:p>
-            <a:pPr lvl="0"/>
-            <a:r>
-              <a:rPr lang="en-US" smtClean="0"/>
-              <a:t>Click to edit Master text styles</a:t>
-            </a:r>
-          </a:p>
-        </p:txBody>
-      </p:sp>
-      <p:sp>
-        <p:nvSpPr>
-          <p:cNvPr id="6" name="Content Placeholder 5"/>
-          <p:cNvSpPr>
-            <a:spLocks noGrp="1"/>
-          </p:cNvSpPr>
-          <p:nvPr>
-            <p:ph sz="quarter" idx="4"/>
-          </p:nvPr>
-        </p:nvSpPr>
-        <p:spPr>
-          <a:xfrm>
-            <a:off x="4629150" y="2505075"/>
-            <a:ext cx="3887788" cy="3684588"/>
-          </a:xfrm>
-        </p:spPr>
-        <p:txBody>
-          <a:bodyPr/>
-          <a:lstStyle/>
-          <a:p>
-            <a:pPr lvl="0"/>
-            <a:r>
-              <a:rPr lang="en-US" smtClean="0"/>
-              <a:t>Click to edit Master text styles</a:t>
-            </a:r>
-          </a:p>
-          <a:p>
-            <a:pPr lvl="1"/>
-            <a:r>
-              <a:rPr lang="en-US" smtClean="0"/>
-              <a:t>Second level</a:t>
-            </a:r>
-          </a:p>
-          <a:p>
-            <a:pPr lvl="2"/>
-            <a:r>
-              <a:rPr lang="en-US" smtClean="0"/>
-              <a:t>Third level</a:t>
-            </a:r>
-          </a:p>
-          <a:p>
-            <a:pPr lvl="3"/>
-            <a:r>
-              <a:rPr lang="en-US" smtClean="0"/>
-              <a:t>Fourth level</a:t>
-            </a:r>
-          </a:p>
-          <a:p>
-            <a:pPr lvl="4"/>
-            <a:r>
-              <a:rPr lang="en-US" smtClean="0"/>
-              <a:t>Fifth level</a:t>
-            </a:r>
-            <a:endParaRPr lang="en-US"/>
-          </a:p>
-        </p:txBody>
-      </p:sp>
-      <p:sp>
-        <p:nvSpPr>
-          <p:cNvPr id="7" name="Date Placeholder 6"/>
-          <p:cNvSpPr>
-            <a:spLocks noGrp="1"/>
-          </p:cNvSpPr>
-          <p:nvPr>
-            <p:ph type="dt" sz="half" idx="10"/>
-          </p:nvPr>
-        </p:nvSpPr>
-        <p:spPr/>
-        <p:txBody>
-          <a:bodyPr/>
-          <a:lstStyle/>
-          <a:p>
-            <a:fld id="{3A7DD4BF-EC1E-4755-8C71-0061F4F36BE2}" type="datetimeFigureOut">
-              <a:rPr lang="en-US" smtClean="0"/>
-              <a:t>3/28/2017</a:t>
-            </a:fld>
-            <a:endParaRPr lang="en-US"/>
-          </a:p>
-        </p:txBody>
-      </p:sp>
-      <p:sp>
-        <p:nvSpPr>
-          <p:cNvPr id="8" name="Footer Placeholder 7"/>
-          <p:cNvSpPr>
-            <a:spLocks noGrp="1"/>
-          </p:cNvSpPr>
-          <p:nvPr>
-            <p:ph type="ftr" sz="quarter" idx="11"/>
-          </p:nvPr>
-        </p:nvSpPr>
-        <p:spPr/>
-        <p:txBody>
-          <a:bodyPr/>
-          <a:lstStyle/>
-          <a:p>
-            <a:endParaRPr lang="en-US"/>
-          </a:p>
-        </p:txBody>
-      </p:sp>
-      <p:sp>
-        <p:nvSpPr>
-          <p:cNvPr id="9" name="Slide Number Placeholder 8"/>
-          <p:cNvSpPr>
-            <a:spLocks noGrp="1"/>
-          </p:cNvSpPr>
-          <p:nvPr>
-            <p:ph type="sldNum" sz="quarter" idx="12"/>
-          </p:nvPr>
-        </p:nvSpPr>
-        <p:spPr/>
-        <p:txBody>
-          <a:bodyPr/>
-          <a:lstStyle/>
-          <a:p>
-            <a:fld id="{8E20C79B-4D7F-4DD1-AFD0-94579907042E}" type="slidenum">
-              <a:rPr lang="en-US" smtClean="0"/>
-              <a:t>‹#›</a:t>
-            </a:fld>
-            <a:endParaRPr lang="en-US"/>
-          </a:p>
-        </p:txBody>
-      </p:sp>
-    </p:spTree>
-    <p:extLst>
-      <p:ext uri="{BB962C8B-B14F-4D97-AF65-F5344CB8AC3E}">
-        <p14:creationId xmlns:p14="http://schemas.microsoft.com/office/powerpoint/2010/main" val="1957304392"/>
-      </p:ext>
-    </p:extLst>
-  </p:cSld>
-  <p:clrMapOvr>
-    <a:masterClrMapping/>
-  </p:clrMapOvr>
-</p:sldLayout>
-</file>
-
-<file path=ppt/slideLayouts/slideLayout39.xml><?xml version="1.0" encoding="utf-8"?>
-<p:sldLayout xmlns:a="http://schemas.openxmlformats.org/drawingml/2006/main" xmlns:r="http://schemas.openxmlformats.org/officeDocument/2006/relationships" xmlns:p="http://schemas.openxmlformats.org/presentationml/2006/main" type="titleOnly" preserve="1">
-  <p:cSld name="Title Only">
-    <p:spTree>
-      <p:nvGrpSpPr>
-        <p:cNvPr id="1" name=""/>
-        <p:cNvGrpSpPr/>
-        <p:nvPr/>
-      </p:nvGrpSpPr>
-      <p:grpSpPr>
-        <a:xfrm>
-          <a:off x="0" y="0"/>
-          <a:ext cx="0" cy="0"/>
-          <a:chOff x="0" y="0"/>
-          <a:chExt cx="0" cy="0"/>
-        </a:xfrm>
-      </p:grpSpPr>
-      <p:sp>
-        <p:nvSpPr>
-          <p:cNvPr id="2" name="Title 1"/>
-          <p:cNvSpPr>
-            <a:spLocks noGrp="1"/>
-          </p:cNvSpPr>
-          <p:nvPr>
-            <p:ph type="title"/>
-          </p:nvPr>
-        </p:nvSpPr>
-        <p:spPr/>
-        <p:txBody>
-          <a:bodyPr/>
-          <a:lstStyle/>
-          <a:p>
-            <a:r>
-              <a:rPr lang="en-US" smtClean="0"/>
-              <a:t>Click to edit Master title style</a:t>
-            </a:r>
-            <a:endParaRPr lang="en-US"/>
-          </a:p>
-        </p:txBody>
-      </p:sp>
-      <p:sp>
-        <p:nvSpPr>
-          <p:cNvPr id="3" name="Date Placeholder 2"/>
-          <p:cNvSpPr>
-            <a:spLocks noGrp="1"/>
-          </p:cNvSpPr>
-          <p:nvPr>
-            <p:ph type="dt" sz="half" idx="10"/>
-          </p:nvPr>
-        </p:nvSpPr>
-        <p:spPr/>
-        <p:txBody>
-          <a:bodyPr/>
-          <a:lstStyle/>
-          <a:p>
-            <a:fld id="{3A7DD4BF-EC1E-4755-8C71-0061F4F36BE2}" type="datetimeFigureOut">
-              <a:rPr lang="en-US" smtClean="0"/>
-              <a:t>3/28/2017</a:t>
-            </a:fld>
-            <a:endParaRPr lang="en-US"/>
-          </a:p>
-        </p:txBody>
-      </p:sp>
-      <p:sp>
-        <p:nvSpPr>
-          <p:cNvPr id="4" name="Footer Placeholder 3"/>
-          <p:cNvSpPr>
-            <a:spLocks noGrp="1"/>
-          </p:cNvSpPr>
-          <p:nvPr>
-            <p:ph type="ftr" sz="quarter" idx="11"/>
-          </p:nvPr>
-        </p:nvSpPr>
-        <p:spPr/>
-        <p:txBody>
-          <a:bodyPr/>
-          <a:lstStyle/>
-          <a:p>
-            <a:endParaRPr lang="en-US"/>
-          </a:p>
-        </p:txBody>
-      </p:sp>
-      <p:sp>
-        <p:nvSpPr>
-          <p:cNvPr id="5" name="Slide Number Placeholder 4"/>
-          <p:cNvSpPr>
-            <a:spLocks noGrp="1"/>
-          </p:cNvSpPr>
-          <p:nvPr>
-            <p:ph type="sldNum" sz="quarter" idx="12"/>
-          </p:nvPr>
-        </p:nvSpPr>
-        <p:spPr/>
-        <p:txBody>
-          <a:bodyPr/>
-          <a:lstStyle/>
-          <a:p>
-            <a:fld id="{8E20C79B-4D7F-4DD1-AFD0-94579907042E}" type="slidenum">
-              <a:rPr lang="en-US" smtClean="0"/>
-              <a:t>‹#›</a:t>
-            </a:fld>
-            <a:endParaRPr lang="en-US"/>
-          </a:p>
-        </p:txBody>
-      </p:sp>
-    </p:spTree>
-    <p:extLst>
-      <p:ext uri="{BB962C8B-B14F-4D97-AF65-F5344CB8AC3E}">
-        <p14:creationId xmlns:p14="http://schemas.microsoft.com/office/powerpoint/2010/main" val="858583760"/>
-      </p:ext>
-    </p:extLst>
-  </p:cSld>
-  <p:clrMapOvr>
-    <a:masterClrMapping/>
-  </p:clrMapOvr>
-</p:sldLayout>
-</file>
-
 <file path=ppt/slideLayouts/slideLayout4.xml><?xml version="1.0" encoding="utf-8"?>
 <p:sldLayout xmlns:a="http://schemas.openxmlformats.org/drawingml/2006/main" xmlns:r="http://schemas.openxmlformats.org/officeDocument/2006/relationships" xmlns:p="http://schemas.openxmlformats.org/presentationml/2006/main" type="twoObj" preserve="1">
   <p:cSld name="Two Content">
@@ -10379,981 +9411,6 @@
     <p:extLst>
       <p:ext uri="{BB962C8B-B14F-4D97-AF65-F5344CB8AC3E}">
         <p14:creationId xmlns:p14="http://schemas.microsoft.com/office/powerpoint/2010/main" val="373755402"/>
-      </p:ext>
-    </p:extLst>
-  </p:cSld>
-  <p:clrMapOvr>
-    <a:masterClrMapping/>
-  </p:clrMapOvr>
-</p:sldLayout>
-</file>
-
-<file path=ppt/slideLayouts/slideLayout40.xml><?xml version="1.0" encoding="utf-8"?>
-<p:sldLayout xmlns:a="http://schemas.openxmlformats.org/drawingml/2006/main" xmlns:r="http://schemas.openxmlformats.org/officeDocument/2006/relationships" xmlns:p="http://schemas.openxmlformats.org/presentationml/2006/main" type="blank" preserve="1">
-  <p:cSld name="Blank">
-    <p:spTree>
-      <p:nvGrpSpPr>
-        <p:cNvPr id="1" name=""/>
-        <p:cNvGrpSpPr/>
-        <p:nvPr/>
-      </p:nvGrpSpPr>
-      <p:grpSpPr>
-        <a:xfrm>
-          <a:off x="0" y="0"/>
-          <a:ext cx="0" cy="0"/>
-          <a:chOff x="0" y="0"/>
-          <a:chExt cx="0" cy="0"/>
-        </a:xfrm>
-      </p:grpSpPr>
-      <p:sp>
-        <p:nvSpPr>
-          <p:cNvPr id="2" name="Date Placeholder 1"/>
-          <p:cNvSpPr>
-            <a:spLocks noGrp="1"/>
-          </p:cNvSpPr>
-          <p:nvPr>
-            <p:ph type="dt" sz="half" idx="10"/>
-          </p:nvPr>
-        </p:nvSpPr>
-        <p:spPr/>
-        <p:txBody>
-          <a:bodyPr/>
-          <a:lstStyle/>
-          <a:p>
-            <a:fld id="{3A7DD4BF-EC1E-4755-8C71-0061F4F36BE2}" type="datetimeFigureOut">
-              <a:rPr lang="en-US" smtClean="0"/>
-              <a:t>3/28/2017</a:t>
-            </a:fld>
-            <a:endParaRPr lang="en-US"/>
-          </a:p>
-        </p:txBody>
-      </p:sp>
-      <p:sp>
-        <p:nvSpPr>
-          <p:cNvPr id="3" name="Footer Placeholder 2"/>
-          <p:cNvSpPr>
-            <a:spLocks noGrp="1"/>
-          </p:cNvSpPr>
-          <p:nvPr>
-            <p:ph type="ftr" sz="quarter" idx="11"/>
-          </p:nvPr>
-        </p:nvSpPr>
-        <p:spPr/>
-        <p:txBody>
-          <a:bodyPr/>
-          <a:lstStyle/>
-          <a:p>
-            <a:endParaRPr lang="en-US"/>
-          </a:p>
-        </p:txBody>
-      </p:sp>
-      <p:sp>
-        <p:nvSpPr>
-          <p:cNvPr id="4" name="Slide Number Placeholder 3"/>
-          <p:cNvSpPr>
-            <a:spLocks noGrp="1"/>
-          </p:cNvSpPr>
-          <p:nvPr>
-            <p:ph type="sldNum" sz="quarter" idx="12"/>
-          </p:nvPr>
-        </p:nvSpPr>
-        <p:spPr/>
-        <p:txBody>
-          <a:bodyPr/>
-          <a:lstStyle/>
-          <a:p>
-            <a:fld id="{8E20C79B-4D7F-4DD1-AFD0-94579907042E}" type="slidenum">
-              <a:rPr lang="en-US" smtClean="0"/>
-              <a:t>‹#›</a:t>
-            </a:fld>
-            <a:endParaRPr lang="en-US"/>
-          </a:p>
-        </p:txBody>
-      </p:sp>
-    </p:spTree>
-    <p:extLst>
-      <p:ext uri="{BB962C8B-B14F-4D97-AF65-F5344CB8AC3E}">
-        <p14:creationId xmlns:p14="http://schemas.microsoft.com/office/powerpoint/2010/main" val="778013818"/>
-      </p:ext>
-    </p:extLst>
-  </p:cSld>
-  <p:clrMapOvr>
-    <a:masterClrMapping/>
-  </p:clrMapOvr>
-</p:sldLayout>
-</file>
-
-<file path=ppt/slideLayouts/slideLayout41.xml><?xml version="1.0" encoding="utf-8"?>
-<p:sldLayout xmlns:a="http://schemas.openxmlformats.org/drawingml/2006/main" xmlns:r="http://schemas.openxmlformats.org/officeDocument/2006/relationships" xmlns:p="http://schemas.openxmlformats.org/presentationml/2006/main" type="objTx" preserve="1">
-  <p:cSld name="Content with Caption">
-    <p:spTree>
-      <p:nvGrpSpPr>
-        <p:cNvPr id="1" name=""/>
-        <p:cNvGrpSpPr/>
-        <p:nvPr/>
-      </p:nvGrpSpPr>
-      <p:grpSpPr>
-        <a:xfrm>
-          <a:off x="0" y="0"/>
-          <a:ext cx="0" cy="0"/>
-          <a:chOff x="0" y="0"/>
-          <a:chExt cx="0" cy="0"/>
-        </a:xfrm>
-      </p:grpSpPr>
-      <p:sp>
-        <p:nvSpPr>
-          <p:cNvPr id="2" name="Title 1"/>
-          <p:cNvSpPr>
-            <a:spLocks noGrp="1"/>
-          </p:cNvSpPr>
-          <p:nvPr>
-            <p:ph type="title"/>
-          </p:nvPr>
-        </p:nvSpPr>
-        <p:spPr>
-          <a:xfrm>
-            <a:off x="630238" y="457200"/>
-            <a:ext cx="2949575" cy="1600200"/>
-          </a:xfrm>
-        </p:spPr>
-        <p:txBody>
-          <a:bodyPr anchor="b"/>
-          <a:lstStyle>
-            <a:lvl1pPr>
-              <a:defRPr sz="3200"/>
-            </a:lvl1pPr>
-          </a:lstStyle>
-          <a:p>
-            <a:r>
-              <a:rPr lang="en-US" smtClean="0"/>
-              <a:t>Click to edit Master title style</a:t>
-            </a:r>
-            <a:endParaRPr lang="en-US"/>
-          </a:p>
-        </p:txBody>
-      </p:sp>
-      <p:sp>
-        <p:nvSpPr>
-          <p:cNvPr id="3" name="Content Placeholder 2"/>
-          <p:cNvSpPr>
-            <a:spLocks noGrp="1"/>
-          </p:cNvSpPr>
-          <p:nvPr>
-            <p:ph idx="1"/>
-          </p:nvPr>
-        </p:nvSpPr>
-        <p:spPr>
-          <a:xfrm>
-            <a:off x="3887788" y="987425"/>
-            <a:ext cx="4629150" cy="4873625"/>
-          </a:xfrm>
-        </p:spPr>
-        <p:txBody>
-          <a:bodyPr/>
-          <a:lstStyle>
-            <a:lvl1pPr>
-              <a:defRPr sz="3200"/>
-            </a:lvl1pPr>
-            <a:lvl2pPr>
-              <a:defRPr sz="2800"/>
-            </a:lvl2pPr>
-            <a:lvl3pPr>
-              <a:defRPr sz="2400"/>
-            </a:lvl3pPr>
-            <a:lvl4pPr>
-              <a:defRPr sz="2000"/>
-            </a:lvl4pPr>
-            <a:lvl5pPr>
-              <a:defRPr sz="2000"/>
-            </a:lvl5pPr>
-            <a:lvl6pPr>
-              <a:defRPr sz="2000"/>
-            </a:lvl6pPr>
-            <a:lvl7pPr>
-              <a:defRPr sz="2000"/>
-            </a:lvl7pPr>
-            <a:lvl8pPr>
-              <a:defRPr sz="2000"/>
-            </a:lvl8pPr>
-            <a:lvl9pPr>
-              <a:defRPr sz="2000"/>
-            </a:lvl9pPr>
-          </a:lstStyle>
-          <a:p>
-            <a:pPr lvl="0"/>
-            <a:r>
-              <a:rPr lang="en-US" smtClean="0"/>
-              <a:t>Click to edit Master text styles</a:t>
-            </a:r>
-          </a:p>
-          <a:p>
-            <a:pPr lvl="1"/>
-            <a:r>
-              <a:rPr lang="en-US" smtClean="0"/>
-              <a:t>Second level</a:t>
-            </a:r>
-          </a:p>
-          <a:p>
-            <a:pPr lvl="2"/>
-            <a:r>
-              <a:rPr lang="en-US" smtClean="0"/>
-              <a:t>Third level</a:t>
-            </a:r>
-          </a:p>
-          <a:p>
-            <a:pPr lvl="3"/>
-            <a:r>
-              <a:rPr lang="en-US" smtClean="0"/>
-              <a:t>Fourth level</a:t>
-            </a:r>
-          </a:p>
-          <a:p>
-            <a:pPr lvl="4"/>
-            <a:r>
-              <a:rPr lang="en-US" smtClean="0"/>
-              <a:t>Fifth level</a:t>
-            </a:r>
-            <a:endParaRPr lang="en-US"/>
-          </a:p>
-        </p:txBody>
-      </p:sp>
-      <p:sp>
-        <p:nvSpPr>
-          <p:cNvPr id="4" name="Text Placeholder 3"/>
-          <p:cNvSpPr>
-            <a:spLocks noGrp="1"/>
-          </p:cNvSpPr>
-          <p:nvPr>
-            <p:ph type="body" sz="half" idx="2"/>
-          </p:nvPr>
-        </p:nvSpPr>
-        <p:spPr>
-          <a:xfrm>
-            <a:off x="630238" y="2057400"/>
-            <a:ext cx="2949575" cy="3811588"/>
-          </a:xfrm>
-        </p:spPr>
-        <p:txBody>
-          <a:bodyPr/>
-          <a:lstStyle>
-            <a:lvl1pPr marL="0" indent="0">
-              <a:buNone/>
-              <a:defRPr sz="1600"/>
-            </a:lvl1pPr>
-            <a:lvl2pPr marL="457200" indent="0">
-              <a:buNone/>
-              <a:defRPr sz="1400"/>
-            </a:lvl2pPr>
-            <a:lvl3pPr marL="914400" indent="0">
-              <a:buNone/>
-              <a:defRPr sz="1200"/>
-            </a:lvl3pPr>
-            <a:lvl4pPr marL="1371600" indent="0">
-              <a:buNone/>
-              <a:defRPr sz="1000"/>
-            </a:lvl4pPr>
-            <a:lvl5pPr marL="1828800" indent="0">
-              <a:buNone/>
-              <a:defRPr sz="1000"/>
-            </a:lvl5pPr>
-            <a:lvl6pPr marL="2286000" indent="0">
-              <a:buNone/>
-              <a:defRPr sz="1000"/>
-            </a:lvl6pPr>
-            <a:lvl7pPr marL="2743200" indent="0">
-              <a:buNone/>
-              <a:defRPr sz="1000"/>
-            </a:lvl7pPr>
-            <a:lvl8pPr marL="3200400" indent="0">
-              <a:buNone/>
-              <a:defRPr sz="1000"/>
-            </a:lvl8pPr>
-            <a:lvl9pPr marL="3657600" indent="0">
-              <a:buNone/>
-              <a:defRPr sz="1000"/>
-            </a:lvl9pPr>
-          </a:lstStyle>
-          <a:p>
-            <a:pPr lvl="0"/>
-            <a:r>
-              <a:rPr lang="en-US" smtClean="0"/>
-              <a:t>Click to edit Master text styles</a:t>
-            </a:r>
-          </a:p>
-        </p:txBody>
-      </p:sp>
-      <p:sp>
-        <p:nvSpPr>
-          <p:cNvPr id="5" name="Date Placeholder 4"/>
-          <p:cNvSpPr>
-            <a:spLocks noGrp="1"/>
-          </p:cNvSpPr>
-          <p:nvPr>
-            <p:ph type="dt" sz="half" idx="10"/>
-          </p:nvPr>
-        </p:nvSpPr>
-        <p:spPr/>
-        <p:txBody>
-          <a:bodyPr/>
-          <a:lstStyle/>
-          <a:p>
-            <a:fld id="{3A7DD4BF-EC1E-4755-8C71-0061F4F36BE2}" type="datetimeFigureOut">
-              <a:rPr lang="en-US" smtClean="0"/>
-              <a:t>3/28/2017</a:t>
-            </a:fld>
-            <a:endParaRPr lang="en-US"/>
-          </a:p>
-        </p:txBody>
-      </p:sp>
-      <p:sp>
-        <p:nvSpPr>
-          <p:cNvPr id="6" name="Footer Placeholder 5"/>
-          <p:cNvSpPr>
-            <a:spLocks noGrp="1"/>
-          </p:cNvSpPr>
-          <p:nvPr>
-            <p:ph type="ftr" sz="quarter" idx="11"/>
-          </p:nvPr>
-        </p:nvSpPr>
-        <p:spPr/>
-        <p:txBody>
-          <a:bodyPr/>
-          <a:lstStyle/>
-          <a:p>
-            <a:endParaRPr lang="en-US"/>
-          </a:p>
-        </p:txBody>
-      </p:sp>
-      <p:sp>
-        <p:nvSpPr>
-          <p:cNvPr id="7" name="Slide Number Placeholder 6"/>
-          <p:cNvSpPr>
-            <a:spLocks noGrp="1"/>
-          </p:cNvSpPr>
-          <p:nvPr>
-            <p:ph type="sldNum" sz="quarter" idx="12"/>
-          </p:nvPr>
-        </p:nvSpPr>
-        <p:spPr/>
-        <p:txBody>
-          <a:bodyPr/>
-          <a:lstStyle/>
-          <a:p>
-            <a:fld id="{8E20C79B-4D7F-4DD1-AFD0-94579907042E}" type="slidenum">
-              <a:rPr lang="en-US" smtClean="0"/>
-              <a:t>‹#›</a:t>
-            </a:fld>
-            <a:endParaRPr lang="en-US"/>
-          </a:p>
-        </p:txBody>
-      </p:sp>
-    </p:spTree>
-    <p:extLst>
-      <p:ext uri="{BB962C8B-B14F-4D97-AF65-F5344CB8AC3E}">
-        <p14:creationId xmlns:p14="http://schemas.microsoft.com/office/powerpoint/2010/main" val="2133603435"/>
-      </p:ext>
-    </p:extLst>
-  </p:cSld>
-  <p:clrMapOvr>
-    <a:masterClrMapping/>
-  </p:clrMapOvr>
-</p:sldLayout>
-</file>
-
-<file path=ppt/slideLayouts/slideLayout42.xml><?xml version="1.0" encoding="utf-8"?>
-<p:sldLayout xmlns:a="http://schemas.openxmlformats.org/drawingml/2006/main" xmlns:r="http://schemas.openxmlformats.org/officeDocument/2006/relationships" xmlns:p="http://schemas.openxmlformats.org/presentationml/2006/main" type="picTx" preserve="1">
-  <p:cSld name="Picture with Caption">
-    <p:spTree>
-      <p:nvGrpSpPr>
-        <p:cNvPr id="1" name=""/>
-        <p:cNvGrpSpPr/>
-        <p:nvPr/>
-      </p:nvGrpSpPr>
-      <p:grpSpPr>
-        <a:xfrm>
-          <a:off x="0" y="0"/>
-          <a:ext cx="0" cy="0"/>
-          <a:chOff x="0" y="0"/>
-          <a:chExt cx="0" cy="0"/>
-        </a:xfrm>
-      </p:grpSpPr>
-      <p:sp>
-        <p:nvSpPr>
-          <p:cNvPr id="2" name="Title 1"/>
-          <p:cNvSpPr>
-            <a:spLocks noGrp="1"/>
-          </p:cNvSpPr>
-          <p:nvPr>
-            <p:ph type="title"/>
-          </p:nvPr>
-        </p:nvSpPr>
-        <p:spPr>
-          <a:xfrm>
-            <a:off x="630238" y="457200"/>
-            <a:ext cx="2949575" cy="1600200"/>
-          </a:xfrm>
-        </p:spPr>
-        <p:txBody>
-          <a:bodyPr anchor="b"/>
-          <a:lstStyle>
-            <a:lvl1pPr>
-              <a:defRPr sz="3200"/>
-            </a:lvl1pPr>
-          </a:lstStyle>
-          <a:p>
-            <a:r>
-              <a:rPr lang="en-US" smtClean="0"/>
-              <a:t>Click to edit Master title style</a:t>
-            </a:r>
-            <a:endParaRPr lang="en-US"/>
-          </a:p>
-        </p:txBody>
-      </p:sp>
-      <p:sp>
-        <p:nvSpPr>
-          <p:cNvPr id="3" name="Picture Placeholder 2"/>
-          <p:cNvSpPr>
-            <a:spLocks noGrp="1"/>
-          </p:cNvSpPr>
-          <p:nvPr>
-            <p:ph type="pic" idx="1"/>
-          </p:nvPr>
-        </p:nvSpPr>
-        <p:spPr>
-          <a:xfrm>
-            <a:off x="3887788" y="987425"/>
-            <a:ext cx="4629150" cy="4873625"/>
-          </a:xfrm>
-        </p:spPr>
-        <p:txBody>
-          <a:bodyPr/>
-          <a:lstStyle>
-            <a:lvl1pPr marL="0" indent="0">
-              <a:buNone/>
-              <a:defRPr sz="3200"/>
-            </a:lvl1pPr>
-            <a:lvl2pPr marL="457200" indent="0">
-              <a:buNone/>
-              <a:defRPr sz="2800"/>
-            </a:lvl2pPr>
-            <a:lvl3pPr marL="914400" indent="0">
-              <a:buNone/>
-              <a:defRPr sz="2400"/>
-            </a:lvl3pPr>
-            <a:lvl4pPr marL="1371600" indent="0">
-              <a:buNone/>
-              <a:defRPr sz="2000"/>
-            </a:lvl4pPr>
-            <a:lvl5pPr marL="1828800" indent="0">
-              <a:buNone/>
-              <a:defRPr sz="2000"/>
-            </a:lvl5pPr>
-            <a:lvl6pPr marL="2286000" indent="0">
-              <a:buNone/>
-              <a:defRPr sz="2000"/>
-            </a:lvl6pPr>
-            <a:lvl7pPr marL="2743200" indent="0">
-              <a:buNone/>
-              <a:defRPr sz="2000"/>
-            </a:lvl7pPr>
-            <a:lvl8pPr marL="3200400" indent="0">
-              <a:buNone/>
-              <a:defRPr sz="2000"/>
-            </a:lvl8pPr>
-            <a:lvl9pPr marL="3657600" indent="0">
-              <a:buNone/>
-              <a:defRPr sz="2000"/>
-            </a:lvl9pPr>
-          </a:lstStyle>
-          <a:p>
-            <a:endParaRPr lang="en-US"/>
-          </a:p>
-        </p:txBody>
-      </p:sp>
-      <p:sp>
-        <p:nvSpPr>
-          <p:cNvPr id="4" name="Text Placeholder 3"/>
-          <p:cNvSpPr>
-            <a:spLocks noGrp="1"/>
-          </p:cNvSpPr>
-          <p:nvPr>
-            <p:ph type="body" sz="half" idx="2"/>
-          </p:nvPr>
-        </p:nvSpPr>
-        <p:spPr>
-          <a:xfrm>
-            <a:off x="630238" y="2057400"/>
-            <a:ext cx="2949575" cy="3811588"/>
-          </a:xfrm>
-        </p:spPr>
-        <p:txBody>
-          <a:bodyPr/>
-          <a:lstStyle>
-            <a:lvl1pPr marL="0" indent="0">
-              <a:buNone/>
-              <a:defRPr sz="1600"/>
-            </a:lvl1pPr>
-            <a:lvl2pPr marL="457200" indent="0">
-              <a:buNone/>
-              <a:defRPr sz="1400"/>
-            </a:lvl2pPr>
-            <a:lvl3pPr marL="914400" indent="0">
-              <a:buNone/>
-              <a:defRPr sz="1200"/>
-            </a:lvl3pPr>
-            <a:lvl4pPr marL="1371600" indent="0">
-              <a:buNone/>
-              <a:defRPr sz="1000"/>
-            </a:lvl4pPr>
-            <a:lvl5pPr marL="1828800" indent="0">
-              <a:buNone/>
-              <a:defRPr sz="1000"/>
-            </a:lvl5pPr>
-            <a:lvl6pPr marL="2286000" indent="0">
-              <a:buNone/>
-              <a:defRPr sz="1000"/>
-            </a:lvl6pPr>
-            <a:lvl7pPr marL="2743200" indent="0">
-              <a:buNone/>
-              <a:defRPr sz="1000"/>
-            </a:lvl7pPr>
-            <a:lvl8pPr marL="3200400" indent="0">
-              <a:buNone/>
-              <a:defRPr sz="1000"/>
-            </a:lvl8pPr>
-            <a:lvl9pPr marL="3657600" indent="0">
-              <a:buNone/>
-              <a:defRPr sz="1000"/>
-            </a:lvl9pPr>
-          </a:lstStyle>
-          <a:p>
-            <a:pPr lvl="0"/>
-            <a:r>
-              <a:rPr lang="en-US" smtClean="0"/>
-              <a:t>Click to edit Master text styles</a:t>
-            </a:r>
-          </a:p>
-        </p:txBody>
-      </p:sp>
-      <p:sp>
-        <p:nvSpPr>
-          <p:cNvPr id="5" name="Date Placeholder 4"/>
-          <p:cNvSpPr>
-            <a:spLocks noGrp="1"/>
-          </p:cNvSpPr>
-          <p:nvPr>
-            <p:ph type="dt" sz="half" idx="10"/>
-          </p:nvPr>
-        </p:nvSpPr>
-        <p:spPr/>
-        <p:txBody>
-          <a:bodyPr/>
-          <a:lstStyle/>
-          <a:p>
-            <a:fld id="{3A7DD4BF-EC1E-4755-8C71-0061F4F36BE2}" type="datetimeFigureOut">
-              <a:rPr lang="en-US" smtClean="0"/>
-              <a:t>3/28/2017</a:t>
-            </a:fld>
-            <a:endParaRPr lang="en-US"/>
-          </a:p>
-        </p:txBody>
-      </p:sp>
-      <p:sp>
-        <p:nvSpPr>
-          <p:cNvPr id="6" name="Footer Placeholder 5"/>
-          <p:cNvSpPr>
-            <a:spLocks noGrp="1"/>
-          </p:cNvSpPr>
-          <p:nvPr>
-            <p:ph type="ftr" sz="quarter" idx="11"/>
-          </p:nvPr>
-        </p:nvSpPr>
-        <p:spPr/>
-        <p:txBody>
-          <a:bodyPr/>
-          <a:lstStyle/>
-          <a:p>
-            <a:endParaRPr lang="en-US"/>
-          </a:p>
-        </p:txBody>
-      </p:sp>
-      <p:sp>
-        <p:nvSpPr>
-          <p:cNvPr id="7" name="Slide Number Placeholder 6"/>
-          <p:cNvSpPr>
-            <a:spLocks noGrp="1"/>
-          </p:cNvSpPr>
-          <p:nvPr>
-            <p:ph type="sldNum" sz="quarter" idx="12"/>
-          </p:nvPr>
-        </p:nvSpPr>
-        <p:spPr/>
-        <p:txBody>
-          <a:bodyPr/>
-          <a:lstStyle/>
-          <a:p>
-            <a:fld id="{8E20C79B-4D7F-4DD1-AFD0-94579907042E}" type="slidenum">
-              <a:rPr lang="en-US" smtClean="0"/>
-              <a:t>‹#›</a:t>
-            </a:fld>
-            <a:endParaRPr lang="en-US"/>
-          </a:p>
-        </p:txBody>
-      </p:sp>
-    </p:spTree>
-    <p:extLst>
-      <p:ext uri="{BB962C8B-B14F-4D97-AF65-F5344CB8AC3E}">
-        <p14:creationId xmlns:p14="http://schemas.microsoft.com/office/powerpoint/2010/main" val="1274140022"/>
-      </p:ext>
-    </p:extLst>
-  </p:cSld>
-  <p:clrMapOvr>
-    <a:masterClrMapping/>
-  </p:clrMapOvr>
-</p:sldLayout>
-</file>
-
-<file path=ppt/slideLayouts/slideLayout43.xml><?xml version="1.0" encoding="utf-8"?>
-<p:sldLayout xmlns:a="http://schemas.openxmlformats.org/drawingml/2006/main" xmlns:r="http://schemas.openxmlformats.org/officeDocument/2006/relationships" xmlns:p="http://schemas.openxmlformats.org/presentationml/2006/main" type="vertTx" preserve="1">
-  <p:cSld name="Title and Vertical Text">
-    <p:spTree>
-      <p:nvGrpSpPr>
-        <p:cNvPr id="1" name=""/>
-        <p:cNvGrpSpPr/>
-        <p:nvPr/>
-      </p:nvGrpSpPr>
-      <p:grpSpPr>
-        <a:xfrm>
-          <a:off x="0" y="0"/>
-          <a:ext cx="0" cy="0"/>
-          <a:chOff x="0" y="0"/>
-          <a:chExt cx="0" cy="0"/>
-        </a:xfrm>
-      </p:grpSpPr>
-      <p:sp>
-        <p:nvSpPr>
-          <p:cNvPr id="2" name="Title 1"/>
-          <p:cNvSpPr>
-            <a:spLocks noGrp="1"/>
-          </p:cNvSpPr>
-          <p:nvPr>
-            <p:ph type="title"/>
-          </p:nvPr>
-        </p:nvSpPr>
-        <p:spPr/>
-        <p:txBody>
-          <a:bodyPr/>
-          <a:lstStyle/>
-          <a:p>
-            <a:r>
-              <a:rPr lang="en-US" smtClean="0"/>
-              <a:t>Click to edit Master title style</a:t>
-            </a:r>
-            <a:endParaRPr lang="en-US"/>
-          </a:p>
-        </p:txBody>
-      </p:sp>
-      <p:sp>
-        <p:nvSpPr>
-          <p:cNvPr id="3" name="Vertical Text Placeholder 2"/>
-          <p:cNvSpPr>
-            <a:spLocks noGrp="1"/>
-          </p:cNvSpPr>
-          <p:nvPr>
-            <p:ph type="body" orient="vert" idx="1"/>
-          </p:nvPr>
-        </p:nvSpPr>
-        <p:spPr/>
-        <p:txBody>
-          <a:bodyPr vert="eaVert"/>
-          <a:lstStyle/>
-          <a:p>
-            <a:pPr lvl="0"/>
-            <a:r>
-              <a:rPr lang="en-US" smtClean="0"/>
-              <a:t>Click to edit Master text styles</a:t>
-            </a:r>
-          </a:p>
-          <a:p>
-            <a:pPr lvl="1"/>
-            <a:r>
-              <a:rPr lang="en-US" smtClean="0"/>
-              <a:t>Second level</a:t>
-            </a:r>
-          </a:p>
-          <a:p>
-            <a:pPr lvl="2"/>
-            <a:r>
-              <a:rPr lang="en-US" smtClean="0"/>
-              <a:t>Third level</a:t>
-            </a:r>
-          </a:p>
-          <a:p>
-            <a:pPr lvl="3"/>
-            <a:r>
-              <a:rPr lang="en-US" smtClean="0"/>
-              <a:t>Fourth level</a:t>
-            </a:r>
-          </a:p>
-          <a:p>
-            <a:pPr lvl="4"/>
-            <a:r>
-              <a:rPr lang="en-US" smtClean="0"/>
-              <a:t>Fifth level</a:t>
-            </a:r>
-            <a:endParaRPr lang="en-US"/>
-          </a:p>
-        </p:txBody>
-      </p:sp>
-      <p:sp>
-        <p:nvSpPr>
-          <p:cNvPr id="4" name="Date Placeholder 3"/>
-          <p:cNvSpPr>
-            <a:spLocks noGrp="1"/>
-          </p:cNvSpPr>
-          <p:nvPr>
-            <p:ph type="dt" sz="half" idx="10"/>
-          </p:nvPr>
-        </p:nvSpPr>
-        <p:spPr/>
-        <p:txBody>
-          <a:bodyPr/>
-          <a:lstStyle/>
-          <a:p>
-            <a:fld id="{3A7DD4BF-EC1E-4755-8C71-0061F4F36BE2}" type="datetimeFigureOut">
-              <a:rPr lang="en-US" smtClean="0"/>
-              <a:t>3/28/2017</a:t>
-            </a:fld>
-            <a:endParaRPr lang="en-US"/>
-          </a:p>
-        </p:txBody>
-      </p:sp>
-      <p:sp>
-        <p:nvSpPr>
-          <p:cNvPr id="5" name="Footer Placeholder 4"/>
-          <p:cNvSpPr>
-            <a:spLocks noGrp="1"/>
-          </p:cNvSpPr>
-          <p:nvPr>
-            <p:ph type="ftr" sz="quarter" idx="11"/>
-          </p:nvPr>
-        </p:nvSpPr>
-        <p:spPr/>
-        <p:txBody>
-          <a:bodyPr/>
-          <a:lstStyle/>
-          <a:p>
-            <a:endParaRPr lang="en-US"/>
-          </a:p>
-        </p:txBody>
-      </p:sp>
-      <p:sp>
-        <p:nvSpPr>
-          <p:cNvPr id="6" name="Slide Number Placeholder 5"/>
-          <p:cNvSpPr>
-            <a:spLocks noGrp="1"/>
-          </p:cNvSpPr>
-          <p:nvPr>
-            <p:ph type="sldNum" sz="quarter" idx="12"/>
-          </p:nvPr>
-        </p:nvSpPr>
-        <p:spPr/>
-        <p:txBody>
-          <a:bodyPr/>
-          <a:lstStyle/>
-          <a:p>
-            <a:fld id="{8E20C79B-4D7F-4DD1-AFD0-94579907042E}" type="slidenum">
-              <a:rPr lang="en-US" smtClean="0"/>
-              <a:t>‹#›</a:t>
-            </a:fld>
-            <a:endParaRPr lang="en-US"/>
-          </a:p>
-        </p:txBody>
-      </p:sp>
-    </p:spTree>
-    <p:extLst>
-      <p:ext uri="{BB962C8B-B14F-4D97-AF65-F5344CB8AC3E}">
-        <p14:creationId xmlns:p14="http://schemas.microsoft.com/office/powerpoint/2010/main" val="614091368"/>
-      </p:ext>
-    </p:extLst>
-  </p:cSld>
-  <p:clrMapOvr>
-    <a:masterClrMapping/>
-  </p:clrMapOvr>
-</p:sldLayout>
-</file>
-
-<file path=ppt/slideLayouts/slideLayout44.xml><?xml version="1.0" encoding="utf-8"?>
-<p:sldLayout xmlns:a="http://schemas.openxmlformats.org/drawingml/2006/main" xmlns:r="http://schemas.openxmlformats.org/officeDocument/2006/relationships" xmlns:p="http://schemas.openxmlformats.org/presentationml/2006/main" type="vertTitleAndTx" preserve="1">
-  <p:cSld name="Vertical Title and Text">
-    <p:spTree>
-      <p:nvGrpSpPr>
-        <p:cNvPr id="1" name=""/>
-        <p:cNvGrpSpPr/>
-        <p:nvPr/>
-      </p:nvGrpSpPr>
-      <p:grpSpPr>
-        <a:xfrm>
-          <a:off x="0" y="0"/>
-          <a:ext cx="0" cy="0"/>
-          <a:chOff x="0" y="0"/>
-          <a:chExt cx="0" cy="0"/>
-        </a:xfrm>
-      </p:grpSpPr>
-      <p:sp>
-        <p:nvSpPr>
-          <p:cNvPr id="2" name="Vertical Title 1"/>
-          <p:cNvSpPr>
-            <a:spLocks noGrp="1"/>
-          </p:cNvSpPr>
-          <p:nvPr>
-            <p:ph type="title" orient="vert"/>
-          </p:nvPr>
-        </p:nvSpPr>
-        <p:spPr>
-          <a:xfrm>
-            <a:off x="6543675" y="365125"/>
-            <a:ext cx="1971675" cy="5811838"/>
-          </a:xfrm>
-        </p:spPr>
-        <p:txBody>
-          <a:bodyPr vert="eaVert"/>
-          <a:lstStyle/>
-          <a:p>
-            <a:r>
-              <a:rPr lang="en-US" smtClean="0"/>
-              <a:t>Click to edit Master title style</a:t>
-            </a:r>
-            <a:endParaRPr lang="en-US"/>
-          </a:p>
-        </p:txBody>
-      </p:sp>
-      <p:sp>
-        <p:nvSpPr>
-          <p:cNvPr id="3" name="Vertical Text Placeholder 2"/>
-          <p:cNvSpPr>
-            <a:spLocks noGrp="1"/>
-          </p:cNvSpPr>
-          <p:nvPr>
-            <p:ph type="body" orient="vert" idx="1"/>
-          </p:nvPr>
-        </p:nvSpPr>
-        <p:spPr>
-          <a:xfrm>
-            <a:off x="628650" y="365125"/>
-            <a:ext cx="5762625" cy="5811838"/>
-          </a:xfrm>
-        </p:spPr>
-        <p:txBody>
-          <a:bodyPr vert="eaVert"/>
-          <a:lstStyle/>
-          <a:p>
-            <a:pPr lvl="0"/>
-            <a:r>
-              <a:rPr lang="en-US" smtClean="0"/>
-              <a:t>Click to edit Master text styles</a:t>
-            </a:r>
-          </a:p>
-          <a:p>
-            <a:pPr lvl="1"/>
-            <a:r>
-              <a:rPr lang="en-US" smtClean="0"/>
-              <a:t>Second level</a:t>
-            </a:r>
-          </a:p>
-          <a:p>
-            <a:pPr lvl="2"/>
-            <a:r>
-              <a:rPr lang="en-US" smtClean="0"/>
-              <a:t>Third level</a:t>
-            </a:r>
-          </a:p>
-          <a:p>
-            <a:pPr lvl="3"/>
-            <a:r>
-              <a:rPr lang="en-US" smtClean="0"/>
-              <a:t>Fourth level</a:t>
-            </a:r>
-          </a:p>
-          <a:p>
-            <a:pPr lvl="4"/>
-            <a:r>
-              <a:rPr lang="en-US" smtClean="0"/>
-              <a:t>Fifth level</a:t>
-            </a:r>
-            <a:endParaRPr lang="en-US"/>
-          </a:p>
-        </p:txBody>
-      </p:sp>
-      <p:sp>
-        <p:nvSpPr>
-          <p:cNvPr id="4" name="Date Placeholder 3"/>
-          <p:cNvSpPr>
-            <a:spLocks noGrp="1"/>
-          </p:cNvSpPr>
-          <p:nvPr>
-            <p:ph type="dt" sz="half" idx="10"/>
-          </p:nvPr>
-        </p:nvSpPr>
-        <p:spPr/>
-        <p:txBody>
-          <a:bodyPr/>
-          <a:lstStyle/>
-          <a:p>
-            <a:fld id="{3A7DD4BF-EC1E-4755-8C71-0061F4F36BE2}" type="datetimeFigureOut">
-              <a:rPr lang="en-US" smtClean="0"/>
-              <a:t>3/28/2017</a:t>
-            </a:fld>
-            <a:endParaRPr lang="en-US"/>
-          </a:p>
-        </p:txBody>
-      </p:sp>
-      <p:sp>
-        <p:nvSpPr>
-          <p:cNvPr id="5" name="Footer Placeholder 4"/>
-          <p:cNvSpPr>
-            <a:spLocks noGrp="1"/>
-          </p:cNvSpPr>
-          <p:nvPr>
-            <p:ph type="ftr" sz="quarter" idx="11"/>
-          </p:nvPr>
-        </p:nvSpPr>
-        <p:spPr/>
-        <p:txBody>
-          <a:bodyPr/>
-          <a:lstStyle/>
-          <a:p>
-            <a:endParaRPr lang="en-US"/>
-          </a:p>
-        </p:txBody>
-      </p:sp>
-      <p:sp>
-        <p:nvSpPr>
-          <p:cNvPr id="6" name="Slide Number Placeholder 5"/>
-          <p:cNvSpPr>
-            <a:spLocks noGrp="1"/>
-          </p:cNvSpPr>
-          <p:nvPr>
-            <p:ph type="sldNum" sz="quarter" idx="12"/>
-          </p:nvPr>
-        </p:nvSpPr>
-        <p:spPr/>
-        <p:txBody>
-          <a:bodyPr/>
-          <a:lstStyle/>
-          <a:p>
-            <a:fld id="{8E20C79B-4D7F-4DD1-AFD0-94579907042E}" type="slidenum">
-              <a:rPr lang="en-US" smtClean="0"/>
-              <a:t>‹#›</a:t>
-            </a:fld>
-            <a:endParaRPr lang="en-US"/>
-          </a:p>
-        </p:txBody>
-      </p:sp>
-    </p:spTree>
-    <p:extLst>
-      <p:ext uri="{BB962C8B-B14F-4D97-AF65-F5344CB8AC3E}">
-        <p14:creationId xmlns:p14="http://schemas.microsoft.com/office/powerpoint/2010/main" val="3347459397"/>
       </p:ext>
     </p:extLst>
   </p:cSld>
@@ -14053,546 +12110,6 @@
 </p:sldMaster>
 </file>
 
-<file path=ppt/slideMasters/slideMaster4.xml><?xml version="1.0" encoding="utf-8"?>
-<p:sldMaster xmlns:a="http://schemas.openxmlformats.org/drawingml/2006/main" xmlns:r="http://schemas.openxmlformats.org/officeDocument/2006/relationships" xmlns:p="http://schemas.openxmlformats.org/presentationml/2006/main" preserve="1">
-  <p:cSld>
-    <p:bg>
-      <p:bgRef idx="1001">
-        <a:schemeClr val="bg1"/>
-      </p:bgRef>
-    </p:bg>
-    <p:spTree>
-      <p:nvGrpSpPr>
-        <p:cNvPr id="1" name=""/>
-        <p:cNvGrpSpPr/>
-        <p:nvPr/>
-      </p:nvGrpSpPr>
-      <p:grpSpPr>
-        <a:xfrm>
-          <a:off x="0" y="0"/>
-          <a:ext cx="0" cy="0"/>
-          <a:chOff x="0" y="0"/>
-          <a:chExt cx="0" cy="0"/>
-        </a:xfrm>
-      </p:grpSpPr>
-      <p:sp>
-        <p:nvSpPr>
-          <p:cNvPr id="2" name="Title Placeholder 1"/>
-          <p:cNvSpPr>
-            <a:spLocks noGrp="1"/>
-          </p:cNvSpPr>
-          <p:nvPr>
-            <p:ph type="title"/>
-          </p:nvPr>
-        </p:nvSpPr>
-        <p:spPr>
-          <a:xfrm>
-            <a:off x="628650" y="365125"/>
-            <a:ext cx="7886700" cy="1325563"/>
-          </a:xfrm>
-          <a:prstGeom prst="rect">
-            <a:avLst/>
-          </a:prstGeom>
-        </p:spPr>
-        <p:txBody>
-          <a:bodyPr vert="horz" lIns="91440" tIns="45720" rIns="91440" bIns="45720" rtlCol="0" anchor="ctr">
-            <a:normAutofit/>
-          </a:bodyPr>
-          <a:lstStyle/>
-          <a:p>
-            <a:r>
-              <a:rPr lang="en-US" smtClean="0"/>
-              <a:t>Click to edit Master title style</a:t>
-            </a:r>
-            <a:endParaRPr lang="en-US"/>
-          </a:p>
-        </p:txBody>
-      </p:sp>
-      <p:sp>
-        <p:nvSpPr>
-          <p:cNvPr id="3" name="Text Placeholder 2"/>
-          <p:cNvSpPr>
-            <a:spLocks noGrp="1"/>
-          </p:cNvSpPr>
-          <p:nvPr>
-            <p:ph type="body" idx="1"/>
-          </p:nvPr>
-        </p:nvSpPr>
-        <p:spPr>
-          <a:xfrm>
-            <a:off x="628650" y="1825625"/>
-            <a:ext cx="7886700" cy="4351338"/>
-          </a:xfrm>
-          <a:prstGeom prst="rect">
-            <a:avLst/>
-          </a:prstGeom>
-        </p:spPr>
-        <p:txBody>
-          <a:bodyPr vert="horz" lIns="91440" tIns="45720" rIns="91440" bIns="45720" rtlCol="0">
-            <a:normAutofit/>
-          </a:bodyPr>
-          <a:lstStyle/>
-          <a:p>
-            <a:pPr lvl="0"/>
-            <a:r>
-              <a:rPr lang="en-US" smtClean="0"/>
-              <a:t>Click to edit Master text styles</a:t>
-            </a:r>
-          </a:p>
-          <a:p>
-            <a:pPr lvl="1"/>
-            <a:r>
-              <a:rPr lang="en-US" smtClean="0"/>
-              <a:t>Second level</a:t>
-            </a:r>
-          </a:p>
-          <a:p>
-            <a:pPr lvl="2"/>
-            <a:r>
-              <a:rPr lang="en-US" smtClean="0"/>
-              <a:t>Third level</a:t>
-            </a:r>
-          </a:p>
-          <a:p>
-            <a:pPr lvl="3"/>
-            <a:r>
-              <a:rPr lang="en-US" smtClean="0"/>
-              <a:t>Fourth level</a:t>
-            </a:r>
-          </a:p>
-          <a:p>
-            <a:pPr lvl="4"/>
-            <a:r>
-              <a:rPr lang="en-US" smtClean="0"/>
-              <a:t>Fifth level</a:t>
-            </a:r>
-            <a:endParaRPr lang="en-US"/>
-          </a:p>
-        </p:txBody>
-      </p:sp>
-      <p:sp>
-        <p:nvSpPr>
-          <p:cNvPr id="4" name="Date Placeholder 3"/>
-          <p:cNvSpPr>
-            <a:spLocks noGrp="1"/>
-          </p:cNvSpPr>
-          <p:nvPr>
-            <p:ph type="dt" sz="half" idx="2"/>
-          </p:nvPr>
-        </p:nvSpPr>
-        <p:spPr>
-          <a:xfrm>
-            <a:off x="628650" y="6356350"/>
-            <a:ext cx="2057400" cy="365125"/>
-          </a:xfrm>
-          <a:prstGeom prst="rect">
-            <a:avLst/>
-          </a:prstGeom>
-        </p:spPr>
-        <p:txBody>
-          <a:bodyPr vert="horz" lIns="91440" tIns="45720" rIns="91440" bIns="45720" rtlCol="0" anchor="ctr"/>
-          <a:lstStyle>
-            <a:lvl1pPr algn="l">
-              <a:defRPr sz="1200">
-                <a:solidFill>
-                  <a:schemeClr val="tx1">
-                    <a:tint val="75000"/>
-                  </a:schemeClr>
-                </a:solidFill>
-              </a:defRPr>
-            </a:lvl1pPr>
-          </a:lstStyle>
-          <a:p>
-            <a:fld id="{3A7DD4BF-EC1E-4755-8C71-0061F4F36BE2}" type="datetimeFigureOut">
-              <a:rPr lang="en-US" smtClean="0"/>
-              <a:t>3/28/2017</a:t>
-            </a:fld>
-            <a:endParaRPr lang="en-US"/>
-          </a:p>
-        </p:txBody>
-      </p:sp>
-      <p:sp>
-        <p:nvSpPr>
-          <p:cNvPr id="5" name="Footer Placeholder 4"/>
-          <p:cNvSpPr>
-            <a:spLocks noGrp="1"/>
-          </p:cNvSpPr>
-          <p:nvPr>
-            <p:ph type="ftr" sz="quarter" idx="3"/>
-          </p:nvPr>
-        </p:nvSpPr>
-        <p:spPr>
-          <a:xfrm>
-            <a:off x="3028950" y="6356350"/>
-            <a:ext cx="3086100" cy="365125"/>
-          </a:xfrm>
-          <a:prstGeom prst="rect">
-            <a:avLst/>
-          </a:prstGeom>
-        </p:spPr>
-        <p:txBody>
-          <a:bodyPr vert="horz" lIns="91440" tIns="45720" rIns="91440" bIns="45720" rtlCol="0" anchor="ctr"/>
-          <a:lstStyle>
-            <a:lvl1pPr algn="ctr">
-              <a:defRPr sz="1200">
-                <a:solidFill>
-                  <a:schemeClr val="tx1">
-                    <a:tint val="75000"/>
-                  </a:schemeClr>
-                </a:solidFill>
-              </a:defRPr>
-            </a:lvl1pPr>
-          </a:lstStyle>
-          <a:p>
-            <a:endParaRPr lang="en-US"/>
-          </a:p>
-        </p:txBody>
-      </p:sp>
-      <p:sp>
-        <p:nvSpPr>
-          <p:cNvPr id="6" name="Slide Number Placeholder 5"/>
-          <p:cNvSpPr>
-            <a:spLocks noGrp="1"/>
-          </p:cNvSpPr>
-          <p:nvPr>
-            <p:ph type="sldNum" sz="quarter" idx="4"/>
-          </p:nvPr>
-        </p:nvSpPr>
-        <p:spPr>
-          <a:xfrm>
-            <a:off x="6457950" y="6356350"/>
-            <a:ext cx="2057400" cy="365125"/>
-          </a:xfrm>
-          <a:prstGeom prst="rect">
-            <a:avLst/>
-          </a:prstGeom>
-        </p:spPr>
-        <p:txBody>
-          <a:bodyPr vert="horz" lIns="91440" tIns="45720" rIns="91440" bIns="45720" rtlCol="0" anchor="ctr"/>
-          <a:lstStyle>
-            <a:lvl1pPr algn="r">
-              <a:defRPr sz="1200">
-                <a:solidFill>
-                  <a:schemeClr val="tx1">
-                    <a:tint val="75000"/>
-                  </a:schemeClr>
-                </a:solidFill>
-              </a:defRPr>
-            </a:lvl1pPr>
-          </a:lstStyle>
-          <a:p>
-            <a:fld id="{8E20C79B-4D7F-4DD1-AFD0-94579907042E}" type="slidenum">
-              <a:rPr lang="en-US" smtClean="0"/>
-              <a:t>‹#›</a:t>
-            </a:fld>
-            <a:endParaRPr lang="en-US"/>
-          </a:p>
-        </p:txBody>
-      </p:sp>
-    </p:spTree>
-    <p:extLst>
-      <p:ext uri="{BB962C8B-B14F-4D97-AF65-F5344CB8AC3E}">
-        <p14:creationId xmlns:p14="http://schemas.microsoft.com/office/powerpoint/2010/main" val="2017755596"/>
-      </p:ext>
-    </p:extLst>
-  </p:cSld>
-  <p:clrMap bg1="lt1" tx1="dk1" bg2="lt2" tx2="dk2" accent1="accent1" accent2="accent2" accent3="accent3" accent4="accent4" accent5="accent5" accent6="accent6" hlink="hlink" folHlink="folHlink"/>
-  <p:sldLayoutIdLst>
-    <p:sldLayoutId id="2147483685" r:id="rId1"/>
-    <p:sldLayoutId id="2147483686" r:id="rId2"/>
-    <p:sldLayoutId id="2147483687" r:id="rId3"/>
-    <p:sldLayoutId id="2147483688" r:id="rId4"/>
-    <p:sldLayoutId id="2147483689" r:id="rId5"/>
-    <p:sldLayoutId id="2147483690" r:id="rId6"/>
-    <p:sldLayoutId id="2147483691" r:id="rId7"/>
-    <p:sldLayoutId id="2147483692" r:id="rId8"/>
-    <p:sldLayoutId id="2147483693" r:id="rId9"/>
-    <p:sldLayoutId id="2147483694" r:id="rId10"/>
-    <p:sldLayoutId id="2147483695" r:id="rId11"/>
-  </p:sldLayoutIdLst>
-  <p:txStyles>
-    <p:titleStyle>
-      <a:lvl1pPr algn="l" defTabSz="914400" rtl="0" eaLnBrk="1" latinLnBrk="0" hangingPunct="1">
-        <a:lnSpc>
-          <a:spcPct val="90000"/>
-        </a:lnSpc>
-        <a:spcBef>
-          <a:spcPct val="0"/>
-        </a:spcBef>
-        <a:buNone/>
-        <a:defRPr sz="4400" kern="1200">
-          <a:solidFill>
-            <a:schemeClr val="tx1"/>
-          </a:solidFill>
-          <a:latin typeface="+mj-lt"/>
-          <a:ea typeface="+mj-ea"/>
-          <a:cs typeface="+mj-cs"/>
-        </a:defRPr>
-      </a:lvl1pPr>
-    </p:titleStyle>
-    <p:bodyStyle>
-      <a:lvl1pPr marL="228600" indent="-228600" algn="l" defTabSz="914400" rtl="0" eaLnBrk="1" latinLnBrk="0" hangingPunct="1">
-        <a:lnSpc>
-          <a:spcPct val="90000"/>
-        </a:lnSpc>
-        <a:spcBef>
-          <a:spcPts val="1000"/>
-        </a:spcBef>
-        <a:buFont typeface="Arial" panose="020B0604020202020204" pitchFamily="34" charset="0"/>
-        <a:buChar char="•"/>
-        <a:defRPr sz="2800" kern="1200">
-          <a:solidFill>
-            <a:schemeClr val="tx1"/>
-          </a:solidFill>
-          <a:latin typeface="+mn-lt"/>
-          <a:ea typeface="+mn-ea"/>
-          <a:cs typeface="+mn-cs"/>
-        </a:defRPr>
-      </a:lvl1pPr>
-      <a:lvl2pPr marL="685800" indent="-228600" algn="l" defTabSz="914400" rtl="0" eaLnBrk="1" latinLnBrk="0" hangingPunct="1">
-        <a:lnSpc>
-          <a:spcPct val="90000"/>
-        </a:lnSpc>
-        <a:spcBef>
-          <a:spcPts val="500"/>
-        </a:spcBef>
-        <a:buFont typeface="Arial" panose="020B0604020202020204" pitchFamily="34" charset="0"/>
-        <a:buChar char="•"/>
-        <a:defRPr sz="2400" kern="1200">
-          <a:solidFill>
-            <a:schemeClr val="tx1"/>
-          </a:solidFill>
-          <a:latin typeface="+mn-lt"/>
-          <a:ea typeface="+mn-ea"/>
-          <a:cs typeface="+mn-cs"/>
-        </a:defRPr>
-      </a:lvl2pPr>
-      <a:lvl3pPr marL="1143000" indent="-228600" algn="l" defTabSz="914400" rtl="0" eaLnBrk="1" latinLnBrk="0" hangingPunct="1">
-        <a:lnSpc>
-          <a:spcPct val="90000"/>
-        </a:lnSpc>
-        <a:spcBef>
-          <a:spcPts val="500"/>
-        </a:spcBef>
-        <a:buFont typeface="Arial" panose="020B0604020202020204" pitchFamily="34" charset="0"/>
-        <a:buChar char="•"/>
-        <a:defRPr sz="2000" kern="1200">
-          <a:solidFill>
-            <a:schemeClr val="tx1"/>
-          </a:solidFill>
-          <a:latin typeface="+mn-lt"/>
-          <a:ea typeface="+mn-ea"/>
-          <a:cs typeface="+mn-cs"/>
-        </a:defRPr>
-      </a:lvl3pPr>
-      <a:lvl4pPr marL="1600200" indent="-228600" algn="l" defTabSz="914400" rtl="0" eaLnBrk="1" latinLnBrk="0" hangingPunct="1">
-        <a:lnSpc>
-          <a:spcPct val="90000"/>
-        </a:lnSpc>
-        <a:spcBef>
-          <a:spcPts val="500"/>
-        </a:spcBef>
-        <a:buFont typeface="Arial" panose="020B0604020202020204" pitchFamily="34" charset="0"/>
-        <a:buChar char="•"/>
-        <a:defRPr sz="1800" kern="1200">
-          <a:solidFill>
-            <a:schemeClr val="tx1"/>
-          </a:solidFill>
-          <a:latin typeface="+mn-lt"/>
-          <a:ea typeface="+mn-ea"/>
-          <a:cs typeface="+mn-cs"/>
-        </a:defRPr>
-      </a:lvl4pPr>
-      <a:lvl5pPr marL="2057400" indent="-228600" algn="l" defTabSz="914400" rtl="0" eaLnBrk="1" latinLnBrk="0" hangingPunct="1">
-        <a:lnSpc>
-          <a:spcPct val="90000"/>
-        </a:lnSpc>
-        <a:spcBef>
-          <a:spcPts val="500"/>
-        </a:spcBef>
-        <a:buFont typeface="Arial" panose="020B0604020202020204" pitchFamily="34" charset="0"/>
-        <a:buChar char="•"/>
-        <a:defRPr sz="1800" kern="1200">
-          <a:solidFill>
-            <a:schemeClr val="tx1"/>
-          </a:solidFill>
-          <a:latin typeface="+mn-lt"/>
-          <a:ea typeface="+mn-ea"/>
-          <a:cs typeface="+mn-cs"/>
-        </a:defRPr>
-      </a:lvl5pPr>
-      <a:lvl6pPr marL="2514600" indent="-228600" algn="l" defTabSz="914400" rtl="0" eaLnBrk="1" latinLnBrk="0" hangingPunct="1">
-        <a:lnSpc>
-          <a:spcPct val="90000"/>
-        </a:lnSpc>
-        <a:spcBef>
-          <a:spcPts val="500"/>
-        </a:spcBef>
-        <a:buFont typeface="Arial" panose="020B0604020202020204" pitchFamily="34" charset="0"/>
-        <a:buChar char="•"/>
-        <a:defRPr sz="1800" kern="1200">
-          <a:solidFill>
-            <a:schemeClr val="tx1"/>
-          </a:solidFill>
-          <a:latin typeface="+mn-lt"/>
-          <a:ea typeface="+mn-ea"/>
-          <a:cs typeface="+mn-cs"/>
-        </a:defRPr>
-      </a:lvl6pPr>
-      <a:lvl7pPr marL="2971800" indent="-228600" algn="l" defTabSz="914400" rtl="0" eaLnBrk="1" latinLnBrk="0" hangingPunct="1">
-        <a:lnSpc>
-          <a:spcPct val="90000"/>
-        </a:lnSpc>
-        <a:spcBef>
-          <a:spcPts val="500"/>
-        </a:spcBef>
-        <a:buFont typeface="Arial" panose="020B0604020202020204" pitchFamily="34" charset="0"/>
-        <a:buChar char="•"/>
-        <a:defRPr sz="1800" kern="1200">
-          <a:solidFill>
-            <a:schemeClr val="tx1"/>
-          </a:solidFill>
-          <a:latin typeface="+mn-lt"/>
-          <a:ea typeface="+mn-ea"/>
-          <a:cs typeface="+mn-cs"/>
-        </a:defRPr>
-      </a:lvl7pPr>
-      <a:lvl8pPr marL="3429000" indent="-228600" algn="l" defTabSz="914400" rtl="0" eaLnBrk="1" latinLnBrk="0" hangingPunct="1">
-        <a:lnSpc>
-          <a:spcPct val="90000"/>
-        </a:lnSpc>
-        <a:spcBef>
-          <a:spcPts val="500"/>
-        </a:spcBef>
-        <a:buFont typeface="Arial" panose="020B0604020202020204" pitchFamily="34" charset="0"/>
-        <a:buChar char="•"/>
-        <a:defRPr sz="1800" kern="1200">
-          <a:solidFill>
-            <a:schemeClr val="tx1"/>
-          </a:solidFill>
-          <a:latin typeface="+mn-lt"/>
-          <a:ea typeface="+mn-ea"/>
-          <a:cs typeface="+mn-cs"/>
-        </a:defRPr>
-      </a:lvl8pPr>
-      <a:lvl9pPr marL="3886200" indent="-228600" algn="l" defTabSz="914400" rtl="0" eaLnBrk="1" latinLnBrk="0" hangingPunct="1">
-        <a:lnSpc>
-          <a:spcPct val="90000"/>
-        </a:lnSpc>
-        <a:spcBef>
-          <a:spcPts val="500"/>
-        </a:spcBef>
-        <a:buFont typeface="Arial" panose="020B0604020202020204" pitchFamily="34" charset="0"/>
-        <a:buChar char="•"/>
-        <a:defRPr sz="1800" kern="1200">
-          <a:solidFill>
-            <a:schemeClr val="tx1"/>
-          </a:solidFill>
-          <a:latin typeface="+mn-lt"/>
-          <a:ea typeface="+mn-ea"/>
-          <a:cs typeface="+mn-cs"/>
-        </a:defRPr>
-      </a:lvl9pPr>
-    </p:bodyStyle>
-    <p:otherStyle>
-      <a:defPPr>
-        <a:defRPr lang="en-US"/>
-      </a:defPPr>
-      <a:lvl1pPr marL="0" algn="l" defTabSz="914400" rtl="0" eaLnBrk="1" latinLnBrk="0" hangingPunct="1">
-        <a:defRPr sz="1800" kern="1200">
-          <a:solidFill>
-            <a:schemeClr val="tx1"/>
-          </a:solidFill>
-          <a:latin typeface="+mn-lt"/>
-          <a:ea typeface="+mn-ea"/>
-          <a:cs typeface="+mn-cs"/>
-        </a:defRPr>
-      </a:lvl1pPr>
-      <a:lvl2pPr marL="457200" algn="l" defTabSz="914400" rtl="0" eaLnBrk="1" latinLnBrk="0" hangingPunct="1">
-        <a:defRPr sz="1800" kern="1200">
-          <a:solidFill>
-            <a:schemeClr val="tx1"/>
-          </a:solidFill>
-          <a:latin typeface="+mn-lt"/>
-          <a:ea typeface="+mn-ea"/>
-          <a:cs typeface="+mn-cs"/>
-        </a:defRPr>
-      </a:lvl2pPr>
-      <a:lvl3pPr marL="914400" algn="l" defTabSz="914400" rtl="0" eaLnBrk="1" latinLnBrk="0" hangingPunct="1">
-        <a:defRPr sz="1800" kern="1200">
-          <a:solidFill>
-            <a:schemeClr val="tx1"/>
-          </a:solidFill>
-          <a:latin typeface="+mn-lt"/>
-          <a:ea typeface="+mn-ea"/>
-          <a:cs typeface="+mn-cs"/>
-        </a:defRPr>
-      </a:lvl3pPr>
-      <a:lvl4pPr marL="1371600" algn="l" defTabSz="914400" rtl="0" eaLnBrk="1" latinLnBrk="0" hangingPunct="1">
-        <a:defRPr sz="1800" kern="1200">
-          <a:solidFill>
-            <a:schemeClr val="tx1"/>
-          </a:solidFill>
-          <a:latin typeface="+mn-lt"/>
-          <a:ea typeface="+mn-ea"/>
-          <a:cs typeface="+mn-cs"/>
-        </a:defRPr>
-      </a:lvl4pPr>
-      <a:lvl5pPr marL="1828800" algn="l" defTabSz="914400" rtl="0" eaLnBrk="1" latinLnBrk="0" hangingPunct="1">
-        <a:defRPr sz="1800" kern="1200">
-          <a:solidFill>
-            <a:schemeClr val="tx1"/>
-          </a:solidFill>
-          <a:latin typeface="+mn-lt"/>
-          <a:ea typeface="+mn-ea"/>
-          <a:cs typeface="+mn-cs"/>
-        </a:defRPr>
-      </a:lvl5pPr>
-      <a:lvl6pPr marL="2286000" algn="l" defTabSz="914400" rtl="0" eaLnBrk="1" latinLnBrk="0" hangingPunct="1">
-        <a:defRPr sz="1800" kern="1200">
-          <a:solidFill>
-            <a:schemeClr val="tx1"/>
-          </a:solidFill>
-          <a:latin typeface="+mn-lt"/>
-          <a:ea typeface="+mn-ea"/>
-          <a:cs typeface="+mn-cs"/>
-        </a:defRPr>
-      </a:lvl6pPr>
-      <a:lvl7pPr marL="2743200" algn="l" defTabSz="914400" rtl="0" eaLnBrk="1" latinLnBrk="0" hangingPunct="1">
-        <a:defRPr sz="1800" kern="1200">
-          <a:solidFill>
-            <a:schemeClr val="tx1"/>
-          </a:solidFill>
-          <a:latin typeface="+mn-lt"/>
-          <a:ea typeface="+mn-ea"/>
-          <a:cs typeface="+mn-cs"/>
-        </a:defRPr>
-      </a:lvl7pPr>
-      <a:lvl8pPr marL="3200400" algn="l" defTabSz="914400" rtl="0" eaLnBrk="1" latinLnBrk="0" hangingPunct="1">
-        <a:defRPr sz="1800" kern="1200">
-          <a:solidFill>
-            <a:schemeClr val="tx1"/>
-          </a:solidFill>
-          <a:latin typeface="+mn-lt"/>
-          <a:ea typeface="+mn-ea"/>
-          <a:cs typeface="+mn-cs"/>
-        </a:defRPr>
-      </a:lvl8pPr>
-      <a:lvl9pPr marL="3657600" algn="l" defTabSz="914400" rtl="0" eaLnBrk="1" latinLnBrk="0" hangingPunct="1">
-        <a:defRPr sz="1800" kern="1200">
-          <a:solidFill>
-            <a:schemeClr val="tx1"/>
-          </a:solidFill>
-          <a:latin typeface="+mn-lt"/>
-          <a:ea typeface="+mn-ea"/>
-          <a:cs typeface="+mn-cs"/>
-        </a:defRPr>
-      </a:lvl9pPr>
-    </p:otherStyle>
-  </p:txStyles>
-</p:sldMaster>
-</file>
-
 <file path=ppt/slides/slide1.xml><?xml version="1.0" encoding="utf-8"?>
 <p:sld xmlns:a="http://schemas.openxmlformats.org/drawingml/2006/main" xmlns:r="http://schemas.openxmlformats.org/officeDocument/2006/relationships" xmlns:p="http://schemas.openxmlformats.org/presentationml/2006/main">
   <p:cSld>
@@ -14740,6 +12257,26 @@
 <file path=ppt/slides/slide10.xml><?xml version="1.0" encoding="utf-8"?>
 <p:sld xmlns:a="http://schemas.openxmlformats.org/drawingml/2006/main" xmlns:r="http://schemas.openxmlformats.org/officeDocument/2006/relationships" xmlns:p="http://schemas.openxmlformats.org/presentationml/2006/main">
   <p:cSld>
+    <p:bg>
+      <p:bgPr>
+        <a:gradFill flip="none" rotWithShape="1">
+          <a:gsLst>
+            <a:gs pos="40000">
+              <a:schemeClr val="accent1">
+                <a:lumMod val="45000"/>
+                <a:lumOff val="55000"/>
+              </a:schemeClr>
+            </a:gs>
+            <a:gs pos="100000">
+              <a:srgbClr val="FFC000"/>
+            </a:gs>
+          </a:gsLst>
+          <a:lin ang="0" scaled="0"/>
+          <a:tileRect/>
+        </a:gradFill>
+        <a:effectLst/>
+      </p:bgPr>
+    </p:bg>
     <p:spTree>
       <p:nvGrpSpPr>
         <p:cNvPr id="1" name=""/>
@@ -15001,6 +12538,26 @@
 <file path=ppt/slides/slide11.xml><?xml version="1.0" encoding="utf-8"?>
 <p:sld xmlns:a="http://schemas.openxmlformats.org/drawingml/2006/main" xmlns:r="http://schemas.openxmlformats.org/officeDocument/2006/relationships" xmlns:p="http://schemas.openxmlformats.org/presentationml/2006/main">
   <p:cSld>
+    <p:bg>
+      <p:bgPr>
+        <a:gradFill flip="none" rotWithShape="1">
+          <a:gsLst>
+            <a:gs pos="40000">
+              <a:schemeClr val="accent1">
+                <a:lumMod val="45000"/>
+                <a:lumOff val="55000"/>
+              </a:schemeClr>
+            </a:gs>
+            <a:gs pos="100000">
+              <a:srgbClr val="FFC000"/>
+            </a:gs>
+          </a:gsLst>
+          <a:lin ang="0" scaled="0"/>
+          <a:tileRect/>
+        </a:gradFill>
+        <a:effectLst/>
+      </p:bgPr>
+    </p:bg>
     <p:spTree>
       <p:nvGrpSpPr>
         <p:cNvPr id="1" name=""/>
@@ -15270,6 +12827,26 @@
 <file path=ppt/slides/slide12.xml><?xml version="1.0" encoding="utf-8"?>
 <p:sld xmlns:a="http://schemas.openxmlformats.org/drawingml/2006/main" xmlns:r="http://schemas.openxmlformats.org/officeDocument/2006/relationships" xmlns:p="http://schemas.openxmlformats.org/presentationml/2006/main">
   <p:cSld>
+    <p:bg>
+      <p:bgPr>
+        <a:gradFill flip="none" rotWithShape="1">
+          <a:gsLst>
+            <a:gs pos="40000">
+              <a:schemeClr val="accent1">
+                <a:lumMod val="45000"/>
+                <a:lumOff val="55000"/>
+              </a:schemeClr>
+            </a:gs>
+            <a:gs pos="100000">
+              <a:srgbClr val="FFC000"/>
+            </a:gs>
+          </a:gsLst>
+          <a:lin ang="0" scaled="0"/>
+          <a:tileRect/>
+        </a:gradFill>
+        <a:effectLst/>
+      </p:bgPr>
+    </p:bg>
     <p:spTree>
       <p:nvGrpSpPr>
         <p:cNvPr id="1" name=""/>
@@ -15534,6 +13111,26 @@
 <file path=ppt/slides/slide13.xml><?xml version="1.0" encoding="utf-8"?>
 <p:sld xmlns:a="http://schemas.openxmlformats.org/drawingml/2006/main" xmlns:r="http://schemas.openxmlformats.org/officeDocument/2006/relationships" xmlns:p="http://schemas.openxmlformats.org/presentationml/2006/main">
   <p:cSld>
+    <p:bg>
+      <p:bgPr>
+        <a:gradFill flip="none" rotWithShape="1">
+          <a:gsLst>
+            <a:gs pos="40000">
+              <a:schemeClr val="accent1">
+                <a:lumMod val="45000"/>
+                <a:lumOff val="55000"/>
+              </a:schemeClr>
+            </a:gs>
+            <a:gs pos="100000">
+              <a:srgbClr val="FFC000"/>
+            </a:gs>
+          </a:gsLst>
+          <a:lin ang="0" scaled="0"/>
+          <a:tileRect/>
+        </a:gradFill>
+        <a:effectLst/>
+      </p:bgPr>
+    </p:bg>
     <p:spTree>
       <p:nvGrpSpPr>
         <p:cNvPr id="1" name=""/>
@@ -15550,7 +13147,7 @@
       </p:grpSpPr>
       <p:sp>
         <p:nvSpPr>
-          <p:cNvPr id="2" name="Rectangle 1"/>
+          <p:cNvPr id="7" name="Rectangle 1"/>
           <p:cNvSpPr/>
           <p:nvPr/>
         </p:nvSpPr>
@@ -15659,49 +13256,6 @@
               <a:alpha val="79000"/>
             </a:srgbClr>
           </a:solidFill>
-        </p:spPr>
-        <p:style>
-          <a:lnRef idx="2">
-            <a:schemeClr val="accent1">
-              <a:shade val="50000"/>
-            </a:schemeClr>
-          </a:lnRef>
-          <a:fillRef idx="1">
-            <a:schemeClr val="accent1"/>
-          </a:fillRef>
-          <a:effectRef idx="0">
-            <a:schemeClr val="accent1"/>
-          </a:effectRef>
-          <a:fontRef idx="minor">
-            <a:schemeClr val="lt1"/>
-          </a:fontRef>
-        </p:style>
-        <p:txBody>
-          <a:bodyPr rtlCol="0" anchor="ctr"/>
-          <a:lstStyle/>
-          <a:p>
-            <a:pPr algn="ctr"/>
-            <a:endParaRPr lang="en-US"/>
-          </a:p>
-        </p:txBody>
-      </p:sp>
-      <p:sp useBgFill="1">
-        <p:nvSpPr>
-          <p:cNvPr id="9" name="BackgroundShape"/>
-          <p:cNvSpPr/>
-          <p:nvPr/>
-        </p:nvSpPr>
-        <p:spPr>
-          <a:xfrm>
-            <a:off x="533400" y="3733800"/>
-            <a:ext cx="1828800" cy="1219200"/>
-          </a:xfrm>
-          <a:prstGeom prst="rect">
-            <a:avLst/>
-          </a:prstGeom>
-          <a:solidFill>
-            <a:schemeClr val="bg1"/>
-          </a:solidFill>
           <a:ln w="25400" cap="flat" cmpd="sng" algn="ctr">
             <a:solidFill>
               <a:schemeClr val="accent1"/>
@@ -15782,10 +13336,50 @@
           </a:p>
         </p:txBody>
       </p:sp>
+      <p:sp useBgFill="1">
+        <p:nvSpPr>
+          <p:cNvPr id="11" name="BackgroundShape"/>
+          <p:cNvSpPr/>
+          <p:nvPr/>
+        </p:nvSpPr>
+        <p:spPr>
+          <a:xfrm>
+            <a:off x="533400" y="3733800"/>
+            <a:ext cx="1828800" cy="1219200"/>
+          </a:xfrm>
+          <a:prstGeom prst="rect">
+            <a:avLst/>
+          </a:prstGeom>
+        </p:spPr>
+        <p:style>
+          <a:lnRef idx="2">
+            <a:schemeClr val="accent1">
+              <a:shade val="50000"/>
+            </a:schemeClr>
+          </a:lnRef>
+          <a:fillRef idx="1">
+            <a:schemeClr val="accent1"/>
+          </a:fillRef>
+          <a:effectRef idx="0">
+            <a:schemeClr val="accent1"/>
+          </a:effectRef>
+          <a:fontRef idx="minor">
+            <a:schemeClr val="lt1"/>
+          </a:fontRef>
+        </p:style>
+        <p:txBody>
+          <a:bodyPr rtlCol="0" anchor="ctr"/>
+          <a:lstStyle/>
+          <a:p>
+            <a:pPr algn="ctr"/>
+            <a:endParaRPr lang="en-US"/>
+          </a:p>
+        </p:txBody>
+      </p:sp>
     </p:spTree>
     <p:extLst>
       <p:ext uri="{BB962C8B-B14F-4D97-AF65-F5344CB8AC3E}">
-        <p14:creationId xmlns:p14="http://schemas.microsoft.com/office/powerpoint/2010/main" val="946209282"/>
+        <p14:creationId xmlns:p14="http://schemas.microsoft.com/office/powerpoint/2010/main" val="1892315544"/>
       </p:ext>
     </p:extLst>
   </p:cSld>
@@ -15798,6 +13392,26 @@
 <file path=ppt/slides/slide14.xml><?xml version="1.0" encoding="utf-8"?>
 <p:sld xmlns:a="http://schemas.openxmlformats.org/drawingml/2006/main" xmlns:r="http://schemas.openxmlformats.org/officeDocument/2006/relationships" xmlns:p="http://schemas.openxmlformats.org/presentationml/2006/main">
   <p:cSld>
+    <p:bg>
+      <p:bgPr>
+        <a:gradFill flip="none" rotWithShape="1">
+          <a:gsLst>
+            <a:gs pos="40000">
+              <a:schemeClr val="accent1">
+                <a:lumMod val="45000"/>
+                <a:lumOff val="55000"/>
+              </a:schemeClr>
+            </a:gs>
+            <a:gs pos="100000">
+              <a:srgbClr val="FFC000"/>
+            </a:gs>
+          </a:gsLst>
+          <a:lin ang="0" scaled="0"/>
+          <a:tileRect/>
+        </a:gradFill>
+        <a:effectLst/>
+      </p:bgPr>
+    </p:bg>
     <p:spTree>
       <p:nvGrpSpPr>
         <p:cNvPr id="1" name=""/>
@@ -22575,267 +20189,6 @@
 </file>
 
 <file path=ppt/theme/theme4.xml><?xml version="1.0" encoding="utf-8"?>
-<a:theme xmlns:a="http://schemas.openxmlformats.org/drawingml/2006/main" name="Sync Labs - Do not edit">
-  <a:themeElements>
-    <a:clrScheme name="Office">
-      <a:dk1>
-        <a:sysClr val="windowText" lastClr="000000"/>
-      </a:dk1>
-      <a:lt1>
-        <a:sysClr val="window" lastClr="FFFFFF"/>
-      </a:lt1>
-      <a:dk2>
-        <a:srgbClr val="44546A"/>
-      </a:dk2>
-      <a:lt2>
-        <a:srgbClr val="E7E6E6"/>
-      </a:lt2>
-      <a:accent1>
-        <a:srgbClr val="5B9BD5"/>
-      </a:accent1>
-      <a:accent2>
-        <a:srgbClr val="ED7D31"/>
-      </a:accent2>
-      <a:accent3>
-        <a:srgbClr val="A5A5A5"/>
-      </a:accent3>
-      <a:accent4>
-        <a:srgbClr val="FFC000"/>
-      </a:accent4>
-      <a:accent5>
-        <a:srgbClr val="4472C4"/>
-      </a:accent5>
-      <a:accent6>
-        <a:srgbClr val="70AD47"/>
-      </a:accent6>
-      <a:hlink>
-        <a:srgbClr val="0563C1"/>
-      </a:hlink>
-      <a:folHlink>
-        <a:srgbClr val="954F72"/>
-      </a:folHlink>
-    </a:clrScheme>
-    <a:fontScheme name="Office">
-      <a:majorFont>
-        <a:latin typeface="Calibri Light" panose="020F0302020204030204"/>
-        <a:ea typeface=""/>
-        <a:cs typeface=""/>
-        <a:font script="Jpan" typeface="ＭＳ Ｐゴシック"/>
-        <a:font script="Hang" typeface="맑은 고딕"/>
-        <a:font script="Hans" typeface="宋体"/>
-        <a:font script="Hant" typeface="新細明體"/>
-        <a:font script="Arab" typeface="Times New Roman"/>
-        <a:font script="Hebr" typeface="Times New Roman"/>
-        <a:font script="Thai" typeface="Angsana New"/>
-        <a:font script="Ethi" typeface="Nyala"/>
-        <a:font script="Beng" typeface="Vrinda"/>
-        <a:font script="Gujr" typeface="Shruti"/>
-        <a:font script="Khmr" typeface="MoolBoran"/>
-        <a:font script="Knda" typeface="Tunga"/>
-        <a:font script="Guru" typeface="Raavi"/>
-        <a:font script="Cans" typeface="Euphemia"/>
-        <a:font script="Cher" typeface="Plantagenet Cherokee"/>
-        <a:font script="Yiii" typeface="Microsoft Yi Baiti"/>
-        <a:font script="Tibt" typeface="Microsoft Himalaya"/>
-        <a:font script="Thaa" typeface="MV Boli"/>
-        <a:font script="Deva" typeface="Mangal"/>
-        <a:font script="Telu" typeface="Gautami"/>
-        <a:font script="Taml" typeface="Latha"/>
-        <a:font script="Syrc" typeface="Estrangelo Edessa"/>
-        <a:font script="Orya" typeface="Kalinga"/>
-        <a:font script="Mlym" typeface="Kartika"/>
-        <a:font script="Laoo" typeface="DokChampa"/>
-        <a:font script="Sinh" typeface="Iskoola Pota"/>
-        <a:font script="Mong" typeface="Mongolian Baiti"/>
-        <a:font script="Viet" typeface="Times New Roman"/>
-        <a:font script="Uigh" typeface="Microsoft Uighur"/>
-        <a:font script="Geor" typeface="Sylfaen"/>
-      </a:majorFont>
-      <a:minorFont>
-        <a:latin typeface="Calibri" panose="020F0502020204030204"/>
-        <a:ea typeface=""/>
-        <a:cs typeface=""/>
-        <a:font script="Jpan" typeface="ＭＳ Ｐゴシック"/>
-        <a:font script="Hang" typeface="맑은 고딕"/>
-        <a:font script="Hans" typeface="宋体"/>
-        <a:font script="Hant" typeface="新細明體"/>
-        <a:font script="Arab" typeface="Arial"/>
-        <a:font script="Hebr" typeface="Arial"/>
-        <a:font script="Thai" typeface="Cordia New"/>
-        <a:font script="Ethi" typeface="Nyala"/>
-        <a:font script="Beng" typeface="Vrinda"/>
-        <a:font script="Gujr" typeface="Shruti"/>
-        <a:font script="Khmr" typeface="DaunPenh"/>
-        <a:font script="Knda" typeface="Tunga"/>
-        <a:font script="Guru" typeface="Raavi"/>
-        <a:font script="Cans" typeface="Euphemia"/>
-        <a:font script="Cher" typeface="Plantagenet Cherokee"/>
-        <a:font script="Yiii" typeface="Microsoft Yi Baiti"/>
-        <a:font script="Tibt" typeface="Microsoft Himalaya"/>
-        <a:font script="Thaa" typeface="MV Boli"/>
-        <a:font script="Deva" typeface="Mangal"/>
-        <a:font script="Telu" typeface="Gautami"/>
-        <a:font script="Taml" typeface="Latha"/>
-        <a:font script="Syrc" typeface="Estrangelo Edessa"/>
-        <a:font script="Orya" typeface="Kalinga"/>
-        <a:font script="Mlym" typeface="Kartika"/>
-        <a:font script="Laoo" typeface="DokChampa"/>
-        <a:font script="Sinh" typeface="Iskoola Pota"/>
-        <a:font script="Mong" typeface="Mongolian Baiti"/>
-        <a:font script="Viet" typeface="Arial"/>
-        <a:font script="Uigh" typeface="Microsoft Uighur"/>
-        <a:font script="Geor" typeface="Sylfaen"/>
-      </a:minorFont>
-    </a:fontScheme>
-    <a:fmtScheme name="Office">
-      <a:fillStyleLst>
-        <a:solidFill>
-          <a:schemeClr val="phClr"/>
-        </a:solidFill>
-        <a:gradFill rotWithShape="1">
-          <a:gsLst>
-            <a:gs pos="0">
-              <a:schemeClr val="phClr">
-                <a:lumMod val="110000"/>
-                <a:satMod val="105000"/>
-                <a:tint val="67000"/>
-              </a:schemeClr>
-            </a:gs>
-            <a:gs pos="50000">
-              <a:schemeClr val="phClr">
-                <a:lumMod val="105000"/>
-                <a:satMod val="103000"/>
-                <a:tint val="73000"/>
-              </a:schemeClr>
-            </a:gs>
-            <a:gs pos="100000">
-              <a:schemeClr val="phClr">
-                <a:lumMod val="105000"/>
-                <a:satMod val="109000"/>
-                <a:tint val="81000"/>
-              </a:schemeClr>
-            </a:gs>
-          </a:gsLst>
-          <a:lin ang="5400000" scaled="0"/>
-        </a:gradFill>
-        <a:gradFill rotWithShape="1">
-          <a:gsLst>
-            <a:gs pos="0">
-              <a:schemeClr val="phClr">
-                <a:satMod val="103000"/>
-                <a:lumMod val="102000"/>
-                <a:tint val="94000"/>
-              </a:schemeClr>
-            </a:gs>
-            <a:gs pos="50000">
-              <a:schemeClr val="phClr">
-                <a:satMod val="110000"/>
-                <a:lumMod val="100000"/>
-                <a:shade val="100000"/>
-              </a:schemeClr>
-            </a:gs>
-            <a:gs pos="100000">
-              <a:schemeClr val="phClr">
-                <a:lumMod val="99000"/>
-                <a:satMod val="120000"/>
-                <a:shade val="78000"/>
-              </a:schemeClr>
-            </a:gs>
-          </a:gsLst>
-          <a:lin ang="5400000" scaled="0"/>
-        </a:gradFill>
-      </a:fillStyleLst>
-      <a:lnStyleLst>
-        <a:ln w="6350" cap="flat" cmpd="sng" algn="ctr">
-          <a:solidFill>
-            <a:schemeClr val="phClr"/>
-          </a:solidFill>
-          <a:prstDash val="solid"/>
-          <a:miter lim="800000"/>
-        </a:ln>
-        <a:ln w="12700" cap="flat" cmpd="sng" algn="ctr">
-          <a:solidFill>
-            <a:schemeClr val="phClr"/>
-          </a:solidFill>
-          <a:prstDash val="solid"/>
-          <a:miter lim="800000"/>
-        </a:ln>
-        <a:ln w="19050" cap="flat" cmpd="sng" algn="ctr">
-          <a:solidFill>
-            <a:schemeClr val="phClr"/>
-          </a:solidFill>
-          <a:prstDash val="solid"/>
-          <a:miter lim="800000"/>
-        </a:ln>
-      </a:lnStyleLst>
-      <a:effectStyleLst>
-        <a:effectStyle>
-          <a:effectLst/>
-        </a:effectStyle>
-        <a:effectStyle>
-          <a:effectLst/>
-        </a:effectStyle>
-        <a:effectStyle>
-          <a:effectLst>
-            <a:outerShdw blurRad="57150" dist="19050" dir="5400000" algn="ctr" rotWithShape="0">
-              <a:srgbClr val="000000">
-                <a:alpha val="63000"/>
-              </a:srgbClr>
-            </a:outerShdw>
-          </a:effectLst>
-        </a:effectStyle>
-      </a:effectStyleLst>
-      <a:bgFillStyleLst>
-        <a:solidFill>
-          <a:schemeClr val="phClr"/>
-        </a:solidFill>
-        <a:solidFill>
-          <a:schemeClr val="phClr">
-            <a:tint val="95000"/>
-            <a:satMod val="170000"/>
-          </a:schemeClr>
-        </a:solidFill>
-        <a:gradFill rotWithShape="1">
-          <a:gsLst>
-            <a:gs pos="0">
-              <a:schemeClr val="phClr">
-                <a:tint val="93000"/>
-                <a:satMod val="150000"/>
-                <a:shade val="98000"/>
-                <a:lumMod val="102000"/>
-              </a:schemeClr>
-            </a:gs>
-            <a:gs pos="50000">
-              <a:schemeClr val="phClr">
-                <a:tint val="98000"/>
-                <a:satMod val="130000"/>
-                <a:shade val="90000"/>
-                <a:lumMod val="103000"/>
-              </a:schemeClr>
-            </a:gs>
-            <a:gs pos="100000">
-              <a:schemeClr val="phClr">
-                <a:shade val="63000"/>
-                <a:satMod val="120000"/>
-              </a:schemeClr>
-            </a:gs>
-          </a:gsLst>
-          <a:lin ang="5400000" scaled="0"/>
-        </a:gradFill>
-      </a:bgFillStyleLst>
-    </a:fmtScheme>
-  </a:themeElements>
-  <a:objectDefaults/>
-  <a:extraClrSchemeLst/>
-  <a:extLst>
-    <a:ext uri="{05A4C25C-085E-4340-85A3-A5531E510DB2}">
-      <thm15:themeFamily xmlns:thm15="http://schemas.microsoft.com/office/thememl/2012/main" name="Office Theme" id="{62F939B6-93AF-4DB8-9C6B-D6C7DFDC589F}" vid="{4A3C46E8-61CC-4603-A589-7422A47A8E4A}"/>
-    </a:ext>
-  </a:extLst>
-</a:theme>
-</file>
-
-<file path=ppt/theme/theme5.xml><?xml version="1.0" encoding="utf-8"?>
 <a:theme xmlns:a="http://schemas.openxmlformats.org/drawingml/2006/main" name="Office Theme">
   <a:themeElements>
     <a:clrScheme name="Office">

</xml_diff>

<commit_message>
Add tests for sync gradient fill
</commit_message>
<xml_diff>
--- a/doc/test/SyncLab.pptx
+++ b/doc/test/SyncLab.pptx
@@ -291,7 +291,7 @@
           <a:p>
             <a:fld id="{43E32005-3A63-48D2-8C73-BF5F95786EBD}" type="datetimeFigureOut">
               <a:rPr lang="en-US" smtClean="0"/>
-              <a:t>4/3/2017</a:t>
+              <a:t>4/4/2017</a:t>
             </a:fld>
             <a:endParaRPr lang="en-US"/>
           </a:p>
@@ -697,11 +697,7 @@
             </a:r>
             <a:r>
               <a:rPr lang="en-US" baseline="0" dirty="0" smtClean="0"/>
-              <a:t> ensure that </a:t>
-            </a:r>
-            <a:r>
-              <a:rPr lang="en-US" baseline="0" dirty="0" smtClean="0"/>
-              <a:t>2 gradient stops can be copied</a:t>
+              <a:t> ensure that 2 gradient stops can be copied</a:t>
             </a:r>
             <a:endParaRPr lang="en-US" dirty="0" smtClean="0"/>
           </a:p>
@@ -821,11 +817,7 @@
             </a:r>
             <a:r>
               <a:rPr lang="en-US" baseline="0" dirty="0" smtClean="0"/>
-              <a:t> ensure that </a:t>
-            </a:r>
-            <a:r>
-              <a:rPr lang="en-US" baseline="0" dirty="0" smtClean="0"/>
-              <a:t>diagonal gradients (multiple of 45) can be copied</a:t>
+              <a:t> ensure that diagonal gradients (multiple of 45) can be copied</a:t>
             </a:r>
             <a:endParaRPr lang="en-US" dirty="0" smtClean="0"/>
           </a:p>
@@ -849,11 +841,7 @@
             </a:pPr>
             <a:r>
               <a:rPr lang="en-US" dirty="0" smtClean="0"/>
-              <a:t>Copy fill from the </a:t>
-            </a:r>
-            <a:r>
-              <a:rPr lang="en-US" dirty="0" smtClean="0"/>
-              <a:t>second</a:t>
+              <a:t>Copy fill from the second</a:t>
             </a:r>
             <a:r>
               <a:rPr lang="en-US" baseline="0" dirty="0" smtClean="0"/>
@@ -865,11 +853,7 @@
             </a:r>
             <a:r>
               <a:rPr lang="en-US" baseline="0" dirty="0" smtClean="0"/>
-              <a:t> </a:t>
-            </a:r>
-            <a:r>
-              <a:rPr lang="en-US" baseline="0" dirty="0" smtClean="0"/>
-              <a:t>shape to the large blue shape.</a:t>
+              <a:t> shape to the large blue shape.</a:t>
             </a:r>
             <a:endParaRPr lang="en-US" dirty="0" smtClean="0"/>
           </a:p>
@@ -961,11 +945,7 @@
             </a:r>
             <a:r>
               <a:rPr lang="en-US" baseline="0" dirty="0" smtClean="0"/>
-              <a:t> ensure that </a:t>
-            </a:r>
-            <a:r>
-              <a:rPr lang="en-US" baseline="0" dirty="0" smtClean="0"/>
-              <a:t>rectangular gradients can be copied</a:t>
+              <a:t> ensure that rectangular gradients can be copied</a:t>
             </a:r>
             <a:endParaRPr lang="en-US" dirty="0" smtClean="0"/>
           </a:p>
@@ -989,7 +969,7 @@
             </a:pPr>
             <a:r>
               <a:rPr lang="en-US" dirty="0" smtClean="0"/>
-              <a:t>Copy fill from the first column, forth</a:t>
+              <a:t>Copy fill from the second column, second</a:t>
             </a:r>
             <a:r>
               <a:rPr lang="en-US" baseline="0" dirty="0" smtClean="0"/>
@@ -1085,11 +1065,7 @@
             </a:r>
             <a:r>
               <a:rPr lang="en-US" baseline="0" dirty="0" smtClean="0"/>
-              <a:t> ensure that </a:t>
-            </a:r>
-            <a:r>
-              <a:rPr lang="en-US" baseline="0" dirty="0" smtClean="0"/>
-              <a:t>path gradients can be copied</a:t>
+              <a:t> ensure that path gradients can be copied</a:t>
             </a:r>
             <a:endParaRPr lang="en-US" dirty="0" smtClean="0"/>
           </a:p>
@@ -1113,7 +1089,7 @@
             </a:pPr>
             <a:r>
               <a:rPr lang="en-US" dirty="0" smtClean="0"/>
-              <a:t>Copy fill from the first column, forth</a:t>
+              <a:t>Copy fill from the second column, third</a:t>
             </a:r>
             <a:r>
               <a:rPr lang="en-US" baseline="0" dirty="0" smtClean="0"/>
@@ -1209,11 +1185,7 @@
             </a:r>
             <a:r>
               <a:rPr lang="en-US" baseline="0" dirty="0" smtClean="0"/>
-              <a:t> ensure that </a:t>
-            </a:r>
-            <a:r>
-              <a:rPr lang="en-US" baseline="0" dirty="0" smtClean="0"/>
-              <a:t>max gradient stops (9) can be copied</a:t>
+              <a:t> ensure that max gradient stops (9) can be copied</a:t>
             </a:r>
             <a:endParaRPr lang="en-US" dirty="0" smtClean="0"/>
           </a:p>
@@ -1237,7 +1209,7 @@
             </a:pPr>
             <a:r>
               <a:rPr lang="en-US" dirty="0" smtClean="0"/>
-              <a:t>Copy fill from the first column, forth</a:t>
+              <a:t>Copy fill from the second column, forth</a:t>
             </a:r>
             <a:r>
               <a:rPr lang="en-US" baseline="0" dirty="0" smtClean="0"/>
@@ -3262,7 +3234,42 @@
             </a:r>
             <a:r>
               <a:rPr lang="en-US" baseline="0" dirty="0" smtClean="0"/>
-              <a:t> the background to help differentiate between background fill and other fills</a:t>
+              <a:t> the background to help differentiate between background fill and other </a:t>
+            </a:r>
+            <a:r>
+              <a:rPr lang="en-US" baseline="0" dirty="0" smtClean="0"/>
+              <a:t>fills</a:t>
+            </a:r>
+          </a:p>
+          <a:p>
+            <a:endParaRPr lang="en-US" baseline="0" dirty="0" smtClean="0"/>
+          </a:p>
+          <a:p>
+            <a:r>
+              <a:rPr lang="en-US" baseline="0" dirty="0" smtClean="0"/>
+              <a:t>Some gradient fills are missing as there is currently no support for it.</a:t>
+            </a:r>
+          </a:p>
+          <a:p>
+            <a:r>
+              <a:rPr lang="en-US" baseline="0" dirty="0" smtClean="0"/>
+              <a:t>These include:</a:t>
+            </a:r>
+          </a:p>
+          <a:p>
+            <a:r>
+              <a:rPr lang="en-US" baseline="0" dirty="0" smtClean="0"/>
+              <a:t>Radial Gradient Fill</a:t>
+            </a:r>
+          </a:p>
+          <a:p>
+            <a:r>
+              <a:rPr lang="en-US" baseline="0" dirty="0" smtClean="0"/>
+              <a:t>Gradients that </a:t>
+            </a:r>
+            <a:r>
+              <a:rPr lang="en-US" baseline="0" smtClean="0"/>
+              <a:t>have brightness</a:t>
             </a:r>
             <a:endParaRPr lang="en-US" dirty="0"/>
           </a:p>
@@ -3896,7 +3903,7 @@
           <a:p>
             <a:fld id="{699DC775-C286-4358-8C92-D7E584E969B3}" type="datetimeFigureOut">
               <a:rPr lang="en-US" smtClean="0"/>
-              <a:t>4/3/2017</a:t>
+              <a:t>4/4/2017</a:t>
             </a:fld>
             <a:endParaRPr lang="en-US"/>
           </a:p>
@@ -4064,7 +4071,7 @@
           <a:p>
             <a:fld id="{699DC775-C286-4358-8C92-D7E584E969B3}" type="datetimeFigureOut">
               <a:rPr lang="en-US" smtClean="0"/>
-              <a:t>4/3/2017</a:t>
+              <a:t>4/4/2017</a:t>
             </a:fld>
             <a:endParaRPr lang="en-US"/>
           </a:p>
@@ -4242,7 +4249,7 @@
           <a:p>
             <a:fld id="{699DC775-C286-4358-8C92-D7E584E969B3}" type="datetimeFigureOut">
               <a:rPr lang="en-US" smtClean="0"/>
-              <a:t>4/3/2017</a:t>
+              <a:t>4/4/2017</a:t>
             </a:fld>
             <a:endParaRPr lang="en-US"/>
           </a:p>
@@ -4482,7 +4489,7 @@
           <a:p>
             <a:fld id="{699DC775-C286-4358-8C92-D7E584E969B3}" type="datetimeFigureOut">
               <a:rPr lang="en-US" smtClean="0"/>
-              <a:t>4/3/2017</a:t>
+              <a:t>4/4/2017</a:t>
             </a:fld>
             <a:endParaRPr lang="en-US"/>
           </a:p>
@@ -4650,7 +4657,7 @@
           <a:p>
             <a:fld id="{699DC775-C286-4358-8C92-D7E584E969B3}" type="datetimeFigureOut">
               <a:rPr lang="en-US" smtClean="0"/>
-              <a:t>4/3/2017</a:t>
+              <a:t>4/4/2017</a:t>
             </a:fld>
             <a:endParaRPr lang="en-US"/>
           </a:p>
@@ -4895,7 +4902,7 @@
           <a:p>
             <a:fld id="{699DC775-C286-4358-8C92-D7E584E969B3}" type="datetimeFigureOut">
               <a:rPr lang="en-US" smtClean="0"/>
-              <a:t>4/3/2017</a:t>
+              <a:t>4/4/2017</a:t>
             </a:fld>
             <a:endParaRPr lang="en-US"/>
           </a:p>
@@ -5180,7 +5187,7 @@
           <a:p>
             <a:fld id="{699DC775-C286-4358-8C92-D7E584E969B3}" type="datetimeFigureOut">
               <a:rPr lang="en-US" smtClean="0"/>
-              <a:t>4/3/2017</a:t>
+              <a:t>4/4/2017</a:t>
             </a:fld>
             <a:endParaRPr lang="en-US"/>
           </a:p>
@@ -5599,7 +5606,7 @@
           <a:p>
             <a:fld id="{699DC775-C286-4358-8C92-D7E584E969B3}" type="datetimeFigureOut">
               <a:rPr lang="en-US" smtClean="0"/>
-              <a:t>4/3/2017</a:t>
+              <a:t>4/4/2017</a:t>
             </a:fld>
             <a:endParaRPr lang="en-US"/>
           </a:p>
@@ -5716,7 +5723,7 @@
           <a:p>
             <a:fld id="{699DC775-C286-4358-8C92-D7E584E969B3}" type="datetimeFigureOut">
               <a:rPr lang="en-US" smtClean="0"/>
-              <a:t>4/3/2017</a:t>
+              <a:t>4/4/2017</a:t>
             </a:fld>
             <a:endParaRPr lang="en-US"/>
           </a:p>
@@ -5811,7 +5818,7 @@
           <a:p>
             <a:fld id="{699DC775-C286-4358-8C92-D7E584E969B3}" type="datetimeFigureOut">
               <a:rPr lang="en-US" smtClean="0"/>
-              <a:t>4/3/2017</a:t>
+              <a:t>4/4/2017</a:t>
             </a:fld>
             <a:endParaRPr lang="en-US"/>
           </a:p>
@@ -6086,7 +6093,7 @@
           <a:p>
             <a:fld id="{699DC775-C286-4358-8C92-D7E584E969B3}" type="datetimeFigureOut">
               <a:rPr lang="en-US" smtClean="0"/>
-              <a:t>4/3/2017</a:t>
+              <a:t>4/4/2017</a:t>
             </a:fld>
             <a:endParaRPr lang="en-US"/>
           </a:p>
@@ -6254,7 +6261,7 @@
           <a:p>
             <a:fld id="{699DC775-C286-4358-8C92-D7E584E969B3}" type="datetimeFigureOut">
               <a:rPr lang="en-US" smtClean="0"/>
-              <a:t>4/3/2017</a:t>
+              <a:t>4/4/2017</a:t>
             </a:fld>
             <a:endParaRPr lang="en-US"/>
           </a:p>
@@ -6506,7 +6513,7 @@
           <a:p>
             <a:fld id="{699DC775-C286-4358-8C92-D7E584E969B3}" type="datetimeFigureOut">
               <a:rPr lang="en-US" smtClean="0"/>
-              <a:t>4/3/2017</a:t>
+              <a:t>4/4/2017</a:t>
             </a:fld>
             <a:endParaRPr lang="en-US"/>
           </a:p>
@@ -6674,7 +6681,7 @@
           <a:p>
             <a:fld id="{699DC775-C286-4358-8C92-D7E584E969B3}" type="datetimeFigureOut">
               <a:rPr lang="en-US" smtClean="0"/>
-              <a:t>4/3/2017</a:t>
+              <a:t>4/4/2017</a:t>
             </a:fld>
             <a:endParaRPr lang="en-US"/>
           </a:p>
@@ -6852,7 +6859,7 @@
           <a:p>
             <a:fld id="{699DC775-C286-4358-8C92-D7E584E969B3}" type="datetimeFigureOut">
               <a:rPr lang="en-US" smtClean="0"/>
-              <a:t>4/3/2017</a:t>
+              <a:t>4/4/2017</a:t>
             </a:fld>
             <a:endParaRPr lang="en-US"/>
           </a:p>
@@ -7100,7 +7107,7 @@
           <a:p>
             <a:fld id="{699DC775-C286-4358-8C92-D7E584E969B3}" type="datetimeFigureOut">
               <a:rPr lang="en-US" smtClean="0"/>
-              <a:t>4/3/2017</a:t>
+              <a:t>4/4/2017</a:t>
             </a:fld>
             <a:endParaRPr lang="en-US"/>
           </a:p>
@@ -7276,7 +7283,7 @@
           <a:p>
             <a:fld id="{699DC775-C286-4358-8C92-D7E584E969B3}" type="datetimeFigureOut">
               <a:rPr lang="en-US" smtClean="0"/>
-              <a:t>4/3/2017</a:t>
+              <a:t>4/4/2017</a:t>
             </a:fld>
             <a:endParaRPr lang="en-US"/>
           </a:p>
@@ -7529,7 +7536,7 @@
           <a:p>
             <a:fld id="{699DC775-C286-4358-8C92-D7E584E969B3}" type="datetimeFigureOut">
               <a:rPr lang="en-US" smtClean="0"/>
-              <a:t>4/3/2017</a:t>
+              <a:t>4/4/2017</a:t>
             </a:fld>
             <a:endParaRPr lang="en-US"/>
           </a:p>
@@ -7822,7 +7829,7 @@
           <a:p>
             <a:fld id="{699DC775-C286-4358-8C92-D7E584E969B3}" type="datetimeFigureOut">
               <a:rPr lang="en-US" smtClean="0"/>
-              <a:t>4/3/2017</a:t>
+              <a:t>4/4/2017</a:t>
             </a:fld>
             <a:endParaRPr lang="en-US"/>
           </a:p>
@@ -8249,7 +8256,7 @@
           <a:p>
             <a:fld id="{699DC775-C286-4358-8C92-D7E584E969B3}" type="datetimeFigureOut">
               <a:rPr lang="en-US" smtClean="0"/>
-              <a:t>4/3/2017</a:t>
+              <a:t>4/4/2017</a:t>
             </a:fld>
             <a:endParaRPr lang="en-US"/>
           </a:p>
@@ -8374,7 +8381,7 @@
           <a:p>
             <a:fld id="{699DC775-C286-4358-8C92-D7E584E969B3}" type="datetimeFigureOut">
               <a:rPr lang="en-US" smtClean="0"/>
-              <a:t>4/3/2017</a:t>
+              <a:t>4/4/2017</a:t>
             </a:fld>
             <a:endParaRPr lang="en-US"/>
           </a:p>
@@ -8477,7 +8484,7 @@
           <a:p>
             <a:fld id="{699DC775-C286-4358-8C92-D7E584E969B3}" type="datetimeFigureOut">
               <a:rPr lang="en-US" smtClean="0"/>
-              <a:t>4/3/2017</a:t>
+              <a:t>4/4/2017</a:t>
             </a:fld>
             <a:endParaRPr lang="en-US"/>
           </a:p>
@@ -8722,7 +8729,7 @@
           <a:p>
             <a:fld id="{699DC775-C286-4358-8C92-D7E584E969B3}" type="datetimeFigureOut">
               <a:rPr lang="en-US" smtClean="0"/>
-              <a:t>4/3/2017</a:t>
+              <a:t>4/4/2017</a:t>
             </a:fld>
             <a:endParaRPr lang="en-US"/>
           </a:p>
@@ -9005,7 +9012,7 @@
           <a:p>
             <a:fld id="{699DC775-C286-4358-8C92-D7E584E969B3}" type="datetimeFigureOut">
               <a:rPr lang="en-US" smtClean="0"/>
-              <a:t>4/3/2017</a:t>
+              <a:t>4/4/2017</a:t>
             </a:fld>
             <a:endParaRPr lang="en-US"/>
           </a:p>
@@ -9265,7 +9272,7 @@
           <a:p>
             <a:fld id="{699DC775-C286-4358-8C92-D7E584E969B3}" type="datetimeFigureOut">
               <a:rPr lang="en-US" smtClean="0"/>
-              <a:t>4/3/2017</a:t>
+              <a:t>4/4/2017</a:t>
             </a:fld>
             <a:endParaRPr lang="en-US"/>
           </a:p>
@@ -9441,7 +9448,7 @@
           <a:p>
             <a:fld id="{699DC775-C286-4358-8C92-D7E584E969B3}" type="datetimeFigureOut">
               <a:rPr lang="en-US" smtClean="0"/>
-              <a:t>4/3/2017</a:t>
+              <a:t>4/4/2017</a:t>
             </a:fld>
             <a:endParaRPr lang="en-US"/>
           </a:p>
@@ -9627,7 +9634,7 @@
           <a:p>
             <a:fld id="{699DC775-C286-4358-8C92-D7E584E969B3}" type="datetimeFigureOut">
               <a:rPr lang="en-US" smtClean="0"/>
-              <a:t>4/3/2017</a:t>
+              <a:t>4/4/2017</a:t>
             </a:fld>
             <a:endParaRPr lang="en-US"/>
           </a:p>
@@ -9817,9 +9824,9 @@
           <a:bodyPr/>
           <a:lstStyle/>
           <a:p>
-            <a:fld id="{2E84B277-1182-40C1-94D9-D4DB9D86193E}" type="datetimeFigureOut">
+            <a:fld id="{45696B32-6A70-48EC-8939-9D142D9557CD}" type="datetimeFigureOut">
               <a:rPr lang="en-US" smtClean="0"/>
-              <a:t>4/3/2017</a:t>
+              <a:t>4/4/2017</a:t>
             </a:fld>
             <a:endParaRPr lang="en-US"/>
           </a:p>
@@ -9859,7 +9866,7 @@
           <a:bodyPr/>
           <a:lstStyle/>
           <a:p>
-            <a:fld id="{DDB33938-7025-4B1E-801A-2E4BE3C0CBEC}" type="slidenum">
+            <a:fld id="{355774F1-BB03-4900-8136-C61D142715DC}" type="slidenum">
               <a:rPr lang="en-US" smtClean="0"/>
               <a:t>‹#›</a:t>
             </a:fld>
@@ -9869,144 +9876,7 @@
       </p:sp>
       <p:sp>
         <p:nvSpPr>
-          <p:cNvPr id="12" name="2GradientShape"/>
-          <p:cNvSpPr/>
-          <p:nvPr userDrawn="1"/>
-        </p:nvSpPr>
-        <p:spPr>
-          <a:xfrm>
-            <a:off x="381000" y="5323114"/>
-            <a:ext cx="1371600" cy="1371600"/>
-          </a:xfrm>
-          <a:prstGeom prst="rect">
-            <a:avLst/>
-          </a:prstGeom>
-          <a:gradFill flip="none" rotWithShape="1">
-            <a:gsLst>
-              <a:gs pos="40000">
-                <a:srgbClr val="0070C0"/>
-              </a:gs>
-              <a:gs pos="100000">
-                <a:srgbClr val="92D050"/>
-              </a:gs>
-            </a:gsLst>
-            <a:lin ang="0" scaled="0"/>
-            <a:tileRect/>
-          </a:gradFill>
-          <a:ln w="25400" cap="flat" cmpd="sng" algn="ctr">
-            <a:solidFill>
-              <a:srgbClr val="385D8A"/>
-            </a:solidFill>
-            <a:prstDash val="solid"/>
-            <a:round/>
-            <a:headEnd type="none" w="med" len="med"/>
-            <a:tailEnd type="none" w="med" len="med"/>
-          </a:ln>
-        </p:spPr>
-        <p:style>
-          <a:lnRef idx="2">
-            <a:schemeClr val="accent1">
-              <a:shade val="50000"/>
-            </a:schemeClr>
-          </a:lnRef>
-          <a:fillRef idx="1">
-            <a:schemeClr val="accent1"/>
-          </a:fillRef>
-          <a:effectRef idx="0">
-            <a:schemeClr val="accent1"/>
-          </a:effectRef>
-          <a:fontRef idx="minor">
-            <a:schemeClr val="lt1"/>
-          </a:fontRef>
-        </p:style>
-        <p:txBody>
-          <a:bodyPr rtlCol="0" anchor="ctr"/>
-          <a:lstStyle/>
-          <a:p>
-            <a:pPr algn="ctr"/>
-            <a:endParaRPr lang="en-US">
-              <a:solidFill>
-                <a:srgbClr val="FFFFFF"/>
-              </a:solidFill>
-              <a:latin typeface="Calibri" panose="020F0502020204030204" pitchFamily="34" charset="0"/>
-            </a:endParaRPr>
-          </a:p>
-        </p:txBody>
-      </p:sp>
-      <p:sp>
-        <p:nvSpPr>
-          <p:cNvPr id="18" name="DiagonalGradientShape"/>
-          <p:cNvSpPr/>
-          <p:nvPr userDrawn="1"/>
-        </p:nvSpPr>
-        <p:spPr>
-          <a:xfrm>
-            <a:off x="2133600" y="309154"/>
-            <a:ext cx="1371600" cy="1371600"/>
-          </a:xfrm>
-          <a:prstGeom prst="rect">
-            <a:avLst/>
-          </a:prstGeom>
-          <a:gradFill flip="none" rotWithShape="1">
-            <a:gsLst>
-              <a:gs pos="23000">
-                <a:srgbClr val="00B050"/>
-              </a:gs>
-              <a:gs pos="65000">
-                <a:schemeClr val="accent1"/>
-              </a:gs>
-              <a:gs pos="100000">
-                <a:schemeClr val="accent6">
-                  <a:lumMod val="75000"/>
-                </a:schemeClr>
-              </a:gs>
-            </a:gsLst>
-            <a:lin ang="8100000" scaled="0"/>
-            <a:tileRect/>
-          </a:gradFill>
-          <a:ln w="25400" cap="flat" cmpd="sng" algn="ctr">
-            <a:solidFill>
-              <a:srgbClr val="385D8A"/>
-            </a:solidFill>
-            <a:prstDash val="solid"/>
-            <a:round/>
-            <a:headEnd type="none" w="med" len="med"/>
-            <a:tailEnd type="none" w="med" len="med"/>
-          </a:ln>
-        </p:spPr>
-        <p:style>
-          <a:lnRef idx="2">
-            <a:schemeClr val="accent1">
-              <a:shade val="50000"/>
-            </a:schemeClr>
-          </a:lnRef>
-          <a:fillRef idx="1">
-            <a:schemeClr val="accent1"/>
-          </a:fillRef>
-          <a:effectRef idx="0">
-            <a:schemeClr val="accent1"/>
-          </a:effectRef>
-          <a:fontRef idx="minor">
-            <a:schemeClr val="lt1"/>
-          </a:fontRef>
-        </p:style>
-        <p:txBody>
-          <a:bodyPr rtlCol="0" anchor="ctr"/>
-          <a:lstStyle/>
-          <a:p>
-            <a:pPr algn="ctr"/>
-            <a:endParaRPr lang="en-US">
-              <a:solidFill>
-                <a:srgbClr val="FFFFFF"/>
-              </a:solidFill>
-              <a:latin typeface="Calibri" panose="020F0502020204030204" pitchFamily="34" charset="0"/>
-            </a:endParaRPr>
-          </a:p>
-        </p:txBody>
-      </p:sp>
-      <p:sp>
-        <p:nvSpPr>
-          <p:cNvPr id="24" name="RectangularGradientShape"/>
+          <p:cNvPr id="12" name="RectangularGradientShape"/>
           <p:cNvSpPr/>
           <p:nvPr userDrawn="1"/>
         </p:nvSpPr>
@@ -10024,17 +9894,13 @@
                 <a:srgbClr val="FFFF00"/>
               </a:gs>
               <a:gs pos="20000">
-                <a:schemeClr val="accent2">
-                  <a:lumMod val="75000"/>
-                </a:schemeClr>
+                <a:srgbClr val="C00000"/>
               </a:gs>
               <a:gs pos="80000">
                 <a:srgbClr val="00B050"/>
               </a:gs>
               <a:gs pos="60000">
-                <a:schemeClr val="accent2">
-                  <a:lumMod val="75000"/>
-                </a:schemeClr>
+                <a:srgbClr val="C00000"/>
               </a:gs>
               <a:gs pos="100000">
                 <a:srgbClr val="00B0F0"/>
@@ -10087,13 +9953,13 @@
       </p:sp>
       <p:sp>
         <p:nvSpPr>
-          <p:cNvPr id="30" name="PathGradientShape"/>
+          <p:cNvPr id="18" name="DiagonalGradientShape"/>
           <p:cNvSpPr/>
           <p:nvPr userDrawn="1"/>
         </p:nvSpPr>
         <p:spPr>
           <a:xfrm>
-            <a:off x="2131423" y="3657600"/>
+            <a:off x="2133600" y="309154"/>
             <a:ext cx="1371600" cy="1371600"/>
           </a:xfrm>
           <a:prstGeom prst="rect">
@@ -10101,19 +9967,17 @@
           </a:prstGeom>
           <a:gradFill flip="none" rotWithShape="1">
             <a:gsLst>
-              <a:gs pos="0">
-                <a:srgbClr val="FF0000"/>
+              <a:gs pos="23000">
+                <a:srgbClr val="00B050"/>
               </a:gs>
-              <a:gs pos="50000">
+              <a:gs pos="65000">
                 <a:srgbClr val="00B0F0"/>
               </a:gs>
               <a:gs pos="100000">
-                <a:schemeClr val="tx1"/>
+                <a:srgbClr val="FFC000"/>
               </a:gs>
             </a:gsLst>
-            <a:path path="shape">
-              <a:fillToRect l="50000" t="50000" r="50000" b="50000"/>
-            </a:path>
+            <a:lin ang="8100000" scaled="0"/>
             <a:tileRect/>
           </a:gradFill>
           <a:ln w="25400" cap="flat" cmpd="sng" algn="ctr">
@@ -10156,183 +10020,10 @@
           </a:p>
         </p:txBody>
       </p:sp>
-      <p:sp>
-        <p:nvSpPr>
-          <p:cNvPr id="36" name="7GradientShape"/>
-          <p:cNvSpPr/>
-          <p:nvPr userDrawn="1"/>
-        </p:nvSpPr>
-        <p:spPr>
-          <a:xfrm>
-            <a:off x="2131423" y="5329646"/>
-            <a:ext cx="1371600" cy="1371600"/>
-          </a:xfrm>
-          <a:prstGeom prst="rect">
-            <a:avLst/>
-          </a:prstGeom>
-          <a:gradFill flip="none" rotWithShape="1">
-            <a:gsLst>
-              <a:gs pos="85000">
-                <a:srgbClr val="002060"/>
-              </a:gs>
-              <a:gs pos="68000">
-                <a:srgbClr val="00B0F0"/>
-              </a:gs>
-              <a:gs pos="51000">
-                <a:srgbClr val="00B050"/>
-              </a:gs>
-              <a:gs pos="34000">
-                <a:srgbClr val="FFFF00"/>
-              </a:gs>
-              <a:gs pos="17000">
-                <a:srgbClr val="FFC000"/>
-              </a:gs>
-              <a:gs pos="0">
-                <a:srgbClr val="FF0000"/>
-              </a:gs>
-              <a:gs pos="100000">
-                <a:srgbClr val="7030A0"/>
-              </a:gs>
-            </a:gsLst>
-            <a:lin ang="0" scaled="0"/>
-            <a:tileRect/>
-          </a:gradFill>
-          <a:ln w="25400" cap="flat" cmpd="sng" algn="ctr">
-            <a:solidFill>
-              <a:srgbClr val="385D8A"/>
-            </a:solidFill>
-            <a:prstDash val="solid"/>
-            <a:round/>
-            <a:headEnd type="none" w="med" len="med"/>
-            <a:tailEnd type="none" w="med" len="med"/>
-          </a:ln>
-        </p:spPr>
-        <p:style>
-          <a:lnRef idx="2">
-            <a:schemeClr val="accent1">
-              <a:shade val="50000"/>
-            </a:schemeClr>
-          </a:lnRef>
-          <a:fillRef idx="1">
-            <a:schemeClr val="accent1"/>
-          </a:fillRef>
-          <a:effectRef idx="0">
-            <a:schemeClr val="accent1"/>
-          </a:effectRef>
-          <a:fontRef idx="minor">
-            <a:schemeClr val="lt1"/>
-          </a:fontRef>
-        </p:style>
-        <p:txBody>
-          <a:bodyPr rtlCol="0" anchor="ctr"/>
-          <a:lstStyle/>
-          <a:p>
-            <a:pPr algn="ctr"/>
-            <a:endParaRPr lang="en-US">
-              <a:solidFill>
-                <a:srgbClr val="FFFFFF"/>
-              </a:solidFill>
-              <a:latin typeface="Calibri" panose="020F0502020204030204" pitchFamily="34" charset="0"/>
-            </a:endParaRPr>
-          </a:p>
-        </p:txBody>
-      </p:sp>
-      <p:sp>
-        <p:nvSpPr>
-          <p:cNvPr id="42" name="7GradientShape"/>
-          <p:cNvSpPr/>
-          <p:nvPr userDrawn="1"/>
-        </p:nvSpPr>
-        <p:spPr>
-          <a:xfrm>
-            <a:off x="2283823" y="5482046"/>
-            <a:ext cx="1371600" cy="1371600"/>
-          </a:xfrm>
-          <a:prstGeom prst="rect">
-            <a:avLst/>
-          </a:prstGeom>
-          <a:gradFill flip="none" rotWithShape="1">
-            <a:gsLst>
-              <a:gs pos="50000">
-                <a:srgbClr val="002060"/>
-              </a:gs>
-              <a:gs pos="40000">
-                <a:srgbClr val="00B0F0"/>
-              </a:gs>
-              <a:gs pos="30000">
-                <a:srgbClr val="00B050"/>
-              </a:gs>
-              <a:gs pos="20000">
-                <a:srgbClr val="FFFF00"/>
-              </a:gs>
-              <a:gs pos="10000">
-                <a:srgbClr val="FFC000"/>
-              </a:gs>
-              <a:gs pos="0">
-                <a:srgbClr val="FF0000"/>
-              </a:gs>
-              <a:gs pos="80000">
-                <a:schemeClr val="tx1"/>
-              </a:gs>
-              <a:gs pos="90000">
-                <a:schemeClr val="bg1">
-                  <a:lumMod val="50000"/>
-                </a:schemeClr>
-              </a:gs>
-              <a:gs pos="70000">
-                <a:schemeClr val="bg1"/>
-              </a:gs>
-              <a:gs pos="60000">
-                <a:srgbClr val="7030A0"/>
-              </a:gs>
-            </a:gsLst>
-            <a:lin ang="0" scaled="0"/>
-            <a:tileRect/>
-          </a:gradFill>
-          <a:ln w="25400" cap="flat" cmpd="sng" algn="ctr">
-            <a:solidFill>
-              <a:srgbClr val="385D8A"/>
-            </a:solidFill>
-            <a:prstDash val="solid"/>
-            <a:round/>
-            <a:headEnd type="none" w="med" len="med"/>
-            <a:tailEnd type="none" w="med" len="med"/>
-          </a:ln>
-        </p:spPr>
-        <p:style>
-          <a:lnRef idx="2">
-            <a:schemeClr val="accent1">
-              <a:shade val="50000"/>
-            </a:schemeClr>
-          </a:lnRef>
-          <a:fillRef idx="1">
-            <a:schemeClr val="accent1"/>
-          </a:fillRef>
-          <a:effectRef idx="0">
-            <a:schemeClr val="accent1"/>
-          </a:effectRef>
-          <a:fontRef idx="minor">
-            <a:schemeClr val="lt1"/>
-          </a:fontRef>
-        </p:style>
-        <p:txBody>
-          <a:bodyPr rtlCol="0" anchor="ctr"/>
-          <a:lstStyle/>
-          <a:p>
-            <a:pPr algn="ctr"/>
-            <a:endParaRPr lang="en-US">
-              <a:solidFill>
-                <a:srgbClr val="FFFFFF"/>
-              </a:solidFill>
-              <a:latin typeface="Calibri" panose="020F0502020204030204" pitchFamily="34" charset="0"/>
-            </a:endParaRPr>
-          </a:p>
-        </p:txBody>
-      </p:sp>
     </p:spTree>
     <p:extLst>
       <p:ext uri="{BB962C8B-B14F-4D97-AF65-F5344CB8AC3E}">
-        <p14:creationId xmlns:p14="http://schemas.microsoft.com/office/powerpoint/2010/main" val="1886012155"/>
+        <p14:creationId xmlns:p14="http://schemas.microsoft.com/office/powerpoint/2010/main" val="748529941"/>
       </p:ext>
     </p:extLst>
   </p:cSld>
@@ -10449,9 +10140,9 @@
           <a:bodyPr/>
           <a:lstStyle/>
           <a:p>
-            <a:fld id="{2E84B277-1182-40C1-94D9-D4DB9D86193E}" type="datetimeFigureOut">
+            <a:fld id="{45696B32-6A70-48EC-8939-9D142D9557CD}" type="datetimeFigureOut">
               <a:rPr lang="en-US" smtClean="0"/>
-              <a:t>4/3/2017</a:t>
+              <a:t>4/4/2017</a:t>
             </a:fld>
             <a:endParaRPr lang="en-US"/>
           </a:p>
@@ -10491,7 +10182,7 @@
           <a:bodyPr/>
           <a:lstStyle/>
           <a:p>
-            <a:fld id="{DDB33938-7025-4B1E-801A-2E4BE3C0CBEC}" type="slidenum">
+            <a:fld id="{355774F1-BB03-4900-8136-C61D142715DC}" type="slidenum">
               <a:rPr lang="en-US" smtClean="0"/>
               <a:t>‹#›</a:t>
             </a:fld>
@@ -10502,7 +10193,7 @@
     </p:spTree>
     <p:extLst>
       <p:ext uri="{BB962C8B-B14F-4D97-AF65-F5344CB8AC3E}">
-        <p14:creationId xmlns:p14="http://schemas.microsoft.com/office/powerpoint/2010/main" val="913068899"/>
+        <p14:creationId xmlns:p14="http://schemas.microsoft.com/office/powerpoint/2010/main" val="519284673"/>
       </p:ext>
     </p:extLst>
   </p:cSld>
@@ -10695,9 +10386,9 @@
           <a:bodyPr/>
           <a:lstStyle/>
           <a:p>
-            <a:fld id="{2E84B277-1182-40C1-94D9-D4DB9D86193E}" type="datetimeFigureOut">
+            <a:fld id="{45696B32-6A70-48EC-8939-9D142D9557CD}" type="datetimeFigureOut">
               <a:rPr lang="en-US" smtClean="0"/>
-              <a:t>4/3/2017</a:t>
+              <a:t>4/4/2017</a:t>
             </a:fld>
             <a:endParaRPr lang="en-US"/>
           </a:p>
@@ -10737,7 +10428,7 @@
           <a:bodyPr/>
           <a:lstStyle/>
           <a:p>
-            <a:fld id="{DDB33938-7025-4B1E-801A-2E4BE3C0CBEC}" type="slidenum">
+            <a:fld id="{355774F1-BB03-4900-8136-C61D142715DC}" type="slidenum">
               <a:rPr lang="en-US" smtClean="0"/>
               <a:t>‹#›</a:t>
             </a:fld>
@@ -10748,7 +10439,7 @@
     </p:spTree>
     <p:extLst>
       <p:ext uri="{BB962C8B-B14F-4D97-AF65-F5344CB8AC3E}">
-        <p14:creationId xmlns:p14="http://schemas.microsoft.com/office/powerpoint/2010/main" val="97017516"/>
+        <p14:creationId xmlns:p14="http://schemas.microsoft.com/office/powerpoint/2010/main" val="1281481479"/>
       </p:ext>
     </p:extLst>
   </p:cSld>
@@ -10927,9 +10618,9 @@
           <a:bodyPr/>
           <a:lstStyle/>
           <a:p>
-            <a:fld id="{2E84B277-1182-40C1-94D9-D4DB9D86193E}" type="datetimeFigureOut">
+            <a:fld id="{45696B32-6A70-48EC-8939-9D142D9557CD}" type="datetimeFigureOut">
               <a:rPr lang="en-US" smtClean="0"/>
-              <a:t>4/3/2017</a:t>
+              <a:t>4/4/2017</a:t>
             </a:fld>
             <a:endParaRPr lang="en-US"/>
           </a:p>
@@ -10969,7 +10660,7 @@
           <a:bodyPr/>
           <a:lstStyle/>
           <a:p>
-            <a:fld id="{DDB33938-7025-4B1E-801A-2E4BE3C0CBEC}" type="slidenum">
+            <a:fld id="{355774F1-BB03-4900-8136-C61D142715DC}" type="slidenum">
               <a:rPr lang="en-US" smtClean="0"/>
               <a:t>‹#›</a:t>
             </a:fld>
@@ -10980,7 +10671,7 @@
     </p:spTree>
     <p:extLst>
       <p:ext uri="{BB962C8B-B14F-4D97-AF65-F5344CB8AC3E}">
-        <p14:creationId xmlns:p14="http://schemas.microsoft.com/office/powerpoint/2010/main" val="1674285452"/>
+        <p14:creationId xmlns:p14="http://schemas.microsoft.com/office/powerpoint/2010/main" val="247131167"/>
       </p:ext>
     </p:extLst>
   </p:cSld>
@@ -11294,9 +10985,9 @@
           <a:bodyPr/>
           <a:lstStyle/>
           <a:p>
-            <a:fld id="{2E84B277-1182-40C1-94D9-D4DB9D86193E}" type="datetimeFigureOut">
+            <a:fld id="{45696B32-6A70-48EC-8939-9D142D9557CD}" type="datetimeFigureOut">
               <a:rPr lang="en-US" smtClean="0"/>
-              <a:t>4/3/2017</a:t>
+              <a:t>4/4/2017</a:t>
             </a:fld>
             <a:endParaRPr lang="en-US"/>
           </a:p>
@@ -11336,7 +11027,7 @@
           <a:bodyPr/>
           <a:lstStyle/>
           <a:p>
-            <a:fld id="{DDB33938-7025-4B1E-801A-2E4BE3C0CBEC}" type="slidenum">
+            <a:fld id="{355774F1-BB03-4900-8136-C61D142715DC}" type="slidenum">
               <a:rPr lang="en-US" smtClean="0"/>
               <a:t>‹#›</a:t>
             </a:fld>
@@ -11347,7 +11038,7 @@
     </p:spTree>
     <p:extLst>
       <p:ext uri="{BB962C8B-B14F-4D97-AF65-F5344CB8AC3E}">
-        <p14:creationId xmlns:p14="http://schemas.microsoft.com/office/powerpoint/2010/main" val="1963304004"/>
+        <p14:creationId xmlns:p14="http://schemas.microsoft.com/office/powerpoint/2010/main" val="4152092341"/>
       </p:ext>
     </p:extLst>
   </p:cSld>
@@ -11412,9 +11103,9 @@
           <a:bodyPr/>
           <a:lstStyle/>
           <a:p>
-            <a:fld id="{2E84B277-1182-40C1-94D9-D4DB9D86193E}" type="datetimeFigureOut">
+            <a:fld id="{45696B32-6A70-48EC-8939-9D142D9557CD}" type="datetimeFigureOut">
               <a:rPr lang="en-US" smtClean="0"/>
-              <a:t>4/3/2017</a:t>
+              <a:t>4/4/2017</a:t>
             </a:fld>
             <a:endParaRPr lang="en-US"/>
           </a:p>
@@ -11454,7 +11145,7 @@
           <a:bodyPr/>
           <a:lstStyle/>
           <a:p>
-            <a:fld id="{DDB33938-7025-4B1E-801A-2E4BE3C0CBEC}" type="slidenum">
+            <a:fld id="{355774F1-BB03-4900-8136-C61D142715DC}" type="slidenum">
               <a:rPr lang="en-US" smtClean="0"/>
               <a:t>‹#›</a:t>
             </a:fld>
@@ -11465,7 +11156,7 @@
     </p:spTree>
     <p:extLst>
       <p:ext uri="{BB962C8B-B14F-4D97-AF65-F5344CB8AC3E}">
-        <p14:creationId xmlns:p14="http://schemas.microsoft.com/office/powerpoint/2010/main" val="3211711025"/>
+        <p14:creationId xmlns:p14="http://schemas.microsoft.com/office/powerpoint/2010/main" val="810010214"/>
       </p:ext>
     </p:extLst>
   </p:cSld>
@@ -11699,7 +11390,7 @@
           <a:p>
             <a:fld id="{699DC775-C286-4358-8C92-D7E584E969B3}" type="datetimeFigureOut">
               <a:rPr lang="en-US" smtClean="0"/>
-              <a:t>4/3/2017</a:t>
+              <a:t>4/4/2017</a:t>
             </a:fld>
             <a:endParaRPr lang="en-US"/>
           </a:p>
@@ -11792,9 +11483,9 @@
           <a:bodyPr/>
           <a:lstStyle/>
           <a:p>
-            <a:fld id="{2E84B277-1182-40C1-94D9-D4DB9D86193E}" type="datetimeFigureOut">
+            <a:fld id="{45696B32-6A70-48EC-8939-9D142D9557CD}" type="datetimeFigureOut">
               <a:rPr lang="en-US" smtClean="0"/>
-              <a:t>4/3/2017</a:t>
+              <a:t>4/4/2017</a:t>
             </a:fld>
             <a:endParaRPr lang="en-US"/>
           </a:p>
@@ -11834,7 +11525,7 @@
           <a:bodyPr/>
           <a:lstStyle/>
           <a:p>
-            <a:fld id="{DDB33938-7025-4B1E-801A-2E4BE3C0CBEC}" type="slidenum">
+            <a:fld id="{355774F1-BB03-4900-8136-C61D142715DC}" type="slidenum">
               <a:rPr lang="en-US" smtClean="0"/>
               <a:t>‹#›</a:t>
             </a:fld>
@@ -11845,7 +11536,7 @@
     </p:spTree>
     <p:extLst>
       <p:ext uri="{BB962C8B-B14F-4D97-AF65-F5344CB8AC3E}">
-        <p14:creationId xmlns:p14="http://schemas.microsoft.com/office/powerpoint/2010/main" val="3642624641"/>
+        <p14:creationId xmlns:p14="http://schemas.microsoft.com/office/powerpoint/2010/main" val="1910575874"/>
       </p:ext>
     </p:extLst>
   </p:cSld>
@@ -12069,9 +11760,9 @@
           <a:bodyPr/>
           <a:lstStyle/>
           <a:p>
-            <a:fld id="{2E84B277-1182-40C1-94D9-D4DB9D86193E}" type="datetimeFigureOut">
+            <a:fld id="{45696B32-6A70-48EC-8939-9D142D9557CD}" type="datetimeFigureOut">
               <a:rPr lang="en-US" smtClean="0"/>
-              <a:t>4/3/2017</a:t>
+              <a:t>4/4/2017</a:t>
             </a:fld>
             <a:endParaRPr lang="en-US"/>
           </a:p>
@@ -12111,7 +11802,7 @@
           <a:bodyPr/>
           <a:lstStyle/>
           <a:p>
-            <a:fld id="{DDB33938-7025-4B1E-801A-2E4BE3C0CBEC}" type="slidenum">
+            <a:fld id="{355774F1-BB03-4900-8136-C61D142715DC}" type="slidenum">
               <a:rPr lang="en-US" smtClean="0"/>
               <a:t>‹#›</a:t>
             </a:fld>
@@ -12122,7 +11813,7 @@
     </p:spTree>
     <p:extLst>
       <p:ext uri="{BB962C8B-B14F-4D97-AF65-F5344CB8AC3E}">
-        <p14:creationId xmlns:p14="http://schemas.microsoft.com/office/powerpoint/2010/main" val="1600367250"/>
+        <p14:creationId xmlns:p14="http://schemas.microsoft.com/office/powerpoint/2010/main" val="4270060945"/>
       </p:ext>
     </p:extLst>
   </p:cSld>
@@ -12322,9 +12013,9 @@
           <a:bodyPr/>
           <a:lstStyle/>
           <a:p>
-            <a:fld id="{2E84B277-1182-40C1-94D9-D4DB9D86193E}" type="datetimeFigureOut">
+            <a:fld id="{45696B32-6A70-48EC-8939-9D142D9557CD}" type="datetimeFigureOut">
               <a:rPr lang="en-US" smtClean="0"/>
-              <a:t>4/3/2017</a:t>
+              <a:t>4/4/2017</a:t>
             </a:fld>
             <a:endParaRPr lang="en-US"/>
           </a:p>
@@ -12364,7 +12055,7 @@
           <a:bodyPr/>
           <a:lstStyle/>
           <a:p>
-            <a:fld id="{DDB33938-7025-4B1E-801A-2E4BE3C0CBEC}" type="slidenum">
+            <a:fld id="{355774F1-BB03-4900-8136-C61D142715DC}" type="slidenum">
               <a:rPr lang="en-US" smtClean="0"/>
               <a:t>‹#›</a:t>
             </a:fld>
@@ -12375,7 +12066,7 @@
     </p:spTree>
     <p:extLst>
       <p:ext uri="{BB962C8B-B14F-4D97-AF65-F5344CB8AC3E}">
-        <p14:creationId xmlns:p14="http://schemas.microsoft.com/office/powerpoint/2010/main" val="2795033591"/>
+        <p14:creationId xmlns:p14="http://schemas.microsoft.com/office/powerpoint/2010/main" val="3620026681"/>
       </p:ext>
     </p:extLst>
   </p:cSld>
@@ -12492,9 +12183,9 @@
           <a:bodyPr/>
           <a:lstStyle/>
           <a:p>
-            <a:fld id="{2E84B277-1182-40C1-94D9-D4DB9D86193E}" type="datetimeFigureOut">
+            <a:fld id="{45696B32-6A70-48EC-8939-9D142D9557CD}" type="datetimeFigureOut">
               <a:rPr lang="en-US" smtClean="0"/>
-              <a:t>4/3/2017</a:t>
+              <a:t>4/4/2017</a:t>
             </a:fld>
             <a:endParaRPr lang="en-US"/>
           </a:p>
@@ -12534,7 +12225,7 @@
           <a:bodyPr/>
           <a:lstStyle/>
           <a:p>
-            <a:fld id="{DDB33938-7025-4B1E-801A-2E4BE3C0CBEC}" type="slidenum">
+            <a:fld id="{355774F1-BB03-4900-8136-C61D142715DC}" type="slidenum">
               <a:rPr lang="en-US" smtClean="0"/>
               <a:t>‹#›</a:t>
             </a:fld>
@@ -12545,7 +12236,7 @@
     </p:spTree>
     <p:extLst>
       <p:ext uri="{BB962C8B-B14F-4D97-AF65-F5344CB8AC3E}">
-        <p14:creationId xmlns:p14="http://schemas.microsoft.com/office/powerpoint/2010/main" val="4205749029"/>
+        <p14:creationId xmlns:p14="http://schemas.microsoft.com/office/powerpoint/2010/main" val="2670450140"/>
       </p:ext>
     </p:extLst>
   </p:cSld>
@@ -12672,9 +12363,9 @@
           <a:bodyPr/>
           <a:lstStyle/>
           <a:p>
-            <a:fld id="{2E84B277-1182-40C1-94D9-D4DB9D86193E}" type="datetimeFigureOut">
+            <a:fld id="{45696B32-6A70-48EC-8939-9D142D9557CD}" type="datetimeFigureOut">
               <a:rPr lang="en-US" smtClean="0"/>
-              <a:t>4/3/2017</a:t>
+              <a:t>4/4/2017</a:t>
             </a:fld>
             <a:endParaRPr lang="en-US"/>
           </a:p>
@@ -12714,7 +12405,7 @@
           <a:bodyPr/>
           <a:lstStyle/>
           <a:p>
-            <a:fld id="{DDB33938-7025-4B1E-801A-2E4BE3C0CBEC}" type="slidenum">
+            <a:fld id="{355774F1-BB03-4900-8136-C61D142715DC}" type="slidenum">
               <a:rPr lang="en-US" smtClean="0"/>
               <a:t>‹#›</a:t>
             </a:fld>
@@ -12725,7 +12416,7 @@
     </p:spTree>
     <p:extLst>
       <p:ext uri="{BB962C8B-B14F-4D97-AF65-F5344CB8AC3E}">
-        <p14:creationId xmlns:p14="http://schemas.microsoft.com/office/powerpoint/2010/main" val="391919816"/>
+        <p14:creationId xmlns:p14="http://schemas.microsoft.com/office/powerpoint/2010/main" val="2244601566"/>
       </p:ext>
     </p:extLst>
   </p:cSld>
@@ -13093,7 +12784,7 @@
           <a:p>
             <a:fld id="{699DC775-C286-4358-8C92-D7E584E969B3}" type="datetimeFigureOut">
               <a:rPr lang="en-US" smtClean="0"/>
-              <a:t>4/3/2017</a:t>
+              <a:t>4/4/2017</a:t>
             </a:fld>
             <a:endParaRPr lang="en-US"/>
           </a:p>
@@ -13210,7 +12901,7 @@
           <a:p>
             <a:fld id="{699DC775-C286-4358-8C92-D7E584E969B3}" type="datetimeFigureOut">
               <a:rPr lang="en-US" smtClean="0"/>
-              <a:t>4/3/2017</a:t>
+              <a:t>4/4/2017</a:t>
             </a:fld>
             <a:endParaRPr lang="en-US"/>
           </a:p>
@@ -13305,7 +12996,7 @@
           <a:p>
             <a:fld id="{699DC775-C286-4358-8C92-D7E584E969B3}" type="datetimeFigureOut">
               <a:rPr lang="en-US" smtClean="0"/>
-              <a:t>4/3/2017</a:t>
+              <a:t>4/4/2017</a:t>
             </a:fld>
             <a:endParaRPr lang="en-US"/>
           </a:p>
@@ -13580,7 +13271,7 @@
           <a:p>
             <a:fld id="{699DC775-C286-4358-8C92-D7E584E969B3}" type="datetimeFigureOut">
               <a:rPr lang="en-US" smtClean="0"/>
-              <a:t>4/3/2017</a:t>
+              <a:t>4/4/2017</a:t>
             </a:fld>
             <a:endParaRPr lang="en-US"/>
           </a:p>
@@ -13832,7 +13523,7 @@
           <a:p>
             <a:fld id="{699DC775-C286-4358-8C92-D7E584E969B3}" type="datetimeFigureOut">
               <a:rPr lang="en-US" smtClean="0"/>
-              <a:t>4/3/2017</a:t>
+              <a:t>4/4/2017</a:t>
             </a:fld>
             <a:endParaRPr lang="en-US"/>
           </a:p>
@@ -14043,7 +13734,7 @@
           <a:p>
             <a:fld id="{699DC775-C286-4358-8C92-D7E584E969B3}" type="datetimeFigureOut">
               <a:rPr lang="en-US" smtClean="0"/>
-              <a:t>4/3/2017</a:t>
+              <a:t>4/4/2017</a:t>
             </a:fld>
             <a:endParaRPr lang="en-US"/>
           </a:p>
@@ -14556,7 +14247,7 @@
           <a:p>
             <a:fld id="{699DC775-C286-4358-8C92-D7E584E969B3}" type="datetimeFigureOut">
               <a:rPr lang="en-US" smtClean="0"/>
-              <a:t>4/3/2017</a:t>
+              <a:t>4/4/2017</a:t>
             </a:fld>
             <a:endParaRPr lang="en-US"/>
           </a:p>
@@ -15067,7 +14758,7 @@
           <a:p>
             <a:fld id="{699DC775-C286-4358-8C92-D7E584E969B3}" type="datetimeFigureOut">
               <a:rPr lang="en-US" smtClean="0"/>
-              <a:t>4/3/2017</a:t>
+              <a:t>4/4/2017</a:t>
             </a:fld>
             <a:endParaRPr lang="en-US"/>
           </a:p>
@@ -15575,9 +15266,9 @@
             </a:lvl1pPr>
           </a:lstStyle>
           <a:p>
-            <a:fld id="{2E84B277-1182-40C1-94D9-D4DB9D86193E}" type="datetimeFigureOut">
+            <a:fld id="{45696B32-6A70-48EC-8939-9D142D9557CD}" type="datetimeFigureOut">
               <a:rPr lang="en-US" smtClean="0"/>
-              <a:t>4/3/2017</a:t>
+              <a:t>4/4/2017</a:t>
             </a:fld>
             <a:endParaRPr lang="en-US"/>
           </a:p>
@@ -15653,7 +15344,7 @@
             </a:lvl1pPr>
           </a:lstStyle>
           <a:p>
-            <a:fld id="{DDB33938-7025-4B1E-801A-2E4BE3C0CBEC}" type="slidenum">
+            <a:fld id="{355774F1-BB03-4900-8136-C61D142715DC}" type="slidenum">
               <a:rPr lang="en-US" smtClean="0"/>
               <a:t>‹#›</a:t>
             </a:fld>
@@ -15664,7 +15355,7 @@
     </p:spTree>
     <p:extLst>
       <p:ext uri="{BB962C8B-B14F-4D97-AF65-F5344CB8AC3E}">
-        <p14:creationId xmlns:p14="http://schemas.microsoft.com/office/powerpoint/2010/main" val="1971839430"/>
+        <p14:creationId xmlns:p14="http://schemas.microsoft.com/office/powerpoint/2010/main" val="4036288527"/>
       </p:ext>
     </p:extLst>
   </p:cSld>
@@ -16382,7 +16073,7 @@
       </p:sp>
       <p:sp>
         <p:nvSpPr>
-          <p:cNvPr id="11" name="2GradientShape"/>
+          <p:cNvPr id="11" name="TwoGradientShape"/>
           <p:cNvSpPr/>
           <p:nvPr/>
         </p:nvSpPr>
@@ -16466,12 +16157,10 @@
                 <a:srgbClr val="00B050"/>
               </a:gs>
               <a:gs pos="65000">
-                <a:schemeClr val="accent1"/>
+                <a:srgbClr val="00B0F0"/>
               </a:gs>
               <a:gs pos="100000">
-                <a:schemeClr val="accent6">
-                  <a:lumMod val="75000"/>
-                </a:schemeClr>
+                <a:srgbClr val="FFC000"/>
               </a:gs>
             </a:gsLst>
             <a:lin ang="8100000" scaled="0"/>
@@ -16537,17 +16226,13 @@
                 <a:srgbClr val="FFFF00"/>
               </a:gs>
               <a:gs pos="20000">
-                <a:schemeClr val="accent2">
-                  <a:lumMod val="75000"/>
-                </a:schemeClr>
+                <a:srgbClr val="C00000"/>
               </a:gs>
               <a:gs pos="80000">
                 <a:srgbClr val="00B050"/>
               </a:gs>
               <a:gs pos="60000">
-                <a:schemeClr val="accent2">
-                  <a:lumMod val="75000"/>
-                </a:schemeClr>
+                <a:srgbClr val="C00000"/>
               </a:gs>
               <a:gs pos="100000">
                 <a:srgbClr val="00B0F0"/>
@@ -16558,6 +16243,15 @@
             </a:path>
             <a:tileRect r="-100000" b="-100000"/>
           </a:gradFill>
+          <a:ln w="25400" cap="flat" cmpd="sng" algn="ctr">
+            <a:solidFill>
+              <a:srgbClr val="385D8A"/>
+            </a:solidFill>
+            <a:prstDash val="solid"/>
+            <a:round/>
+            <a:headEnd type="none" w="med" len="med"/>
+            <a:tailEnd type="none" w="med" len="med"/>
+          </a:ln>
         </p:spPr>
         <p:style>
           <a:lnRef idx="2">
@@ -16580,7 +16274,12 @@
           <a:lstStyle/>
           <a:p>
             <a:pPr algn="ctr"/>
-            <a:endParaRPr lang="en-US"/>
+            <a:endParaRPr lang="en-US">
+              <a:solidFill>
+                <a:srgbClr val="FFFFFF"/>
+              </a:solidFill>
+              <a:latin typeface="Calibri" panose="020F0502020204030204" pitchFamily="34" charset="0"/>
+            </a:endParaRPr>
           </a:p>
         </p:txBody>
       </p:sp>
@@ -16643,7 +16342,7 @@
       </p:sp>
       <p:sp>
         <p:nvSpPr>
-          <p:cNvPr id="14" name="7GradientShape"/>
+          <p:cNvPr id="14" name="NineGradientShape"/>
           <p:cNvSpPr/>
           <p:nvPr/>
         </p:nvSpPr>
@@ -17022,7 +16721,7 @@
       </p:sp>
       <p:sp>
         <p:nvSpPr>
-          <p:cNvPr id="11" name="2GradientShape"/>
+          <p:cNvPr id="11" name="TwoGradientShape"/>
           <p:cNvSpPr/>
           <p:nvPr/>
         </p:nvSpPr>
@@ -17106,15 +16805,13 @@
                 <a:srgbClr val="00B050"/>
               </a:gs>
               <a:gs pos="65000">
-                <a:schemeClr val="accent1"/>
+                <a:srgbClr val="00B0F0"/>
               </a:gs>
               <a:gs pos="100000">
-                <a:schemeClr val="accent6">
-                  <a:lumMod val="75000"/>
-                </a:schemeClr>
+                <a:srgbClr val="FFC000"/>
               </a:gs>
             </a:gsLst>
-            <a:lin ang="8100000" scaled="0"/>
+            <a:lin ang="8100000" scaled="1"/>
             <a:tileRect/>
           </a:gradFill>
           <a:ln w="25400" cap="flat" cmpd="sng" algn="ctr">
@@ -17177,17 +16874,13 @@
                 <a:srgbClr val="FFFF00"/>
               </a:gs>
               <a:gs pos="20000">
-                <a:schemeClr val="accent2">
-                  <a:lumMod val="75000"/>
-                </a:schemeClr>
+                <a:srgbClr val="C00000"/>
               </a:gs>
               <a:gs pos="80000">
                 <a:srgbClr val="00B050"/>
               </a:gs>
               <a:gs pos="60000">
-                <a:schemeClr val="accent2">
-                  <a:lumMod val="75000"/>
-                </a:schemeClr>
+                <a:srgbClr val="C00000"/>
               </a:gs>
               <a:gs pos="100000">
                 <a:srgbClr val="00B0F0"/>
@@ -17283,7 +16976,7 @@
       </p:sp>
       <p:sp>
         <p:nvSpPr>
-          <p:cNvPr id="14" name="7GradientShape"/>
+          <p:cNvPr id="14" name="NineGradientShape"/>
           <p:cNvSpPr/>
           <p:nvPr/>
         </p:nvSpPr>
@@ -17643,7 +17336,7 @@
       </p:sp>
       <p:sp>
         <p:nvSpPr>
-          <p:cNvPr id="11" name="2GradientShape"/>
+          <p:cNvPr id="11" name="TwoGradientShape"/>
           <p:cNvSpPr/>
           <p:nvPr/>
         </p:nvSpPr>
@@ -17727,15 +17420,13 @@
                 <a:srgbClr val="00B050"/>
               </a:gs>
               <a:gs pos="65000">
-                <a:schemeClr val="accent1"/>
+                <a:srgbClr val="00B0F0"/>
               </a:gs>
               <a:gs pos="100000">
-                <a:schemeClr val="accent6">
-                  <a:lumMod val="75000"/>
-                </a:schemeClr>
+                <a:srgbClr val="FFC000"/>
               </a:gs>
             </a:gsLst>
-            <a:lin ang="8100000" scaled="0"/>
+            <a:lin ang="8100000" scaled="1"/>
             <a:tileRect/>
           </a:gradFill>
           <a:ln w="25400" cap="flat" cmpd="sng" algn="ctr">
@@ -17798,17 +17489,13 @@
                 <a:srgbClr val="FFFF00"/>
               </a:gs>
               <a:gs pos="20000">
-                <a:schemeClr val="accent2">
-                  <a:lumMod val="75000"/>
-                </a:schemeClr>
+                <a:srgbClr val="C00000"/>
               </a:gs>
               <a:gs pos="80000">
                 <a:srgbClr val="00B050"/>
               </a:gs>
               <a:gs pos="60000">
-                <a:schemeClr val="accent2">
-                  <a:lumMod val="75000"/>
-                </a:schemeClr>
+                <a:srgbClr val="C00000"/>
               </a:gs>
               <a:gs pos="100000">
                 <a:srgbClr val="00B0F0"/>
@@ -17904,7 +17591,7 @@
       </p:sp>
       <p:sp>
         <p:nvSpPr>
-          <p:cNvPr id="14" name="7GradientShape"/>
+          <p:cNvPr id="14" name="NineGradientShape"/>
           <p:cNvSpPr/>
           <p:nvPr/>
         </p:nvSpPr>
@@ -18290,7 +17977,7 @@
       </p:sp>
       <p:sp>
         <p:nvSpPr>
-          <p:cNvPr id="11" name="2GradientShape"/>
+          <p:cNvPr id="11" name="TwoGradientShape"/>
           <p:cNvSpPr/>
           <p:nvPr/>
         </p:nvSpPr>
@@ -18374,15 +18061,13 @@
                 <a:srgbClr val="00B050"/>
               </a:gs>
               <a:gs pos="65000">
-                <a:schemeClr val="accent1"/>
+                <a:srgbClr val="00B0F0"/>
               </a:gs>
               <a:gs pos="100000">
-                <a:schemeClr val="accent6">
-                  <a:lumMod val="75000"/>
-                </a:schemeClr>
+                <a:srgbClr val="FFC000"/>
               </a:gs>
             </a:gsLst>
-            <a:lin ang="8100000" scaled="0"/>
+            <a:lin ang="8100000" scaled="1"/>
             <a:tileRect/>
           </a:gradFill>
           <a:ln w="25400" cap="flat" cmpd="sng" algn="ctr">
@@ -18445,17 +18130,13 @@
                 <a:srgbClr val="FFFF00"/>
               </a:gs>
               <a:gs pos="20000">
-                <a:schemeClr val="accent2">
-                  <a:lumMod val="75000"/>
-                </a:schemeClr>
+                <a:srgbClr val="C00000"/>
               </a:gs>
               <a:gs pos="80000">
                 <a:srgbClr val="00B050"/>
               </a:gs>
               <a:gs pos="60000">
-                <a:schemeClr val="accent2">
-                  <a:lumMod val="75000"/>
-                </a:schemeClr>
+                <a:srgbClr val="C00000"/>
               </a:gs>
               <a:gs pos="100000">
                 <a:srgbClr val="00B0F0"/>
@@ -18551,7 +18232,7 @@
       </p:sp>
       <p:sp>
         <p:nvSpPr>
-          <p:cNvPr id="14" name="7GradientShape"/>
+          <p:cNvPr id="14" name="NineGradientShape"/>
           <p:cNvSpPr/>
           <p:nvPr/>
         </p:nvSpPr>
@@ -18920,7 +18601,7 @@
       </p:sp>
       <p:sp>
         <p:nvSpPr>
-          <p:cNvPr id="11" name="2GradientShape"/>
+          <p:cNvPr id="11" name="TwoGradientShape"/>
           <p:cNvSpPr/>
           <p:nvPr/>
         </p:nvSpPr>
@@ -19004,15 +18685,13 @@
                 <a:srgbClr val="00B050"/>
               </a:gs>
               <a:gs pos="65000">
-                <a:schemeClr val="accent1"/>
+                <a:srgbClr val="00B0F0"/>
               </a:gs>
               <a:gs pos="100000">
-                <a:schemeClr val="accent6">
-                  <a:lumMod val="75000"/>
-                </a:schemeClr>
+                <a:srgbClr val="FFC000"/>
               </a:gs>
             </a:gsLst>
-            <a:lin ang="8100000" scaled="0"/>
+            <a:lin ang="8100000" scaled="1"/>
             <a:tileRect/>
           </a:gradFill>
           <a:ln w="25400" cap="flat" cmpd="sng" algn="ctr">
@@ -19075,17 +18754,13 @@
                 <a:srgbClr val="FFFF00"/>
               </a:gs>
               <a:gs pos="20000">
-                <a:schemeClr val="accent2">
-                  <a:lumMod val="75000"/>
-                </a:schemeClr>
+                <a:srgbClr val="C00000"/>
               </a:gs>
               <a:gs pos="80000">
                 <a:srgbClr val="00B050"/>
               </a:gs>
               <a:gs pos="60000">
-                <a:schemeClr val="accent2">
-                  <a:lumMod val="75000"/>
-                </a:schemeClr>
+                <a:srgbClr val="C00000"/>
               </a:gs>
               <a:gs pos="100000">
                 <a:srgbClr val="00B0F0"/>
@@ -19181,7 +18856,7 @@
       </p:sp>
       <p:sp>
         <p:nvSpPr>
-          <p:cNvPr id="14" name="7GradientShape"/>
+          <p:cNvPr id="14" name="NineGradientShape"/>
           <p:cNvSpPr/>
           <p:nvPr/>
         </p:nvSpPr>
@@ -19516,10 +19191,10 @@
                 <a:srgbClr val="00B050"/>
               </a:gs>
               <a:gs pos="65000">
-                <a:srgbClr val="5B9BD5"/>
+                <a:srgbClr val="00B0F0"/>
               </a:gs>
               <a:gs pos="100000">
-                <a:srgbClr val="548235"/>
+                <a:srgbClr val="FFC000"/>
               </a:gs>
             </a:gsLst>
             <a:lin ang="8100000" scaled="1"/>
@@ -19553,7 +19228,7 @@
       </p:sp>
       <p:sp>
         <p:nvSpPr>
-          <p:cNvPr id="11" name="2GradientShape"/>
+          <p:cNvPr id="11" name="TwoGradientShape"/>
           <p:cNvSpPr/>
           <p:nvPr/>
         </p:nvSpPr>
@@ -19637,15 +19312,13 @@
                 <a:srgbClr val="00B050"/>
               </a:gs>
               <a:gs pos="65000">
-                <a:schemeClr val="accent1"/>
+                <a:srgbClr val="00B0F0"/>
               </a:gs>
               <a:gs pos="100000">
-                <a:schemeClr val="accent6">
-                  <a:lumMod val="75000"/>
-                </a:schemeClr>
+                <a:srgbClr val="FFC000"/>
               </a:gs>
             </a:gsLst>
-            <a:lin ang="8100000" scaled="0"/>
+            <a:lin ang="8100000" scaled="1"/>
             <a:tileRect/>
           </a:gradFill>
           <a:ln w="25400" cap="flat" cmpd="sng" algn="ctr">
@@ -19708,17 +19381,13 @@
                 <a:srgbClr val="FFFF00"/>
               </a:gs>
               <a:gs pos="20000">
-                <a:schemeClr val="accent2">
-                  <a:lumMod val="75000"/>
-                </a:schemeClr>
+                <a:srgbClr val="C00000"/>
               </a:gs>
               <a:gs pos="80000">
                 <a:srgbClr val="00B050"/>
               </a:gs>
               <a:gs pos="60000">
-                <a:schemeClr val="accent2">
-                  <a:lumMod val="75000"/>
-                </a:schemeClr>
+                <a:srgbClr val="C00000"/>
               </a:gs>
               <a:gs pos="100000">
                 <a:srgbClr val="00B0F0"/>
@@ -19814,7 +19483,7 @@
       </p:sp>
       <p:sp>
         <p:nvSpPr>
-          <p:cNvPr id="14" name="7GradientShape"/>
+          <p:cNvPr id="14" name="NineGradientShape"/>
           <p:cNvSpPr/>
           <p:nvPr/>
         </p:nvSpPr>
@@ -20149,13 +19818,13 @@
                 <a:srgbClr val="FFFF00"/>
               </a:gs>
               <a:gs pos="20000">
-                <a:srgbClr val="C55A11"/>
+                <a:srgbClr val="C00000"/>
               </a:gs>
               <a:gs pos="80000">
                 <a:srgbClr val="00B050"/>
               </a:gs>
               <a:gs pos="60000">
-                <a:srgbClr val="C55A11"/>
+                <a:srgbClr val="C00000"/>
               </a:gs>
               <a:gs pos="100000">
                 <a:srgbClr val="00B0F0"/>
@@ -20194,7 +19863,7 @@
       </p:sp>
       <p:sp>
         <p:nvSpPr>
-          <p:cNvPr id="11" name="2GradientShape"/>
+          <p:cNvPr id="11" name="TwoGradientShape"/>
           <p:cNvSpPr/>
           <p:nvPr/>
         </p:nvSpPr>
@@ -20278,15 +19947,13 @@
                 <a:srgbClr val="00B050"/>
               </a:gs>
               <a:gs pos="65000">
-                <a:schemeClr val="accent1"/>
+                <a:srgbClr val="00B0F0"/>
               </a:gs>
               <a:gs pos="100000">
-                <a:schemeClr val="accent6">
-                  <a:lumMod val="75000"/>
-                </a:schemeClr>
+                <a:srgbClr val="FFC000"/>
               </a:gs>
             </a:gsLst>
-            <a:lin ang="8100000" scaled="0"/>
+            <a:lin ang="8100000" scaled="1"/>
             <a:tileRect/>
           </a:gradFill>
           <a:ln w="25400" cap="flat" cmpd="sng" algn="ctr">
@@ -20349,17 +20016,13 @@
                 <a:srgbClr val="FFFF00"/>
               </a:gs>
               <a:gs pos="20000">
-                <a:schemeClr val="accent2">
-                  <a:lumMod val="75000"/>
-                </a:schemeClr>
+                <a:srgbClr val="C00000"/>
               </a:gs>
               <a:gs pos="80000">
                 <a:srgbClr val="00B050"/>
               </a:gs>
               <a:gs pos="60000">
-                <a:schemeClr val="accent2">
-                  <a:lumMod val="75000"/>
-                </a:schemeClr>
+                <a:srgbClr val="C00000"/>
               </a:gs>
               <a:gs pos="100000">
                 <a:srgbClr val="00B0F0"/>
@@ -20469,7 +20132,7 @@
       </p:sp>
       <p:sp>
         <p:nvSpPr>
-          <p:cNvPr id="14" name="7GradientShape"/>
+          <p:cNvPr id="14" name="NineGradientShape"/>
           <p:cNvSpPr/>
           <p:nvPr/>
         </p:nvSpPr>
@@ -20843,7 +20506,7 @@
       </p:sp>
       <p:sp>
         <p:nvSpPr>
-          <p:cNvPr id="11" name="2GradientShape"/>
+          <p:cNvPr id="11" name="TwoGradientShape"/>
           <p:cNvSpPr/>
           <p:nvPr/>
         </p:nvSpPr>
@@ -20927,15 +20590,13 @@
                 <a:srgbClr val="00B050"/>
               </a:gs>
               <a:gs pos="65000">
-                <a:schemeClr val="accent1"/>
+                <a:srgbClr val="00B0F0"/>
               </a:gs>
               <a:gs pos="100000">
-                <a:schemeClr val="accent6">
-                  <a:lumMod val="75000"/>
-                </a:schemeClr>
+                <a:srgbClr val="FFC000"/>
               </a:gs>
             </a:gsLst>
-            <a:lin ang="8100000" scaled="0"/>
+            <a:lin ang="8100000" scaled="1"/>
             <a:tileRect/>
           </a:gradFill>
           <a:ln w="25400" cap="flat" cmpd="sng" algn="ctr">
@@ -20998,17 +20659,13 @@
                 <a:srgbClr val="FFFF00"/>
               </a:gs>
               <a:gs pos="20000">
-                <a:schemeClr val="accent2">
-                  <a:lumMod val="75000"/>
-                </a:schemeClr>
+                <a:srgbClr val="C00000"/>
               </a:gs>
               <a:gs pos="80000">
                 <a:srgbClr val="00B050"/>
               </a:gs>
               <a:gs pos="60000">
-                <a:schemeClr val="accent2">
-                  <a:lumMod val="75000"/>
-                </a:schemeClr>
+                <a:srgbClr val="C00000"/>
               </a:gs>
               <a:gs pos="100000">
                 <a:srgbClr val="00B0F0"/>
@@ -21118,7 +20775,7 @@
       </p:sp>
       <p:sp>
         <p:nvSpPr>
-          <p:cNvPr id="14" name="7GradientShape"/>
+          <p:cNvPr id="14" name="NineGradientShape"/>
           <p:cNvSpPr/>
           <p:nvPr/>
         </p:nvSpPr>
@@ -21511,7 +21168,7 @@
       </p:sp>
       <p:sp>
         <p:nvSpPr>
-          <p:cNvPr id="11" name="2GradientShape"/>
+          <p:cNvPr id="11" name="TwoGradientShape"/>
           <p:cNvSpPr/>
           <p:nvPr/>
         </p:nvSpPr>
@@ -21595,15 +21252,13 @@
                 <a:srgbClr val="00B050"/>
               </a:gs>
               <a:gs pos="65000">
-                <a:schemeClr val="accent1"/>
+                <a:srgbClr val="00B0F0"/>
               </a:gs>
               <a:gs pos="100000">
-                <a:schemeClr val="accent6">
-                  <a:lumMod val="75000"/>
-                </a:schemeClr>
+                <a:srgbClr val="FFC000"/>
               </a:gs>
             </a:gsLst>
-            <a:lin ang="8100000" scaled="0"/>
+            <a:lin ang="8100000" scaled="1"/>
             <a:tileRect/>
           </a:gradFill>
           <a:ln w="25400" cap="flat" cmpd="sng" algn="ctr">
@@ -21666,17 +21321,13 @@
                 <a:srgbClr val="FFFF00"/>
               </a:gs>
               <a:gs pos="20000">
-                <a:schemeClr val="accent2">
-                  <a:lumMod val="75000"/>
-                </a:schemeClr>
+                <a:srgbClr val="C00000"/>
               </a:gs>
               <a:gs pos="80000">
                 <a:srgbClr val="00B050"/>
               </a:gs>
               <a:gs pos="60000">
-                <a:schemeClr val="accent2">
-                  <a:lumMod val="75000"/>
-                </a:schemeClr>
+                <a:srgbClr val="C00000"/>
               </a:gs>
               <a:gs pos="100000">
                 <a:srgbClr val="00B0F0"/>
@@ -21772,7 +21423,7 @@
       </p:sp>
       <p:sp>
         <p:nvSpPr>
-          <p:cNvPr id="14" name="7GradientShape"/>
+          <p:cNvPr id="14" name="NineGradientShape"/>
           <p:cNvSpPr/>
           <p:nvPr/>
         </p:nvSpPr>
@@ -22150,7 +21801,7 @@
       </p:sp>
       <p:sp>
         <p:nvSpPr>
-          <p:cNvPr id="11" name="2GradientShape"/>
+          <p:cNvPr id="11" name="TwoGradientShape"/>
           <p:cNvSpPr/>
           <p:nvPr/>
         </p:nvSpPr>
@@ -22234,15 +21885,13 @@
                 <a:srgbClr val="00B050"/>
               </a:gs>
               <a:gs pos="65000">
-                <a:schemeClr val="accent1"/>
+                <a:srgbClr val="00B0F0"/>
               </a:gs>
               <a:gs pos="100000">
-                <a:schemeClr val="accent6">
-                  <a:lumMod val="75000"/>
-                </a:schemeClr>
+                <a:srgbClr val="FFC000"/>
               </a:gs>
             </a:gsLst>
-            <a:lin ang="8100000" scaled="0"/>
+            <a:lin ang="8100000" scaled="1"/>
             <a:tileRect/>
           </a:gradFill>
           <a:ln w="25400" cap="flat" cmpd="sng" algn="ctr">
@@ -22305,17 +21954,13 @@
                 <a:srgbClr val="FFFF00"/>
               </a:gs>
               <a:gs pos="20000">
-                <a:schemeClr val="accent2">
-                  <a:lumMod val="75000"/>
-                </a:schemeClr>
+                <a:srgbClr val="C00000"/>
               </a:gs>
               <a:gs pos="80000">
                 <a:srgbClr val="00B050"/>
               </a:gs>
               <a:gs pos="60000">
-                <a:schemeClr val="accent2">
-                  <a:lumMod val="75000"/>
-                </a:schemeClr>
+                <a:srgbClr val="C00000"/>
               </a:gs>
               <a:gs pos="100000">
                 <a:srgbClr val="00B0F0"/>
@@ -22411,7 +22056,7 @@
       </p:sp>
       <p:sp>
         <p:nvSpPr>
-          <p:cNvPr id="14" name="7GradientShape"/>
+          <p:cNvPr id="14" name="NineGradientShape"/>
           <p:cNvSpPr/>
           <p:nvPr/>
         </p:nvSpPr>

</xml_diff>

<commit_message>
Add tests for copy/sync in group
</commit_message>
<xml_diff>
--- a/doc/test/SyncLab.pptx
+++ b/doc/test/SyncLab.pptx
@@ -8,7 +8,7 @@
     <p:sldMasterId id="2147483684" r:id="rId4"/>
   </p:sldMasterIdLst>
   <p:notesMasterIdLst>
-    <p:notesMasterId r:id="rId39"/>
+    <p:notesMasterId r:id="rId44"/>
   </p:notesMasterIdLst>
   <p:sldIdLst>
     <p:sldId id="287" r:id="rId5"/>
@@ -45,6 +45,11 @@
     <p:sldId id="384" r:id="rId36"/>
     <p:sldId id="386" r:id="rId37"/>
     <p:sldId id="388" r:id="rId38"/>
+    <p:sldId id="402" r:id="rId39"/>
+    <p:sldId id="403" r:id="rId40"/>
+    <p:sldId id="405" r:id="rId41"/>
+    <p:sldId id="407" r:id="rId42"/>
+    <p:sldId id="406" r:id="rId43"/>
   </p:sldIdLst>
   <p:sldSz cx="9144000" cy="6858000" type="screen4x3"/>
   <p:notesSz cx="6858000" cy="9144000"/>
@@ -200,6 +205,15 @@
             <p14:sldId id="388"/>
           </p14:sldIdLst>
         </p14:section>
+        <p14:section name="Sync Group" id="{6CC32FF3-EA1B-4104-B5F2-01F8BC44C93B}">
+          <p14:sldIdLst>
+            <p14:sldId id="402"/>
+            <p14:sldId id="403"/>
+            <p14:sldId id="405"/>
+            <p14:sldId id="407"/>
+            <p14:sldId id="406"/>
+          </p14:sldIdLst>
+        </p14:section>
       </p14:sectionLst>
     </p:ext>
     <p:ext uri="{EFAFB233-063F-42B5-8137-9DF3F51BA10A}">
@@ -291,7 +305,7 @@
           <a:p>
             <a:fld id="{43E32005-3A63-48D2-8C73-BF5F95786EBD}" type="datetimeFigureOut">
               <a:rPr lang="en-US" smtClean="0"/>
-              <a:t>4/4/2017</a:t>
+              <a:t>5/29/2017</a:t>
             </a:fld>
             <a:endParaRPr lang="en-US"/>
           </a:p>
@@ -2823,6 +2837,94 @@
 </p:notes>
 </file>
 
+<file path=ppt/notesSlides/notesSlide29.xml><?xml version="1.0" encoding="utf-8"?>
+<p:notes xmlns:a="http://schemas.openxmlformats.org/drawingml/2006/main" xmlns:r="http://schemas.openxmlformats.org/officeDocument/2006/relationships" xmlns:p="http://schemas.openxmlformats.org/presentationml/2006/main">
+  <p:cSld>
+    <p:spTree>
+      <p:nvGrpSpPr>
+        <p:cNvPr id="1" name=""/>
+        <p:cNvGrpSpPr/>
+        <p:nvPr/>
+      </p:nvGrpSpPr>
+      <p:grpSpPr>
+        <a:xfrm>
+          <a:off x="0" y="0"/>
+          <a:ext cx="0" cy="0"/>
+          <a:chOff x="0" y="0"/>
+          <a:chExt cx="0" cy="0"/>
+        </a:xfrm>
+      </p:grpSpPr>
+      <p:sp>
+        <p:nvSpPr>
+          <p:cNvPr id="2" name="Slide Image Placeholder 1"/>
+          <p:cNvSpPr>
+            <a:spLocks noGrp="1" noRot="1" noChangeAspect="1"/>
+          </p:cNvSpPr>
+          <p:nvPr>
+            <p:ph type="sldImg"/>
+          </p:nvPr>
+        </p:nvSpPr>
+        <p:spPr/>
+      </p:sp>
+      <p:sp>
+        <p:nvSpPr>
+          <p:cNvPr id="3" name="Notes Placeholder 2"/>
+          <p:cNvSpPr>
+            <a:spLocks noGrp="1"/>
+          </p:cNvSpPr>
+          <p:nvPr>
+            <p:ph type="body" idx="1"/>
+          </p:nvPr>
+        </p:nvSpPr>
+        <p:spPr/>
+        <p:txBody>
+          <a:bodyPr/>
+          <a:lstStyle/>
+          <a:p>
+            <a:r>
+              <a:rPr lang="en-US" dirty="0" smtClean="0"/>
+              <a:t>Original Shapes</a:t>
+            </a:r>
+            <a:endParaRPr lang="en-US" dirty="0"/>
+          </a:p>
+        </p:txBody>
+      </p:sp>
+      <p:sp>
+        <p:nvSpPr>
+          <p:cNvPr id="4" name="Slide Number Placeholder 3"/>
+          <p:cNvSpPr>
+            <a:spLocks noGrp="1"/>
+          </p:cNvSpPr>
+          <p:nvPr>
+            <p:ph type="sldNum" sz="quarter" idx="10"/>
+          </p:nvPr>
+        </p:nvSpPr>
+        <p:spPr/>
+        <p:txBody>
+          <a:bodyPr/>
+          <a:lstStyle/>
+          <a:p>
+            <a:fld id="{0FE7C38A-472B-4221-8E00-509E1DA863EC}" type="slidenum">
+              <a:rPr lang="en-US" smtClean="0"/>
+              <a:t>36</a:t>
+            </a:fld>
+            <a:endParaRPr lang="en-US"/>
+          </a:p>
+        </p:txBody>
+      </p:sp>
+    </p:spTree>
+    <p:extLst>
+      <p:ext uri="{BB962C8B-B14F-4D97-AF65-F5344CB8AC3E}">
+        <p14:creationId xmlns:p14="http://schemas.microsoft.com/office/powerpoint/2010/main" val="2115274562"/>
+      </p:ext>
+    </p:extLst>
+  </p:cSld>
+  <p:clrMapOvr>
+    <a:masterClrMapping/>
+  </p:clrMapOvr>
+</p:notes>
+</file>
+
 <file path=ppt/notesSlides/notesSlide3.xml><?xml version="1.0" encoding="utf-8"?>
 <p:notes xmlns:a="http://schemas.openxmlformats.org/drawingml/2006/main" xmlns:r="http://schemas.openxmlformats.org/officeDocument/2006/relationships" xmlns:p="http://schemas.openxmlformats.org/presentationml/2006/main">
   <p:cSld>
@@ -2944,6 +3046,305 @@
     <p:extLst>
       <p:ext uri="{BB962C8B-B14F-4D97-AF65-F5344CB8AC3E}">
         <p14:creationId xmlns:p14="http://schemas.microsoft.com/office/powerpoint/2010/main" val="4074764116"/>
+      </p:ext>
+    </p:extLst>
+  </p:cSld>
+  <p:clrMapOvr>
+    <a:masterClrMapping/>
+  </p:clrMapOvr>
+</p:notes>
+</file>
+
+<file path=ppt/notesSlides/notesSlide30.xml><?xml version="1.0" encoding="utf-8"?>
+<p:notes xmlns:a="http://schemas.openxmlformats.org/drawingml/2006/main" xmlns:r="http://schemas.openxmlformats.org/officeDocument/2006/relationships" xmlns:p="http://schemas.openxmlformats.org/presentationml/2006/main">
+  <p:cSld>
+    <p:spTree>
+      <p:nvGrpSpPr>
+        <p:cNvPr id="1" name=""/>
+        <p:cNvGrpSpPr/>
+        <p:nvPr/>
+      </p:nvGrpSpPr>
+      <p:grpSpPr>
+        <a:xfrm>
+          <a:off x="0" y="0"/>
+          <a:ext cx="0" cy="0"/>
+          <a:chOff x="0" y="0"/>
+          <a:chExt cx="0" cy="0"/>
+        </a:xfrm>
+      </p:grpSpPr>
+      <p:sp>
+        <p:nvSpPr>
+          <p:cNvPr id="2" name="Slide Image Placeholder 1"/>
+          <p:cNvSpPr>
+            <a:spLocks noGrp="1" noRot="1" noChangeAspect="1"/>
+          </p:cNvSpPr>
+          <p:nvPr>
+            <p:ph type="sldImg"/>
+          </p:nvPr>
+        </p:nvSpPr>
+        <p:spPr/>
+      </p:sp>
+      <p:sp>
+        <p:nvSpPr>
+          <p:cNvPr id="3" name="Notes Placeholder 2"/>
+          <p:cNvSpPr>
+            <a:spLocks noGrp="1"/>
+          </p:cNvSpPr>
+          <p:nvPr>
+            <p:ph type="body" idx="1"/>
+          </p:nvPr>
+        </p:nvSpPr>
+        <p:spPr/>
+        <p:txBody>
+          <a:bodyPr/>
+          <a:lstStyle/>
+          <a:p>
+            <a:r>
+              <a:rPr lang="en-US" dirty="0" smtClean="0"/>
+              <a:t>Sync from group to shape</a:t>
+            </a:r>
+          </a:p>
+          <a:p>
+            <a:r>
+              <a:rPr lang="en-US" dirty="0" smtClean="0"/>
+              <a:t>Copy the fill for red shape (in the group)</a:t>
+            </a:r>
+          </a:p>
+          <a:p>
+            <a:r>
+              <a:rPr lang="en-US" dirty="0" smtClean="0"/>
+              <a:t>Sync to the arrow</a:t>
+            </a:r>
+          </a:p>
+        </p:txBody>
+      </p:sp>
+      <p:sp>
+        <p:nvSpPr>
+          <p:cNvPr id="4" name="Slide Number Placeholder 3"/>
+          <p:cNvSpPr>
+            <a:spLocks noGrp="1"/>
+          </p:cNvSpPr>
+          <p:nvPr>
+            <p:ph type="sldNum" sz="quarter" idx="10"/>
+          </p:nvPr>
+        </p:nvSpPr>
+        <p:spPr/>
+        <p:txBody>
+          <a:bodyPr/>
+          <a:lstStyle/>
+          <a:p>
+            <a:fld id="{0FE7C38A-472B-4221-8E00-509E1DA863EC}" type="slidenum">
+              <a:rPr lang="en-US" smtClean="0"/>
+              <a:t>37</a:t>
+            </a:fld>
+            <a:endParaRPr lang="en-US"/>
+          </a:p>
+        </p:txBody>
+      </p:sp>
+    </p:spTree>
+    <p:extLst>
+      <p:ext uri="{BB962C8B-B14F-4D97-AF65-F5344CB8AC3E}">
+        <p14:creationId xmlns:p14="http://schemas.microsoft.com/office/powerpoint/2010/main" val="2210537975"/>
+      </p:ext>
+    </p:extLst>
+  </p:cSld>
+  <p:clrMapOvr>
+    <a:masterClrMapping/>
+  </p:clrMapOvr>
+</p:notes>
+</file>
+
+<file path=ppt/notesSlides/notesSlide31.xml><?xml version="1.0" encoding="utf-8"?>
+<p:notes xmlns:a="http://schemas.openxmlformats.org/drawingml/2006/main" xmlns:r="http://schemas.openxmlformats.org/officeDocument/2006/relationships" xmlns:p="http://schemas.openxmlformats.org/presentationml/2006/main">
+  <p:cSld>
+    <p:spTree>
+      <p:nvGrpSpPr>
+        <p:cNvPr id="1" name=""/>
+        <p:cNvGrpSpPr/>
+        <p:nvPr/>
+      </p:nvGrpSpPr>
+      <p:grpSpPr>
+        <a:xfrm>
+          <a:off x="0" y="0"/>
+          <a:ext cx="0" cy="0"/>
+          <a:chOff x="0" y="0"/>
+          <a:chExt cx="0" cy="0"/>
+        </a:xfrm>
+      </p:grpSpPr>
+      <p:sp>
+        <p:nvSpPr>
+          <p:cNvPr id="2" name="Slide Image Placeholder 1"/>
+          <p:cNvSpPr>
+            <a:spLocks noGrp="1" noRot="1" noChangeAspect="1"/>
+          </p:cNvSpPr>
+          <p:nvPr>
+            <p:ph type="sldImg"/>
+          </p:nvPr>
+        </p:nvSpPr>
+        <p:spPr/>
+      </p:sp>
+      <p:sp>
+        <p:nvSpPr>
+          <p:cNvPr id="3" name="Notes Placeholder 2"/>
+          <p:cNvSpPr>
+            <a:spLocks noGrp="1"/>
+          </p:cNvSpPr>
+          <p:nvPr>
+            <p:ph type="body" idx="1"/>
+          </p:nvPr>
+        </p:nvSpPr>
+        <p:spPr/>
+        <p:txBody>
+          <a:bodyPr/>
+          <a:lstStyle/>
+          <a:p>
+            <a:r>
+              <a:rPr lang="en-US" dirty="0" smtClean="0"/>
+              <a:t>Original Shapes</a:t>
+            </a:r>
+            <a:endParaRPr lang="en-US" dirty="0"/>
+          </a:p>
+        </p:txBody>
+      </p:sp>
+      <p:sp>
+        <p:nvSpPr>
+          <p:cNvPr id="4" name="Slide Number Placeholder 3"/>
+          <p:cNvSpPr>
+            <a:spLocks noGrp="1"/>
+          </p:cNvSpPr>
+          <p:nvPr>
+            <p:ph type="sldNum" sz="quarter" idx="10"/>
+          </p:nvPr>
+        </p:nvSpPr>
+        <p:spPr/>
+        <p:txBody>
+          <a:bodyPr/>
+          <a:lstStyle/>
+          <a:p>
+            <a:fld id="{0FE7C38A-472B-4221-8E00-509E1DA863EC}" type="slidenum">
+              <a:rPr lang="en-US" smtClean="0"/>
+              <a:t>38</a:t>
+            </a:fld>
+            <a:endParaRPr lang="en-US"/>
+          </a:p>
+        </p:txBody>
+      </p:sp>
+    </p:spTree>
+    <p:extLst>
+      <p:ext uri="{BB962C8B-B14F-4D97-AF65-F5344CB8AC3E}">
+        <p14:creationId xmlns:p14="http://schemas.microsoft.com/office/powerpoint/2010/main" val="3196501275"/>
+      </p:ext>
+    </p:extLst>
+  </p:cSld>
+  <p:clrMapOvr>
+    <a:masterClrMapping/>
+  </p:clrMapOvr>
+</p:notes>
+</file>
+
+<file path=ppt/notesSlides/notesSlide32.xml><?xml version="1.0" encoding="utf-8"?>
+<p:notes xmlns:a="http://schemas.openxmlformats.org/drawingml/2006/main" xmlns:r="http://schemas.openxmlformats.org/officeDocument/2006/relationships" xmlns:p="http://schemas.openxmlformats.org/presentationml/2006/main">
+  <p:cSld>
+    <p:spTree>
+      <p:nvGrpSpPr>
+        <p:cNvPr id="1" name=""/>
+        <p:cNvGrpSpPr/>
+        <p:nvPr/>
+      </p:nvGrpSpPr>
+      <p:grpSpPr>
+        <a:xfrm>
+          <a:off x="0" y="0"/>
+          <a:ext cx="0" cy="0"/>
+          <a:chOff x="0" y="0"/>
+          <a:chExt cx="0" cy="0"/>
+        </a:xfrm>
+      </p:grpSpPr>
+      <p:sp>
+        <p:nvSpPr>
+          <p:cNvPr id="2" name="Slide Image Placeholder 1"/>
+          <p:cNvSpPr>
+            <a:spLocks noGrp="1" noRot="1" noChangeAspect="1"/>
+          </p:cNvSpPr>
+          <p:nvPr>
+            <p:ph type="sldImg"/>
+          </p:nvPr>
+        </p:nvSpPr>
+        <p:spPr/>
+      </p:sp>
+      <p:sp>
+        <p:nvSpPr>
+          <p:cNvPr id="3" name="Notes Placeholder 2"/>
+          <p:cNvSpPr>
+            <a:spLocks noGrp="1"/>
+          </p:cNvSpPr>
+          <p:nvPr>
+            <p:ph type="body" idx="1"/>
+          </p:nvPr>
+        </p:nvSpPr>
+        <p:spPr/>
+        <p:txBody>
+          <a:bodyPr/>
+          <a:lstStyle/>
+          <a:p>
+            <a:r>
+              <a:rPr lang="en-US" dirty="0" smtClean="0"/>
+              <a:t>Sync From</a:t>
+            </a:r>
+            <a:r>
+              <a:rPr lang="en-US" baseline="0" dirty="0" smtClean="0"/>
+              <a:t> </a:t>
+            </a:r>
+            <a:r>
+              <a:rPr lang="en-US" dirty="0" smtClean="0"/>
+              <a:t>shape to group</a:t>
+            </a:r>
+          </a:p>
+          <a:p>
+            <a:r>
+              <a:rPr lang="en-US" dirty="0" smtClean="0"/>
+              <a:t>Copy the line</a:t>
+            </a:r>
+            <a:r>
+              <a:rPr lang="en-US" baseline="0" dirty="0" smtClean="0"/>
+              <a:t> fill from yellow line</a:t>
+            </a:r>
+            <a:endParaRPr lang="en-US" dirty="0" smtClean="0"/>
+          </a:p>
+          <a:p>
+            <a:r>
+              <a:rPr lang="en-US" dirty="0" smtClean="0"/>
+              <a:t>Sync to the circle</a:t>
+            </a:r>
+          </a:p>
+        </p:txBody>
+      </p:sp>
+      <p:sp>
+        <p:nvSpPr>
+          <p:cNvPr id="4" name="Slide Number Placeholder 3"/>
+          <p:cNvSpPr>
+            <a:spLocks noGrp="1"/>
+          </p:cNvSpPr>
+          <p:nvPr>
+            <p:ph type="sldNum" sz="quarter" idx="10"/>
+          </p:nvPr>
+        </p:nvSpPr>
+        <p:spPr/>
+        <p:txBody>
+          <a:bodyPr/>
+          <a:lstStyle/>
+          <a:p>
+            <a:fld id="{0FE7C38A-472B-4221-8E00-509E1DA863EC}" type="slidenum">
+              <a:rPr lang="en-US" smtClean="0"/>
+              <a:t>39</a:t>
+            </a:fld>
+            <a:endParaRPr lang="en-US"/>
+          </a:p>
+        </p:txBody>
+      </p:sp>
+    </p:spTree>
+    <p:extLst>
+      <p:ext uri="{BB962C8B-B14F-4D97-AF65-F5344CB8AC3E}">
+        <p14:creationId xmlns:p14="http://schemas.microsoft.com/office/powerpoint/2010/main" val="3592809948"/>
       </p:ext>
     </p:extLst>
   </p:cSld>
@@ -3234,11 +3635,7 @@
             </a:r>
             <a:r>
               <a:rPr lang="en-US" baseline="0" dirty="0" smtClean="0"/>
-              <a:t> the background to help differentiate between background fill and other </a:t>
-            </a:r>
-            <a:r>
-              <a:rPr lang="en-US" baseline="0" dirty="0" smtClean="0"/>
-              <a:t>fills</a:t>
+              <a:t> the background to help differentiate between background fill and other fills</a:t>
             </a:r>
           </a:p>
           <a:p>
@@ -3903,7 +4300,7 @@
           <a:p>
             <a:fld id="{699DC775-C286-4358-8C92-D7E584E969B3}" type="datetimeFigureOut">
               <a:rPr lang="en-US" smtClean="0"/>
-              <a:t>4/4/2017</a:t>
+              <a:t>5/29/2017</a:t>
             </a:fld>
             <a:endParaRPr lang="en-US"/>
           </a:p>
@@ -4071,7 +4468,7 @@
           <a:p>
             <a:fld id="{699DC775-C286-4358-8C92-D7E584E969B3}" type="datetimeFigureOut">
               <a:rPr lang="en-US" smtClean="0"/>
-              <a:t>4/4/2017</a:t>
+              <a:t>5/29/2017</a:t>
             </a:fld>
             <a:endParaRPr lang="en-US"/>
           </a:p>
@@ -4249,7 +4646,7 @@
           <a:p>
             <a:fld id="{699DC775-C286-4358-8C92-D7E584E969B3}" type="datetimeFigureOut">
               <a:rPr lang="en-US" smtClean="0"/>
-              <a:t>4/4/2017</a:t>
+              <a:t>5/29/2017</a:t>
             </a:fld>
             <a:endParaRPr lang="en-US"/>
           </a:p>
@@ -4489,7 +4886,7 @@
           <a:p>
             <a:fld id="{699DC775-C286-4358-8C92-D7E584E969B3}" type="datetimeFigureOut">
               <a:rPr lang="en-US" smtClean="0"/>
-              <a:t>4/4/2017</a:t>
+              <a:t>5/29/2017</a:t>
             </a:fld>
             <a:endParaRPr lang="en-US"/>
           </a:p>
@@ -4657,7 +5054,7 @@
           <a:p>
             <a:fld id="{699DC775-C286-4358-8C92-D7E584E969B3}" type="datetimeFigureOut">
               <a:rPr lang="en-US" smtClean="0"/>
-              <a:t>4/4/2017</a:t>
+              <a:t>5/29/2017</a:t>
             </a:fld>
             <a:endParaRPr lang="en-US"/>
           </a:p>
@@ -4902,7 +5299,7 @@
           <a:p>
             <a:fld id="{699DC775-C286-4358-8C92-D7E584E969B3}" type="datetimeFigureOut">
               <a:rPr lang="en-US" smtClean="0"/>
-              <a:t>4/4/2017</a:t>
+              <a:t>5/29/2017</a:t>
             </a:fld>
             <a:endParaRPr lang="en-US"/>
           </a:p>
@@ -5187,7 +5584,7 @@
           <a:p>
             <a:fld id="{699DC775-C286-4358-8C92-D7E584E969B3}" type="datetimeFigureOut">
               <a:rPr lang="en-US" smtClean="0"/>
-              <a:t>4/4/2017</a:t>
+              <a:t>5/29/2017</a:t>
             </a:fld>
             <a:endParaRPr lang="en-US"/>
           </a:p>
@@ -5606,7 +6003,7 @@
           <a:p>
             <a:fld id="{699DC775-C286-4358-8C92-D7E584E969B3}" type="datetimeFigureOut">
               <a:rPr lang="en-US" smtClean="0"/>
-              <a:t>4/4/2017</a:t>
+              <a:t>5/29/2017</a:t>
             </a:fld>
             <a:endParaRPr lang="en-US"/>
           </a:p>
@@ -5723,7 +6120,7 @@
           <a:p>
             <a:fld id="{699DC775-C286-4358-8C92-D7E584E969B3}" type="datetimeFigureOut">
               <a:rPr lang="en-US" smtClean="0"/>
-              <a:t>4/4/2017</a:t>
+              <a:t>5/29/2017</a:t>
             </a:fld>
             <a:endParaRPr lang="en-US"/>
           </a:p>
@@ -5818,7 +6215,7 @@
           <a:p>
             <a:fld id="{699DC775-C286-4358-8C92-D7E584E969B3}" type="datetimeFigureOut">
               <a:rPr lang="en-US" smtClean="0"/>
-              <a:t>4/4/2017</a:t>
+              <a:t>5/29/2017</a:t>
             </a:fld>
             <a:endParaRPr lang="en-US"/>
           </a:p>
@@ -6093,7 +6490,7 @@
           <a:p>
             <a:fld id="{699DC775-C286-4358-8C92-D7E584E969B3}" type="datetimeFigureOut">
               <a:rPr lang="en-US" smtClean="0"/>
-              <a:t>4/4/2017</a:t>
+              <a:t>5/29/2017</a:t>
             </a:fld>
             <a:endParaRPr lang="en-US"/>
           </a:p>
@@ -6261,7 +6658,7 @@
           <a:p>
             <a:fld id="{699DC775-C286-4358-8C92-D7E584E969B3}" type="datetimeFigureOut">
               <a:rPr lang="en-US" smtClean="0"/>
-              <a:t>4/4/2017</a:t>
+              <a:t>5/29/2017</a:t>
             </a:fld>
             <a:endParaRPr lang="en-US"/>
           </a:p>
@@ -6513,7 +6910,7 @@
           <a:p>
             <a:fld id="{699DC775-C286-4358-8C92-D7E584E969B3}" type="datetimeFigureOut">
               <a:rPr lang="en-US" smtClean="0"/>
-              <a:t>4/4/2017</a:t>
+              <a:t>5/29/2017</a:t>
             </a:fld>
             <a:endParaRPr lang="en-US"/>
           </a:p>
@@ -6681,7 +7078,7 @@
           <a:p>
             <a:fld id="{699DC775-C286-4358-8C92-D7E584E969B3}" type="datetimeFigureOut">
               <a:rPr lang="en-US" smtClean="0"/>
-              <a:t>4/4/2017</a:t>
+              <a:t>5/29/2017</a:t>
             </a:fld>
             <a:endParaRPr lang="en-US"/>
           </a:p>
@@ -6859,7 +7256,7 @@
           <a:p>
             <a:fld id="{699DC775-C286-4358-8C92-D7E584E969B3}" type="datetimeFigureOut">
               <a:rPr lang="en-US" smtClean="0"/>
-              <a:t>4/4/2017</a:t>
+              <a:t>5/29/2017</a:t>
             </a:fld>
             <a:endParaRPr lang="en-US"/>
           </a:p>
@@ -7107,7 +7504,7 @@
           <a:p>
             <a:fld id="{699DC775-C286-4358-8C92-D7E584E969B3}" type="datetimeFigureOut">
               <a:rPr lang="en-US" smtClean="0"/>
-              <a:t>4/4/2017</a:t>
+              <a:t>5/29/2017</a:t>
             </a:fld>
             <a:endParaRPr lang="en-US"/>
           </a:p>
@@ -7283,7 +7680,7 @@
           <a:p>
             <a:fld id="{699DC775-C286-4358-8C92-D7E584E969B3}" type="datetimeFigureOut">
               <a:rPr lang="en-US" smtClean="0"/>
-              <a:t>4/4/2017</a:t>
+              <a:t>5/29/2017</a:t>
             </a:fld>
             <a:endParaRPr lang="en-US"/>
           </a:p>
@@ -7536,7 +7933,7 @@
           <a:p>
             <a:fld id="{699DC775-C286-4358-8C92-D7E584E969B3}" type="datetimeFigureOut">
               <a:rPr lang="en-US" smtClean="0"/>
-              <a:t>4/4/2017</a:t>
+              <a:t>5/29/2017</a:t>
             </a:fld>
             <a:endParaRPr lang="en-US"/>
           </a:p>
@@ -7829,7 +8226,7 @@
           <a:p>
             <a:fld id="{699DC775-C286-4358-8C92-D7E584E969B3}" type="datetimeFigureOut">
               <a:rPr lang="en-US" smtClean="0"/>
-              <a:t>4/4/2017</a:t>
+              <a:t>5/29/2017</a:t>
             </a:fld>
             <a:endParaRPr lang="en-US"/>
           </a:p>
@@ -8256,7 +8653,7 @@
           <a:p>
             <a:fld id="{699DC775-C286-4358-8C92-D7E584E969B3}" type="datetimeFigureOut">
               <a:rPr lang="en-US" smtClean="0"/>
-              <a:t>4/4/2017</a:t>
+              <a:t>5/29/2017</a:t>
             </a:fld>
             <a:endParaRPr lang="en-US"/>
           </a:p>
@@ -8381,7 +8778,7 @@
           <a:p>
             <a:fld id="{699DC775-C286-4358-8C92-D7E584E969B3}" type="datetimeFigureOut">
               <a:rPr lang="en-US" smtClean="0"/>
-              <a:t>4/4/2017</a:t>
+              <a:t>5/29/2017</a:t>
             </a:fld>
             <a:endParaRPr lang="en-US"/>
           </a:p>
@@ -8484,7 +8881,7 @@
           <a:p>
             <a:fld id="{699DC775-C286-4358-8C92-D7E584E969B3}" type="datetimeFigureOut">
               <a:rPr lang="en-US" smtClean="0"/>
-              <a:t>4/4/2017</a:t>
+              <a:t>5/29/2017</a:t>
             </a:fld>
             <a:endParaRPr lang="en-US"/>
           </a:p>
@@ -8729,7 +9126,7 @@
           <a:p>
             <a:fld id="{699DC775-C286-4358-8C92-D7E584E969B3}" type="datetimeFigureOut">
               <a:rPr lang="en-US" smtClean="0"/>
-              <a:t>4/4/2017</a:t>
+              <a:t>5/29/2017</a:t>
             </a:fld>
             <a:endParaRPr lang="en-US"/>
           </a:p>
@@ -9012,7 +9409,7 @@
           <a:p>
             <a:fld id="{699DC775-C286-4358-8C92-D7E584E969B3}" type="datetimeFigureOut">
               <a:rPr lang="en-US" smtClean="0"/>
-              <a:t>4/4/2017</a:t>
+              <a:t>5/29/2017</a:t>
             </a:fld>
             <a:endParaRPr lang="en-US"/>
           </a:p>
@@ -9272,7 +9669,7 @@
           <a:p>
             <a:fld id="{699DC775-C286-4358-8C92-D7E584E969B3}" type="datetimeFigureOut">
               <a:rPr lang="en-US" smtClean="0"/>
-              <a:t>4/4/2017</a:t>
+              <a:t>5/29/2017</a:t>
             </a:fld>
             <a:endParaRPr lang="en-US"/>
           </a:p>
@@ -9448,7 +9845,7 @@
           <a:p>
             <a:fld id="{699DC775-C286-4358-8C92-D7E584E969B3}" type="datetimeFigureOut">
               <a:rPr lang="en-US" smtClean="0"/>
-              <a:t>4/4/2017</a:t>
+              <a:t>5/29/2017</a:t>
             </a:fld>
             <a:endParaRPr lang="en-US"/>
           </a:p>
@@ -9634,7 +10031,7 @@
           <a:p>
             <a:fld id="{699DC775-C286-4358-8C92-D7E584E969B3}" type="datetimeFigureOut">
               <a:rPr lang="en-US" smtClean="0"/>
-              <a:t>4/4/2017</a:t>
+              <a:t>5/29/2017</a:t>
             </a:fld>
             <a:endParaRPr lang="en-US"/>
           </a:p>
@@ -9826,7 +10223,7 @@
           <a:p>
             <a:fld id="{45696B32-6A70-48EC-8939-9D142D9557CD}" type="datetimeFigureOut">
               <a:rPr lang="en-US" smtClean="0"/>
-              <a:t>4/4/2017</a:t>
+              <a:t>5/29/2017</a:t>
             </a:fld>
             <a:endParaRPr lang="en-US"/>
           </a:p>
@@ -10142,7 +10539,7 @@
           <a:p>
             <a:fld id="{45696B32-6A70-48EC-8939-9D142D9557CD}" type="datetimeFigureOut">
               <a:rPr lang="en-US" smtClean="0"/>
-              <a:t>4/4/2017</a:t>
+              <a:t>5/29/2017</a:t>
             </a:fld>
             <a:endParaRPr lang="en-US"/>
           </a:p>
@@ -10388,7 +10785,7 @@
           <a:p>
             <a:fld id="{45696B32-6A70-48EC-8939-9D142D9557CD}" type="datetimeFigureOut">
               <a:rPr lang="en-US" smtClean="0"/>
-              <a:t>4/4/2017</a:t>
+              <a:t>5/29/2017</a:t>
             </a:fld>
             <a:endParaRPr lang="en-US"/>
           </a:p>
@@ -10620,7 +11017,7 @@
           <a:p>
             <a:fld id="{45696B32-6A70-48EC-8939-9D142D9557CD}" type="datetimeFigureOut">
               <a:rPr lang="en-US" smtClean="0"/>
-              <a:t>4/4/2017</a:t>
+              <a:t>5/29/2017</a:t>
             </a:fld>
             <a:endParaRPr lang="en-US"/>
           </a:p>
@@ -10987,7 +11384,7 @@
           <a:p>
             <a:fld id="{45696B32-6A70-48EC-8939-9D142D9557CD}" type="datetimeFigureOut">
               <a:rPr lang="en-US" smtClean="0"/>
-              <a:t>4/4/2017</a:t>
+              <a:t>5/29/2017</a:t>
             </a:fld>
             <a:endParaRPr lang="en-US"/>
           </a:p>
@@ -11105,7 +11502,7 @@
           <a:p>
             <a:fld id="{45696B32-6A70-48EC-8939-9D142D9557CD}" type="datetimeFigureOut">
               <a:rPr lang="en-US" smtClean="0"/>
-              <a:t>4/4/2017</a:t>
+              <a:t>5/29/2017</a:t>
             </a:fld>
             <a:endParaRPr lang="en-US"/>
           </a:p>
@@ -11390,7 +11787,7 @@
           <a:p>
             <a:fld id="{699DC775-C286-4358-8C92-D7E584E969B3}" type="datetimeFigureOut">
               <a:rPr lang="en-US" smtClean="0"/>
-              <a:t>4/4/2017</a:t>
+              <a:t>5/29/2017</a:t>
             </a:fld>
             <a:endParaRPr lang="en-US"/>
           </a:p>
@@ -11485,7 +11882,7 @@
           <a:p>
             <a:fld id="{45696B32-6A70-48EC-8939-9D142D9557CD}" type="datetimeFigureOut">
               <a:rPr lang="en-US" smtClean="0"/>
-              <a:t>4/4/2017</a:t>
+              <a:t>5/29/2017</a:t>
             </a:fld>
             <a:endParaRPr lang="en-US"/>
           </a:p>
@@ -11762,7 +12159,7 @@
           <a:p>
             <a:fld id="{45696B32-6A70-48EC-8939-9D142D9557CD}" type="datetimeFigureOut">
               <a:rPr lang="en-US" smtClean="0"/>
-              <a:t>4/4/2017</a:t>
+              <a:t>5/29/2017</a:t>
             </a:fld>
             <a:endParaRPr lang="en-US"/>
           </a:p>
@@ -12015,7 +12412,7 @@
           <a:p>
             <a:fld id="{45696B32-6A70-48EC-8939-9D142D9557CD}" type="datetimeFigureOut">
               <a:rPr lang="en-US" smtClean="0"/>
-              <a:t>4/4/2017</a:t>
+              <a:t>5/29/2017</a:t>
             </a:fld>
             <a:endParaRPr lang="en-US"/>
           </a:p>
@@ -12185,7 +12582,7 @@
           <a:p>
             <a:fld id="{45696B32-6A70-48EC-8939-9D142D9557CD}" type="datetimeFigureOut">
               <a:rPr lang="en-US" smtClean="0"/>
-              <a:t>4/4/2017</a:t>
+              <a:t>5/29/2017</a:t>
             </a:fld>
             <a:endParaRPr lang="en-US"/>
           </a:p>
@@ -12365,7 +12762,7 @@
           <a:p>
             <a:fld id="{45696B32-6A70-48EC-8939-9D142D9557CD}" type="datetimeFigureOut">
               <a:rPr lang="en-US" smtClean="0"/>
-              <a:t>4/4/2017</a:t>
+              <a:t>5/29/2017</a:t>
             </a:fld>
             <a:endParaRPr lang="en-US"/>
           </a:p>
@@ -12784,7 +13181,7 @@
           <a:p>
             <a:fld id="{699DC775-C286-4358-8C92-D7E584E969B3}" type="datetimeFigureOut">
               <a:rPr lang="en-US" smtClean="0"/>
-              <a:t>4/4/2017</a:t>
+              <a:t>5/29/2017</a:t>
             </a:fld>
             <a:endParaRPr lang="en-US"/>
           </a:p>
@@ -12901,7 +13298,7 @@
           <a:p>
             <a:fld id="{699DC775-C286-4358-8C92-D7E584E969B3}" type="datetimeFigureOut">
               <a:rPr lang="en-US" smtClean="0"/>
-              <a:t>4/4/2017</a:t>
+              <a:t>5/29/2017</a:t>
             </a:fld>
             <a:endParaRPr lang="en-US"/>
           </a:p>
@@ -12996,7 +13393,7 @@
           <a:p>
             <a:fld id="{699DC775-C286-4358-8C92-D7E584E969B3}" type="datetimeFigureOut">
               <a:rPr lang="en-US" smtClean="0"/>
-              <a:t>4/4/2017</a:t>
+              <a:t>5/29/2017</a:t>
             </a:fld>
             <a:endParaRPr lang="en-US"/>
           </a:p>
@@ -13271,7 +13668,7 @@
           <a:p>
             <a:fld id="{699DC775-C286-4358-8C92-D7E584E969B3}" type="datetimeFigureOut">
               <a:rPr lang="en-US" smtClean="0"/>
-              <a:t>4/4/2017</a:t>
+              <a:t>5/29/2017</a:t>
             </a:fld>
             <a:endParaRPr lang="en-US"/>
           </a:p>
@@ -13523,7 +13920,7 @@
           <a:p>
             <a:fld id="{699DC775-C286-4358-8C92-D7E584E969B3}" type="datetimeFigureOut">
               <a:rPr lang="en-US" smtClean="0"/>
-              <a:t>4/4/2017</a:t>
+              <a:t>5/29/2017</a:t>
             </a:fld>
             <a:endParaRPr lang="en-US"/>
           </a:p>
@@ -13734,7 +14131,7 @@
           <a:p>
             <a:fld id="{699DC775-C286-4358-8C92-D7E584E969B3}" type="datetimeFigureOut">
               <a:rPr lang="en-US" smtClean="0"/>
-              <a:t>4/4/2017</a:t>
+              <a:t>5/29/2017</a:t>
             </a:fld>
             <a:endParaRPr lang="en-US"/>
           </a:p>
@@ -14247,7 +14644,7 @@
           <a:p>
             <a:fld id="{699DC775-C286-4358-8C92-D7E584E969B3}" type="datetimeFigureOut">
               <a:rPr lang="en-US" smtClean="0"/>
-              <a:t>4/4/2017</a:t>
+              <a:t>5/29/2017</a:t>
             </a:fld>
             <a:endParaRPr lang="en-US"/>
           </a:p>
@@ -14758,7 +15155,7 @@
           <a:p>
             <a:fld id="{699DC775-C286-4358-8C92-D7E584E969B3}" type="datetimeFigureOut">
               <a:rPr lang="en-US" smtClean="0"/>
-              <a:t>4/4/2017</a:t>
+              <a:t>5/29/2017</a:t>
             </a:fld>
             <a:endParaRPr lang="en-US"/>
           </a:p>
@@ -15268,7 +15665,7 @@
           <a:p>
             <a:fld id="{45696B32-6A70-48EC-8939-9D142D9557CD}" type="datetimeFigureOut">
               <a:rPr lang="en-US" smtClean="0"/>
-              <a:t>4/4/2017</a:t>
+              <a:t>5/29/2017</a:t>
             </a:fld>
             <a:endParaRPr lang="en-US"/>
           </a:p>
@@ -26589,6 +26986,1280 @@
     <p:extLst>
       <p:ext uri="{BB962C8B-B14F-4D97-AF65-F5344CB8AC3E}">
         <p14:creationId xmlns:p14="http://schemas.microsoft.com/office/powerpoint/2010/main" val="1904788095"/>
+      </p:ext>
+    </p:extLst>
+  </p:cSld>
+  <p:clrMapOvr>
+    <a:masterClrMapping/>
+  </p:clrMapOvr>
+</p:sld>
+</file>
+
+<file path=ppt/slides/slide35.xml><?xml version="1.0" encoding="utf-8"?>
+<p:sld xmlns:a="http://schemas.openxmlformats.org/drawingml/2006/main" xmlns:r="http://schemas.openxmlformats.org/officeDocument/2006/relationships" xmlns:p="http://schemas.openxmlformats.org/presentationml/2006/main">
+  <p:cSld>
+    <p:spTree>
+      <p:nvGrpSpPr>
+        <p:cNvPr id="1" name=""/>
+        <p:cNvGrpSpPr/>
+        <p:nvPr/>
+      </p:nvGrpSpPr>
+      <p:grpSpPr>
+        <a:xfrm>
+          <a:off x="0" y="0"/>
+          <a:ext cx="0" cy="0"/>
+          <a:chOff x="0" y="0"/>
+          <a:chExt cx="0" cy="0"/>
+        </a:xfrm>
+      </p:grpSpPr>
+      <p:sp>
+        <p:nvSpPr>
+          <p:cNvPr id="2" name="Title 1"/>
+          <p:cNvSpPr>
+            <a:spLocks noGrp="1"/>
+          </p:cNvSpPr>
+          <p:nvPr>
+            <p:ph type="title"/>
+          </p:nvPr>
+        </p:nvSpPr>
+        <p:spPr/>
+        <p:txBody>
+          <a:bodyPr/>
+          <a:lstStyle/>
+          <a:p>
+            <a:r>
+              <a:rPr lang="en-US" dirty="0" smtClean="0"/>
+              <a:t>Sync:: Group</a:t>
+            </a:r>
+            <a:endParaRPr lang="en-SG" dirty="0"/>
+          </a:p>
+        </p:txBody>
+      </p:sp>
+      <p:sp>
+        <p:nvSpPr>
+          <p:cNvPr id="4" name="Content Placeholder 3"/>
+          <p:cNvSpPr>
+            <a:spLocks noGrp="1"/>
+          </p:cNvSpPr>
+          <p:nvPr>
+            <p:ph idx="1"/>
+          </p:nvPr>
+        </p:nvSpPr>
+        <p:spPr/>
+        <p:txBody>
+          <a:bodyPr/>
+          <a:lstStyle/>
+          <a:p>
+            <a:pPr marL="0" indent="0">
+              <a:buNone/>
+            </a:pPr>
+            <a:r>
+              <a:rPr lang="en-US" b="1" dirty="0" smtClean="0"/>
+              <a:t>Additional instructions</a:t>
+            </a:r>
+            <a:r>
+              <a:rPr lang="en-US" b="1" dirty="0"/>
+              <a:t>:</a:t>
+            </a:r>
+          </a:p>
+          <a:p>
+            <a:pPr marL="285750" indent="-285750"/>
+            <a:r>
+              <a:rPr lang="en-US" dirty="0"/>
+              <a:t>Select </a:t>
+            </a:r>
+            <a:r>
+              <a:rPr lang="en-US" dirty="0" smtClean="0"/>
+              <a:t>the appropriate </a:t>
+            </a:r>
+            <a:r>
+              <a:rPr lang="en-US" b="1" dirty="0" smtClean="0"/>
+              <a:t>Shape</a:t>
+            </a:r>
+            <a:endParaRPr lang="en-US" dirty="0" smtClean="0"/>
+          </a:p>
+          <a:p>
+            <a:pPr marL="285750" indent="-285750"/>
+            <a:r>
+              <a:rPr lang="en-US" dirty="0" smtClean="0"/>
+              <a:t>Click </a:t>
+            </a:r>
+            <a:r>
+              <a:rPr lang="en-US" b="1" dirty="0" err="1" smtClean="0"/>
+              <a:t>SyncLab</a:t>
+            </a:r>
+            <a:r>
+              <a:rPr lang="en-US" dirty="0" smtClean="0"/>
+              <a:t> Ribbon button.</a:t>
+            </a:r>
+          </a:p>
+          <a:p>
+            <a:pPr marL="285750" indent="-285750"/>
+            <a:r>
+              <a:rPr lang="en-US" dirty="0" smtClean="0"/>
+              <a:t>Click </a:t>
+            </a:r>
+            <a:r>
+              <a:rPr lang="en-US" b="1" dirty="0"/>
+              <a:t>Copy</a:t>
+            </a:r>
+            <a:r>
+              <a:rPr lang="en-US" dirty="0"/>
+              <a:t> to copy the format and select the formats to copy</a:t>
+            </a:r>
+          </a:p>
+          <a:p>
+            <a:pPr marL="285750" indent="-285750"/>
+            <a:r>
+              <a:rPr lang="en-US" dirty="0"/>
+              <a:t>Select the </a:t>
+            </a:r>
+            <a:r>
+              <a:rPr lang="en-US" b="1" dirty="0"/>
+              <a:t>Shapes</a:t>
+            </a:r>
+            <a:r>
+              <a:rPr lang="en-US" dirty="0"/>
+              <a:t> to sync the format</a:t>
+            </a:r>
+          </a:p>
+          <a:p>
+            <a:pPr marL="285750" indent="-285750"/>
+            <a:r>
+              <a:rPr lang="en-US" dirty="0"/>
+              <a:t>Click </a:t>
+            </a:r>
+            <a:r>
+              <a:rPr lang="en-US" b="1" dirty="0"/>
+              <a:t>Paste</a:t>
+            </a:r>
+            <a:r>
+              <a:rPr lang="en-US" dirty="0"/>
+              <a:t> to sync the format</a:t>
+            </a:r>
+          </a:p>
+          <a:p>
+            <a:endParaRPr lang="en-US" dirty="0"/>
+          </a:p>
+        </p:txBody>
+      </p:sp>
+    </p:spTree>
+    <p:extLst>
+      <p:ext uri="{BB962C8B-B14F-4D97-AF65-F5344CB8AC3E}">
+        <p14:creationId xmlns:p14="http://schemas.microsoft.com/office/powerpoint/2010/main" val="377832731"/>
+      </p:ext>
+    </p:extLst>
+  </p:cSld>
+  <p:clrMapOvr>
+    <a:masterClrMapping/>
+  </p:clrMapOvr>
+</p:sld>
+</file>
+
+<file path=ppt/slides/slide36.xml><?xml version="1.0" encoding="utf-8"?>
+<p:sld xmlns:a="http://schemas.openxmlformats.org/drawingml/2006/main" xmlns:r="http://schemas.openxmlformats.org/officeDocument/2006/relationships" xmlns:p="http://schemas.openxmlformats.org/presentationml/2006/main">
+  <p:cSld>
+    <p:spTree>
+      <p:nvGrpSpPr>
+        <p:cNvPr id="1" name=""/>
+        <p:cNvGrpSpPr/>
+        <p:nvPr/>
+      </p:nvGrpSpPr>
+      <p:grpSpPr>
+        <a:xfrm>
+          <a:off x="0" y="0"/>
+          <a:ext cx="0" cy="0"/>
+          <a:chOff x="0" y="0"/>
+          <a:chExt cx="0" cy="0"/>
+        </a:xfrm>
+      </p:grpSpPr>
+      <p:grpSp>
+        <p:nvGrpSpPr>
+          <p:cNvPr id="2" name="Group 1"/>
+          <p:cNvGrpSpPr/>
+          <p:nvPr/>
+        </p:nvGrpSpPr>
+        <p:grpSpPr>
+          <a:xfrm>
+            <a:off x="570411" y="1676400"/>
+            <a:ext cx="3657600" cy="2815972"/>
+            <a:chOff x="660392" y="917828"/>
+            <a:chExt cx="3657600" cy="2815972"/>
+          </a:xfrm>
+        </p:grpSpPr>
+        <p:sp>
+          <p:nvSpPr>
+            <p:cNvPr id="4" name="Rectangle 3"/>
+            <p:cNvSpPr/>
+            <p:nvPr/>
+          </p:nvSpPr>
+          <p:spPr>
+            <a:xfrm>
+              <a:off x="660392" y="917828"/>
+              <a:ext cx="1828800" cy="1219200"/>
+            </a:xfrm>
+            <a:prstGeom prst="rect">
+              <a:avLst/>
+            </a:prstGeom>
+            <a:solidFill>
+              <a:schemeClr val="accent1"/>
+            </a:solidFill>
+            <a:ln w="25400" cap="flat" cmpd="sng" algn="ctr">
+              <a:solidFill>
+                <a:schemeClr val="accent1"/>
+              </a:solidFill>
+              <a:prstDash val="solid"/>
+              <a:round/>
+              <a:headEnd type="none" w="med" len="med"/>
+              <a:tailEnd type="none" w="med" len="med"/>
+            </a:ln>
+          </p:spPr>
+          <p:style>
+            <a:lnRef idx="2">
+              <a:schemeClr val="accent1">
+                <a:shade val="50000"/>
+              </a:schemeClr>
+            </a:lnRef>
+            <a:fillRef idx="1">
+              <a:schemeClr val="accent1"/>
+            </a:fillRef>
+            <a:effectRef idx="0">
+              <a:schemeClr val="accent1"/>
+            </a:effectRef>
+            <a:fontRef idx="minor">
+              <a:schemeClr val="lt1"/>
+            </a:fontRef>
+          </p:style>
+          <p:txBody>
+            <a:bodyPr rtlCol="0" anchor="ctr"/>
+            <a:lstStyle/>
+            <a:p>
+              <a:pPr algn="ctr"/>
+              <a:endParaRPr lang="en-US">
+                <a:solidFill>
+                  <a:srgbClr val="FFFFFF"/>
+                </a:solidFill>
+                <a:latin typeface="Calibri" panose="020F0502020204030204" pitchFamily="34" charset="0"/>
+              </a:endParaRPr>
+            </a:p>
+          </p:txBody>
+        </p:sp>
+        <p:sp>
+          <p:nvSpPr>
+            <p:cNvPr id="7" name="CopyFrom"/>
+            <p:cNvSpPr/>
+            <p:nvPr/>
+          </p:nvSpPr>
+          <p:spPr>
+            <a:xfrm rot="18672083">
+              <a:off x="1574792" y="1413710"/>
+              <a:ext cx="1828800" cy="1219200"/>
+            </a:xfrm>
+            <a:prstGeom prst="rect">
+              <a:avLst/>
+            </a:prstGeom>
+            <a:solidFill>
+              <a:srgbClr val="FF0000"/>
+            </a:solidFill>
+          </p:spPr>
+          <p:style>
+            <a:lnRef idx="2">
+              <a:schemeClr val="accent1">
+                <a:shade val="50000"/>
+              </a:schemeClr>
+            </a:lnRef>
+            <a:fillRef idx="1">
+              <a:schemeClr val="accent1"/>
+            </a:fillRef>
+            <a:effectRef idx="0">
+              <a:schemeClr val="accent1"/>
+            </a:effectRef>
+            <a:fontRef idx="minor">
+              <a:schemeClr val="lt1"/>
+            </a:fontRef>
+          </p:style>
+          <p:txBody>
+            <a:bodyPr rtlCol="0" anchor="ctr"/>
+            <a:lstStyle/>
+            <a:p>
+              <a:pPr algn="ctr"/>
+              <a:endParaRPr lang="en-US"/>
+            </a:p>
+          </p:txBody>
+        </p:sp>
+        <p:sp>
+          <p:nvSpPr>
+            <p:cNvPr id="5" name="Oval 4"/>
+            <p:cNvSpPr/>
+            <p:nvPr/>
+          </p:nvSpPr>
+          <p:spPr>
+            <a:xfrm>
+              <a:off x="2489192" y="1905000"/>
+              <a:ext cx="1828800" cy="1828800"/>
+            </a:xfrm>
+            <a:prstGeom prst="ellipse">
+              <a:avLst/>
+            </a:prstGeom>
+            <a:solidFill>
+              <a:schemeClr val="accent1"/>
+            </a:solidFill>
+            <a:ln w="254000" cap="flat" cmpd="sng" algn="ctr">
+              <a:solidFill>
+                <a:srgbClr val="385D8A"/>
+              </a:solidFill>
+              <a:prstDash val="solid"/>
+              <a:round/>
+              <a:headEnd type="none" w="med" len="med"/>
+              <a:tailEnd type="none" w="med" len="med"/>
+            </a:ln>
+          </p:spPr>
+          <p:style>
+            <a:lnRef idx="2">
+              <a:schemeClr val="accent1">
+                <a:shade val="50000"/>
+              </a:schemeClr>
+            </a:lnRef>
+            <a:fillRef idx="1">
+              <a:schemeClr val="accent1"/>
+            </a:fillRef>
+            <a:effectRef idx="0">
+              <a:schemeClr val="accent1"/>
+            </a:effectRef>
+            <a:fontRef idx="minor">
+              <a:schemeClr val="lt1"/>
+            </a:fontRef>
+          </p:style>
+          <p:txBody>
+            <a:bodyPr rtlCol="0" anchor="ctr"/>
+            <a:lstStyle/>
+            <a:p>
+              <a:pPr algn="ctr"/>
+              <a:endParaRPr lang="en-US">
+                <a:solidFill>
+                  <a:srgbClr val="FFFFFF"/>
+                </a:solidFill>
+                <a:latin typeface="Calibri" panose="020F0502020204030204" pitchFamily="34" charset="0"/>
+              </a:endParaRPr>
+            </a:p>
+          </p:txBody>
+        </p:sp>
+      </p:grpSp>
+      <p:sp>
+        <p:nvSpPr>
+          <p:cNvPr id="6" name="Right Arrow 5"/>
+          <p:cNvSpPr/>
+          <p:nvPr/>
+        </p:nvSpPr>
+        <p:spPr>
+          <a:xfrm rot="18000000">
+            <a:off x="4930324" y="1741291"/>
+            <a:ext cx="3581400" cy="1066800"/>
+          </a:xfrm>
+          <a:prstGeom prst="rightArrow">
+            <a:avLst/>
+          </a:prstGeom>
+        </p:spPr>
+        <p:style>
+          <a:lnRef idx="2">
+            <a:schemeClr val="accent1">
+              <a:shade val="50000"/>
+            </a:schemeClr>
+          </a:lnRef>
+          <a:fillRef idx="1">
+            <a:schemeClr val="accent1"/>
+          </a:fillRef>
+          <a:effectRef idx="0">
+            <a:schemeClr val="accent1"/>
+          </a:effectRef>
+          <a:fontRef idx="minor">
+            <a:schemeClr val="lt1"/>
+          </a:fontRef>
+        </p:style>
+        <p:txBody>
+          <a:bodyPr rtlCol="0" anchor="ctr"/>
+          <a:lstStyle/>
+          <a:p>
+            <a:pPr algn="ctr"/>
+            <a:endParaRPr lang="en-US"/>
+          </a:p>
+        </p:txBody>
+      </p:sp>
+      <p:cxnSp>
+        <p:nvCxnSpPr>
+          <p:cNvPr id="8" name="Straight Connector 2"/>
+          <p:cNvCxnSpPr/>
+          <p:nvPr/>
+        </p:nvCxnSpPr>
+        <p:spPr>
+          <a:xfrm flipH="1">
+            <a:off x="4228011" y="5410200"/>
+            <a:ext cx="4572000" cy="0"/>
+          </a:xfrm>
+          <a:prstGeom prst="line">
+            <a:avLst/>
+          </a:prstGeom>
+          <a:ln w="254000" cap="flat" cmpd="sng" algn="ctr">
+            <a:solidFill>
+              <a:srgbClr val="FFFF00"/>
+            </a:solidFill>
+            <a:prstDash val="solid"/>
+            <a:round/>
+            <a:headEnd type="none" w="med" len="med"/>
+            <a:tailEnd type="none" w="med" len="med"/>
+          </a:ln>
+        </p:spPr>
+        <p:style>
+          <a:lnRef idx="1">
+            <a:schemeClr val="accent1"/>
+          </a:lnRef>
+          <a:fillRef idx="0">
+            <a:schemeClr val="accent1"/>
+          </a:fillRef>
+          <a:effectRef idx="0">
+            <a:schemeClr val="accent1"/>
+          </a:effectRef>
+          <a:fontRef idx="minor">
+            <a:schemeClr val="tx1"/>
+          </a:fontRef>
+        </p:style>
+      </p:cxnSp>
+    </p:spTree>
+    <p:extLst>
+      <p:ext uri="{BB962C8B-B14F-4D97-AF65-F5344CB8AC3E}">
+        <p14:creationId xmlns:p14="http://schemas.microsoft.com/office/powerpoint/2010/main" val="1222628196"/>
+      </p:ext>
+    </p:extLst>
+  </p:cSld>
+  <p:clrMapOvr>
+    <a:masterClrMapping/>
+  </p:clrMapOvr>
+</p:sld>
+</file>
+
+<file path=ppt/slides/slide37.xml><?xml version="1.0" encoding="utf-8"?>
+<p:sld xmlns:a="http://schemas.openxmlformats.org/drawingml/2006/main" xmlns:r="http://schemas.openxmlformats.org/officeDocument/2006/relationships" xmlns:p="http://schemas.openxmlformats.org/presentationml/2006/main">
+  <p:cSld>
+    <p:spTree>
+      <p:nvGrpSpPr>
+        <p:cNvPr id="1" name=""/>
+        <p:cNvGrpSpPr/>
+        <p:nvPr/>
+      </p:nvGrpSpPr>
+      <p:grpSpPr>
+        <a:xfrm>
+          <a:off x="0" y="0"/>
+          <a:ext cx="0" cy="0"/>
+          <a:chOff x="0" y="0"/>
+          <a:chExt cx="0" cy="0"/>
+        </a:xfrm>
+      </p:grpSpPr>
+      <p:grpSp>
+        <p:nvGrpSpPr>
+          <p:cNvPr id="2" name="Group 1"/>
+          <p:cNvGrpSpPr/>
+          <p:nvPr/>
+        </p:nvGrpSpPr>
+        <p:grpSpPr>
+          <a:xfrm>
+            <a:off x="570411" y="1676400"/>
+            <a:ext cx="3657600" cy="2815972"/>
+            <a:chOff x="660392" y="917828"/>
+            <a:chExt cx="3657600" cy="2815972"/>
+          </a:xfrm>
+        </p:grpSpPr>
+        <p:sp>
+          <p:nvSpPr>
+            <p:cNvPr id="4" name="Rectangle 3"/>
+            <p:cNvSpPr/>
+            <p:nvPr/>
+          </p:nvSpPr>
+          <p:spPr>
+            <a:xfrm>
+              <a:off x="660392" y="917828"/>
+              <a:ext cx="1828800" cy="1219200"/>
+            </a:xfrm>
+            <a:prstGeom prst="rect">
+              <a:avLst/>
+            </a:prstGeom>
+            <a:solidFill>
+              <a:schemeClr val="accent1"/>
+            </a:solidFill>
+            <a:ln w="25400" cap="flat" cmpd="sng" algn="ctr">
+              <a:solidFill>
+                <a:schemeClr val="accent1"/>
+              </a:solidFill>
+              <a:prstDash val="solid"/>
+              <a:round/>
+              <a:headEnd type="none" w="med" len="med"/>
+              <a:tailEnd type="none" w="med" len="med"/>
+            </a:ln>
+          </p:spPr>
+          <p:style>
+            <a:lnRef idx="2">
+              <a:schemeClr val="accent1">
+                <a:shade val="50000"/>
+              </a:schemeClr>
+            </a:lnRef>
+            <a:fillRef idx="1">
+              <a:schemeClr val="accent1"/>
+            </a:fillRef>
+            <a:effectRef idx="0">
+              <a:schemeClr val="accent1"/>
+            </a:effectRef>
+            <a:fontRef idx="minor">
+              <a:schemeClr val="lt1"/>
+            </a:fontRef>
+          </p:style>
+          <p:txBody>
+            <a:bodyPr rtlCol="0" anchor="ctr"/>
+            <a:lstStyle/>
+            <a:p>
+              <a:pPr algn="ctr"/>
+              <a:endParaRPr lang="en-US">
+                <a:solidFill>
+                  <a:srgbClr val="FFFFFF"/>
+                </a:solidFill>
+                <a:latin typeface="Calibri" panose="020F0502020204030204" pitchFamily="34" charset="0"/>
+              </a:endParaRPr>
+            </a:p>
+          </p:txBody>
+        </p:sp>
+        <p:sp>
+          <p:nvSpPr>
+            <p:cNvPr id="7" name="CopyFrom"/>
+            <p:cNvSpPr/>
+            <p:nvPr/>
+          </p:nvSpPr>
+          <p:spPr>
+            <a:xfrm rot="18672083">
+              <a:off x="1574792" y="1413710"/>
+              <a:ext cx="1828800" cy="1219200"/>
+            </a:xfrm>
+            <a:prstGeom prst="rect">
+              <a:avLst/>
+            </a:prstGeom>
+            <a:solidFill>
+              <a:srgbClr val="FF0000"/>
+            </a:solidFill>
+            <a:ln w="25400" cap="flat" cmpd="sng" algn="ctr">
+              <a:solidFill>
+                <a:srgbClr val="385D8A"/>
+              </a:solidFill>
+              <a:prstDash val="solid"/>
+              <a:round/>
+              <a:headEnd type="none" w="med" len="med"/>
+              <a:tailEnd type="none" w="med" len="med"/>
+            </a:ln>
+          </p:spPr>
+          <p:style>
+            <a:lnRef idx="2">
+              <a:schemeClr val="accent1">
+                <a:shade val="50000"/>
+              </a:schemeClr>
+            </a:lnRef>
+            <a:fillRef idx="1">
+              <a:schemeClr val="accent1"/>
+            </a:fillRef>
+            <a:effectRef idx="0">
+              <a:schemeClr val="accent1"/>
+            </a:effectRef>
+            <a:fontRef idx="minor">
+              <a:schemeClr val="lt1"/>
+            </a:fontRef>
+          </p:style>
+          <p:txBody>
+            <a:bodyPr rtlCol="0" anchor="ctr"/>
+            <a:lstStyle/>
+            <a:p>
+              <a:pPr algn="ctr"/>
+              <a:endParaRPr lang="en-US">
+                <a:solidFill>
+                  <a:srgbClr val="FFFFFF"/>
+                </a:solidFill>
+                <a:latin typeface="Calibri" panose="020F0502020204030204" pitchFamily="34" charset="0"/>
+              </a:endParaRPr>
+            </a:p>
+          </p:txBody>
+        </p:sp>
+        <p:sp>
+          <p:nvSpPr>
+            <p:cNvPr id="5" name="Oval 4"/>
+            <p:cNvSpPr/>
+            <p:nvPr/>
+          </p:nvSpPr>
+          <p:spPr>
+            <a:xfrm>
+              <a:off x="2489192" y="1905000"/>
+              <a:ext cx="1828800" cy="1828800"/>
+            </a:xfrm>
+            <a:prstGeom prst="ellipse">
+              <a:avLst/>
+            </a:prstGeom>
+            <a:ln w="254000"/>
+          </p:spPr>
+          <p:style>
+            <a:lnRef idx="2">
+              <a:schemeClr val="accent1">
+                <a:shade val="50000"/>
+              </a:schemeClr>
+            </a:lnRef>
+            <a:fillRef idx="1">
+              <a:schemeClr val="accent1"/>
+            </a:fillRef>
+            <a:effectRef idx="0">
+              <a:schemeClr val="accent1"/>
+            </a:effectRef>
+            <a:fontRef idx="minor">
+              <a:schemeClr val="lt1"/>
+            </a:fontRef>
+          </p:style>
+          <p:txBody>
+            <a:bodyPr rtlCol="0" anchor="ctr"/>
+            <a:lstStyle/>
+            <a:p>
+              <a:pPr algn="ctr"/>
+              <a:endParaRPr lang="en-US"/>
+            </a:p>
+          </p:txBody>
+        </p:sp>
+      </p:grpSp>
+      <p:sp>
+        <p:nvSpPr>
+          <p:cNvPr id="6" name="Right Arrow 5"/>
+          <p:cNvSpPr/>
+          <p:nvPr/>
+        </p:nvSpPr>
+        <p:spPr>
+          <a:xfrm rot="18000000">
+            <a:off x="4930324" y="1741291"/>
+            <a:ext cx="3581400" cy="1066800"/>
+          </a:xfrm>
+          <a:prstGeom prst="rightArrow">
+            <a:avLst/>
+          </a:prstGeom>
+          <a:solidFill>
+            <a:srgbClr val="FF0000"/>
+          </a:solidFill>
+        </p:spPr>
+        <p:style>
+          <a:lnRef idx="2">
+            <a:schemeClr val="accent1">
+              <a:shade val="50000"/>
+            </a:schemeClr>
+          </a:lnRef>
+          <a:fillRef idx="1">
+            <a:schemeClr val="accent1"/>
+          </a:fillRef>
+          <a:effectRef idx="0">
+            <a:schemeClr val="accent1"/>
+          </a:effectRef>
+          <a:fontRef idx="minor">
+            <a:schemeClr val="lt1"/>
+          </a:fontRef>
+        </p:style>
+        <p:txBody>
+          <a:bodyPr rtlCol="0" anchor="ctr"/>
+          <a:lstStyle/>
+          <a:p>
+            <a:pPr algn="ctr"/>
+            <a:endParaRPr lang="en-US"/>
+          </a:p>
+        </p:txBody>
+      </p:sp>
+      <p:cxnSp>
+        <p:nvCxnSpPr>
+          <p:cNvPr id="8" name="Straight Connector 2"/>
+          <p:cNvCxnSpPr/>
+          <p:nvPr/>
+        </p:nvCxnSpPr>
+        <p:spPr>
+          <a:xfrm flipH="1">
+            <a:off x="4228011" y="5410200"/>
+            <a:ext cx="4572000" cy="0"/>
+          </a:xfrm>
+          <a:prstGeom prst="line">
+            <a:avLst/>
+          </a:prstGeom>
+          <a:ln w="254000" cap="flat" cmpd="sng" algn="ctr">
+            <a:solidFill>
+              <a:srgbClr val="FFFF00"/>
+            </a:solidFill>
+            <a:prstDash val="solid"/>
+            <a:round/>
+            <a:headEnd type="none" w="med" len="med"/>
+            <a:tailEnd type="none" w="med" len="med"/>
+          </a:ln>
+        </p:spPr>
+        <p:style>
+          <a:lnRef idx="1">
+            <a:schemeClr val="accent1"/>
+          </a:lnRef>
+          <a:fillRef idx="0">
+            <a:schemeClr val="accent1"/>
+          </a:fillRef>
+          <a:effectRef idx="0">
+            <a:schemeClr val="accent1"/>
+          </a:effectRef>
+          <a:fontRef idx="minor">
+            <a:schemeClr val="tx1"/>
+          </a:fontRef>
+        </p:style>
+      </p:cxnSp>
+    </p:spTree>
+    <p:extLst>
+      <p:ext uri="{BB962C8B-B14F-4D97-AF65-F5344CB8AC3E}">
+        <p14:creationId xmlns:p14="http://schemas.microsoft.com/office/powerpoint/2010/main" val="70174979"/>
+      </p:ext>
+    </p:extLst>
+  </p:cSld>
+  <p:clrMapOvr>
+    <a:masterClrMapping/>
+  </p:clrMapOvr>
+</p:sld>
+</file>
+
+<file path=ppt/slides/slide38.xml><?xml version="1.0" encoding="utf-8"?>
+<p:sld xmlns:a="http://schemas.openxmlformats.org/drawingml/2006/main" xmlns:r="http://schemas.openxmlformats.org/officeDocument/2006/relationships" xmlns:p="http://schemas.openxmlformats.org/presentationml/2006/main">
+  <p:cSld>
+    <p:spTree>
+      <p:nvGrpSpPr>
+        <p:cNvPr id="1" name=""/>
+        <p:cNvGrpSpPr/>
+        <p:nvPr/>
+      </p:nvGrpSpPr>
+      <p:grpSpPr>
+        <a:xfrm>
+          <a:off x="0" y="0"/>
+          <a:ext cx="0" cy="0"/>
+          <a:chOff x="0" y="0"/>
+          <a:chExt cx="0" cy="0"/>
+        </a:xfrm>
+      </p:grpSpPr>
+      <p:grpSp>
+        <p:nvGrpSpPr>
+          <p:cNvPr id="2" name="Group 1"/>
+          <p:cNvGrpSpPr/>
+          <p:nvPr/>
+        </p:nvGrpSpPr>
+        <p:grpSpPr>
+          <a:xfrm>
+            <a:off x="570411" y="1676400"/>
+            <a:ext cx="3657600" cy="2815972"/>
+            <a:chOff x="660392" y="917828"/>
+            <a:chExt cx="3657600" cy="2815972"/>
+          </a:xfrm>
+        </p:grpSpPr>
+        <p:sp>
+          <p:nvSpPr>
+            <p:cNvPr id="4" name="Rectangle 3"/>
+            <p:cNvSpPr/>
+            <p:nvPr/>
+          </p:nvSpPr>
+          <p:spPr>
+            <a:xfrm>
+              <a:off x="660392" y="917828"/>
+              <a:ext cx="1828800" cy="1219200"/>
+            </a:xfrm>
+            <a:prstGeom prst="rect">
+              <a:avLst/>
+            </a:prstGeom>
+            <a:solidFill>
+              <a:schemeClr val="accent1"/>
+            </a:solidFill>
+            <a:ln w="25400" cap="flat" cmpd="sng" algn="ctr">
+              <a:solidFill>
+                <a:schemeClr val="accent1"/>
+              </a:solidFill>
+              <a:prstDash val="solid"/>
+              <a:round/>
+              <a:headEnd type="none" w="med" len="med"/>
+              <a:tailEnd type="none" w="med" len="med"/>
+            </a:ln>
+          </p:spPr>
+          <p:style>
+            <a:lnRef idx="2">
+              <a:schemeClr val="accent1">
+                <a:shade val="50000"/>
+              </a:schemeClr>
+            </a:lnRef>
+            <a:fillRef idx="1">
+              <a:schemeClr val="accent1"/>
+            </a:fillRef>
+            <a:effectRef idx="0">
+              <a:schemeClr val="accent1"/>
+            </a:effectRef>
+            <a:fontRef idx="minor">
+              <a:schemeClr val="lt1"/>
+            </a:fontRef>
+          </p:style>
+          <p:txBody>
+            <a:bodyPr rtlCol="0" anchor="ctr"/>
+            <a:lstStyle/>
+            <a:p>
+              <a:pPr algn="ctr"/>
+              <a:endParaRPr lang="en-US">
+                <a:solidFill>
+                  <a:srgbClr val="FFFFFF"/>
+                </a:solidFill>
+                <a:latin typeface="Calibri" panose="020F0502020204030204" pitchFamily="34" charset="0"/>
+              </a:endParaRPr>
+            </a:p>
+          </p:txBody>
+        </p:sp>
+        <p:sp>
+          <p:nvSpPr>
+            <p:cNvPr id="7" name="CopyFrom"/>
+            <p:cNvSpPr/>
+            <p:nvPr/>
+          </p:nvSpPr>
+          <p:spPr>
+            <a:xfrm rot="18672083">
+              <a:off x="1574792" y="1413710"/>
+              <a:ext cx="1828800" cy="1219200"/>
+            </a:xfrm>
+            <a:prstGeom prst="rect">
+              <a:avLst/>
+            </a:prstGeom>
+            <a:solidFill>
+              <a:srgbClr val="FF0000"/>
+            </a:solidFill>
+          </p:spPr>
+          <p:style>
+            <a:lnRef idx="2">
+              <a:schemeClr val="accent1">
+                <a:shade val="50000"/>
+              </a:schemeClr>
+            </a:lnRef>
+            <a:fillRef idx="1">
+              <a:schemeClr val="accent1"/>
+            </a:fillRef>
+            <a:effectRef idx="0">
+              <a:schemeClr val="accent1"/>
+            </a:effectRef>
+            <a:fontRef idx="minor">
+              <a:schemeClr val="lt1"/>
+            </a:fontRef>
+          </p:style>
+          <p:txBody>
+            <a:bodyPr rtlCol="0" anchor="ctr"/>
+            <a:lstStyle/>
+            <a:p>
+              <a:pPr algn="ctr"/>
+              <a:endParaRPr lang="en-US"/>
+            </a:p>
+          </p:txBody>
+        </p:sp>
+        <p:sp>
+          <p:nvSpPr>
+            <p:cNvPr id="5" name="Oval 4"/>
+            <p:cNvSpPr/>
+            <p:nvPr/>
+          </p:nvSpPr>
+          <p:spPr>
+            <a:xfrm>
+              <a:off x="2489192" y="1905000"/>
+              <a:ext cx="1828800" cy="1828800"/>
+            </a:xfrm>
+            <a:prstGeom prst="ellipse">
+              <a:avLst/>
+            </a:prstGeom>
+            <a:solidFill>
+              <a:schemeClr val="accent1"/>
+            </a:solidFill>
+            <a:ln w="254000" cap="flat" cmpd="sng" algn="ctr">
+              <a:solidFill>
+                <a:srgbClr val="385D8A"/>
+              </a:solidFill>
+              <a:prstDash val="solid"/>
+              <a:round/>
+              <a:headEnd type="none" w="med" len="med"/>
+              <a:tailEnd type="none" w="med" len="med"/>
+            </a:ln>
+          </p:spPr>
+          <p:style>
+            <a:lnRef idx="2">
+              <a:schemeClr val="accent1">
+                <a:shade val="50000"/>
+              </a:schemeClr>
+            </a:lnRef>
+            <a:fillRef idx="1">
+              <a:schemeClr val="accent1"/>
+            </a:fillRef>
+            <a:effectRef idx="0">
+              <a:schemeClr val="accent1"/>
+            </a:effectRef>
+            <a:fontRef idx="minor">
+              <a:schemeClr val="lt1"/>
+            </a:fontRef>
+          </p:style>
+          <p:txBody>
+            <a:bodyPr rtlCol="0" anchor="ctr"/>
+            <a:lstStyle/>
+            <a:p>
+              <a:pPr algn="ctr"/>
+              <a:endParaRPr lang="en-US">
+                <a:solidFill>
+                  <a:srgbClr val="FFFFFF"/>
+                </a:solidFill>
+                <a:latin typeface="Calibri" panose="020F0502020204030204" pitchFamily="34" charset="0"/>
+              </a:endParaRPr>
+            </a:p>
+          </p:txBody>
+        </p:sp>
+      </p:grpSp>
+      <p:sp>
+        <p:nvSpPr>
+          <p:cNvPr id="6" name="Right Arrow 5"/>
+          <p:cNvSpPr/>
+          <p:nvPr/>
+        </p:nvSpPr>
+        <p:spPr>
+          <a:xfrm rot="18000000">
+            <a:off x="4930324" y="1741291"/>
+            <a:ext cx="3581400" cy="1066800"/>
+          </a:xfrm>
+          <a:prstGeom prst="rightArrow">
+            <a:avLst/>
+          </a:prstGeom>
+        </p:spPr>
+        <p:style>
+          <a:lnRef idx="2">
+            <a:schemeClr val="accent1">
+              <a:shade val="50000"/>
+            </a:schemeClr>
+          </a:lnRef>
+          <a:fillRef idx="1">
+            <a:schemeClr val="accent1"/>
+          </a:fillRef>
+          <a:effectRef idx="0">
+            <a:schemeClr val="accent1"/>
+          </a:effectRef>
+          <a:fontRef idx="minor">
+            <a:schemeClr val="lt1"/>
+          </a:fontRef>
+        </p:style>
+        <p:txBody>
+          <a:bodyPr rtlCol="0" anchor="ctr"/>
+          <a:lstStyle/>
+          <a:p>
+            <a:pPr algn="ctr"/>
+            <a:endParaRPr lang="en-US"/>
+          </a:p>
+        </p:txBody>
+      </p:sp>
+      <p:cxnSp>
+        <p:nvCxnSpPr>
+          <p:cNvPr id="8" name="Straight Connector 2"/>
+          <p:cNvCxnSpPr/>
+          <p:nvPr/>
+        </p:nvCxnSpPr>
+        <p:spPr>
+          <a:xfrm flipH="1">
+            <a:off x="4228011" y="5410200"/>
+            <a:ext cx="4572000" cy="0"/>
+          </a:xfrm>
+          <a:prstGeom prst="line">
+            <a:avLst/>
+          </a:prstGeom>
+          <a:ln w="254000" cap="flat" cmpd="sng" algn="ctr">
+            <a:solidFill>
+              <a:srgbClr val="FFFF00"/>
+            </a:solidFill>
+            <a:prstDash val="solid"/>
+            <a:round/>
+            <a:headEnd type="none" w="med" len="med"/>
+            <a:tailEnd type="none" w="med" len="med"/>
+          </a:ln>
+        </p:spPr>
+        <p:style>
+          <a:lnRef idx="1">
+            <a:schemeClr val="accent1"/>
+          </a:lnRef>
+          <a:fillRef idx="0">
+            <a:schemeClr val="accent1"/>
+          </a:fillRef>
+          <a:effectRef idx="0">
+            <a:schemeClr val="accent1"/>
+          </a:effectRef>
+          <a:fontRef idx="minor">
+            <a:schemeClr val="tx1"/>
+          </a:fontRef>
+        </p:style>
+      </p:cxnSp>
+    </p:spTree>
+    <p:extLst>
+      <p:ext uri="{BB962C8B-B14F-4D97-AF65-F5344CB8AC3E}">
+        <p14:creationId xmlns:p14="http://schemas.microsoft.com/office/powerpoint/2010/main" val="875146916"/>
+      </p:ext>
+    </p:extLst>
+  </p:cSld>
+  <p:clrMapOvr>
+    <a:masterClrMapping/>
+  </p:clrMapOvr>
+</p:sld>
+</file>
+
+<file path=ppt/slides/slide39.xml><?xml version="1.0" encoding="utf-8"?>
+<p:sld xmlns:a="http://schemas.openxmlformats.org/drawingml/2006/main" xmlns:r="http://schemas.openxmlformats.org/officeDocument/2006/relationships" xmlns:p="http://schemas.openxmlformats.org/presentationml/2006/main">
+  <p:cSld>
+    <p:spTree>
+      <p:nvGrpSpPr>
+        <p:cNvPr id="1" name=""/>
+        <p:cNvGrpSpPr/>
+        <p:nvPr/>
+      </p:nvGrpSpPr>
+      <p:grpSpPr>
+        <a:xfrm>
+          <a:off x="0" y="0"/>
+          <a:ext cx="0" cy="0"/>
+          <a:chOff x="0" y="0"/>
+          <a:chExt cx="0" cy="0"/>
+        </a:xfrm>
+      </p:grpSpPr>
+      <p:grpSp>
+        <p:nvGrpSpPr>
+          <p:cNvPr id="2" name="Group 1"/>
+          <p:cNvGrpSpPr/>
+          <p:nvPr/>
+        </p:nvGrpSpPr>
+        <p:grpSpPr>
+          <a:xfrm>
+            <a:off x="570411" y="1676400"/>
+            <a:ext cx="3657600" cy="2815972"/>
+            <a:chOff x="660392" y="917828"/>
+            <a:chExt cx="3657600" cy="2815972"/>
+          </a:xfrm>
+        </p:grpSpPr>
+        <p:sp>
+          <p:nvSpPr>
+            <p:cNvPr id="4" name="Rectangle 3"/>
+            <p:cNvSpPr/>
+            <p:nvPr/>
+          </p:nvSpPr>
+          <p:spPr>
+            <a:xfrm>
+              <a:off x="660392" y="917828"/>
+              <a:ext cx="1828800" cy="1219200"/>
+            </a:xfrm>
+            <a:prstGeom prst="rect">
+              <a:avLst/>
+            </a:prstGeom>
+            <a:solidFill>
+              <a:schemeClr val="accent1"/>
+            </a:solidFill>
+            <a:ln w="25400" cap="flat" cmpd="sng" algn="ctr">
+              <a:solidFill>
+                <a:schemeClr val="accent1"/>
+              </a:solidFill>
+              <a:prstDash val="solid"/>
+              <a:round/>
+              <a:headEnd type="none" w="med" len="med"/>
+              <a:tailEnd type="none" w="med" len="med"/>
+            </a:ln>
+          </p:spPr>
+          <p:style>
+            <a:lnRef idx="2">
+              <a:schemeClr val="accent1">
+                <a:shade val="50000"/>
+              </a:schemeClr>
+            </a:lnRef>
+            <a:fillRef idx="1">
+              <a:schemeClr val="accent1"/>
+            </a:fillRef>
+            <a:effectRef idx="0">
+              <a:schemeClr val="accent1"/>
+            </a:effectRef>
+            <a:fontRef idx="minor">
+              <a:schemeClr val="lt1"/>
+            </a:fontRef>
+          </p:style>
+          <p:txBody>
+            <a:bodyPr rtlCol="0" anchor="ctr"/>
+            <a:lstStyle/>
+            <a:p>
+              <a:pPr algn="ctr"/>
+              <a:endParaRPr lang="en-US">
+                <a:solidFill>
+                  <a:srgbClr val="FFFFFF"/>
+                </a:solidFill>
+                <a:latin typeface="Calibri" panose="020F0502020204030204" pitchFamily="34" charset="0"/>
+              </a:endParaRPr>
+            </a:p>
+          </p:txBody>
+        </p:sp>
+        <p:sp>
+          <p:nvSpPr>
+            <p:cNvPr id="7" name="CopyFrom"/>
+            <p:cNvSpPr/>
+            <p:nvPr/>
+          </p:nvSpPr>
+          <p:spPr>
+            <a:xfrm rot="18672083">
+              <a:off x="1574792" y="1413710"/>
+              <a:ext cx="1828800" cy="1219200"/>
+            </a:xfrm>
+            <a:prstGeom prst="rect">
+              <a:avLst/>
+            </a:prstGeom>
+            <a:solidFill>
+              <a:srgbClr val="FF0000"/>
+            </a:solidFill>
+          </p:spPr>
+          <p:style>
+            <a:lnRef idx="2">
+              <a:schemeClr val="accent1">
+                <a:shade val="50000"/>
+              </a:schemeClr>
+            </a:lnRef>
+            <a:fillRef idx="1">
+              <a:schemeClr val="accent1"/>
+            </a:fillRef>
+            <a:effectRef idx="0">
+              <a:schemeClr val="accent1"/>
+            </a:effectRef>
+            <a:fontRef idx="minor">
+              <a:schemeClr val="lt1"/>
+            </a:fontRef>
+          </p:style>
+          <p:txBody>
+            <a:bodyPr rtlCol="0" anchor="ctr"/>
+            <a:lstStyle/>
+            <a:p>
+              <a:pPr algn="ctr"/>
+              <a:endParaRPr lang="en-US"/>
+            </a:p>
+          </p:txBody>
+        </p:sp>
+        <p:sp>
+          <p:nvSpPr>
+            <p:cNvPr id="5" name="Oval 4"/>
+            <p:cNvSpPr/>
+            <p:nvPr/>
+          </p:nvSpPr>
+          <p:spPr>
+            <a:xfrm>
+              <a:off x="2489192" y="1905000"/>
+              <a:ext cx="1828800" cy="1828800"/>
+            </a:xfrm>
+            <a:prstGeom prst="ellipse">
+              <a:avLst/>
+            </a:prstGeom>
+            <a:ln w="254000">
+              <a:solidFill>
+                <a:srgbClr val="FFFF00"/>
+              </a:solidFill>
+            </a:ln>
+          </p:spPr>
+          <p:style>
+            <a:lnRef idx="2">
+              <a:schemeClr val="accent1">
+                <a:shade val="50000"/>
+              </a:schemeClr>
+            </a:lnRef>
+            <a:fillRef idx="1">
+              <a:schemeClr val="accent1"/>
+            </a:fillRef>
+            <a:effectRef idx="0">
+              <a:schemeClr val="accent1"/>
+            </a:effectRef>
+            <a:fontRef idx="minor">
+              <a:schemeClr val="lt1"/>
+            </a:fontRef>
+          </p:style>
+          <p:txBody>
+            <a:bodyPr rtlCol="0" anchor="ctr"/>
+            <a:lstStyle/>
+            <a:p>
+              <a:pPr algn="ctr"/>
+              <a:endParaRPr lang="en-US"/>
+            </a:p>
+          </p:txBody>
+        </p:sp>
+      </p:grpSp>
+      <p:sp>
+        <p:nvSpPr>
+          <p:cNvPr id="6" name="Right Arrow 5"/>
+          <p:cNvSpPr/>
+          <p:nvPr/>
+        </p:nvSpPr>
+        <p:spPr>
+          <a:xfrm rot="18000000">
+            <a:off x="4930324" y="1741291"/>
+            <a:ext cx="3581400" cy="1066800"/>
+          </a:xfrm>
+          <a:prstGeom prst="rightArrow">
+            <a:avLst/>
+          </a:prstGeom>
+        </p:spPr>
+        <p:style>
+          <a:lnRef idx="2">
+            <a:schemeClr val="accent1">
+              <a:shade val="50000"/>
+            </a:schemeClr>
+          </a:lnRef>
+          <a:fillRef idx="1">
+            <a:schemeClr val="accent1"/>
+          </a:fillRef>
+          <a:effectRef idx="0">
+            <a:schemeClr val="accent1"/>
+          </a:effectRef>
+          <a:fontRef idx="minor">
+            <a:schemeClr val="lt1"/>
+          </a:fontRef>
+        </p:style>
+        <p:txBody>
+          <a:bodyPr rtlCol="0" anchor="ctr"/>
+          <a:lstStyle/>
+          <a:p>
+            <a:pPr algn="ctr"/>
+            <a:endParaRPr lang="en-US"/>
+          </a:p>
+        </p:txBody>
+      </p:sp>
+      <p:cxnSp>
+        <p:nvCxnSpPr>
+          <p:cNvPr id="8" name="Straight Connector 2"/>
+          <p:cNvCxnSpPr/>
+          <p:nvPr/>
+        </p:nvCxnSpPr>
+        <p:spPr>
+          <a:xfrm flipH="1">
+            <a:off x="4228011" y="5410200"/>
+            <a:ext cx="4572000" cy="0"/>
+          </a:xfrm>
+          <a:prstGeom prst="line">
+            <a:avLst/>
+          </a:prstGeom>
+          <a:ln w="254000" cap="flat" cmpd="sng" algn="ctr">
+            <a:solidFill>
+              <a:srgbClr val="FFFF00"/>
+            </a:solidFill>
+            <a:prstDash val="solid"/>
+            <a:round/>
+            <a:headEnd type="none" w="med" len="med"/>
+            <a:tailEnd type="none" w="med" len="med"/>
+          </a:ln>
+        </p:spPr>
+        <p:style>
+          <a:lnRef idx="1">
+            <a:schemeClr val="accent1"/>
+          </a:lnRef>
+          <a:fillRef idx="0">
+            <a:schemeClr val="accent1"/>
+          </a:fillRef>
+          <a:effectRef idx="0">
+            <a:schemeClr val="accent1"/>
+          </a:effectRef>
+          <a:fontRef idx="minor">
+            <a:schemeClr val="tx1"/>
+          </a:fontRef>
+        </p:style>
+      </p:cxnSp>
+    </p:spTree>
+    <p:extLst>
+      <p:ext uri="{BB962C8B-B14F-4D97-AF65-F5344CB8AC3E}">
+        <p14:creationId xmlns:p14="http://schemas.microsoft.com/office/powerpoint/2010/main" val="2885983572"/>
       </p:ext>
     </p:extLst>
   </p:cSld>

</xml_diff>

<commit_message>
Sync Lab should be able to sync objects within groups #1377 (#1386)
* Allow user to copy/sync shape in group

* Add tests for copy/sync in group
</commit_message>
<xml_diff>
--- a/doc/test/SyncLab.pptx
+++ b/doc/test/SyncLab.pptx
@@ -8,7 +8,7 @@
     <p:sldMasterId id="2147483684" r:id="rId4"/>
   </p:sldMasterIdLst>
   <p:notesMasterIdLst>
-    <p:notesMasterId r:id="rId39"/>
+    <p:notesMasterId r:id="rId44"/>
   </p:notesMasterIdLst>
   <p:sldIdLst>
     <p:sldId id="287" r:id="rId5"/>
@@ -45,6 +45,11 @@
     <p:sldId id="384" r:id="rId36"/>
     <p:sldId id="386" r:id="rId37"/>
     <p:sldId id="388" r:id="rId38"/>
+    <p:sldId id="402" r:id="rId39"/>
+    <p:sldId id="403" r:id="rId40"/>
+    <p:sldId id="405" r:id="rId41"/>
+    <p:sldId id="407" r:id="rId42"/>
+    <p:sldId id="406" r:id="rId43"/>
   </p:sldIdLst>
   <p:sldSz cx="9144000" cy="6858000" type="screen4x3"/>
   <p:notesSz cx="6858000" cy="9144000"/>
@@ -200,6 +205,15 @@
             <p14:sldId id="388"/>
           </p14:sldIdLst>
         </p14:section>
+        <p14:section name="Sync Group" id="{6CC32FF3-EA1B-4104-B5F2-01F8BC44C93B}">
+          <p14:sldIdLst>
+            <p14:sldId id="402"/>
+            <p14:sldId id="403"/>
+            <p14:sldId id="405"/>
+            <p14:sldId id="407"/>
+            <p14:sldId id="406"/>
+          </p14:sldIdLst>
+        </p14:section>
       </p14:sectionLst>
     </p:ext>
     <p:ext uri="{EFAFB233-063F-42B5-8137-9DF3F51BA10A}">
@@ -291,7 +305,7 @@
           <a:p>
             <a:fld id="{43E32005-3A63-48D2-8C73-BF5F95786EBD}" type="datetimeFigureOut">
               <a:rPr lang="en-US" smtClean="0"/>
-              <a:t>4/4/2017</a:t>
+              <a:t>5/29/2017</a:t>
             </a:fld>
             <a:endParaRPr lang="en-US"/>
           </a:p>
@@ -2823,6 +2837,94 @@
 </p:notes>
 </file>
 
+<file path=ppt/notesSlides/notesSlide29.xml><?xml version="1.0" encoding="utf-8"?>
+<p:notes xmlns:a="http://schemas.openxmlformats.org/drawingml/2006/main" xmlns:r="http://schemas.openxmlformats.org/officeDocument/2006/relationships" xmlns:p="http://schemas.openxmlformats.org/presentationml/2006/main">
+  <p:cSld>
+    <p:spTree>
+      <p:nvGrpSpPr>
+        <p:cNvPr id="1" name=""/>
+        <p:cNvGrpSpPr/>
+        <p:nvPr/>
+      </p:nvGrpSpPr>
+      <p:grpSpPr>
+        <a:xfrm>
+          <a:off x="0" y="0"/>
+          <a:ext cx="0" cy="0"/>
+          <a:chOff x="0" y="0"/>
+          <a:chExt cx="0" cy="0"/>
+        </a:xfrm>
+      </p:grpSpPr>
+      <p:sp>
+        <p:nvSpPr>
+          <p:cNvPr id="2" name="Slide Image Placeholder 1"/>
+          <p:cNvSpPr>
+            <a:spLocks noGrp="1" noRot="1" noChangeAspect="1"/>
+          </p:cNvSpPr>
+          <p:nvPr>
+            <p:ph type="sldImg"/>
+          </p:nvPr>
+        </p:nvSpPr>
+        <p:spPr/>
+      </p:sp>
+      <p:sp>
+        <p:nvSpPr>
+          <p:cNvPr id="3" name="Notes Placeholder 2"/>
+          <p:cNvSpPr>
+            <a:spLocks noGrp="1"/>
+          </p:cNvSpPr>
+          <p:nvPr>
+            <p:ph type="body" idx="1"/>
+          </p:nvPr>
+        </p:nvSpPr>
+        <p:spPr/>
+        <p:txBody>
+          <a:bodyPr/>
+          <a:lstStyle/>
+          <a:p>
+            <a:r>
+              <a:rPr lang="en-US" dirty="0" smtClean="0"/>
+              <a:t>Original Shapes</a:t>
+            </a:r>
+            <a:endParaRPr lang="en-US" dirty="0"/>
+          </a:p>
+        </p:txBody>
+      </p:sp>
+      <p:sp>
+        <p:nvSpPr>
+          <p:cNvPr id="4" name="Slide Number Placeholder 3"/>
+          <p:cNvSpPr>
+            <a:spLocks noGrp="1"/>
+          </p:cNvSpPr>
+          <p:nvPr>
+            <p:ph type="sldNum" sz="quarter" idx="10"/>
+          </p:nvPr>
+        </p:nvSpPr>
+        <p:spPr/>
+        <p:txBody>
+          <a:bodyPr/>
+          <a:lstStyle/>
+          <a:p>
+            <a:fld id="{0FE7C38A-472B-4221-8E00-509E1DA863EC}" type="slidenum">
+              <a:rPr lang="en-US" smtClean="0"/>
+              <a:t>36</a:t>
+            </a:fld>
+            <a:endParaRPr lang="en-US"/>
+          </a:p>
+        </p:txBody>
+      </p:sp>
+    </p:spTree>
+    <p:extLst>
+      <p:ext uri="{BB962C8B-B14F-4D97-AF65-F5344CB8AC3E}">
+        <p14:creationId xmlns:p14="http://schemas.microsoft.com/office/powerpoint/2010/main" val="2115274562"/>
+      </p:ext>
+    </p:extLst>
+  </p:cSld>
+  <p:clrMapOvr>
+    <a:masterClrMapping/>
+  </p:clrMapOvr>
+</p:notes>
+</file>
+
 <file path=ppt/notesSlides/notesSlide3.xml><?xml version="1.0" encoding="utf-8"?>
 <p:notes xmlns:a="http://schemas.openxmlformats.org/drawingml/2006/main" xmlns:r="http://schemas.openxmlformats.org/officeDocument/2006/relationships" xmlns:p="http://schemas.openxmlformats.org/presentationml/2006/main">
   <p:cSld>
@@ -2944,6 +3046,305 @@
     <p:extLst>
       <p:ext uri="{BB962C8B-B14F-4D97-AF65-F5344CB8AC3E}">
         <p14:creationId xmlns:p14="http://schemas.microsoft.com/office/powerpoint/2010/main" val="4074764116"/>
+      </p:ext>
+    </p:extLst>
+  </p:cSld>
+  <p:clrMapOvr>
+    <a:masterClrMapping/>
+  </p:clrMapOvr>
+</p:notes>
+</file>
+
+<file path=ppt/notesSlides/notesSlide30.xml><?xml version="1.0" encoding="utf-8"?>
+<p:notes xmlns:a="http://schemas.openxmlformats.org/drawingml/2006/main" xmlns:r="http://schemas.openxmlformats.org/officeDocument/2006/relationships" xmlns:p="http://schemas.openxmlformats.org/presentationml/2006/main">
+  <p:cSld>
+    <p:spTree>
+      <p:nvGrpSpPr>
+        <p:cNvPr id="1" name=""/>
+        <p:cNvGrpSpPr/>
+        <p:nvPr/>
+      </p:nvGrpSpPr>
+      <p:grpSpPr>
+        <a:xfrm>
+          <a:off x="0" y="0"/>
+          <a:ext cx="0" cy="0"/>
+          <a:chOff x="0" y="0"/>
+          <a:chExt cx="0" cy="0"/>
+        </a:xfrm>
+      </p:grpSpPr>
+      <p:sp>
+        <p:nvSpPr>
+          <p:cNvPr id="2" name="Slide Image Placeholder 1"/>
+          <p:cNvSpPr>
+            <a:spLocks noGrp="1" noRot="1" noChangeAspect="1"/>
+          </p:cNvSpPr>
+          <p:nvPr>
+            <p:ph type="sldImg"/>
+          </p:nvPr>
+        </p:nvSpPr>
+        <p:spPr/>
+      </p:sp>
+      <p:sp>
+        <p:nvSpPr>
+          <p:cNvPr id="3" name="Notes Placeholder 2"/>
+          <p:cNvSpPr>
+            <a:spLocks noGrp="1"/>
+          </p:cNvSpPr>
+          <p:nvPr>
+            <p:ph type="body" idx="1"/>
+          </p:nvPr>
+        </p:nvSpPr>
+        <p:spPr/>
+        <p:txBody>
+          <a:bodyPr/>
+          <a:lstStyle/>
+          <a:p>
+            <a:r>
+              <a:rPr lang="en-US" dirty="0" smtClean="0"/>
+              <a:t>Sync from group to shape</a:t>
+            </a:r>
+          </a:p>
+          <a:p>
+            <a:r>
+              <a:rPr lang="en-US" dirty="0" smtClean="0"/>
+              <a:t>Copy the fill for red shape (in the group)</a:t>
+            </a:r>
+          </a:p>
+          <a:p>
+            <a:r>
+              <a:rPr lang="en-US" dirty="0" smtClean="0"/>
+              <a:t>Sync to the arrow</a:t>
+            </a:r>
+          </a:p>
+        </p:txBody>
+      </p:sp>
+      <p:sp>
+        <p:nvSpPr>
+          <p:cNvPr id="4" name="Slide Number Placeholder 3"/>
+          <p:cNvSpPr>
+            <a:spLocks noGrp="1"/>
+          </p:cNvSpPr>
+          <p:nvPr>
+            <p:ph type="sldNum" sz="quarter" idx="10"/>
+          </p:nvPr>
+        </p:nvSpPr>
+        <p:spPr/>
+        <p:txBody>
+          <a:bodyPr/>
+          <a:lstStyle/>
+          <a:p>
+            <a:fld id="{0FE7C38A-472B-4221-8E00-509E1DA863EC}" type="slidenum">
+              <a:rPr lang="en-US" smtClean="0"/>
+              <a:t>37</a:t>
+            </a:fld>
+            <a:endParaRPr lang="en-US"/>
+          </a:p>
+        </p:txBody>
+      </p:sp>
+    </p:spTree>
+    <p:extLst>
+      <p:ext uri="{BB962C8B-B14F-4D97-AF65-F5344CB8AC3E}">
+        <p14:creationId xmlns:p14="http://schemas.microsoft.com/office/powerpoint/2010/main" val="2210537975"/>
+      </p:ext>
+    </p:extLst>
+  </p:cSld>
+  <p:clrMapOvr>
+    <a:masterClrMapping/>
+  </p:clrMapOvr>
+</p:notes>
+</file>
+
+<file path=ppt/notesSlides/notesSlide31.xml><?xml version="1.0" encoding="utf-8"?>
+<p:notes xmlns:a="http://schemas.openxmlformats.org/drawingml/2006/main" xmlns:r="http://schemas.openxmlformats.org/officeDocument/2006/relationships" xmlns:p="http://schemas.openxmlformats.org/presentationml/2006/main">
+  <p:cSld>
+    <p:spTree>
+      <p:nvGrpSpPr>
+        <p:cNvPr id="1" name=""/>
+        <p:cNvGrpSpPr/>
+        <p:nvPr/>
+      </p:nvGrpSpPr>
+      <p:grpSpPr>
+        <a:xfrm>
+          <a:off x="0" y="0"/>
+          <a:ext cx="0" cy="0"/>
+          <a:chOff x="0" y="0"/>
+          <a:chExt cx="0" cy="0"/>
+        </a:xfrm>
+      </p:grpSpPr>
+      <p:sp>
+        <p:nvSpPr>
+          <p:cNvPr id="2" name="Slide Image Placeholder 1"/>
+          <p:cNvSpPr>
+            <a:spLocks noGrp="1" noRot="1" noChangeAspect="1"/>
+          </p:cNvSpPr>
+          <p:nvPr>
+            <p:ph type="sldImg"/>
+          </p:nvPr>
+        </p:nvSpPr>
+        <p:spPr/>
+      </p:sp>
+      <p:sp>
+        <p:nvSpPr>
+          <p:cNvPr id="3" name="Notes Placeholder 2"/>
+          <p:cNvSpPr>
+            <a:spLocks noGrp="1"/>
+          </p:cNvSpPr>
+          <p:nvPr>
+            <p:ph type="body" idx="1"/>
+          </p:nvPr>
+        </p:nvSpPr>
+        <p:spPr/>
+        <p:txBody>
+          <a:bodyPr/>
+          <a:lstStyle/>
+          <a:p>
+            <a:r>
+              <a:rPr lang="en-US" dirty="0" smtClean="0"/>
+              <a:t>Original Shapes</a:t>
+            </a:r>
+            <a:endParaRPr lang="en-US" dirty="0"/>
+          </a:p>
+        </p:txBody>
+      </p:sp>
+      <p:sp>
+        <p:nvSpPr>
+          <p:cNvPr id="4" name="Slide Number Placeholder 3"/>
+          <p:cNvSpPr>
+            <a:spLocks noGrp="1"/>
+          </p:cNvSpPr>
+          <p:nvPr>
+            <p:ph type="sldNum" sz="quarter" idx="10"/>
+          </p:nvPr>
+        </p:nvSpPr>
+        <p:spPr/>
+        <p:txBody>
+          <a:bodyPr/>
+          <a:lstStyle/>
+          <a:p>
+            <a:fld id="{0FE7C38A-472B-4221-8E00-509E1DA863EC}" type="slidenum">
+              <a:rPr lang="en-US" smtClean="0"/>
+              <a:t>38</a:t>
+            </a:fld>
+            <a:endParaRPr lang="en-US"/>
+          </a:p>
+        </p:txBody>
+      </p:sp>
+    </p:spTree>
+    <p:extLst>
+      <p:ext uri="{BB962C8B-B14F-4D97-AF65-F5344CB8AC3E}">
+        <p14:creationId xmlns:p14="http://schemas.microsoft.com/office/powerpoint/2010/main" val="3196501275"/>
+      </p:ext>
+    </p:extLst>
+  </p:cSld>
+  <p:clrMapOvr>
+    <a:masterClrMapping/>
+  </p:clrMapOvr>
+</p:notes>
+</file>
+
+<file path=ppt/notesSlides/notesSlide32.xml><?xml version="1.0" encoding="utf-8"?>
+<p:notes xmlns:a="http://schemas.openxmlformats.org/drawingml/2006/main" xmlns:r="http://schemas.openxmlformats.org/officeDocument/2006/relationships" xmlns:p="http://schemas.openxmlformats.org/presentationml/2006/main">
+  <p:cSld>
+    <p:spTree>
+      <p:nvGrpSpPr>
+        <p:cNvPr id="1" name=""/>
+        <p:cNvGrpSpPr/>
+        <p:nvPr/>
+      </p:nvGrpSpPr>
+      <p:grpSpPr>
+        <a:xfrm>
+          <a:off x="0" y="0"/>
+          <a:ext cx="0" cy="0"/>
+          <a:chOff x="0" y="0"/>
+          <a:chExt cx="0" cy="0"/>
+        </a:xfrm>
+      </p:grpSpPr>
+      <p:sp>
+        <p:nvSpPr>
+          <p:cNvPr id="2" name="Slide Image Placeholder 1"/>
+          <p:cNvSpPr>
+            <a:spLocks noGrp="1" noRot="1" noChangeAspect="1"/>
+          </p:cNvSpPr>
+          <p:nvPr>
+            <p:ph type="sldImg"/>
+          </p:nvPr>
+        </p:nvSpPr>
+        <p:spPr/>
+      </p:sp>
+      <p:sp>
+        <p:nvSpPr>
+          <p:cNvPr id="3" name="Notes Placeholder 2"/>
+          <p:cNvSpPr>
+            <a:spLocks noGrp="1"/>
+          </p:cNvSpPr>
+          <p:nvPr>
+            <p:ph type="body" idx="1"/>
+          </p:nvPr>
+        </p:nvSpPr>
+        <p:spPr/>
+        <p:txBody>
+          <a:bodyPr/>
+          <a:lstStyle/>
+          <a:p>
+            <a:r>
+              <a:rPr lang="en-US" dirty="0" smtClean="0"/>
+              <a:t>Sync From</a:t>
+            </a:r>
+            <a:r>
+              <a:rPr lang="en-US" baseline="0" dirty="0" smtClean="0"/>
+              <a:t> </a:t>
+            </a:r>
+            <a:r>
+              <a:rPr lang="en-US" dirty="0" smtClean="0"/>
+              <a:t>shape to group</a:t>
+            </a:r>
+          </a:p>
+          <a:p>
+            <a:r>
+              <a:rPr lang="en-US" dirty="0" smtClean="0"/>
+              <a:t>Copy the line</a:t>
+            </a:r>
+            <a:r>
+              <a:rPr lang="en-US" baseline="0" dirty="0" smtClean="0"/>
+              <a:t> fill from yellow line</a:t>
+            </a:r>
+            <a:endParaRPr lang="en-US" dirty="0" smtClean="0"/>
+          </a:p>
+          <a:p>
+            <a:r>
+              <a:rPr lang="en-US" dirty="0" smtClean="0"/>
+              <a:t>Sync to the circle</a:t>
+            </a:r>
+          </a:p>
+        </p:txBody>
+      </p:sp>
+      <p:sp>
+        <p:nvSpPr>
+          <p:cNvPr id="4" name="Slide Number Placeholder 3"/>
+          <p:cNvSpPr>
+            <a:spLocks noGrp="1"/>
+          </p:cNvSpPr>
+          <p:nvPr>
+            <p:ph type="sldNum" sz="quarter" idx="10"/>
+          </p:nvPr>
+        </p:nvSpPr>
+        <p:spPr/>
+        <p:txBody>
+          <a:bodyPr/>
+          <a:lstStyle/>
+          <a:p>
+            <a:fld id="{0FE7C38A-472B-4221-8E00-509E1DA863EC}" type="slidenum">
+              <a:rPr lang="en-US" smtClean="0"/>
+              <a:t>39</a:t>
+            </a:fld>
+            <a:endParaRPr lang="en-US"/>
+          </a:p>
+        </p:txBody>
+      </p:sp>
+    </p:spTree>
+    <p:extLst>
+      <p:ext uri="{BB962C8B-B14F-4D97-AF65-F5344CB8AC3E}">
+        <p14:creationId xmlns:p14="http://schemas.microsoft.com/office/powerpoint/2010/main" val="3592809948"/>
       </p:ext>
     </p:extLst>
   </p:cSld>
@@ -3234,11 +3635,7 @@
             </a:r>
             <a:r>
               <a:rPr lang="en-US" baseline="0" dirty="0" smtClean="0"/>
-              <a:t> the background to help differentiate between background fill and other </a:t>
-            </a:r>
-            <a:r>
-              <a:rPr lang="en-US" baseline="0" dirty="0" smtClean="0"/>
-              <a:t>fills</a:t>
+              <a:t> the background to help differentiate between background fill and other fills</a:t>
             </a:r>
           </a:p>
           <a:p>
@@ -3903,7 +4300,7 @@
           <a:p>
             <a:fld id="{699DC775-C286-4358-8C92-D7E584E969B3}" type="datetimeFigureOut">
               <a:rPr lang="en-US" smtClean="0"/>
-              <a:t>4/4/2017</a:t>
+              <a:t>5/29/2017</a:t>
             </a:fld>
             <a:endParaRPr lang="en-US"/>
           </a:p>
@@ -4071,7 +4468,7 @@
           <a:p>
             <a:fld id="{699DC775-C286-4358-8C92-D7E584E969B3}" type="datetimeFigureOut">
               <a:rPr lang="en-US" smtClean="0"/>
-              <a:t>4/4/2017</a:t>
+              <a:t>5/29/2017</a:t>
             </a:fld>
             <a:endParaRPr lang="en-US"/>
           </a:p>
@@ -4249,7 +4646,7 @@
           <a:p>
             <a:fld id="{699DC775-C286-4358-8C92-D7E584E969B3}" type="datetimeFigureOut">
               <a:rPr lang="en-US" smtClean="0"/>
-              <a:t>4/4/2017</a:t>
+              <a:t>5/29/2017</a:t>
             </a:fld>
             <a:endParaRPr lang="en-US"/>
           </a:p>
@@ -4489,7 +4886,7 @@
           <a:p>
             <a:fld id="{699DC775-C286-4358-8C92-D7E584E969B3}" type="datetimeFigureOut">
               <a:rPr lang="en-US" smtClean="0"/>
-              <a:t>4/4/2017</a:t>
+              <a:t>5/29/2017</a:t>
             </a:fld>
             <a:endParaRPr lang="en-US"/>
           </a:p>
@@ -4657,7 +5054,7 @@
           <a:p>
             <a:fld id="{699DC775-C286-4358-8C92-D7E584E969B3}" type="datetimeFigureOut">
               <a:rPr lang="en-US" smtClean="0"/>
-              <a:t>4/4/2017</a:t>
+              <a:t>5/29/2017</a:t>
             </a:fld>
             <a:endParaRPr lang="en-US"/>
           </a:p>
@@ -4902,7 +5299,7 @@
           <a:p>
             <a:fld id="{699DC775-C286-4358-8C92-D7E584E969B3}" type="datetimeFigureOut">
               <a:rPr lang="en-US" smtClean="0"/>
-              <a:t>4/4/2017</a:t>
+              <a:t>5/29/2017</a:t>
             </a:fld>
             <a:endParaRPr lang="en-US"/>
           </a:p>
@@ -5187,7 +5584,7 @@
           <a:p>
             <a:fld id="{699DC775-C286-4358-8C92-D7E584E969B3}" type="datetimeFigureOut">
               <a:rPr lang="en-US" smtClean="0"/>
-              <a:t>4/4/2017</a:t>
+              <a:t>5/29/2017</a:t>
             </a:fld>
             <a:endParaRPr lang="en-US"/>
           </a:p>
@@ -5606,7 +6003,7 @@
           <a:p>
             <a:fld id="{699DC775-C286-4358-8C92-D7E584E969B3}" type="datetimeFigureOut">
               <a:rPr lang="en-US" smtClean="0"/>
-              <a:t>4/4/2017</a:t>
+              <a:t>5/29/2017</a:t>
             </a:fld>
             <a:endParaRPr lang="en-US"/>
           </a:p>
@@ -5723,7 +6120,7 @@
           <a:p>
             <a:fld id="{699DC775-C286-4358-8C92-D7E584E969B3}" type="datetimeFigureOut">
               <a:rPr lang="en-US" smtClean="0"/>
-              <a:t>4/4/2017</a:t>
+              <a:t>5/29/2017</a:t>
             </a:fld>
             <a:endParaRPr lang="en-US"/>
           </a:p>
@@ -5818,7 +6215,7 @@
           <a:p>
             <a:fld id="{699DC775-C286-4358-8C92-D7E584E969B3}" type="datetimeFigureOut">
               <a:rPr lang="en-US" smtClean="0"/>
-              <a:t>4/4/2017</a:t>
+              <a:t>5/29/2017</a:t>
             </a:fld>
             <a:endParaRPr lang="en-US"/>
           </a:p>
@@ -6093,7 +6490,7 @@
           <a:p>
             <a:fld id="{699DC775-C286-4358-8C92-D7E584E969B3}" type="datetimeFigureOut">
               <a:rPr lang="en-US" smtClean="0"/>
-              <a:t>4/4/2017</a:t>
+              <a:t>5/29/2017</a:t>
             </a:fld>
             <a:endParaRPr lang="en-US"/>
           </a:p>
@@ -6261,7 +6658,7 @@
           <a:p>
             <a:fld id="{699DC775-C286-4358-8C92-D7E584E969B3}" type="datetimeFigureOut">
               <a:rPr lang="en-US" smtClean="0"/>
-              <a:t>4/4/2017</a:t>
+              <a:t>5/29/2017</a:t>
             </a:fld>
             <a:endParaRPr lang="en-US"/>
           </a:p>
@@ -6513,7 +6910,7 @@
           <a:p>
             <a:fld id="{699DC775-C286-4358-8C92-D7E584E969B3}" type="datetimeFigureOut">
               <a:rPr lang="en-US" smtClean="0"/>
-              <a:t>4/4/2017</a:t>
+              <a:t>5/29/2017</a:t>
             </a:fld>
             <a:endParaRPr lang="en-US"/>
           </a:p>
@@ -6681,7 +7078,7 @@
           <a:p>
             <a:fld id="{699DC775-C286-4358-8C92-D7E584E969B3}" type="datetimeFigureOut">
               <a:rPr lang="en-US" smtClean="0"/>
-              <a:t>4/4/2017</a:t>
+              <a:t>5/29/2017</a:t>
             </a:fld>
             <a:endParaRPr lang="en-US"/>
           </a:p>
@@ -6859,7 +7256,7 @@
           <a:p>
             <a:fld id="{699DC775-C286-4358-8C92-D7E584E969B3}" type="datetimeFigureOut">
               <a:rPr lang="en-US" smtClean="0"/>
-              <a:t>4/4/2017</a:t>
+              <a:t>5/29/2017</a:t>
             </a:fld>
             <a:endParaRPr lang="en-US"/>
           </a:p>
@@ -7107,7 +7504,7 @@
           <a:p>
             <a:fld id="{699DC775-C286-4358-8C92-D7E584E969B3}" type="datetimeFigureOut">
               <a:rPr lang="en-US" smtClean="0"/>
-              <a:t>4/4/2017</a:t>
+              <a:t>5/29/2017</a:t>
             </a:fld>
             <a:endParaRPr lang="en-US"/>
           </a:p>
@@ -7283,7 +7680,7 @@
           <a:p>
             <a:fld id="{699DC775-C286-4358-8C92-D7E584E969B3}" type="datetimeFigureOut">
               <a:rPr lang="en-US" smtClean="0"/>
-              <a:t>4/4/2017</a:t>
+              <a:t>5/29/2017</a:t>
             </a:fld>
             <a:endParaRPr lang="en-US"/>
           </a:p>
@@ -7536,7 +7933,7 @@
           <a:p>
             <a:fld id="{699DC775-C286-4358-8C92-D7E584E969B3}" type="datetimeFigureOut">
               <a:rPr lang="en-US" smtClean="0"/>
-              <a:t>4/4/2017</a:t>
+              <a:t>5/29/2017</a:t>
             </a:fld>
             <a:endParaRPr lang="en-US"/>
           </a:p>
@@ -7829,7 +8226,7 @@
           <a:p>
             <a:fld id="{699DC775-C286-4358-8C92-D7E584E969B3}" type="datetimeFigureOut">
               <a:rPr lang="en-US" smtClean="0"/>
-              <a:t>4/4/2017</a:t>
+              <a:t>5/29/2017</a:t>
             </a:fld>
             <a:endParaRPr lang="en-US"/>
           </a:p>
@@ -8256,7 +8653,7 @@
           <a:p>
             <a:fld id="{699DC775-C286-4358-8C92-D7E584E969B3}" type="datetimeFigureOut">
               <a:rPr lang="en-US" smtClean="0"/>
-              <a:t>4/4/2017</a:t>
+              <a:t>5/29/2017</a:t>
             </a:fld>
             <a:endParaRPr lang="en-US"/>
           </a:p>
@@ -8381,7 +8778,7 @@
           <a:p>
             <a:fld id="{699DC775-C286-4358-8C92-D7E584E969B3}" type="datetimeFigureOut">
               <a:rPr lang="en-US" smtClean="0"/>
-              <a:t>4/4/2017</a:t>
+              <a:t>5/29/2017</a:t>
             </a:fld>
             <a:endParaRPr lang="en-US"/>
           </a:p>
@@ -8484,7 +8881,7 @@
           <a:p>
             <a:fld id="{699DC775-C286-4358-8C92-D7E584E969B3}" type="datetimeFigureOut">
               <a:rPr lang="en-US" smtClean="0"/>
-              <a:t>4/4/2017</a:t>
+              <a:t>5/29/2017</a:t>
             </a:fld>
             <a:endParaRPr lang="en-US"/>
           </a:p>
@@ -8729,7 +9126,7 @@
           <a:p>
             <a:fld id="{699DC775-C286-4358-8C92-D7E584E969B3}" type="datetimeFigureOut">
               <a:rPr lang="en-US" smtClean="0"/>
-              <a:t>4/4/2017</a:t>
+              <a:t>5/29/2017</a:t>
             </a:fld>
             <a:endParaRPr lang="en-US"/>
           </a:p>
@@ -9012,7 +9409,7 @@
           <a:p>
             <a:fld id="{699DC775-C286-4358-8C92-D7E584E969B3}" type="datetimeFigureOut">
               <a:rPr lang="en-US" smtClean="0"/>
-              <a:t>4/4/2017</a:t>
+              <a:t>5/29/2017</a:t>
             </a:fld>
             <a:endParaRPr lang="en-US"/>
           </a:p>
@@ -9272,7 +9669,7 @@
           <a:p>
             <a:fld id="{699DC775-C286-4358-8C92-D7E584E969B3}" type="datetimeFigureOut">
               <a:rPr lang="en-US" smtClean="0"/>
-              <a:t>4/4/2017</a:t>
+              <a:t>5/29/2017</a:t>
             </a:fld>
             <a:endParaRPr lang="en-US"/>
           </a:p>
@@ -9448,7 +9845,7 @@
           <a:p>
             <a:fld id="{699DC775-C286-4358-8C92-D7E584E969B3}" type="datetimeFigureOut">
               <a:rPr lang="en-US" smtClean="0"/>
-              <a:t>4/4/2017</a:t>
+              <a:t>5/29/2017</a:t>
             </a:fld>
             <a:endParaRPr lang="en-US"/>
           </a:p>
@@ -9634,7 +10031,7 @@
           <a:p>
             <a:fld id="{699DC775-C286-4358-8C92-D7E584E969B3}" type="datetimeFigureOut">
               <a:rPr lang="en-US" smtClean="0"/>
-              <a:t>4/4/2017</a:t>
+              <a:t>5/29/2017</a:t>
             </a:fld>
             <a:endParaRPr lang="en-US"/>
           </a:p>
@@ -9826,7 +10223,7 @@
           <a:p>
             <a:fld id="{45696B32-6A70-48EC-8939-9D142D9557CD}" type="datetimeFigureOut">
               <a:rPr lang="en-US" smtClean="0"/>
-              <a:t>4/4/2017</a:t>
+              <a:t>5/29/2017</a:t>
             </a:fld>
             <a:endParaRPr lang="en-US"/>
           </a:p>
@@ -10142,7 +10539,7 @@
           <a:p>
             <a:fld id="{45696B32-6A70-48EC-8939-9D142D9557CD}" type="datetimeFigureOut">
               <a:rPr lang="en-US" smtClean="0"/>
-              <a:t>4/4/2017</a:t>
+              <a:t>5/29/2017</a:t>
             </a:fld>
             <a:endParaRPr lang="en-US"/>
           </a:p>
@@ -10388,7 +10785,7 @@
           <a:p>
             <a:fld id="{45696B32-6A70-48EC-8939-9D142D9557CD}" type="datetimeFigureOut">
               <a:rPr lang="en-US" smtClean="0"/>
-              <a:t>4/4/2017</a:t>
+              <a:t>5/29/2017</a:t>
             </a:fld>
             <a:endParaRPr lang="en-US"/>
           </a:p>
@@ -10620,7 +11017,7 @@
           <a:p>
             <a:fld id="{45696B32-6A70-48EC-8939-9D142D9557CD}" type="datetimeFigureOut">
               <a:rPr lang="en-US" smtClean="0"/>
-              <a:t>4/4/2017</a:t>
+              <a:t>5/29/2017</a:t>
             </a:fld>
             <a:endParaRPr lang="en-US"/>
           </a:p>
@@ -10987,7 +11384,7 @@
           <a:p>
             <a:fld id="{45696B32-6A70-48EC-8939-9D142D9557CD}" type="datetimeFigureOut">
               <a:rPr lang="en-US" smtClean="0"/>
-              <a:t>4/4/2017</a:t>
+              <a:t>5/29/2017</a:t>
             </a:fld>
             <a:endParaRPr lang="en-US"/>
           </a:p>
@@ -11105,7 +11502,7 @@
           <a:p>
             <a:fld id="{45696B32-6A70-48EC-8939-9D142D9557CD}" type="datetimeFigureOut">
               <a:rPr lang="en-US" smtClean="0"/>
-              <a:t>4/4/2017</a:t>
+              <a:t>5/29/2017</a:t>
             </a:fld>
             <a:endParaRPr lang="en-US"/>
           </a:p>
@@ -11390,7 +11787,7 @@
           <a:p>
             <a:fld id="{699DC775-C286-4358-8C92-D7E584E969B3}" type="datetimeFigureOut">
               <a:rPr lang="en-US" smtClean="0"/>
-              <a:t>4/4/2017</a:t>
+              <a:t>5/29/2017</a:t>
             </a:fld>
             <a:endParaRPr lang="en-US"/>
           </a:p>
@@ -11485,7 +11882,7 @@
           <a:p>
             <a:fld id="{45696B32-6A70-48EC-8939-9D142D9557CD}" type="datetimeFigureOut">
               <a:rPr lang="en-US" smtClean="0"/>
-              <a:t>4/4/2017</a:t>
+              <a:t>5/29/2017</a:t>
             </a:fld>
             <a:endParaRPr lang="en-US"/>
           </a:p>
@@ -11762,7 +12159,7 @@
           <a:p>
             <a:fld id="{45696B32-6A70-48EC-8939-9D142D9557CD}" type="datetimeFigureOut">
               <a:rPr lang="en-US" smtClean="0"/>
-              <a:t>4/4/2017</a:t>
+              <a:t>5/29/2017</a:t>
             </a:fld>
             <a:endParaRPr lang="en-US"/>
           </a:p>
@@ -12015,7 +12412,7 @@
           <a:p>
             <a:fld id="{45696B32-6A70-48EC-8939-9D142D9557CD}" type="datetimeFigureOut">
               <a:rPr lang="en-US" smtClean="0"/>
-              <a:t>4/4/2017</a:t>
+              <a:t>5/29/2017</a:t>
             </a:fld>
             <a:endParaRPr lang="en-US"/>
           </a:p>
@@ -12185,7 +12582,7 @@
           <a:p>
             <a:fld id="{45696B32-6A70-48EC-8939-9D142D9557CD}" type="datetimeFigureOut">
               <a:rPr lang="en-US" smtClean="0"/>
-              <a:t>4/4/2017</a:t>
+              <a:t>5/29/2017</a:t>
             </a:fld>
             <a:endParaRPr lang="en-US"/>
           </a:p>
@@ -12365,7 +12762,7 @@
           <a:p>
             <a:fld id="{45696B32-6A70-48EC-8939-9D142D9557CD}" type="datetimeFigureOut">
               <a:rPr lang="en-US" smtClean="0"/>
-              <a:t>4/4/2017</a:t>
+              <a:t>5/29/2017</a:t>
             </a:fld>
             <a:endParaRPr lang="en-US"/>
           </a:p>
@@ -12784,7 +13181,7 @@
           <a:p>
             <a:fld id="{699DC775-C286-4358-8C92-D7E584E969B3}" type="datetimeFigureOut">
               <a:rPr lang="en-US" smtClean="0"/>
-              <a:t>4/4/2017</a:t>
+              <a:t>5/29/2017</a:t>
             </a:fld>
             <a:endParaRPr lang="en-US"/>
           </a:p>
@@ -12901,7 +13298,7 @@
           <a:p>
             <a:fld id="{699DC775-C286-4358-8C92-D7E584E969B3}" type="datetimeFigureOut">
               <a:rPr lang="en-US" smtClean="0"/>
-              <a:t>4/4/2017</a:t>
+              <a:t>5/29/2017</a:t>
             </a:fld>
             <a:endParaRPr lang="en-US"/>
           </a:p>
@@ -12996,7 +13393,7 @@
           <a:p>
             <a:fld id="{699DC775-C286-4358-8C92-D7E584E969B3}" type="datetimeFigureOut">
               <a:rPr lang="en-US" smtClean="0"/>
-              <a:t>4/4/2017</a:t>
+              <a:t>5/29/2017</a:t>
             </a:fld>
             <a:endParaRPr lang="en-US"/>
           </a:p>
@@ -13271,7 +13668,7 @@
           <a:p>
             <a:fld id="{699DC775-C286-4358-8C92-D7E584E969B3}" type="datetimeFigureOut">
               <a:rPr lang="en-US" smtClean="0"/>
-              <a:t>4/4/2017</a:t>
+              <a:t>5/29/2017</a:t>
             </a:fld>
             <a:endParaRPr lang="en-US"/>
           </a:p>
@@ -13523,7 +13920,7 @@
           <a:p>
             <a:fld id="{699DC775-C286-4358-8C92-D7E584E969B3}" type="datetimeFigureOut">
               <a:rPr lang="en-US" smtClean="0"/>
-              <a:t>4/4/2017</a:t>
+              <a:t>5/29/2017</a:t>
             </a:fld>
             <a:endParaRPr lang="en-US"/>
           </a:p>
@@ -13734,7 +14131,7 @@
           <a:p>
             <a:fld id="{699DC775-C286-4358-8C92-D7E584E969B3}" type="datetimeFigureOut">
               <a:rPr lang="en-US" smtClean="0"/>
-              <a:t>4/4/2017</a:t>
+              <a:t>5/29/2017</a:t>
             </a:fld>
             <a:endParaRPr lang="en-US"/>
           </a:p>
@@ -14247,7 +14644,7 @@
           <a:p>
             <a:fld id="{699DC775-C286-4358-8C92-D7E584E969B3}" type="datetimeFigureOut">
               <a:rPr lang="en-US" smtClean="0"/>
-              <a:t>4/4/2017</a:t>
+              <a:t>5/29/2017</a:t>
             </a:fld>
             <a:endParaRPr lang="en-US"/>
           </a:p>
@@ -14758,7 +15155,7 @@
           <a:p>
             <a:fld id="{699DC775-C286-4358-8C92-D7E584E969B3}" type="datetimeFigureOut">
               <a:rPr lang="en-US" smtClean="0"/>
-              <a:t>4/4/2017</a:t>
+              <a:t>5/29/2017</a:t>
             </a:fld>
             <a:endParaRPr lang="en-US"/>
           </a:p>
@@ -15268,7 +15665,7 @@
           <a:p>
             <a:fld id="{45696B32-6A70-48EC-8939-9D142D9557CD}" type="datetimeFigureOut">
               <a:rPr lang="en-US" smtClean="0"/>
-              <a:t>4/4/2017</a:t>
+              <a:t>5/29/2017</a:t>
             </a:fld>
             <a:endParaRPr lang="en-US"/>
           </a:p>
@@ -26589,6 +26986,1280 @@
     <p:extLst>
       <p:ext uri="{BB962C8B-B14F-4D97-AF65-F5344CB8AC3E}">
         <p14:creationId xmlns:p14="http://schemas.microsoft.com/office/powerpoint/2010/main" val="1904788095"/>
+      </p:ext>
+    </p:extLst>
+  </p:cSld>
+  <p:clrMapOvr>
+    <a:masterClrMapping/>
+  </p:clrMapOvr>
+</p:sld>
+</file>
+
+<file path=ppt/slides/slide35.xml><?xml version="1.0" encoding="utf-8"?>
+<p:sld xmlns:a="http://schemas.openxmlformats.org/drawingml/2006/main" xmlns:r="http://schemas.openxmlformats.org/officeDocument/2006/relationships" xmlns:p="http://schemas.openxmlformats.org/presentationml/2006/main">
+  <p:cSld>
+    <p:spTree>
+      <p:nvGrpSpPr>
+        <p:cNvPr id="1" name=""/>
+        <p:cNvGrpSpPr/>
+        <p:nvPr/>
+      </p:nvGrpSpPr>
+      <p:grpSpPr>
+        <a:xfrm>
+          <a:off x="0" y="0"/>
+          <a:ext cx="0" cy="0"/>
+          <a:chOff x="0" y="0"/>
+          <a:chExt cx="0" cy="0"/>
+        </a:xfrm>
+      </p:grpSpPr>
+      <p:sp>
+        <p:nvSpPr>
+          <p:cNvPr id="2" name="Title 1"/>
+          <p:cNvSpPr>
+            <a:spLocks noGrp="1"/>
+          </p:cNvSpPr>
+          <p:nvPr>
+            <p:ph type="title"/>
+          </p:nvPr>
+        </p:nvSpPr>
+        <p:spPr/>
+        <p:txBody>
+          <a:bodyPr/>
+          <a:lstStyle/>
+          <a:p>
+            <a:r>
+              <a:rPr lang="en-US" dirty="0" smtClean="0"/>
+              <a:t>Sync:: Group</a:t>
+            </a:r>
+            <a:endParaRPr lang="en-SG" dirty="0"/>
+          </a:p>
+        </p:txBody>
+      </p:sp>
+      <p:sp>
+        <p:nvSpPr>
+          <p:cNvPr id="4" name="Content Placeholder 3"/>
+          <p:cNvSpPr>
+            <a:spLocks noGrp="1"/>
+          </p:cNvSpPr>
+          <p:nvPr>
+            <p:ph idx="1"/>
+          </p:nvPr>
+        </p:nvSpPr>
+        <p:spPr/>
+        <p:txBody>
+          <a:bodyPr/>
+          <a:lstStyle/>
+          <a:p>
+            <a:pPr marL="0" indent="0">
+              <a:buNone/>
+            </a:pPr>
+            <a:r>
+              <a:rPr lang="en-US" b="1" dirty="0" smtClean="0"/>
+              <a:t>Additional instructions</a:t>
+            </a:r>
+            <a:r>
+              <a:rPr lang="en-US" b="1" dirty="0"/>
+              <a:t>:</a:t>
+            </a:r>
+          </a:p>
+          <a:p>
+            <a:pPr marL="285750" indent="-285750"/>
+            <a:r>
+              <a:rPr lang="en-US" dirty="0"/>
+              <a:t>Select </a:t>
+            </a:r>
+            <a:r>
+              <a:rPr lang="en-US" dirty="0" smtClean="0"/>
+              <a:t>the appropriate </a:t>
+            </a:r>
+            <a:r>
+              <a:rPr lang="en-US" b="1" dirty="0" smtClean="0"/>
+              <a:t>Shape</a:t>
+            </a:r>
+            <a:endParaRPr lang="en-US" dirty="0" smtClean="0"/>
+          </a:p>
+          <a:p>
+            <a:pPr marL="285750" indent="-285750"/>
+            <a:r>
+              <a:rPr lang="en-US" dirty="0" smtClean="0"/>
+              <a:t>Click </a:t>
+            </a:r>
+            <a:r>
+              <a:rPr lang="en-US" b="1" dirty="0" err="1" smtClean="0"/>
+              <a:t>SyncLab</a:t>
+            </a:r>
+            <a:r>
+              <a:rPr lang="en-US" dirty="0" smtClean="0"/>
+              <a:t> Ribbon button.</a:t>
+            </a:r>
+          </a:p>
+          <a:p>
+            <a:pPr marL="285750" indent="-285750"/>
+            <a:r>
+              <a:rPr lang="en-US" dirty="0" smtClean="0"/>
+              <a:t>Click </a:t>
+            </a:r>
+            <a:r>
+              <a:rPr lang="en-US" b="1" dirty="0"/>
+              <a:t>Copy</a:t>
+            </a:r>
+            <a:r>
+              <a:rPr lang="en-US" dirty="0"/>
+              <a:t> to copy the format and select the formats to copy</a:t>
+            </a:r>
+          </a:p>
+          <a:p>
+            <a:pPr marL="285750" indent="-285750"/>
+            <a:r>
+              <a:rPr lang="en-US" dirty="0"/>
+              <a:t>Select the </a:t>
+            </a:r>
+            <a:r>
+              <a:rPr lang="en-US" b="1" dirty="0"/>
+              <a:t>Shapes</a:t>
+            </a:r>
+            <a:r>
+              <a:rPr lang="en-US" dirty="0"/>
+              <a:t> to sync the format</a:t>
+            </a:r>
+          </a:p>
+          <a:p>
+            <a:pPr marL="285750" indent="-285750"/>
+            <a:r>
+              <a:rPr lang="en-US" dirty="0"/>
+              <a:t>Click </a:t>
+            </a:r>
+            <a:r>
+              <a:rPr lang="en-US" b="1" dirty="0"/>
+              <a:t>Paste</a:t>
+            </a:r>
+            <a:r>
+              <a:rPr lang="en-US" dirty="0"/>
+              <a:t> to sync the format</a:t>
+            </a:r>
+          </a:p>
+          <a:p>
+            <a:endParaRPr lang="en-US" dirty="0"/>
+          </a:p>
+        </p:txBody>
+      </p:sp>
+    </p:spTree>
+    <p:extLst>
+      <p:ext uri="{BB962C8B-B14F-4D97-AF65-F5344CB8AC3E}">
+        <p14:creationId xmlns:p14="http://schemas.microsoft.com/office/powerpoint/2010/main" val="377832731"/>
+      </p:ext>
+    </p:extLst>
+  </p:cSld>
+  <p:clrMapOvr>
+    <a:masterClrMapping/>
+  </p:clrMapOvr>
+</p:sld>
+</file>
+
+<file path=ppt/slides/slide36.xml><?xml version="1.0" encoding="utf-8"?>
+<p:sld xmlns:a="http://schemas.openxmlformats.org/drawingml/2006/main" xmlns:r="http://schemas.openxmlformats.org/officeDocument/2006/relationships" xmlns:p="http://schemas.openxmlformats.org/presentationml/2006/main">
+  <p:cSld>
+    <p:spTree>
+      <p:nvGrpSpPr>
+        <p:cNvPr id="1" name=""/>
+        <p:cNvGrpSpPr/>
+        <p:nvPr/>
+      </p:nvGrpSpPr>
+      <p:grpSpPr>
+        <a:xfrm>
+          <a:off x="0" y="0"/>
+          <a:ext cx="0" cy="0"/>
+          <a:chOff x="0" y="0"/>
+          <a:chExt cx="0" cy="0"/>
+        </a:xfrm>
+      </p:grpSpPr>
+      <p:grpSp>
+        <p:nvGrpSpPr>
+          <p:cNvPr id="2" name="Group 1"/>
+          <p:cNvGrpSpPr/>
+          <p:nvPr/>
+        </p:nvGrpSpPr>
+        <p:grpSpPr>
+          <a:xfrm>
+            <a:off x="570411" y="1676400"/>
+            <a:ext cx="3657600" cy="2815972"/>
+            <a:chOff x="660392" y="917828"/>
+            <a:chExt cx="3657600" cy="2815972"/>
+          </a:xfrm>
+        </p:grpSpPr>
+        <p:sp>
+          <p:nvSpPr>
+            <p:cNvPr id="4" name="Rectangle 3"/>
+            <p:cNvSpPr/>
+            <p:nvPr/>
+          </p:nvSpPr>
+          <p:spPr>
+            <a:xfrm>
+              <a:off x="660392" y="917828"/>
+              <a:ext cx="1828800" cy="1219200"/>
+            </a:xfrm>
+            <a:prstGeom prst="rect">
+              <a:avLst/>
+            </a:prstGeom>
+            <a:solidFill>
+              <a:schemeClr val="accent1"/>
+            </a:solidFill>
+            <a:ln w="25400" cap="flat" cmpd="sng" algn="ctr">
+              <a:solidFill>
+                <a:schemeClr val="accent1"/>
+              </a:solidFill>
+              <a:prstDash val="solid"/>
+              <a:round/>
+              <a:headEnd type="none" w="med" len="med"/>
+              <a:tailEnd type="none" w="med" len="med"/>
+            </a:ln>
+          </p:spPr>
+          <p:style>
+            <a:lnRef idx="2">
+              <a:schemeClr val="accent1">
+                <a:shade val="50000"/>
+              </a:schemeClr>
+            </a:lnRef>
+            <a:fillRef idx="1">
+              <a:schemeClr val="accent1"/>
+            </a:fillRef>
+            <a:effectRef idx="0">
+              <a:schemeClr val="accent1"/>
+            </a:effectRef>
+            <a:fontRef idx="minor">
+              <a:schemeClr val="lt1"/>
+            </a:fontRef>
+          </p:style>
+          <p:txBody>
+            <a:bodyPr rtlCol="0" anchor="ctr"/>
+            <a:lstStyle/>
+            <a:p>
+              <a:pPr algn="ctr"/>
+              <a:endParaRPr lang="en-US">
+                <a:solidFill>
+                  <a:srgbClr val="FFFFFF"/>
+                </a:solidFill>
+                <a:latin typeface="Calibri" panose="020F0502020204030204" pitchFamily="34" charset="0"/>
+              </a:endParaRPr>
+            </a:p>
+          </p:txBody>
+        </p:sp>
+        <p:sp>
+          <p:nvSpPr>
+            <p:cNvPr id="7" name="CopyFrom"/>
+            <p:cNvSpPr/>
+            <p:nvPr/>
+          </p:nvSpPr>
+          <p:spPr>
+            <a:xfrm rot="18672083">
+              <a:off x="1574792" y="1413710"/>
+              <a:ext cx="1828800" cy="1219200"/>
+            </a:xfrm>
+            <a:prstGeom prst="rect">
+              <a:avLst/>
+            </a:prstGeom>
+            <a:solidFill>
+              <a:srgbClr val="FF0000"/>
+            </a:solidFill>
+          </p:spPr>
+          <p:style>
+            <a:lnRef idx="2">
+              <a:schemeClr val="accent1">
+                <a:shade val="50000"/>
+              </a:schemeClr>
+            </a:lnRef>
+            <a:fillRef idx="1">
+              <a:schemeClr val="accent1"/>
+            </a:fillRef>
+            <a:effectRef idx="0">
+              <a:schemeClr val="accent1"/>
+            </a:effectRef>
+            <a:fontRef idx="minor">
+              <a:schemeClr val="lt1"/>
+            </a:fontRef>
+          </p:style>
+          <p:txBody>
+            <a:bodyPr rtlCol="0" anchor="ctr"/>
+            <a:lstStyle/>
+            <a:p>
+              <a:pPr algn="ctr"/>
+              <a:endParaRPr lang="en-US"/>
+            </a:p>
+          </p:txBody>
+        </p:sp>
+        <p:sp>
+          <p:nvSpPr>
+            <p:cNvPr id="5" name="Oval 4"/>
+            <p:cNvSpPr/>
+            <p:nvPr/>
+          </p:nvSpPr>
+          <p:spPr>
+            <a:xfrm>
+              <a:off x="2489192" y="1905000"/>
+              <a:ext cx="1828800" cy="1828800"/>
+            </a:xfrm>
+            <a:prstGeom prst="ellipse">
+              <a:avLst/>
+            </a:prstGeom>
+            <a:solidFill>
+              <a:schemeClr val="accent1"/>
+            </a:solidFill>
+            <a:ln w="254000" cap="flat" cmpd="sng" algn="ctr">
+              <a:solidFill>
+                <a:srgbClr val="385D8A"/>
+              </a:solidFill>
+              <a:prstDash val="solid"/>
+              <a:round/>
+              <a:headEnd type="none" w="med" len="med"/>
+              <a:tailEnd type="none" w="med" len="med"/>
+            </a:ln>
+          </p:spPr>
+          <p:style>
+            <a:lnRef idx="2">
+              <a:schemeClr val="accent1">
+                <a:shade val="50000"/>
+              </a:schemeClr>
+            </a:lnRef>
+            <a:fillRef idx="1">
+              <a:schemeClr val="accent1"/>
+            </a:fillRef>
+            <a:effectRef idx="0">
+              <a:schemeClr val="accent1"/>
+            </a:effectRef>
+            <a:fontRef idx="minor">
+              <a:schemeClr val="lt1"/>
+            </a:fontRef>
+          </p:style>
+          <p:txBody>
+            <a:bodyPr rtlCol="0" anchor="ctr"/>
+            <a:lstStyle/>
+            <a:p>
+              <a:pPr algn="ctr"/>
+              <a:endParaRPr lang="en-US">
+                <a:solidFill>
+                  <a:srgbClr val="FFFFFF"/>
+                </a:solidFill>
+                <a:latin typeface="Calibri" panose="020F0502020204030204" pitchFamily="34" charset="0"/>
+              </a:endParaRPr>
+            </a:p>
+          </p:txBody>
+        </p:sp>
+      </p:grpSp>
+      <p:sp>
+        <p:nvSpPr>
+          <p:cNvPr id="6" name="Right Arrow 5"/>
+          <p:cNvSpPr/>
+          <p:nvPr/>
+        </p:nvSpPr>
+        <p:spPr>
+          <a:xfrm rot="18000000">
+            <a:off x="4930324" y="1741291"/>
+            <a:ext cx="3581400" cy="1066800"/>
+          </a:xfrm>
+          <a:prstGeom prst="rightArrow">
+            <a:avLst/>
+          </a:prstGeom>
+        </p:spPr>
+        <p:style>
+          <a:lnRef idx="2">
+            <a:schemeClr val="accent1">
+              <a:shade val="50000"/>
+            </a:schemeClr>
+          </a:lnRef>
+          <a:fillRef idx="1">
+            <a:schemeClr val="accent1"/>
+          </a:fillRef>
+          <a:effectRef idx="0">
+            <a:schemeClr val="accent1"/>
+          </a:effectRef>
+          <a:fontRef idx="minor">
+            <a:schemeClr val="lt1"/>
+          </a:fontRef>
+        </p:style>
+        <p:txBody>
+          <a:bodyPr rtlCol="0" anchor="ctr"/>
+          <a:lstStyle/>
+          <a:p>
+            <a:pPr algn="ctr"/>
+            <a:endParaRPr lang="en-US"/>
+          </a:p>
+        </p:txBody>
+      </p:sp>
+      <p:cxnSp>
+        <p:nvCxnSpPr>
+          <p:cNvPr id="8" name="Straight Connector 2"/>
+          <p:cNvCxnSpPr/>
+          <p:nvPr/>
+        </p:nvCxnSpPr>
+        <p:spPr>
+          <a:xfrm flipH="1">
+            <a:off x="4228011" y="5410200"/>
+            <a:ext cx="4572000" cy="0"/>
+          </a:xfrm>
+          <a:prstGeom prst="line">
+            <a:avLst/>
+          </a:prstGeom>
+          <a:ln w="254000" cap="flat" cmpd="sng" algn="ctr">
+            <a:solidFill>
+              <a:srgbClr val="FFFF00"/>
+            </a:solidFill>
+            <a:prstDash val="solid"/>
+            <a:round/>
+            <a:headEnd type="none" w="med" len="med"/>
+            <a:tailEnd type="none" w="med" len="med"/>
+          </a:ln>
+        </p:spPr>
+        <p:style>
+          <a:lnRef idx="1">
+            <a:schemeClr val="accent1"/>
+          </a:lnRef>
+          <a:fillRef idx="0">
+            <a:schemeClr val="accent1"/>
+          </a:fillRef>
+          <a:effectRef idx="0">
+            <a:schemeClr val="accent1"/>
+          </a:effectRef>
+          <a:fontRef idx="minor">
+            <a:schemeClr val="tx1"/>
+          </a:fontRef>
+        </p:style>
+      </p:cxnSp>
+    </p:spTree>
+    <p:extLst>
+      <p:ext uri="{BB962C8B-B14F-4D97-AF65-F5344CB8AC3E}">
+        <p14:creationId xmlns:p14="http://schemas.microsoft.com/office/powerpoint/2010/main" val="1222628196"/>
+      </p:ext>
+    </p:extLst>
+  </p:cSld>
+  <p:clrMapOvr>
+    <a:masterClrMapping/>
+  </p:clrMapOvr>
+</p:sld>
+</file>
+
+<file path=ppt/slides/slide37.xml><?xml version="1.0" encoding="utf-8"?>
+<p:sld xmlns:a="http://schemas.openxmlformats.org/drawingml/2006/main" xmlns:r="http://schemas.openxmlformats.org/officeDocument/2006/relationships" xmlns:p="http://schemas.openxmlformats.org/presentationml/2006/main">
+  <p:cSld>
+    <p:spTree>
+      <p:nvGrpSpPr>
+        <p:cNvPr id="1" name=""/>
+        <p:cNvGrpSpPr/>
+        <p:nvPr/>
+      </p:nvGrpSpPr>
+      <p:grpSpPr>
+        <a:xfrm>
+          <a:off x="0" y="0"/>
+          <a:ext cx="0" cy="0"/>
+          <a:chOff x="0" y="0"/>
+          <a:chExt cx="0" cy="0"/>
+        </a:xfrm>
+      </p:grpSpPr>
+      <p:grpSp>
+        <p:nvGrpSpPr>
+          <p:cNvPr id="2" name="Group 1"/>
+          <p:cNvGrpSpPr/>
+          <p:nvPr/>
+        </p:nvGrpSpPr>
+        <p:grpSpPr>
+          <a:xfrm>
+            <a:off x="570411" y="1676400"/>
+            <a:ext cx="3657600" cy="2815972"/>
+            <a:chOff x="660392" y="917828"/>
+            <a:chExt cx="3657600" cy="2815972"/>
+          </a:xfrm>
+        </p:grpSpPr>
+        <p:sp>
+          <p:nvSpPr>
+            <p:cNvPr id="4" name="Rectangle 3"/>
+            <p:cNvSpPr/>
+            <p:nvPr/>
+          </p:nvSpPr>
+          <p:spPr>
+            <a:xfrm>
+              <a:off x="660392" y="917828"/>
+              <a:ext cx="1828800" cy="1219200"/>
+            </a:xfrm>
+            <a:prstGeom prst="rect">
+              <a:avLst/>
+            </a:prstGeom>
+            <a:solidFill>
+              <a:schemeClr val="accent1"/>
+            </a:solidFill>
+            <a:ln w="25400" cap="flat" cmpd="sng" algn="ctr">
+              <a:solidFill>
+                <a:schemeClr val="accent1"/>
+              </a:solidFill>
+              <a:prstDash val="solid"/>
+              <a:round/>
+              <a:headEnd type="none" w="med" len="med"/>
+              <a:tailEnd type="none" w="med" len="med"/>
+            </a:ln>
+          </p:spPr>
+          <p:style>
+            <a:lnRef idx="2">
+              <a:schemeClr val="accent1">
+                <a:shade val="50000"/>
+              </a:schemeClr>
+            </a:lnRef>
+            <a:fillRef idx="1">
+              <a:schemeClr val="accent1"/>
+            </a:fillRef>
+            <a:effectRef idx="0">
+              <a:schemeClr val="accent1"/>
+            </a:effectRef>
+            <a:fontRef idx="minor">
+              <a:schemeClr val="lt1"/>
+            </a:fontRef>
+          </p:style>
+          <p:txBody>
+            <a:bodyPr rtlCol="0" anchor="ctr"/>
+            <a:lstStyle/>
+            <a:p>
+              <a:pPr algn="ctr"/>
+              <a:endParaRPr lang="en-US">
+                <a:solidFill>
+                  <a:srgbClr val="FFFFFF"/>
+                </a:solidFill>
+                <a:latin typeface="Calibri" panose="020F0502020204030204" pitchFamily="34" charset="0"/>
+              </a:endParaRPr>
+            </a:p>
+          </p:txBody>
+        </p:sp>
+        <p:sp>
+          <p:nvSpPr>
+            <p:cNvPr id="7" name="CopyFrom"/>
+            <p:cNvSpPr/>
+            <p:nvPr/>
+          </p:nvSpPr>
+          <p:spPr>
+            <a:xfrm rot="18672083">
+              <a:off x="1574792" y="1413710"/>
+              <a:ext cx="1828800" cy="1219200"/>
+            </a:xfrm>
+            <a:prstGeom prst="rect">
+              <a:avLst/>
+            </a:prstGeom>
+            <a:solidFill>
+              <a:srgbClr val="FF0000"/>
+            </a:solidFill>
+            <a:ln w="25400" cap="flat" cmpd="sng" algn="ctr">
+              <a:solidFill>
+                <a:srgbClr val="385D8A"/>
+              </a:solidFill>
+              <a:prstDash val="solid"/>
+              <a:round/>
+              <a:headEnd type="none" w="med" len="med"/>
+              <a:tailEnd type="none" w="med" len="med"/>
+            </a:ln>
+          </p:spPr>
+          <p:style>
+            <a:lnRef idx="2">
+              <a:schemeClr val="accent1">
+                <a:shade val="50000"/>
+              </a:schemeClr>
+            </a:lnRef>
+            <a:fillRef idx="1">
+              <a:schemeClr val="accent1"/>
+            </a:fillRef>
+            <a:effectRef idx="0">
+              <a:schemeClr val="accent1"/>
+            </a:effectRef>
+            <a:fontRef idx="minor">
+              <a:schemeClr val="lt1"/>
+            </a:fontRef>
+          </p:style>
+          <p:txBody>
+            <a:bodyPr rtlCol="0" anchor="ctr"/>
+            <a:lstStyle/>
+            <a:p>
+              <a:pPr algn="ctr"/>
+              <a:endParaRPr lang="en-US">
+                <a:solidFill>
+                  <a:srgbClr val="FFFFFF"/>
+                </a:solidFill>
+                <a:latin typeface="Calibri" panose="020F0502020204030204" pitchFamily="34" charset="0"/>
+              </a:endParaRPr>
+            </a:p>
+          </p:txBody>
+        </p:sp>
+        <p:sp>
+          <p:nvSpPr>
+            <p:cNvPr id="5" name="Oval 4"/>
+            <p:cNvSpPr/>
+            <p:nvPr/>
+          </p:nvSpPr>
+          <p:spPr>
+            <a:xfrm>
+              <a:off x="2489192" y="1905000"/>
+              <a:ext cx="1828800" cy="1828800"/>
+            </a:xfrm>
+            <a:prstGeom prst="ellipse">
+              <a:avLst/>
+            </a:prstGeom>
+            <a:ln w="254000"/>
+          </p:spPr>
+          <p:style>
+            <a:lnRef idx="2">
+              <a:schemeClr val="accent1">
+                <a:shade val="50000"/>
+              </a:schemeClr>
+            </a:lnRef>
+            <a:fillRef idx="1">
+              <a:schemeClr val="accent1"/>
+            </a:fillRef>
+            <a:effectRef idx="0">
+              <a:schemeClr val="accent1"/>
+            </a:effectRef>
+            <a:fontRef idx="minor">
+              <a:schemeClr val="lt1"/>
+            </a:fontRef>
+          </p:style>
+          <p:txBody>
+            <a:bodyPr rtlCol="0" anchor="ctr"/>
+            <a:lstStyle/>
+            <a:p>
+              <a:pPr algn="ctr"/>
+              <a:endParaRPr lang="en-US"/>
+            </a:p>
+          </p:txBody>
+        </p:sp>
+      </p:grpSp>
+      <p:sp>
+        <p:nvSpPr>
+          <p:cNvPr id="6" name="Right Arrow 5"/>
+          <p:cNvSpPr/>
+          <p:nvPr/>
+        </p:nvSpPr>
+        <p:spPr>
+          <a:xfrm rot="18000000">
+            <a:off x="4930324" y="1741291"/>
+            <a:ext cx="3581400" cy="1066800"/>
+          </a:xfrm>
+          <a:prstGeom prst="rightArrow">
+            <a:avLst/>
+          </a:prstGeom>
+          <a:solidFill>
+            <a:srgbClr val="FF0000"/>
+          </a:solidFill>
+        </p:spPr>
+        <p:style>
+          <a:lnRef idx="2">
+            <a:schemeClr val="accent1">
+              <a:shade val="50000"/>
+            </a:schemeClr>
+          </a:lnRef>
+          <a:fillRef idx="1">
+            <a:schemeClr val="accent1"/>
+          </a:fillRef>
+          <a:effectRef idx="0">
+            <a:schemeClr val="accent1"/>
+          </a:effectRef>
+          <a:fontRef idx="minor">
+            <a:schemeClr val="lt1"/>
+          </a:fontRef>
+        </p:style>
+        <p:txBody>
+          <a:bodyPr rtlCol="0" anchor="ctr"/>
+          <a:lstStyle/>
+          <a:p>
+            <a:pPr algn="ctr"/>
+            <a:endParaRPr lang="en-US"/>
+          </a:p>
+        </p:txBody>
+      </p:sp>
+      <p:cxnSp>
+        <p:nvCxnSpPr>
+          <p:cNvPr id="8" name="Straight Connector 2"/>
+          <p:cNvCxnSpPr/>
+          <p:nvPr/>
+        </p:nvCxnSpPr>
+        <p:spPr>
+          <a:xfrm flipH="1">
+            <a:off x="4228011" y="5410200"/>
+            <a:ext cx="4572000" cy="0"/>
+          </a:xfrm>
+          <a:prstGeom prst="line">
+            <a:avLst/>
+          </a:prstGeom>
+          <a:ln w="254000" cap="flat" cmpd="sng" algn="ctr">
+            <a:solidFill>
+              <a:srgbClr val="FFFF00"/>
+            </a:solidFill>
+            <a:prstDash val="solid"/>
+            <a:round/>
+            <a:headEnd type="none" w="med" len="med"/>
+            <a:tailEnd type="none" w="med" len="med"/>
+          </a:ln>
+        </p:spPr>
+        <p:style>
+          <a:lnRef idx="1">
+            <a:schemeClr val="accent1"/>
+          </a:lnRef>
+          <a:fillRef idx="0">
+            <a:schemeClr val="accent1"/>
+          </a:fillRef>
+          <a:effectRef idx="0">
+            <a:schemeClr val="accent1"/>
+          </a:effectRef>
+          <a:fontRef idx="minor">
+            <a:schemeClr val="tx1"/>
+          </a:fontRef>
+        </p:style>
+      </p:cxnSp>
+    </p:spTree>
+    <p:extLst>
+      <p:ext uri="{BB962C8B-B14F-4D97-AF65-F5344CB8AC3E}">
+        <p14:creationId xmlns:p14="http://schemas.microsoft.com/office/powerpoint/2010/main" val="70174979"/>
+      </p:ext>
+    </p:extLst>
+  </p:cSld>
+  <p:clrMapOvr>
+    <a:masterClrMapping/>
+  </p:clrMapOvr>
+</p:sld>
+</file>
+
+<file path=ppt/slides/slide38.xml><?xml version="1.0" encoding="utf-8"?>
+<p:sld xmlns:a="http://schemas.openxmlformats.org/drawingml/2006/main" xmlns:r="http://schemas.openxmlformats.org/officeDocument/2006/relationships" xmlns:p="http://schemas.openxmlformats.org/presentationml/2006/main">
+  <p:cSld>
+    <p:spTree>
+      <p:nvGrpSpPr>
+        <p:cNvPr id="1" name=""/>
+        <p:cNvGrpSpPr/>
+        <p:nvPr/>
+      </p:nvGrpSpPr>
+      <p:grpSpPr>
+        <a:xfrm>
+          <a:off x="0" y="0"/>
+          <a:ext cx="0" cy="0"/>
+          <a:chOff x="0" y="0"/>
+          <a:chExt cx="0" cy="0"/>
+        </a:xfrm>
+      </p:grpSpPr>
+      <p:grpSp>
+        <p:nvGrpSpPr>
+          <p:cNvPr id="2" name="Group 1"/>
+          <p:cNvGrpSpPr/>
+          <p:nvPr/>
+        </p:nvGrpSpPr>
+        <p:grpSpPr>
+          <a:xfrm>
+            <a:off x="570411" y="1676400"/>
+            <a:ext cx="3657600" cy="2815972"/>
+            <a:chOff x="660392" y="917828"/>
+            <a:chExt cx="3657600" cy="2815972"/>
+          </a:xfrm>
+        </p:grpSpPr>
+        <p:sp>
+          <p:nvSpPr>
+            <p:cNvPr id="4" name="Rectangle 3"/>
+            <p:cNvSpPr/>
+            <p:nvPr/>
+          </p:nvSpPr>
+          <p:spPr>
+            <a:xfrm>
+              <a:off x="660392" y="917828"/>
+              <a:ext cx="1828800" cy="1219200"/>
+            </a:xfrm>
+            <a:prstGeom prst="rect">
+              <a:avLst/>
+            </a:prstGeom>
+            <a:solidFill>
+              <a:schemeClr val="accent1"/>
+            </a:solidFill>
+            <a:ln w="25400" cap="flat" cmpd="sng" algn="ctr">
+              <a:solidFill>
+                <a:schemeClr val="accent1"/>
+              </a:solidFill>
+              <a:prstDash val="solid"/>
+              <a:round/>
+              <a:headEnd type="none" w="med" len="med"/>
+              <a:tailEnd type="none" w="med" len="med"/>
+            </a:ln>
+          </p:spPr>
+          <p:style>
+            <a:lnRef idx="2">
+              <a:schemeClr val="accent1">
+                <a:shade val="50000"/>
+              </a:schemeClr>
+            </a:lnRef>
+            <a:fillRef idx="1">
+              <a:schemeClr val="accent1"/>
+            </a:fillRef>
+            <a:effectRef idx="0">
+              <a:schemeClr val="accent1"/>
+            </a:effectRef>
+            <a:fontRef idx="minor">
+              <a:schemeClr val="lt1"/>
+            </a:fontRef>
+          </p:style>
+          <p:txBody>
+            <a:bodyPr rtlCol="0" anchor="ctr"/>
+            <a:lstStyle/>
+            <a:p>
+              <a:pPr algn="ctr"/>
+              <a:endParaRPr lang="en-US">
+                <a:solidFill>
+                  <a:srgbClr val="FFFFFF"/>
+                </a:solidFill>
+                <a:latin typeface="Calibri" panose="020F0502020204030204" pitchFamily="34" charset="0"/>
+              </a:endParaRPr>
+            </a:p>
+          </p:txBody>
+        </p:sp>
+        <p:sp>
+          <p:nvSpPr>
+            <p:cNvPr id="7" name="CopyFrom"/>
+            <p:cNvSpPr/>
+            <p:nvPr/>
+          </p:nvSpPr>
+          <p:spPr>
+            <a:xfrm rot="18672083">
+              <a:off x="1574792" y="1413710"/>
+              <a:ext cx="1828800" cy="1219200"/>
+            </a:xfrm>
+            <a:prstGeom prst="rect">
+              <a:avLst/>
+            </a:prstGeom>
+            <a:solidFill>
+              <a:srgbClr val="FF0000"/>
+            </a:solidFill>
+          </p:spPr>
+          <p:style>
+            <a:lnRef idx="2">
+              <a:schemeClr val="accent1">
+                <a:shade val="50000"/>
+              </a:schemeClr>
+            </a:lnRef>
+            <a:fillRef idx="1">
+              <a:schemeClr val="accent1"/>
+            </a:fillRef>
+            <a:effectRef idx="0">
+              <a:schemeClr val="accent1"/>
+            </a:effectRef>
+            <a:fontRef idx="minor">
+              <a:schemeClr val="lt1"/>
+            </a:fontRef>
+          </p:style>
+          <p:txBody>
+            <a:bodyPr rtlCol="0" anchor="ctr"/>
+            <a:lstStyle/>
+            <a:p>
+              <a:pPr algn="ctr"/>
+              <a:endParaRPr lang="en-US"/>
+            </a:p>
+          </p:txBody>
+        </p:sp>
+        <p:sp>
+          <p:nvSpPr>
+            <p:cNvPr id="5" name="Oval 4"/>
+            <p:cNvSpPr/>
+            <p:nvPr/>
+          </p:nvSpPr>
+          <p:spPr>
+            <a:xfrm>
+              <a:off x="2489192" y="1905000"/>
+              <a:ext cx="1828800" cy="1828800"/>
+            </a:xfrm>
+            <a:prstGeom prst="ellipse">
+              <a:avLst/>
+            </a:prstGeom>
+            <a:solidFill>
+              <a:schemeClr val="accent1"/>
+            </a:solidFill>
+            <a:ln w="254000" cap="flat" cmpd="sng" algn="ctr">
+              <a:solidFill>
+                <a:srgbClr val="385D8A"/>
+              </a:solidFill>
+              <a:prstDash val="solid"/>
+              <a:round/>
+              <a:headEnd type="none" w="med" len="med"/>
+              <a:tailEnd type="none" w="med" len="med"/>
+            </a:ln>
+          </p:spPr>
+          <p:style>
+            <a:lnRef idx="2">
+              <a:schemeClr val="accent1">
+                <a:shade val="50000"/>
+              </a:schemeClr>
+            </a:lnRef>
+            <a:fillRef idx="1">
+              <a:schemeClr val="accent1"/>
+            </a:fillRef>
+            <a:effectRef idx="0">
+              <a:schemeClr val="accent1"/>
+            </a:effectRef>
+            <a:fontRef idx="minor">
+              <a:schemeClr val="lt1"/>
+            </a:fontRef>
+          </p:style>
+          <p:txBody>
+            <a:bodyPr rtlCol="0" anchor="ctr"/>
+            <a:lstStyle/>
+            <a:p>
+              <a:pPr algn="ctr"/>
+              <a:endParaRPr lang="en-US">
+                <a:solidFill>
+                  <a:srgbClr val="FFFFFF"/>
+                </a:solidFill>
+                <a:latin typeface="Calibri" panose="020F0502020204030204" pitchFamily="34" charset="0"/>
+              </a:endParaRPr>
+            </a:p>
+          </p:txBody>
+        </p:sp>
+      </p:grpSp>
+      <p:sp>
+        <p:nvSpPr>
+          <p:cNvPr id="6" name="Right Arrow 5"/>
+          <p:cNvSpPr/>
+          <p:nvPr/>
+        </p:nvSpPr>
+        <p:spPr>
+          <a:xfrm rot="18000000">
+            <a:off x="4930324" y="1741291"/>
+            <a:ext cx="3581400" cy="1066800"/>
+          </a:xfrm>
+          <a:prstGeom prst="rightArrow">
+            <a:avLst/>
+          </a:prstGeom>
+        </p:spPr>
+        <p:style>
+          <a:lnRef idx="2">
+            <a:schemeClr val="accent1">
+              <a:shade val="50000"/>
+            </a:schemeClr>
+          </a:lnRef>
+          <a:fillRef idx="1">
+            <a:schemeClr val="accent1"/>
+          </a:fillRef>
+          <a:effectRef idx="0">
+            <a:schemeClr val="accent1"/>
+          </a:effectRef>
+          <a:fontRef idx="minor">
+            <a:schemeClr val="lt1"/>
+          </a:fontRef>
+        </p:style>
+        <p:txBody>
+          <a:bodyPr rtlCol="0" anchor="ctr"/>
+          <a:lstStyle/>
+          <a:p>
+            <a:pPr algn="ctr"/>
+            <a:endParaRPr lang="en-US"/>
+          </a:p>
+        </p:txBody>
+      </p:sp>
+      <p:cxnSp>
+        <p:nvCxnSpPr>
+          <p:cNvPr id="8" name="Straight Connector 2"/>
+          <p:cNvCxnSpPr/>
+          <p:nvPr/>
+        </p:nvCxnSpPr>
+        <p:spPr>
+          <a:xfrm flipH="1">
+            <a:off x="4228011" y="5410200"/>
+            <a:ext cx="4572000" cy="0"/>
+          </a:xfrm>
+          <a:prstGeom prst="line">
+            <a:avLst/>
+          </a:prstGeom>
+          <a:ln w="254000" cap="flat" cmpd="sng" algn="ctr">
+            <a:solidFill>
+              <a:srgbClr val="FFFF00"/>
+            </a:solidFill>
+            <a:prstDash val="solid"/>
+            <a:round/>
+            <a:headEnd type="none" w="med" len="med"/>
+            <a:tailEnd type="none" w="med" len="med"/>
+          </a:ln>
+        </p:spPr>
+        <p:style>
+          <a:lnRef idx="1">
+            <a:schemeClr val="accent1"/>
+          </a:lnRef>
+          <a:fillRef idx="0">
+            <a:schemeClr val="accent1"/>
+          </a:fillRef>
+          <a:effectRef idx="0">
+            <a:schemeClr val="accent1"/>
+          </a:effectRef>
+          <a:fontRef idx="minor">
+            <a:schemeClr val="tx1"/>
+          </a:fontRef>
+        </p:style>
+      </p:cxnSp>
+    </p:spTree>
+    <p:extLst>
+      <p:ext uri="{BB962C8B-B14F-4D97-AF65-F5344CB8AC3E}">
+        <p14:creationId xmlns:p14="http://schemas.microsoft.com/office/powerpoint/2010/main" val="875146916"/>
+      </p:ext>
+    </p:extLst>
+  </p:cSld>
+  <p:clrMapOvr>
+    <a:masterClrMapping/>
+  </p:clrMapOvr>
+</p:sld>
+</file>
+
+<file path=ppt/slides/slide39.xml><?xml version="1.0" encoding="utf-8"?>
+<p:sld xmlns:a="http://schemas.openxmlformats.org/drawingml/2006/main" xmlns:r="http://schemas.openxmlformats.org/officeDocument/2006/relationships" xmlns:p="http://schemas.openxmlformats.org/presentationml/2006/main">
+  <p:cSld>
+    <p:spTree>
+      <p:nvGrpSpPr>
+        <p:cNvPr id="1" name=""/>
+        <p:cNvGrpSpPr/>
+        <p:nvPr/>
+      </p:nvGrpSpPr>
+      <p:grpSpPr>
+        <a:xfrm>
+          <a:off x="0" y="0"/>
+          <a:ext cx="0" cy="0"/>
+          <a:chOff x="0" y="0"/>
+          <a:chExt cx="0" cy="0"/>
+        </a:xfrm>
+      </p:grpSpPr>
+      <p:grpSp>
+        <p:nvGrpSpPr>
+          <p:cNvPr id="2" name="Group 1"/>
+          <p:cNvGrpSpPr/>
+          <p:nvPr/>
+        </p:nvGrpSpPr>
+        <p:grpSpPr>
+          <a:xfrm>
+            <a:off x="570411" y="1676400"/>
+            <a:ext cx="3657600" cy="2815972"/>
+            <a:chOff x="660392" y="917828"/>
+            <a:chExt cx="3657600" cy="2815972"/>
+          </a:xfrm>
+        </p:grpSpPr>
+        <p:sp>
+          <p:nvSpPr>
+            <p:cNvPr id="4" name="Rectangle 3"/>
+            <p:cNvSpPr/>
+            <p:nvPr/>
+          </p:nvSpPr>
+          <p:spPr>
+            <a:xfrm>
+              <a:off x="660392" y="917828"/>
+              <a:ext cx="1828800" cy="1219200"/>
+            </a:xfrm>
+            <a:prstGeom prst="rect">
+              <a:avLst/>
+            </a:prstGeom>
+            <a:solidFill>
+              <a:schemeClr val="accent1"/>
+            </a:solidFill>
+            <a:ln w="25400" cap="flat" cmpd="sng" algn="ctr">
+              <a:solidFill>
+                <a:schemeClr val="accent1"/>
+              </a:solidFill>
+              <a:prstDash val="solid"/>
+              <a:round/>
+              <a:headEnd type="none" w="med" len="med"/>
+              <a:tailEnd type="none" w="med" len="med"/>
+            </a:ln>
+          </p:spPr>
+          <p:style>
+            <a:lnRef idx="2">
+              <a:schemeClr val="accent1">
+                <a:shade val="50000"/>
+              </a:schemeClr>
+            </a:lnRef>
+            <a:fillRef idx="1">
+              <a:schemeClr val="accent1"/>
+            </a:fillRef>
+            <a:effectRef idx="0">
+              <a:schemeClr val="accent1"/>
+            </a:effectRef>
+            <a:fontRef idx="minor">
+              <a:schemeClr val="lt1"/>
+            </a:fontRef>
+          </p:style>
+          <p:txBody>
+            <a:bodyPr rtlCol="0" anchor="ctr"/>
+            <a:lstStyle/>
+            <a:p>
+              <a:pPr algn="ctr"/>
+              <a:endParaRPr lang="en-US">
+                <a:solidFill>
+                  <a:srgbClr val="FFFFFF"/>
+                </a:solidFill>
+                <a:latin typeface="Calibri" panose="020F0502020204030204" pitchFamily="34" charset="0"/>
+              </a:endParaRPr>
+            </a:p>
+          </p:txBody>
+        </p:sp>
+        <p:sp>
+          <p:nvSpPr>
+            <p:cNvPr id="7" name="CopyFrom"/>
+            <p:cNvSpPr/>
+            <p:nvPr/>
+          </p:nvSpPr>
+          <p:spPr>
+            <a:xfrm rot="18672083">
+              <a:off x="1574792" y="1413710"/>
+              <a:ext cx="1828800" cy="1219200"/>
+            </a:xfrm>
+            <a:prstGeom prst="rect">
+              <a:avLst/>
+            </a:prstGeom>
+            <a:solidFill>
+              <a:srgbClr val="FF0000"/>
+            </a:solidFill>
+          </p:spPr>
+          <p:style>
+            <a:lnRef idx="2">
+              <a:schemeClr val="accent1">
+                <a:shade val="50000"/>
+              </a:schemeClr>
+            </a:lnRef>
+            <a:fillRef idx="1">
+              <a:schemeClr val="accent1"/>
+            </a:fillRef>
+            <a:effectRef idx="0">
+              <a:schemeClr val="accent1"/>
+            </a:effectRef>
+            <a:fontRef idx="minor">
+              <a:schemeClr val="lt1"/>
+            </a:fontRef>
+          </p:style>
+          <p:txBody>
+            <a:bodyPr rtlCol="0" anchor="ctr"/>
+            <a:lstStyle/>
+            <a:p>
+              <a:pPr algn="ctr"/>
+              <a:endParaRPr lang="en-US"/>
+            </a:p>
+          </p:txBody>
+        </p:sp>
+        <p:sp>
+          <p:nvSpPr>
+            <p:cNvPr id="5" name="Oval 4"/>
+            <p:cNvSpPr/>
+            <p:nvPr/>
+          </p:nvSpPr>
+          <p:spPr>
+            <a:xfrm>
+              <a:off x="2489192" y="1905000"/>
+              <a:ext cx="1828800" cy="1828800"/>
+            </a:xfrm>
+            <a:prstGeom prst="ellipse">
+              <a:avLst/>
+            </a:prstGeom>
+            <a:ln w="254000">
+              <a:solidFill>
+                <a:srgbClr val="FFFF00"/>
+              </a:solidFill>
+            </a:ln>
+          </p:spPr>
+          <p:style>
+            <a:lnRef idx="2">
+              <a:schemeClr val="accent1">
+                <a:shade val="50000"/>
+              </a:schemeClr>
+            </a:lnRef>
+            <a:fillRef idx="1">
+              <a:schemeClr val="accent1"/>
+            </a:fillRef>
+            <a:effectRef idx="0">
+              <a:schemeClr val="accent1"/>
+            </a:effectRef>
+            <a:fontRef idx="minor">
+              <a:schemeClr val="lt1"/>
+            </a:fontRef>
+          </p:style>
+          <p:txBody>
+            <a:bodyPr rtlCol="0" anchor="ctr"/>
+            <a:lstStyle/>
+            <a:p>
+              <a:pPr algn="ctr"/>
+              <a:endParaRPr lang="en-US"/>
+            </a:p>
+          </p:txBody>
+        </p:sp>
+      </p:grpSp>
+      <p:sp>
+        <p:nvSpPr>
+          <p:cNvPr id="6" name="Right Arrow 5"/>
+          <p:cNvSpPr/>
+          <p:nvPr/>
+        </p:nvSpPr>
+        <p:spPr>
+          <a:xfrm rot="18000000">
+            <a:off x="4930324" y="1741291"/>
+            <a:ext cx="3581400" cy="1066800"/>
+          </a:xfrm>
+          <a:prstGeom prst="rightArrow">
+            <a:avLst/>
+          </a:prstGeom>
+        </p:spPr>
+        <p:style>
+          <a:lnRef idx="2">
+            <a:schemeClr val="accent1">
+              <a:shade val="50000"/>
+            </a:schemeClr>
+          </a:lnRef>
+          <a:fillRef idx="1">
+            <a:schemeClr val="accent1"/>
+          </a:fillRef>
+          <a:effectRef idx="0">
+            <a:schemeClr val="accent1"/>
+          </a:effectRef>
+          <a:fontRef idx="minor">
+            <a:schemeClr val="lt1"/>
+          </a:fontRef>
+        </p:style>
+        <p:txBody>
+          <a:bodyPr rtlCol="0" anchor="ctr"/>
+          <a:lstStyle/>
+          <a:p>
+            <a:pPr algn="ctr"/>
+            <a:endParaRPr lang="en-US"/>
+          </a:p>
+        </p:txBody>
+      </p:sp>
+      <p:cxnSp>
+        <p:nvCxnSpPr>
+          <p:cNvPr id="8" name="Straight Connector 2"/>
+          <p:cNvCxnSpPr/>
+          <p:nvPr/>
+        </p:nvCxnSpPr>
+        <p:spPr>
+          <a:xfrm flipH="1">
+            <a:off x="4228011" y="5410200"/>
+            <a:ext cx="4572000" cy="0"/>
+          </a:xfrm>
+          <a:prstGeom prst="line">
+            <a:avLst/>
+          </a:prstGeom>
+          <a:ln w="254000" cap="flat" cmpd="sng" algn="ctr">
+            <a:solidFill>
+              <a:srgbClr val="FFFF00"/>
+            </a:solidFill>
+            <a:prstDash val="solid"/>
+            <a:round/>
+            <a:headEnd type="none" w="med" len="med"/>
+            <a:tailEnd type="none" w="med" len="med"/>
+          </a:ln>
+        </p:spPr>
+        <p:style>
+          <a:lnRef idx="1">
+            <a:schemeClr val="accent1"/>
+          </a:lnRef>
+          <a:fillRef idx="0">
+            <a:schemeClr val="accent1"/>
+          </a:fillRef>
+          <a:effectRef idx="0">
+            <a:schemeClr val="accent1"/>
+          </a:effectRef>
+          <a:fontRef idx="minor">
+            <a:schemeClr val="tx1"/>
+          </a:fontRef>
+        </p:style>
+      </p:cxnSp>
+    </p:spTree>
+    <p:extLst>
+      <p:ext uri="{BB962C8B-B14F-4D97-AF65-F5344CB8AC3E}">
+        <p14:creationId xmlns:p14="http://schemas.microsoft.com/office/powerpoint/2010/main" val="2885983572"/>
       </p:ext>
     </p:extLst>
   </p:cSld>

</xml_diff>